<commit_message>
Adding powerpoint presentation and readme files
</commit_message>
<xml_diff>
--- a/Portland , Or Housing & Affordability.pptx
+++ b/Portland , Or Housing & Affordability.pptx
@@ -5,19 +5,23 @@
     <p:sldMasterId id="2147483648" r:id="rId1"/>
   </p:sldMasterIdLst>
   <p:notesMasterIdLst>
-    <p:notesMasterId r:id="rId12"/>
+    <p:notesMasterId r:id="rId16"/>
   </p:notesMasterIdLst>
   <p:sldIdLst>
     <p:sldId id="256" r:id="rId2"/>
     <p:sldId id="257" r:id="rId3"/>
-    <p:sldId id="258" r:id="rId4"/>
-    <p:sldId id="259" r:id="rId5"/>
-    <p:sldId id="265" r:id="rId6"/>
-    <p:sldId id="260" r:id="rId7"/>
-    <p:sldId id="261" r:id="rId8"/>
-    <p:sldId id="262" r:id="rId9"/>
-    <p:sldId id="263" r:id="rId10"/>
-    <p:sldId id="264" r:id="rId11"/>
+    <p:sldId id="263" r:id="rId4"/>
+    <p:sldId id="267" r:id="rId5"/>
+    <p:sldId id="260" r:id="rId6"/>
+    <p:sldId id="266" r:id="rId7"/>
+    <p:sldId id="259" r:id="rId8"/>
+    <p:sldId id="258" r:id="rId9"/>
+    <p:sldId id="265" r:id="rId10"/>
+    <p:sldId id="269" r:id="rId11"/>
+    <p:sldId id="262" r:id="rId12"/>
+    <p:sldId id="268" r:id="rId13"/>
+    <p:sldId id="264" r:id="rId14"/>
+    <p:sldId id="270" r:id="rId15"/>
   </p:sldIdLst>
   <p:sldSz cx="12192000" cy="6858000"/>
   <p:notesSz cx="6858000" cy="9144000"/>
@@ -128,12 +132,543 @@
 <p1510:revInfo xmlns:a="http://schemas.openxmlformats.org/drawingml/2006/main" xmlns:r="http://schemas.openxmlformats.org/officeDocument/2006/relationships" xmlns:p1510="http://schemas.microsoft.com/office/powerpoint/2015/10/main">
   <p1510:revLst>
     <p1510:client id="{6C13EF49-7177-4324-9067-B7991CF0F0BE}" v="7" dt="2025-02-04T02:08:26.941"/>
+    <p1510:client id="{D8EC7A79-B977-4C69-BE6D-C41EAF22F477}" v="43" dt="2025-02-04T04:49:53.895"/>
   </p1510:revLst>
 </p1510:revInfo>
 </file>
 
 <file path=ppt/changesInfos/changesInfo1.xml><?xml version="1.0" encoding="utf-8"?>
 <pc:chgInfo xmlns:a="http://schemas.openxmlformats.org/drawingml/2006/main" xmlns:r="http://schemas.openxmlformats.org/officeDocument/2006/relationships" xmlns:ac="http://schemas.microsoft.com/office/drawing/2013/main/command" xmlns:pc="http://schemas.microsoft.com/office/powerpoint/2013/main/command">
+  <pc:docChgLst>
+    <pc:chgData name="Tiki tiki" userId="9b95eec42b947e32" providerId="LiveId" clId="{D8EC7A79-B977-4C69-BE6D-C41EAF22F477}"/>
+    <pc:docChg chg="undo custSel addSld delSld modSld sldOrd">
+      <pc:chgData name="Tiki tiki" userId="9b95eec42b947e32" providerId="LiveId" clId="{D8EC7A79-B977-4C69-BE6D-C41EAF22F477}" dt="2025-02-04T05:16:14.659" v="331" actId="680"/>
+      <pc:docMkLst>
+        <pc:docMk/>
+      </pc:docMkLst>
+      <pc:sldChg chg="addSp delSp modSp mod modMedia setBg addAnim delAnim setClrOvrMap">
+        <pc:chgData name="Tiki tiki" userId="9b95eec42b947e32" providerId="LiveId" clId="{D8EC7A79-B977-4C69-BE6D-C41EAF22F477}" dt="2025-02-04T04:19:22.213" v="67" actId="478"/>
+        <pc:sldMkLst>
+          <pc:docMk/>
+          <pc:sldMk cId="2269157965" sldId="256"/>
+        </pc:sldMkLst>
+        <pc:spChg chg="mod">
+          <ac:chgData name="Tiki tiki" userId="9b95eec42b947e32" providerId="LiveId" clId="{D8EC7A79-B977-4C69-BE6D-C41EAF22F477}" dt="2025-02-04T04:19:19.837" v="66" actId="20577"/>
+          <ac:spMkLst>
+            <pc:docMk/>
+            <pc:sldMk cId="2269157965" sldId="256"/>
+            <ac:spMk id="2" creationId="{7EDDCCF4-08DE-E4E3-7D16-87B58569D53A}"/>
+          </ac:spMkLst>
+        </pc:spChg>
+        <pc:spChg chg="del mod">
+          <ac:chgData name="Tiki tiki" userId="9b95eec42b947e32" providerId="LiveId" clId="{D8EC7A79-B977-4C69-BE6D-C41EAF22F477}" dt="2025-02-04T04:19:22.213" v="67" actId="478"/>
+          <ac:spMkLst>
+            <pc:docMk/>
+            <pc:sldMk cId="2269157965" sldId="256"/>
+            <ac:spMk id="3" creationId="{D3692CC7-B6C8-90A5-B9E5-09CFB8E7C299}"/>
+          </ac:spMkLst>
+        </pc:spChg>
+        <pc:spChg chg="add">
+          <ac:chgData name="Tiki tiki" userId="9b95eec42b947e32" providerId="LiveId" clId="{D8EC7A79-B977-4C69-BE6D-C41EAF22F477}" dt="2025-02-04T04:19:09.570" v="53" actId="26606"/>
+          <ac:spMkLst>
+            <pc:docMk/>
+            <pc:sldMk cId="2269157965" sldId="256"/>
+            <ac:spMk id="6" creationId="{71B2258F-86CA-4D4D-8270-BC05FCDEBFB3}"/>
+          </ac:spMkLst>
+        </pc:spChg>
+        <pc:spChg chg="add del">
+          <ac:chgData name="Tiki tiki" userId="9b95eec42b947e32" providerId="LiveId" clId="{D8EC7A79-B977-4C69-BE6D-C41EAF22F477}" dt="2025-02-04T04:16:19.571" v="23" actId="26606"/>
+          <ac:spMkLst>
+            <pc:docMk/>
+            <pc:sldMk cId="2269157965" sldId="256"/>
+            <ac:spMk id="8" creationId="{6F5A5072-7B47-4D32-B52A-4EBBF590B8A5}"/>
+          </ac:spMkLst>
+        </pc:spChg>
+        <pc:spChg chg="add del">
+          <ac:chgData name="Tiki tiki" userId="9b95eec42b947e32" providerId="LiveId" clId="{D8EC7A79-B977-4C69-BE6D-C41EAF22F477}" dt="2025-02-04T04:16:03.569" v="17" actId="26606"/>
+          <ac:spMkLst>
+            <pc:docMk/>
+            <pc:sldMk cId="2269157965" sldId="256"/>
+            <ac:spMk id="9" creationId="{6F828D28-8E09-41CC-8229-3070B5467A96}"/>
+          </ac:spMkLst>
+        </pc:spChg>
+        <pc:spChg chg="add del">
+          <ac:chgData name="Tiki tiki" userId="9b95eec42b947e32" providerId="LiveId" clId="{D8EC7A79-B977-4C69-BE6D-C41EAF22F477}" dt="2025-02-04T04:16:19.571" v="23" actId="26606"/>
+          <ac:spMkLst>
+            <pc:docMk/>
+            <pc:sldMk cId="2269157965" sldId="256"/>
+            <ac:spMk id="10" creationId="{9715DAF0-AE1B-46C9-8A6B-DB2AA05AB91D}"/>
+          </ac:spMkLst>
+        </pc:spChg>
+        <pc:spChg chg="add del">
+          <ac:chgData name="Tiki tiki" userId="9b95eec42b947e32" providerId="LiveId" clId="{D8EC7A79-B977-4C69-BE6D-C41EAF22F477}" dt="2025-02-04T04:16:03.569" v="17" actId="26606"/>
+          <ac:spMkLst>
+            <pc:docMk/>
+            <pc:sldMk cId="2269157965" sldId="256"/>
+            <ac:spMk id="11" creationId="{D5B012D8-7F27-4758-9AC6-C889B154BD73}"/>
+          </ac:spMkLst>
+        </pc:spChg>
+        <pc:spChg chg="add del">
+          <ac:chgData name="Tiki tiki" userId="9b95eec42b947e32" providerId="LiveId" clId="{D8EC7A79-B977-4C69-BE6D-C41EAF22F477}" dt="2025-02-04T04:16:19.571" v="23" actId="26606"/>
+          <ac:spMkLst>
+            <pc:docMk/>
+            <pc:sldMk cId="2269157965" sldId="256"/>
+            <ac:spMk id="12" creationId="{6016219D-510E-4184-9090-6D5578A87BD1}"/>
+          </ac:spMkLst>
+        </pc:spChg>
+        <pc:spChg chg="add del">
+          <ac:chgData name="Tiki tiki" userId="9b95eec42b947e32" providerId="LiveId" clId="{D8EC7A79-B977-4C69-BE6D-C41EAF22F477}" dt="2025-02-04T04:16:03.569" v="17" actId="26606"/>
+          <ac:spMkLst>
+            <pc:docMk/>
+            <pc:sldMk cId="2269157965" sldId="256"/>
+            <ac:spMk id="13" creationId="{4063B759-00FC-46D1-9898-8E8625268FAF}"/>
+          </ac:spMkLst>
+        </pc:spChg>
+        <pc:spChg chg="add del">
+          <ac:chgData name="Tiki tiki" userId="9b95eec42b947e32" providerId="LiveId" clId="{D8EC7A79-B977-4C69-BE6D-C41EAF22F477}" dt="2025-02-04T04:16:19.571" v="23" actId="26606"/>
+          <ac:spMkLst>
+            <pc:docMk/>
+            <pc:sldMk cId="2269157965" sldId="256"/>
+            <ac:spMk id="14" creationId="{AFF4A713-7B75-4B21-90D7-5AB19547C728}"/>
+          </ac:spMkLst>
+        </pc:spChg>
+        <pc:spChg chg="add del">
+          <ac:chgData name="Tiki tiki" userId="9b95eec42b947e32" providerId="LiveId" clId="{D8EC7A79-B977-4C69-BE6D-C41EAF22F477}" dt="2025-02-04T04:16:18.200" v="20" actId="26606"/>
+          <ac:spMkLst>
+            <pc:docMk/>
+            <pc:sldMk cId="2269157965" sldId="256"/>
+            <ac:spMk id="15" creationId="{71B2258F-86CA-4D4D-8270-BC05FCDEBFB3}"/>
+          </ac:spMkLst>
+        </pc:spChg>
+        <pc:spChg chg="add del">
+          <ac:chgData name="Tiki tiki" userId="9b95eec42b947e32" providerId="LiveId" clId="{D8EC7A79-B977-4C69-BE6D-C41EAF22F477}" dt="2025-02-04T04:16:19.571" v="23" actId="26606"/>
+          <ac:spMkLst>
+            <pc:docMk/>
+            <pc:sldMk cId="2269157965" sldId="256"/>
+            <ac:spMk id="18" creationId="{C29501E6-A978-4A61-9689-9085AF97A53A}"/>
+          </ac:spMkLst>
+        </pc:spChg>
+        <pc:spChg chg="add del">
+          <ac:chgData name="Tiki tiki" userId="9b95eec42b947e32" providerId="LiveId" clId="{D8EC7A79-B977-4C69-BE6D-C41EAF22F477}" dt="2025-02-04T04:16:19.571" v="23" actId="26606"/>
+          <ac:spMkLst>
+            <pc:docMk/>
+            <pc:sldMk cId="2269157965" sldId="256"/>
+            <ac:spMk id="19" creationId="{DC631C0B-6DA6-4E57-8231-CE32B3434A7E}"/>
+          </ac:spMkLst>
+        </pc:spChg>
+        <pc:spChg chg="add del">
+          <ac:chgData name="Tiki tiki" userId="9b95eec42b947e32" providerId="LiveId" clId="{D8EC7A79-B977-4C69-BE6D-C41EAF22F477}" dt="2025-02-04T04:18:50.997" v="40" actId="26606"/>
+          <ac:spMkLst>
+            <pc:docMk/>
+            <pc:sldMk cId="2269157965" sldId="256"/>
+            <ac:spMk id="21" creationId="{71B2258F-86CA-4D4D-8270-BC05FCDEBFB3}"/>
+          </ac:spMkLst>
+        </pc:spChg>
+        <pc:picChg chg="add del mod">
+          <ac:chgData name="Tiki tiki" userId="9b95eec42b947e32" providerId="LiveId" clId="{D8EC7A79-B977-4C69-BE6D-C41EAF22F477}" dt="2025-02-04T04:16:03.569" v="17" actId="26606"/>
+          <ac:picMkLst>
+            <pc:docMk/>
+            <pc:sldMk cId="2269157965" sldId="256"/>
+            <ac:picMk id="5" creationId="{F83D8897-8273-3FAE-54E0-3967FB990DE2}"/>
+          </ac:picMkLst>
+        </pc:picChg>
+        <pc:picChg chg="add">
+          <ac:chgData name="Tiki tiki" userId="9b95eec42b947e32" providerId="LiveId" clId="{D8EC7A79-B977-4C69-BE6D-C41EAF22F477}" dt="2025-02-04T04:19:09.570" v="53" actId="26606"/>
+          <ac:picMkLst>
+            <pc:docMk/>
+            <pc:sldMk cId="2269157965" sldId="256"/>
+            <ac:picMk id="7" creationId="{BD7E12CC-B2D6-B296-779C-335FEEF4C0CE}"/>
+          </ac:picMkLst>
+        </pc:picChg>
+        <pc:picChg chg="add del">
+          <ac:chgData name="Tiki tiki" userId="9b95eec42b947e32" providerId="LiveId" clId="{D8EC7A79-B977-4C69-BE6D-C41EAF22F477}" dt="2025-02-04T04:16:18.200" v="20" actId="26606"/>
+          <ac:picMkLst>
+            <pc:docMk/>
+            <pc:sldMk cId="2269157965" sldId="256"/>
+            <ac:picMk id="16" creationId="{D7209A65-D967-791B-C649-D7151F58D0D6}"/>
+          </ac:picMkLst>
+        </pc:picChg>
+        <pc:picChg chg="add del">
+          <ac:chgData name="Tiki tiki" userId="9b95eec42b947e32" providerId="LiveId" clId="{D8EC7A79-B977-4C69-BE6D-C41EAF22F477}" dt="2025-02-04T04:18:50.997" v="40" actId="26606"/>
+          <ac:picMkLst>
+            <pc:docMk/>
+            <pc:sldMk cId="2269157965" sldId="256"/>
+            <ac:picMk id="22" creationId="{D7209A65-D967-791B-C649-D7151F58D0D6}"/>
+          </ac:picMkLst>
+        </pc:picChg>
+      </pc:sldChg>
+      <pc:sldChg chg="modSp mod">
+        <pc:chgData name="Tiki tiki" userId="9b95eec42b947e32" providerId="LiveId" clId="{D8EC7A79-B977-4C69-BE6D-C41EAF22F477}" dt="2025-02-04T04:13:52.083" v="13" actId="20577"/>
+        <pc:sldMkLst>
+          <pc:docMk/>
+          <pc:sldMk cId="2844210991" sldId="257"/>
+        </pc:sldMkLst>
+        <pc:spChg chg="mod">
+          <ac:chgData name="Tiki tiki" userId="9b95eec42b947e32" providerId="LiveId" clId="{D8EC7A79-B977-4C69-BE6D-C41EAF22F477}" dt="2025-02-04T04:13:52.083" v="13" actId="20577"/>
+          <ac:spMkLst>
+            <pc:docMk/>
+            <pc:sldMk cId="2844210991" sldId="257"/>
+            <ac:spMk id="8" creationId="{595FA538-9A69-EEFC-1862-46CD0E7DD5B1}"/>
+          </ac:spMkLst>
+        </pc:spChg>
+      </pc:sldChg>
+      <pc:sldChg chg="addSp delSp modSp mod ord">
+        <pc:chgData name="Tiki tiki" userId="9b95eec42b947e32" providerId="LiveId" clId="{D8EC7A79-B977-4C69-BE6D-C41EAF22F477}" dt="2025-02-04T04:50:11.991" v="324" actId="1076"/>
+        <pc:sldMkLst>
+          <pc:docMk/>
+          <pc:sldMk cId="1863822752" sldId="258"/>
+        </pc:sldMkLst>
+        <pc:spChg chg="add del mod">
+          <ac:chgData name="Tiki tiki" userId="9b95eec42b947e32" providerId="LiveId" clId="{D8EC7A79-B977-4C69-BE6D-C41EAF22F477}" dt="2025-02-04T04:32:09.991" v="94"/>
+          <ac:spMkLst>
+            <pc:docMk/>
+            <pc:sldMk cId="1863822752" sldId="258"/>
+            <ac:spMk id="2" creationId="{83BD14DC-BCE0-C6EE-F203-F0BE716033C7}"/>
+          </ac:spMkLst>
+        </pc:spChg>
+        <pc:spChg chg="add mod">
+          <ac:chgData name="Tiki tiki" userId="9b95eec42b947e32" providerId="LiveId" clId="{D8EC7A79-B977-4C69-BE6D-C41EAF22F477}" dt="2025-02-04T04:50:11.991" v="324" actId="1076"/>
+          <ac:spMkLst>
+            <pc:docMk/>
+            <pc:sldMk cId="1863822752" sldId="258"/>
+            <ac:spMk id="3" creationId="{DF42CABA-238A-7DD6-06E6-929C3E195D18}"/>
+          </ac:spMkLst>
+        </pc:spChg>
+        <pc:spChg chg="add del mod">
+          <ac:chgData name="Tiki tiki" userId="9b95eec42b947e32" providerId="LiveId" clId="{D8EC7A79-B977-4C69-BE6D-C41EAF22F477}" dt="2025-02-04T04:49:53.894" v="317"/>
+          <ac:spMkLst>
+            <pc:docMk/>
+            <pc:sldMk cId="1863822752" sldId="258"/>
+            <ac:spMk id="6" creationId="{D8352586-51FF-5CEE-084E-99C89242C0CB}"/>
+          </ac:spMkLst>
+        </pc:spChg>
+        <pc:picChg chg="del mod">
+          <ac:chgData name="Tiki tiki" userId="9b95eec42b947e32" providerId="LiveId" clId="{D8EC7A79-B977-4C69-BE6D-C41EAF22F477}" dt="2025-02-04T04:49:51.697" v="316" actId="478"/>
+          <ac:picMkLst>
+            <pc:docMk/>
+            <pc:sldMk cId="1863822752" sldId="258"/>
+            <ac:picMk id="5" creationId="{617C7B46-B1B8-A4CB-99EA-0FF60A6E5535}"/>
+          </ac:picMkLst>
+        </pc:picChg>
+        <pc:picChg chg="add mod">
+          <ac:chgData name="Tiki tiki" userId="9b95eec42b947e32" providerId="LiveId" clId="{D8EC7A79-B977-4C69-BE6D-C41EAF22F477}" dt="2025-02-04T04:50:08.798" v="323" actId="14100"/>
+          <ac:picMkLst>
+            <pc:docMk/>
+            <pc:sldMk cId="1863822752" sldId="258"/>
+            <ac:picMk id="8" creationId="{6E7615B2-4699-60F9-F26B-5DB17B495F4B}"/>
+          </ac:picMkLst>
+        </pc:picChg>
+      </pc:sldChg>
+      <pc:sldChg chg="addSp delSp modSp mod ord">
+        <pc:chgData name="Tiki tiki" userId="9b95eec42b947e32" providerId="LiveId" clId="{D8EC7A79-B977-4C69-BE6D-C41EAF22F477}" dt="2025-02-04T04:33:31.016" v="118" actId="20577"/>
+        <pc:sldMkLst>
+          <pc:docMk/>
+          <pc:sldMk cId="235427710" sldId="259"/>
+        </pc:sldMkLst>
+        <pc:spChg chg="del">
+          <ac:chgData name="Tiki tiki" userId="9b95eec42b947e32" providerId="LiveId" clId="{D8EC7A79-B977-4C69-BE6D-C41EAF22F477}" dt="2025-02-04T04:32:34.673" v="100" actId="478"/>
+          <ac:spMkLst>
+            <pc:docMk/>
+            <pc:sldMk cId="235427710" sldId="259"/>
+            <ac:spMk id="2" creationId="{843E137E-4A23-0D22-6AA9-E5183F9582DA}"/>
+          </ac:spMkLst>
+        </pc:spChg>
+        <pc:spChg chg="add del mod">
+          <ac:chgData name="Tiki tiki" userId="9b95eec42b947e32" providerId="LiveId" clId="{D8EC7A79-B977-4C69-BE6D-C41EAF22F477}" dt="2025-02-04T04:32:42.272" v="105"/>
+          <ac:spMkLst>
+            <pc:docMk/>
+            <pc:sldMk cId="235427710" sldId="259"/>
+            <ac:spMk id="3" creationId="{49C3B6D5-EA4D-FFBF-A661-6CF95DA3A0C0}"/>
+          </ac:spMkLst>
+        </pc:spChg>
+        <pc:spChg chg="add mod">
+          <ac:chgData name="Tiki tiki" userId="9b95eec42b947e32" providerId="LiveId" clId="{D8EC7A79-B977-4C69-BE6D-C41EAF22F477}" dt="2025-02-04T04:33:31.016" v="118" actId="20577"/>
+          <ac:spMkLst>
+            <pc:docMk/>
+            <pc:sldMk cId="235427710" sldId="259"/>
+            <ac:spMk id="4" creationId="{F8D63D7D-4DE1-BE6D-F655-CEEBE6F59983}"/>
+          </ac:spMkLst>
+        </pc:spChg>
+      </pc:sldChg>
+      <pc:sldChg chg="addSp delSp modSp mod ord">
+        <pc:chgData name="Tiki tiki" userId="9b95eec42b947e32" providerId="LiveId" clId="{D8EC7A79-B977-4C69-BE6D-C41EAF22F477}" dt="2025-02-04T04:52:34.263" v="330" actId="20577"/>
+        <pc:sldMkLst>
+          <pc:docMk/>
+          <pc:sldMk cId="1343469666" sldId="260"/>
+        </pc:sldMkLst>
+        <pc:spChg chg="del mod">
+          <ac:chgData name="Tiki tiki" userId="9b95eec42b947e32" providerId="LiveId" clId="{D8EC7A79-B977-4C69-BE6D-C41EAF22F477}" dt="2025-02-04T04:44:47.244" v="314" actId="478"/>
+          <ac:spMkLst>
+            <pc:docMk/>
+            <pc:sldMk cId="1343469666" sldId="260"/>
+            <ac:spMk id="10" creationId="{8A4003E8-2697-1BA5-0063-30BBFCD098AB}"/>
+          </ac:spMkLst>
+        </pc:spChg>
+        <pc:spChg chg="mod">
+          <ac:chgData name="Tiki tiki" userId="9b95eec42b947e32" providerId="LiveId" clId="{D8EC7A79-B977-4C69-BE6D-C41EAF22F477}" dt="2025-02-04T04:52:34.263" v="330" actId="20577"/>
+          <ac:spMkLst>
+            <pc:docMk/>
+            <pc:sldMk cId="1343469666" sldId="260"/>
+            <ac:spMk id="11" creationId="{7D751BA9-8535-6D9F-1DED-47A6BB8E3499}"/>
+          </ac:spMkLst>
+        </pc:spChg>
+        <pc:spChg chg="del">
+          <ac:chgData name="Tiki tiki" userId="9b95eec42b947e32" providerId="LiveId" clId="{D8EC7A79-B977-4C69-BE6D-C41EAF22F477}" dt="2025-02-04T04:44:38.456" v="313" actId="26606"/>
+          <ac:spMkLst>
+            <pc:docMk/>
+            <pc:sldMk cId="1343469666" sldId="260"/>
+            <ac:spMk id="29" creationId="{FFB60E8C-7224-44A4-87A0-46A1711DD2ED}"/>
+          </ac:spMkLst>
+        </pc:spChg>
+        <pc:spChg chg="del">
+          <ac:chgData name="Tiki tiki" userId="9b95eec42b947e32" providerId="LiveId" clId="{D8EC7A79-B977-4C69-BE6D-C41EAF22F477}" dt="2025-02-04T04:44:38.456" v="313" actId="26606"/>
+          <ac:spMkLst>
+            <pc:docMk/>
+            <pc:sldMk cId="1343469666" sldId="260"/>
+            <ac:spMk id="33" creationId="{E659831F-0D9A-4C63-9EBB-8435B85A440F}"/>
+          </ac:spMkLst>
+        </pc:spChg>
+        <pc:spChg chg="del">
+          <ac:chgData name="Tiki tiki" userId="9b95eec42b947e32" providerId="LiveId" clId="{D8EC7A79-B977-4C69-BE6D-C41EAF22F477}" dt="2025-02-04T04:44:38.456" v="313" actId="26606"/>
+          <ac:spMkLst>
+            <pc:docMk/>
+            <pc:sldMk cId="1343469666" sldId="260"/>
+            <ac:spMk id="35" creationId="{5A55FBCD-CD42-40F5-8A1B-3203F9CAEEAA}"/>
+          </ac:spMkLst>
+        </pc:spChg>
+        <pc:spChg chg="add">
+          <ac:chgData name="Tiki tiki" userId="9b95eec42b947e32" providerId="LiveId" clId="{D8EC7A79-B977-4C69-BE6D-C41EAF22F477}" dt="2025-02-04T04:44:38.456" v="313" actId="26606"/>
+          <ac:spMkLst>
+            <pc:docMk/>
+            <pc:sldMk cId="1343469666" sldId="260"/>
+            <ac:spMk id="40" creationId="{3756B343-807D-456E-AA26-80E96B75D13B}"/>
+          </ac:spMkLst>
+        </pc:spChg>
+        <pc:spChg chg="add">
+          <ac:chgData name="Tiki tiki" userId="9b95eec42b947e32" providerId="LiveId" clId="{D8EC7A79-B977-4C69-BE6D-C41EAF22F477}" dt="2025-02-04T04:44:38.456" v="313" actId="26606"/>
+          <ac:spMkLst>
+            <pc:docMk/>
+            <pc:sldMk cId="1343469666" sldId="260"/>
+            <ac:spMk id="42" creationId="{08980754-6F4B-43C9-B9BE-127B6BED6586}"/>
+          </ac:spMkLst>
+        </pc:spChg>
+        <pc:spChg chg="add">
+          <ac:chgData name="Tiki tiki" userId="9b95eec42b947e32" providerId="LiveId" clId="{D8EC7A79-B977-4C69-BE6D-C41EAF22F477}" dt="2025-02-04T04:44:38.456" v="313" actId="26606"/>
+          <ac:spMkLst>
+            <pc:docMk/>
+            <pc:sldMk cId="1343469666" sldId="260"/>
+            <ac:spMk id="44" creationId="{2C1BBA94-3F40-40AA-8BB9-E69E25E537C1}"/>
+          </ac:spMkLst>
+        </pc:spChg>
+        <pc:spChg chg="add">
+          <ac:chgData name="Tiki tiki" userId="9b95eec42b947e32" providerId="LiveId" clId="{D8EC7A79-B977-4C69-BE6D-C41EAF22F477}" dt="2025-02-04T04:44:38.456" v="313" actId="26606"/>
+          <ac:spMkLst>
+            <pc:docMk/>
+            <pc:sldMk cId="1343469666" sldId="260"/>
+            <ac:spMk id="46" creationId="{169CC832-2974-4E8D-90ED-3E2941BA7336}"/>
+          </ac:spMkLst>
+        </pc:spChg>
+        <pc:spChg chg="add">
+          <ac:chgData name="Tiki tiki" userId="9b95eec42b947e32" providerId="LiveId" clId="{D8EC7A79-B977-4C69-BE6D-C41EAF22F477}" dt="2025-02-04T04:44:38.456" v="313" actId="26606"/>
+          <ac:spMkLst>
+            <pc:docMk/>
+            <pc:sldMk cId="1343469666" sldId="260"/>
+            <ac:spMk id="48" creationId="{55222F96-971A-4F90-B841-6BAB416C7AC1}"/>
+          </ac:spMkLst>
+        </pc:spChg>
+      </pc:sldChg>
+      <pc:sldChg chg="del">
+        <pc:chgData name="Tiki tiki" userId="9b95eec42b947e32" providerId="LiveId" clId="{D8EC7A79-B977-4C69-BE6D-C41EAF22F477}" dt="2025-02-04T04:12:33.086" v="1" actId="47"/>
+        <pc:sldMkLst>
+          <pc:docMk/>
+          <pc:sldMk cId="2065721054" sldId="261"/>
+        </pc:sldMkLst>
+      </pc:sldChg>
+      <pc:sldChg chg="ord">
+        <pc:chgData name="Tiki tiki" userId="9b95eec42b947e32" providerId="LiveId" clId="{D8EC7A79-B977-4C69-BE6D-C41EAF22F477}" dt="2025-02-04T04:21:11.928" v="71"/>
+        <pc:sldMkLst>
+          <pc:docMk/>
+          <pc:sldMk cId="419163453" sldId="262"/>
+        </pc:sldMkLst>
+      </pc:sldChg>
+      <pc:sldChg chg="addSp delSp modSp mod ord">
+        <pc:chgData name="Tiki tiki" userId="9b95eec42b947e32" providerId="LiveId" clId="{D8EC7A79-B977-4C69-BE6D-C41EAF22F477}" dt="2025-02-04T04:37:37.581" v="235" actId="14100"/>
+        <pc:sldMkLst>
+          <pc:docMk/>
+          <pc:sldMk cId="1289324827" sldId="263"/>
+        </pc:sldMkLst>
+        <pc:spChg chg="add del mod">
+          <ac:chgData name="Tiki tiki" userId="9b95eec42b947e32" providerId="LiveId" clId="{D8EC7A79-B977-4C69-BE6D-C41EAF22F477}" dt="2025-02-04T04:33:54.676" v="122"/>
+          <ac:spMkLst>
+            <pc:docMk/>
+            <pc:sldMk cId="1289324827" sldId="263"/>
+            <ac:spMk id="2" creationId="{35891D4E-DE04-6D39-CD86-7C53BDF0F124}"/>
+          </ac:spMkLst>
+        </pc:spChg>
+        <pc:spChg chg="add mod">
+          <ac:chgData name="Tiki tiki" userId="9b95eec42b947e32" providerId="LiveId" clId="{D8EC7A79-B977-4C69-BE6D-C41EAF22F477}" dt="2025-02-04T04:36:00.059" v="224" actId="1076"/>
+          <ac:spMkLst>
+            <pc:docMk/>
+            <pc:sldMk cId="1289324827" sldId="263"/>
+            <ac:spMk id="3" creationId="{F04BB51C-C235-7BD5-7638-5AD75E9598B2}"/>
+          </ac:spMkLst>
+        </pc:spChg>
+        <pc:spChg chg="add mod">
+          <ac:chgData name="Tiki tiki" userId="9b95eec42b947e32" providerId="LiveId" clId="{D8EC7A79-B977-4C69-BE6D-C41EAF22F477}" dt="2025-02-04T04:37:37.581" v="235" actId="14100"/>
+          <ac:spMkLst>
+            <pc:docMk/>
+            <pc:sldMk cId="1289324827" sldId="263"/>
+            <ac:spMk id="4" creationId="{2206C14A-2054-D4B9-E52E-B3CFAFE461F2}"/>
+          </ac:spMkLst>
+        </pc:spChg>
+        <pc:picChg chg="mod">
+          <ac:chgData name="Tiki tiki" userId="9b95eec42b947e32" providerId="LiveId" clId="{D8EC7A79-B977-4C69-BE6D-C41EAF22F477}" dt="2025-02-04T04:37:29.641" v="233" actId="14100"/>
+          <ac:picMkLst>
+            <pc:docMk/>
+            <pc:sldMk cId="1289324827" sldId="263"/>
+            <ac:picMk id="5" creationId="{A6172785-CFD4-8967-EAAD-649AC6E17754}"/>
+          </ac:picMkLst>
+        </pc:picChg>
+      </pc:sldChg>
+      <pc:sldChg chg="addSp delSp modSp new mod ord">
+        <pc:chgData name="Tiki tiki" userId="9b95eec42b947e32" providerId="LiveId" clId="{D8EC7A79-B977-4C69-BE6D-C41EAF22F477}" dt="2025-02-04T04:44:17.983" v="312" actId="1076"/>
+        <pc:sldMkLst>
+          <pc:docMk/>
+          <pc:sldMk cId="356397702" sldId="265"/>
+        </pc:sldMkLst>
+        <pc:spChg chg="del">
+          <ac:chgData name="Tiki tiki" userId="9b95eec42b947e32" providerId="LiveId" clId="{D8EC7A79-B977-4C69-BE6D-C41EAF22F477}" dt="2025-02-04T04:13:27.441" v="8" actId="478"/>
+          <ac:spMkLst>
+            <pc:docMk/>
+            <pc:sldMk cId="356397702" sldId="265"/>
+            <ac:spMk id="2" creationId="{E4738D16-65F1-1D46-2147-9A2D46D6F0A5}"/>
+          </ac:spMkLst>
+        </pc:spChg>
+        <pc:spChg chg="del">
+          <ac:chgData name="Tiki tiki" userId="9b95eec42b947e32" providerId="LiveId" clId="{D8EC7A79-B977-4C69-BE6D-C41EAF22F477}" dt="2025-02-04T04:13:26.264" v="7" actId="478"/>
+          <ac:spMkLst>
+            <pc:docMk/>
+            <pc:sldMk cId="356397702" sldId="265"/>
+            <ac:spMk id="3" creationId="{5262E0F4-6F22-2365-E407-3322CF4223DF}"/>
+          </ac:spMkLst>
+        </pc:spChg>
+        <pc:spChg chg="add mod">
+          <ac:chgData name="Tiki tiki" userId="9b95eec42b947e32" providerId="LiveId" clId="{D8EC7A79-B977-4C69-BE6D-C41EAF22F477}" dt="2025-02-04T04:44:17.983" v="312" actId="1076"/>
+          <ac:spMkLst>
+            <pc:docMk/>
+            <pc:sldMk cId="356397702" sldId="265"/>
+            <ac:spMk id="6" creationId="{4654BB0E-8D52-640B-14DD-43C06CBA4E72}"/>
+          </ac:spMkLst>
+        </pc:spChg>
+        <pc:picChg chg="add mod">
+          <ac:chgData name="Tiki tiki" userId="9b95eec42b947e32" providerId="LiveId" clId="{D8EC7A79-B977-4C69-BE6D-C41EAF22F477}" dt="2025-02-04T04:44:04.685" v="308" actId="1076"/>
+          <ac:picMkLst>
+            <pc:docMk/>
+            <pc:sldMk cId="356397702" sldId="265"/>
+            <ac:picMk id="5" creationId="{E0509358-5B43-2852-0EA8-472480413938}"/>
+          </ac:picMkLst>
+        </pc:picChg>
+      </pc:sldChg>
+      <pc:sldChg chg="del">
+        <pc:chgData name="Tiki tiki" userId="9b95eec42b947e32" providerId="LiveId" clId="{D8EC7A79-B977-4C69-BE6D-C41EAF22F477}" dt="2025-02-04T04:12:19.785" v="0" actId="47"/>
+        <pc:sldMkLst>
+          <pc:docMk/>
+          <pc:sldMk cId="3673177090" sldId="265"/>
+        </pc:sldMkLst>
+      </pc:sldChg>
+      <pc:sldChg chg="modSp new mod ord">
+        <pc:chgData name="Tiki tiki" userId="9b95eec42b947e32" providerId="LiveId" clId="{D8EC7A79-B977-4C69-BE6D-C41EAF22F477}" dt="2025-02-04T04:40:35.804" v="275" actId="114"/>
+        <pc:sldMkLst>
+          <pc:docMk/>
+          <pc:sldMk cId="367915691" sldId="266"/>
+        </pc:sldMkLst>
+        <pc:spChg chg="mod">
+          <ac:chgData name="Tiki tiki" userId="9b95eec42b947e32" providerId="LiveId" clId="{D8EC7A79-B977-4C69-BE6D-C41EAF22F477}" dt="2025-02-04T04:40:35.804" v="275" actId="114"/>
+          <ac:spMkLst>
+            <pc:docMk/>
+            <pc:sldMk cId="367915691" sldId="266"/>
+            <ac:spMk id="2" creationId="{D14C6216-C32C-72D2-4FFF-87B016EDB068}"/>
+          </ac:spMkLst>
+        </pc:spChg>
+        <pc:spChg chg="mod">
+          <ac:chgData name="Tiki tiki" userId="9b95eec42b947e32" providerId="LiveId" clId="{D8EC7A79-B977-4C69-BE6D-C41EAF22F477}" dt="2025-02-04T04:39:18.534" v="253" actId="20577"/>
+          <ac:spMkLst>
+            <pc:docMk/>
+            <pc:sldMk cId="367915691" sldId="266"/>
+            <ac:spMk id="3" creationId="{6A7F2CE1-136A-FE64-5399-AD97FA123AD7}"/>
+          </ac:spMkLst>
+        </pc:spChg>
+      </pc:sldChg>
+      <pc:sldChg chg="modSp new mod">
+        <pc:chgData name="Tiki tiki" userId="9b95eec42b947e32" providerId="LiveId" clId="{D8EC7A79-B977-4C69-BE6D-C41EAF22F477}" dt="2025-02-04T04:40:28.787" v="273" actId="115"/>
+        <pc:sldMkLst>
+          <pc:docMk/>
+          <pc:sldMk cId="1401788394" sldId="267"/>
+        </pc:sldMkLst>
+        <pc:spChg chg="mod">
+          <ac:chgData name="Tiki tiki" userId="9b95eec42b947e32" providerId="LiveId" clId="{D8EC7A79-B977-4C69-BE6D-C41EAF22F477}" dt="2025-02-04T04:40:28.787" v="273" actId="115"/>
+          <ac:spMkLst>
+            <pc:docMk/>
+            <pc:sldMk cId="1401788394" sldId="267"/>
+            <ac:spMk id="2" creationId="{E9C7A802-C906-2D69-681B-9A7082BCC553}"/>
+          </ac:spMkLst>
+        </pc:spChg>
+        <pc:spChg chg="mod">
+          <ac:chgData name="Tiki tiki" userId="9b95eec42b947e32" providerId="LiveId" clId="{D8EC7A79-B977-4C69-BE6D-C41EAF22F477}" dt="2025-02-04T04:39:42.800" v="258" actId="20577"/>
+          <ac:spMkLst>
+            <pc:docMk/>
+            <pc:sldMk cId="1401788394" sldId="267"/>
+            <ac:spMk id="3" creationId="{A7FC7537-F700-4E2A-5361-7A17A3DC398C}"/>
+          </ac:spMkLst>
+        </pc:spChg>
+      </pc:sldChg>
+      <pc:sldChg chg="delSp modSp new mod">
+        <pc:chgData name="Tiki tiki" userId="9b95eec42b947e32" providerId="LiveId" clId="{D8EC7A79-B977-4C69-BE6D-C41EAF22F477}" dt="2025-02-04T04:45:24.236" v="315" actId="255"/>
+        <pc:sldMkLst>
+          <pc:docMk/>
+          <pc:sldMk cId="3053260396" sldId="268"/>
+        </pc:sldMkLst>
+        <pc:spChg chg="del">
+          <ac:chgData name="Tiki tiki" userId="9b95eec42b947e32" providerId="LiveId" clId="{D8EC7A79-B977-4C69-BE6D-C41EAF22F477}" dt="2025-02-04T04:42:45.365" v="295" actId="478"/>
+          <ac:spMkLst>
+            <pc:docMk/>
+            <pc:sldMk cId="3053260396" sldId="268"/>
+            <ac:spMk id="2" creationId="{9456E9AC-9242-748F-EFD3-0A4F8C115DCE}"/>
+          </ac:spMkLst>
+        </pc:spChg>
+        <pc:spChg chg="mod">
+          <ac:chgData name="Tiki tiki" userId="9b95eec42b947e32" providerId="LiveId" clId="{D8EC7A79-B977-4C69-BE6D-C41EAF22F477}" dt="2025-02-04T04:45:24.236" v="315" actId="255"/>
+          <ac:spMkLst>
+            <pc:docMk/>
+            <pc:sldMk cId="3053260396" sldId="268"/>
+            <ac:spMk id="3" creationId="{0605C7F2-0E86-D752-8DA7-7B8F1B0CEFD6}"/>
+          </ac:spMkLst>
+        </pc:spChg>
+      </pc:sldChg>
+      <pc:sldChg chg="modSp new mod ord">
+        <pc:chgData name="Tiki tiki" userId="9b95eec42b947e32" providerId="LiveId" clId="{D8EC7A79-B977-4C69-BE6D-C41EAF22F477}" dt="2025-02-04T04:50:48.925" v="328"/>
+        <pc:sldMkLst>
+          <pc:docMk/>
+          <pc:sldMk cId="3523240209" sldId="269"/>
+        </pc:sldMkLst>
+        <pc:spChg chg="mod">
+          <ac:chgData name="Tiki tiki" userId="9b95eec42b947e32" providerId="LiveId" clId="{D8EC7A79-B977-4C69-BE6D-C41EAF22F477}" dt="2025-02-04T04:50:32.464" v="326"/>
+          <ac:spMkLst>
+            <pc:docMk/>
+            <pc:sldMk cId="3523240209" sldId="269"/>
+            <ac:spMk id="3" creationId="{7BA83987-2445-A9B9-9804-EAF6E6BC1099}"/>
+          </ac:spMkLst>
+        </pc:spChg>
+      </pc:sldChg>
+      <pc:sldChg chg="new">
+        <pc:chgData name="Tiki tiki" userId="9b95eec42b947e32" providerId="LiveId" clId="{D8EC7A79-B977-4C69-BE6D-C41EAF22F477}" dt="2025-02-04T05:16:14.659" v="331" actId="680"/>
+        <pc:sldMkLst>
+          <pc:docMk/>
+          <pc:sldMk cId="2545084118" sldId="270"/>
+        </pc:sldMkLst>
+      </pc:sldChg>
+    </pc:docChg>
+  </pc:docChgLst>
   <pc:docChgLst>
     <pc:chgData name="Tiki tiki" userId="9b95eec42b947e32" providerId="LiveId" clId="{6C13EF49-7177-4324-9067-B7991CF0F0BE}"/>
     <pc:docChg chg="custSel modSld">
@@ -770,7 +1305,7 @@
           <a:p>
             <a:fld id="{E66EED18-0FEB-4E26-8FB1-B4D6647DA350}" type="slidenum">
               <a:rPr lang="en-US" smtClean="0"/>
-              <a:t>8</a:t>
+              <a:t>3</a:t>
             </a:fld>
             <a:endParaRPr lang="en-US"/>
           </a:p>
@@ -779,7 +1314,7 @@
     </p:spTree>
     <p:extLst>
       <p:ext uri="{BB962C8B-B14F-4D97-AF65-F5344CB8AC3E}">
-        <p14:creationId xmlns:p14="http://schemas.microsoft.com/office/powerpoint/2010/main" val="2039112027"/>
+        <p14:creationId xmlns:p14="http://schemas.microsoft.com/office/powerpoint/2010/main" val="611025929"/>
       </p:ext>
     </p:extLst>
   </p:cSld>
@@ -854,7 +1389,7 @@
           <a:p>
             <a:fld id="{E66EED18-0FEB-4E26-8FB1-B4D6647DA350}" type="slidenum">
               <a:rPr lang="en-US" smtClean="0"/>
-              <a:t>9</a:t>
+              <a:t>11</a:t>
             </a:fld>
             <a:endParaRPr lang="en-US"/>
           </a:p>
@@ -863,7 +1398,7 @@
     </p:spTree>
     <p:extLst>
       <p:ext uri="{BB962C8B-B14F-4D97-AF65-F5344CB8AC3E}">
-        <p14:creationId xmlns:p14="http://schemas.microsoft.com/office/powerpoint/2010/main" val="611025929"/>
+        <p14:creationId xmlns:p14="http://schemas.microsoft.com/office/powerpoint/2010/main" val="2039112027"/>
       </p:ext>
     </p:extLst>
   </p:cSld>
@@ -4073,6 +4608,14 @@
 <file path=ppt/slides/slide1.xml><?xml version="1.0" encoding="utf-8"?>
 <p:sld xmlns:a="http://schemas.openxmlformats.org/drawingml/2006/main" xmlns:r="http://schemas.openxmlformats.org/officeDocument/2006/relationships" xmlns:p="http://schemas.openxmlformats.org/presentationml/2006/main">
   <p:cSld>
+    <p:bg>
+      <p:bgPr>
+        <a:solidFill>
+          <a:srgbClr val="000000"/>
+        </a:solidFill>
+        <a:effectLst/>
+      </p:bgPr>
+    </p:bg>
     <p:spTree>
       <p:nvGrpSpPr>
         <p:cNvPr id="1" name=""/>
@@ -4089,61 +4632,134 @@
       </p:grpSpPr>
       <p:sp>
         <p:nvSpPr>
-          <p:cNvPr id="2" name="Title 1">
-            <a:extLst>
-              <a:ext uri="{FF2B5EF4-FFF2-40B4-BE49-F238E27FC236}">
-                <a16:creationId xmlns:a16="http://schemas.microsoft.com/office/drawing/2014/main" id="{7EDDCCF4-08DE-E4E3-7D16-87B58569D53A}"/>
-              </a:ext>
-            </a:extLst>
-          </p:cNvPr>
-          <p:cNvSpPr>
-            <a:spLocks noGrp="1"/>
-          </p:cNvSpPr>
-          <p:nvPr>
-            <p:ph type="ctrTitle"/>
+          <p:cNvPr id="6" name="Rectangle 5">
+            <a:extLst>
+              <a:ext uri="{FF2B5EF4-FFF2-40B4-BE49-F238E27FC236}">
+                <a16:creationId xmlns:a16="http://schemas.microsoft.com/office/drawing/2014/main" id="{71B2258F-86CA-4D4D-8270-BC05FCDEBFB3}"/>
+              </a:ext>
+              <a:ext uri="{C183D7F6-B498-43B3-948B-1728B52AA6E4}">
+                <adec:decorative xmlns:adec="http://schemas.microsoft.com/office/drawing/2017/decorative" val="1"/>
+              </a:ext>
+            </a:extLst>
+          </p:cNvPr>
+          <p:cNvSpPr>
+            <a:spLocks noGrp="1" noRot="1" noChangeAspect="1" noMove="1" noResize="1" noEditPoints="1" noAdjustHandles="1" noChangeArrowheads="1" noChangeShapeType="1" noTextEdit="1"/>
+          </p:cNvSpPr>
+          <p:nvPr>
+            <p:extLst>
+              <p:ext uri="{386F3935-93C4-4BCD-93E2-E3B085C9AB24}">
+                <p16:designElem xmlns:p16="http://schemas.microsoft.com/office/powerpoint/2015/main" val="1"/>
+              </p:ext>
+            </p:extLst>
           </p:nvPr>
         </p:nvSpPr>
         <p:spPr>
           <a:xfrm>
-            <a:off x="1524000" y="1122363"/>
-            <a:ext cx="9144000" cy="1394695"/>
+            <a:off x="0" y="0"/>
+            <a:ext cx="12192000" cy="6857999"/>
+          </a:xfrm>
+          <a:prstGeom prst="rect">
+            <a:avLst/>
+          </a:prstGeom>
+          <a:solidFill>
+            <a:srgbClr val="000000"/>
+          </a:solidFill>
+          <a:ln>
+            <a:noFill/>
+          </a:ln>
+        </p:spPr>
+        <p:style>
+          <a:lnRef idx="2">
+            <a:schemeClr val="accent1">
+              <a:shade val="50000"/>
+            </a:schemeClr>
+          </a:lnRef>
+          <a:fillRef idx="1">
+            <a:schemeClr val="accent1"/>
+          </a:fillRef>
+          <a:effectRef idx="0">
+            <a:schemeClr val="accent1"/>
+          </a:effectRef>
+          <a:fontRef idx="minor">
+            <a:schemeClr val="lt1"/>
+          </a:fontRef>
+        </p:style>
+        <p:txBody>
+          <a:bodyPr rtlCol="0" anchor="ctr"/>
+          <a:lstStyle/>
+          <a:p>
+            <a:pPr algn="ctr"/>
+            <a:endParaRPr lang="en-US"/>
+          </a:p>
+        </p:txBody>
+      </p:sp>
+      <p:pic>
+        <p:nvPicPr>
+          <p:cNvPr id="7" name="Picture 6" descr="Empty street surrounded with buildings">
+            <a:extLst>
+              <a:ext uri="{FF2B5EF4-FFF2-40B4-BE49-F238E27FC236}">
+                <a16:creationId xmlns:a16="http://schemas.microsoft.com/office/drawing/2014/main" id="{BD7E12CC-B2D6-B296-779C-335FEEF4C0CE}"/>
+              </a:ext>
+            </a:extLst>
+          </p:cNvPr>
+          <p:cNvPicPr>
+            <a:picLocks noChangeAspect="1"/>
+          </p:cNvPicPr>
+          <p:nvPr/>
+        </p:nvPicPr>
+        <p:blipFill>
+          <a:blip r:embed="rId2">
+            <a:alphaModFix amt="50000"/>
+          </a:blip>
+          <a:srcRect b="15730"/>
+          <a:stretch/>
+        </p:blipFill>
+        <p:spPr>
+          <a:xfrm>
+            <a:off x="20" y="1"/>
+            <a:ext cx="12191980" cy="6857999"/>
+          </a:xfrm>
+          <a:prstGeom prst="rect">
+            <a:avLst/>
+          </a:prstGeom>
+        </p:spPr>
+      </p:pic>
+      <p:sp>
+        <p:nvSpPr>
+          <p:cNvPr id="2" name="Title 1">
+            <a:extLst>
+              <a:ext uri="{FF2B5EF4-FFF2-40B4-BE49-F238E27FC236}">
+                <a16:creationId xmlns:a16="http://schemas.microsoft.com/office/drawing/2014/main" id="{7EDDCCF4-08DE-E4E3-7D16-87B58569D53A}"/>
+              </a:ext>
+            </a:extLst>
+          </p:cNvPr>
+          <p:cNvSpPr>
+            <a:spLocks noGrp="1"/>
+          </p:cNvSpPr>
+          <p:nvPr>
+            <p:ph type="ctrTitle"/>
+          </p:nvPr>
+        </p:nvSpPr>
+        <p:spPr>
+          <a:xfrm>
+            <a:off x="1524000" y="1122362"/>
+            <a:ext cx="9144000" cy="2900518"/>
           </a:xfrm>
         </p:spPr>
         <p:txBody>
           <a:bodyPr>
-            <a:normAutofit fontScale="90000"/>
+            <a:normAutofit/>
           </a:bodyPr>
           <a:lstStyle/>
           <a:p>
             <a:r>
-              <a:rPr lang="en-US" dirty="0"/>
-              <a:t>Portland , Or Housing &amp; Affordability</a:t>
-            </a:r>
-          </a:p>
-        </p:txBody>
-      </p:sp>
-      <p:sp>
-        <p:nvSpPr>
-          <p:cNvPr id="3" name="Subtitle 2">
-            <a:extLst>
-              <a:ext uri="{FF2B5EF4-FFF2-40B4-BE49-F238E27FC236}">
-                <a16:creationId xmlns:a16="http://schemas.microsoft.com/office/drawing/2014/main" id="{D3692CC7-B6C8-90A5-B9E5-09CFB8E7C299}"/>
-              </a:ext>
-            </a:extLst>
-          </p:cNvPr>
-          <p:cNvSpPr>
-            <a:spLocks noGrp="1"/>
-          </p:cNvSpPr>
-          <p:nvPr>
-            <p:ph type="subTitle" idx="1"/>
-          </p:nvPr>
-        </p:nvSpPr>
-        <p:spPr/>
-        <p:txBody>
-          <a:bodyPr/>
-          <a:lstStyle/>
-          <a:p>
-            <a:endParaRPr lang="en-US" dirty="0"/>
+              <a:rPr lang="en-US" dirty="0">
+                <a:solidFill>
+                  <a:srgbClr val="FFFFFF"/>
+                </a:solidFill>
+              </a:rPr>
+              <a:t>Portland , OR Housing &amp; Affordability 2019-2023</a:t>
+            </a:r>
           </a:p>
         </p:txBody>
       </p:sp>
@@ -4155,8 +4771,100 @@
     </p:extLst>
   </p:cSld>
   <p:clrMapOvr>
-    <a:masterClrMapping/>
+    <a:overrideClrMapping bg1="dk1" tx1="lt1" bg2="dk2" tx2="lt2" accent1="accent1" accent2="accent2" accent3="accent3" accent4="accent4" accent5="accent5" accent6="accent6" hlink="hlink" folHlink="folHlink"/>
   </p:clrMapOvr>
+  <p:timing>
+    <p:tnLst>
+      <p:par>
+        <p:cTn id="1" dur="indefinite" restart="never" nodeType="tmRoot">
+          <p:childTnLst>
+            <p:seq concurrent="1" nextAc="seek">
+              <p:cTn id="2" dur="indefinite" nodeType="mainSeq">
+                <p:childTnLst>
+                  <p:par>
+                    <p:cTn id="3" fill="hold">
+                      <p:stCondLst>
+                        <p:cond delay="indefinite"/>
+                        <p:cond evt="onBegin" delay="0">
+                          <p:tn val="2"/>
+                        </p:cond>
+                      </p:stCondLst>
+                      <p:childTnLst>
+                        <p:par>
+                          <p:cTn id="4" fill="hold">
+                            <p:stCondLst>
+                              <p:cond delay="0"/>
+                            </p:stCondLst>
+                            <p:childTnLst>
+                              <p:par>
+                                <p:cTn id="5" presetID="10" presetClass="entr" presetSubtype="0" fill="hold" grpId="0" nodeType="withEffect">
+                                  <p:stCondLst>
+                                    <p:cond delay="1000"/>
+                                  </p:stCondLst>
+                                  <p:iterate>
+                                    <p:tmPct val="10000"/>
+                                  </p:iterate>
+                                  <p:childTnLst>
+                                    <p:set>
+                                      <p:cBhvr>
+                                        <p:cTn id="6" dur="1" fill="hold">
+                                          <p:stCondLst>
+                                            <p:cond delay="0"/>
+                                          </p:stCondLst>
+                                        </p:cTn>
+                                        <p:tgtEl>
+                                          <p:spTgt spid="2"/>
+                                        </p:tgtEl>
+                                        <p:attrNameLst>
+                                          <p:attrName>style.visibility</p:attrName>
+                                        </p:attrNameLst>
+                                      </p:cBhvr>
+                                      <p:to>
+                                        <p:strVal val="visible"/>
+                                      </p:to>
+                                    </p:set>
+                                    <p:animEffect transition="in" filter="fade">
+                                      <p:cBhvr>
+                                        <p:cTn id="7" dur="700"/>
+                                        <p:tgtEl>
+                                          <p:spTgt spid="2"/>
+                                        </p:tgtEl>
+                                      </p:cBhvr>
+                                    </p:animEffect>
+                                  </p:childTnLst>
+                                </p:cTn>
+                              </p:par>
+                            </p:childTnLst>
+                          </p:cTn>
+                        </p:par>
+                      </p:childTnLst>
+                    </p:cTn>
+                  </p:par>
+                </p:childTnLst>
+              </p:cTn>
+              <p:prevCondLst>
+                <p:cond evt="onPrev" delay="0">
+                  <p:tgtEl>
+                    <p:sldTgt/>
+                  </p:tgtEl>
+                </p:cond>
+              </p:prevCondLst>
+              <p:nextCondLst>
+                <p:cond evt="onNext" delay="0">
+                  <p:tgtEl>
+                    <p:sldTgt/>
+                  </p:tgtEl>
+                </p:cond>
+              </p:nextCondLst>
+            </p:seq>
+          </p:childTnLst>
+        </p:cTn>
+      </p:par>
+    </p:tnLst>
+    <p:bldLst>
+      <p:bldP spid="2" grpId="0"/>
+    </p:bldLst>
+  </p:timing>
 </p:sld>
 </file>
 
@@ -4177,6 +4885,677 @@
           <a:chExt cx="0" cy="0"/>
         </a:xfrm>
       </p:grpSpPr>
+      <p:sp>
+        <p:nvSpPr>
+          <p:cNvPr id="2" name="Title 1">
+            <a:extLst>
+              <a:ext uri="{FF2B5EF4-FFF2-40B4-BE49-F238E27FC236}">
+                <a16:creationId xmlns:a16="http://schemas.microsoft.com/office/drawing/2014/main" id="{8EBF4C62-6231-A0B0-F047-43FA632EB307}"/>
+              </a:ext>
+            </a:extLst>
+          </p:cNvPr>
+          <p:cNvSpPr>
+            <a:spLocks noGrp="1"/>
+          </p:cNvSpPr>
+          <p:nvPr>
+            <p:ph type="title"/>
+          </p:nvPr>
+        </p:nvSpPr>
+        <p:spPr/>
+        <p:txBody>
+          <a:bodyPr/>
+          <a:lstStyle/>
+          <a:p>
+            <a:endParaRPr lang="en-US"/>
+          </a:p>
+        </p:txBody>
+      </p:sp>
+      <p:sp>
+        <p:nvSpPr>
+          <p:cNvPr id="3" name="Content Placeholder 2">
+            <a:extLst>
+              <a:ext uri="{FF2B5EF4-FFF2-40B4-BE49-F238E27FC236}">
+                <a16:creationId xmlns:a16="http://schemas.microsoft.com/office/drawing/2014/main" id="{7BA83987-2445-A9B9-9804-EAF6E6BC1099}"/>
+              </a:ext>
+            </a:extLst>
+          </p:cNvPr>
+          <p:cNvSpPr>
+            <a:spLocks noGrp="1"/>
+          </p:cNvSpPr>
+          <p:nvPr>
+            <p:ph idx="1"/>
+          </p:nvPr>
+        </p:nvSpPr>
+        <p:spPr/>
+        <p:txBody>
+          <a:bodyPr/>
+          <a:lstStyle/>
+          <a:p>
+            <a:r>
+              <a:rPr lang="en-US" b="0" i="0" dirty="0">
+                <a:solidFill>
+                  <a:srgbClr val="1D1C1D"/>
+                </a:solidFill>
+                <a:effectLst/>
+                <a:latin typeface="Slack-Lato"/>
+              </a:rPr>
+              <a:t>According to U.S. Department of Housing and Urban Development, the general rule of thumb for housing affordability based on the home value-to-income ratio is:</a:t>
+            </a:r>
+            <a:br>
+              <a:rPr lang="en-US" dirty="0"/>
+            </a:br>
+            <a:r>
+              <a:rPr lang="en-US" b="1" i="0" dirty="0">
+                <a:solidFill>
+                  <a:srgbClr val="1D1C1D"/>
+                </a:solidFill>
+                <a:effectLst/>
+                <a:latin typeface="Slack-Lato"/>
+              </a:rPr>
+              <a:t>Affordable: ≤ 3.0</a:t>
+            </a:r>
+            <a:r>
+              <a:rPr lang="en-US" b="0" i="0" dirty="0">
+                <a:solidFill>
+                  <a:srgbClr val="1D1C1D"/>
+                </a:solidFill>
+                <a:effectLst/>
+                <a:latin typeface="Slack-Lato"/>
+              </a:rPr>
+              <a:t> → The home price is three times or less than the household's annual income.</a:t>
+            </a:r>
+            <a:br>
+              <a:rPr lang="en-US" dirty="0"/>
+            </a:br>
+            <a:r>
+              <a:rPr lang="en-US" b="1" i="0" dirty="0">
+                <a:solidFill>
+                  <a:srgbClr val="1D1C1D"/>
+                </a:solidFill>
+                <a:effectLst/>
+                <a:latin typeface="Slack-Lato"/>
+              </a:rPr>
+              <a:t>Moderately Affordable: 3.1 </a:t>
+            </a:r>
+            <a:r>
+              <a:rPr lang="en-US" b="0" i="0" dirty="0">
+                <a:solidFill>
+                  <a:srgbClr val="1D1C1D"/>
+                </a:solidFill>
+                <a:effectLst/>
+                <a:latin typeface="Slack-Lato"/>
+              </a:rPr>
+              <a:t>- 5 → Still manageable, but may require some financial adjustments.</a:t>
+            </a:r>
+            <a:br>
+              <a:rPr lang="en-US" dirty="0"/>
+            </a:br>
+            <a:r>
+              <a:rPr lang="en-US" b="1" i="0" dirty="0">
+                <a:solidFill>
+                  <a:srgbClr val="1D1C1D"/>
+                </a:solidFill>
+                <a:effectLst/>
+                <a:latin typeface="Slack-Lato"/>
+              </a:rPr>
+              <a:t>Severely Unaffordable: &gt; 5.0</a:t>
+            </a:r>
+            <a:r>
+              <a:rPr lang="en-US" b="0" i="0" dirty="0">
+                <a:solidFill>
+                  <a:srgbClr val="1D1C1D"/>
+                </a:solidFill>
+                <a:effectLst/>
+                <a:latin typeface="Slack-Lato"/>
+              </a:rPr>
+              <a:t> → Indicates significant housing affordability issues, where home prices are five times or more than annual income. Homeownership may require excessive debt, high mortgage payments, or compromises in other financial areas.</a:t>
+            </a:r>
+            <a:endParaRPr lang="en-US" dirty="0"/>
+          </a:p>
+        </p:txBody>
+      </p:sp>
+    </p:spTree>
+    <p:extLst>
+      <p:ext uri="{BB962C8B-B14F-4D97-AF65-F5344CB8AC3E}">
+        <p14:creationId xmlns:p14="http://schemas.microsoft.com/office/powerpoint/2010/main" val="3523240209"/>
+      </p:ext>
+    </p:extLst>
+  </p:cSld>
+  <p:clrMapOvr>
+    <a:masterClrMapping/>
+  </p:clrMapOvr>
+</p:sld>
+</file>
+
+<file path=ppt/slides/slide11.xml><?xml version="1.0" encoding="utf-8"?>
+<p:sld xmlns:a="http://schemas.openxmlformats.org/drawingml/2006/main" xmlns:r="http://schemas.openxmlformats.org/officeDocument/2006/relationships" xmlns:p="http://schemas.openxmlformats.org/presentationml/2006/main">
+  <p:cSld>
+    <p:spTree>
+      <p:nvGrpSpPr>
+        <p:cNvPr id="1" name=""/>
+        <p:cNvGrpSpPr/>
+        <p:nvPr/>
+      </p:nvGrpSpPr>
+      <p:grpSpPr>
+        <a:xfrm>
+          <a:off x="0" y="0"/>
+          <a:ext cx="0" cy="0"/>
+          <a:chOff x="0" y="0"/>
+          <a:chExt cx="0" cy="0"/>
+        </a:xfrm>
+      </p:grpSpPr>
+      <p:pic>
+        <p:nvPicPr>
+          <p:cNvPr id="5" name="Content Placeholder 4" descr="A screenshot of a graph&#10;&#10;Description automatically generated">
+            <a:extLst>
+              <a:ext uri="{FF2B5EF4-FFF2-40B4-BE49-F238E27FC236}">
+                <a16:creationId xmlns:a16="http://schemas.microsoft.com/office/drawing/2014/main" id="{42903D7E-87BA-1629-0C98-8B1505DD2511}"/>
+              </a:ext>
+            </a:extLst>
+          </p:cNvPr>
+          <p:cNvPicPr>
+            <a:picLocks noGrp="1" noChangeAspect="1"/>
+          </p:cNvPicPr>
+          <p:nvPr>
+            <p:ph idx="1"/>
+          </p:nvPr>
+        </p:nvPicPr>
+        <p:blipFill>
+          <a:blip r:embed="rId3">
+            <a:extLst>
+              <a:ext uri="{28A0092B-C50C-407E-A947-70E740481C1C}">
+                <a14:useLocalDpi xmlns:a14="http://schemas.microsoft.com/office/drawing/2010/main" val="0"/>
+              </a:ext>
+            </a:extLst>
+          </a:blip>
+          <a:stretch>
+            <a:fillRect/>
+          </a:stretch>
+        </p:blipFill>
+        <p:spPr>
+          <a:xfrm>
+            <a:off x="0" y="0"/>
+            <a:ext cx="12001498" cy="6858000"/>
+          </a:xfrm>
+        </p:spPr>
+      </p:pic>
+    </p:spTree>
+    <p:extLst>
+      <p:ext uri="{BB962C8B-B14F-4D97-AF65-F5344CB8AC3E}">
+        <p14:creationId xmlns:p14="http://schemas.microsoft.com/office/powerpoint/2010/main" val="419163453"/>
+      </p:ext>
+    </p:extLst>
+  </p:cSld>
+  <p:clrMapOvr>
+    <a:masterClrMapping/>
+  </p:clrMapOvr>
+</p:sld>
+</file>
+
+<file path=ppt/slides/slide12.xml><?xml version="1.0" encoding="utf-8"?>
+<p:sld xmlns:a="http://schemas.openxmlformats.org/drawingml/2006/main" xmlns:r="http://schemas.openxmlformats.org/officeDocument/2006/relationships" xmlns:p="http://schemas.openxmlformats.org/presentationml/2006/main">
+  <p:cSld>
+    <p:spTree>
+      <p:nvGrpSpPr>
+        <p:cNvPr id="1" name=""/>
+        <p:cNvGrpSpPr/>
+        <p:nvPr/>
+      </p:nvGrpSpPr>
+      <p:grpSpPr>
+        <a:xfrm>
+          <a:off x="0" y="0"/>
+          <a:ext cx="0" cy="0"/>
+          <a:chOff x="0" y="0"/>
+          <a:chExt cx="0" cy="0"/>
+        </a:xfrm>
+      </p:grpSpPr>
+      <p:sp>
+        <p:nvSpPr>
+          <p:cNvPr id="3" name="Content Placeholder 2">
+            <a:extLst>
+              <a:ext uri="{FF2B5EF4-FFF2-40B4-BE49-F238E27FC236}">
+                <a16:creationId xmlns:a16="http://schemas.microsoft.com/office/drawing/2014/main" id="{0605C7F2-0E86-D752-8DA7-7B8F1B0CEFD6}"/>
+              </a:ext>
+            </a:extLst>
+          </p:cNvPr>
+          <p:cNvSpPr>
+            <a:spLocks noGrp="1"/>
+          </p:cNvSpPr>
+          <p:nvPr>
+            <p:ph idx="1"/>
+          </p:nvPr>
+        </p:nvSpPr>
+        <p:spPr>
+          <a:xfrm>
+            <a:off x="700548" y="911225"/>
+            <a:ext cx="10515600" cy="4667250"/>
+          </a:xfrm>
+        </p:spPr>
+        <p:txBody>
+          <a:bodyPr>
+            <a:normAutofit fontScale="25000" lnSpcReduction="20000"/>
+          </a:bodyPr>
+          <a:lstStyle/>
+          <a:p>
+            <a:pPr marL="0" indent="0" algn="l">
+              <a:buNone/>
+            </a:pPr>
+            <a:r>
+              <a:rPr lang="en-US" sz="6200" b="1" i="0" dirty="0">
+                <a:solidFill>
+                  <a:srgbClr val="1D1C1D"/>
+                </a:solidFill>
+                <a:effectLst/>
+                <a:latin typeface="Slack-Lato"/>
+              </a:rPr>
+              <a:t>Affordable Subdivisions (2023)</a:t>
+            </a:r>
+            <a:endParaRPr lang="en-US" sz="6200" b="0" i="0" dirty="0">
+              <a:solidFill>
+                <a:srgbClr val="1D1C1D"/>
+              </a:solidFill>
+              <a:effectLst/>
+              <a:latin typeface="Slack-Lato"/>
+            </a:endParaRPr>
+          </a:p>
+          <a:p>
+            <a:pPr marL="0" indent="0" algn="l">
+              <a:buNone/>
+            </a:pPr>
+            <a:r>
+              <a:rPr lang="en-US" sz="5000" b="0" i="0" dirty="0">
+                <a:solidFill>
+                  <a:srgbClr val="1D1C1D"/>
+                </a:solidFill>
+                <a:effectLst/>
+                <a:latin typeface="Slack-Lato"/>
+              </a:rPr>
+              <a:t>These areas have the lowest home value-to-income ratios, making them moderately affordable:</a:t>
+            </a:r>
+            <a:br>
+              <a:rPr lang="en-US" sz="5000" b="0" i="0" dirty="0">
+                <a:solidFill>
+                  <a:srgbClr val="1D1C1D"/>
+                </a:solidFill>
+                <a:effectLst/>
+                <a:latin typeface="Slack-Lato"/>
+              </a:rPr>
+            </a:br>
+            <a:r>
+              <a:rPr lang="en-US" sz="5000" b="0" i="0" dirty="0">
+                <a:solidFill>
+                  <a:srgbClr val="1D1C1D"/>
+                </a:solidFill>
+                <a:effectLst/>
+                <a:latin typeface="Slack-Lato"/>
+              </a:rPr>
+              <a:t>Sandy, Clackamas – 4.38</a:t>
+            </a:r>
+            <a:br>
+              <a:rPr lang="en-US" b="0" i="0" dirty="0">
+                <a:solidFill>
+                  <a:srgbClr val="1D1C1D"/>
+                </a:solidFill>
+                <a:effectLst/>
+                <a:latin typeface="Slack-Lato"/>
+              </a:rPr>
+            </a:br>
+            <a:endParaRPr lang="en-US" b="0" i="0" dirty="0">
+              <a:solidFill>
+                <a:srgbClr val="1D1C1D"/>
+              </a:solidFill>
+              <a:effectLst/>
+              <a:latin typeface="Slack-Lato"/>
+            </a:endParaRPr>
+          </a:p>
+          <a:p>
+            <a:pPr algn="l"/>
+            <a:r>
+              <a:rPr lang="en-US" sz="5600" b="0" i="0" dirty="0">
+                <a:solidFill>
+                  <a:srgbClr val="1D1C1D"/>
+                </a:solidFill>
+                <a:effectLst/>
+                <a:latin typeface="Slack-Lato"/>
+              </a:rPr>
+              <a:t>Forest Grove-Cornelius, Washington – 5.20</a:t>
+            </a:r>
+            <a:br>
+              <a:rPr lang="en-US" sz="5600" b="0" i="0" dirty="0">
+                <a:solidFill>
+                  <a:srgbClr val="1D1C1D"/>
+                </a:solidFill>
+                <a:effectLst/>
+                <a:latin typeface="Slack-Lato"/>
+              </a:rPr>
+            </a:br>
+            <a:endParaRPr lang="en-US" sz="5600" b="0" i="0" dirty="0">
+              <a:solidFill>
+                <a:srgbClr val="1D1C1D"/>
+              </a:solidFill>
+              <a:effectLst/>
+              <a:latin typeface="Slack-Lato"/>
+            </a:endParaRPr>
+          </a:p>
+          <a:p>
+            <a:pPr algn="l"/>
+            <a:r>
+              <a:rPr lang="en-US" sz="5600" b="0" i="0" dirty="0">
+                <a:solidFill>
+                  <a:srgbClr val="1D1C1D"/>
+                </a:solidFill>
+                <a:effectLst/>
+                <a:latin typeface="Slack-Lato"/>
+              </a:rPr>
+              <a:t>Molalla, Clackamas – 5.02</a:t>
+            </a:r>
+            <a:br>
+              <a:rPr lang="en-US" sz="5600" b="0" i="0" dirty="0">
+                <a:solidFill>
+                  <a:srgbClr val="1D1C1D"/>
+                </a:solidFill>
+                <a:effectLst/>
+                <a:latin typeface="Slack-Lato"/>
+              </a:rPr>
+            </a:br>
+            <a:endParaRPr lang="en-US" sz="5600" b="0" i="0" dirty="0">
+              <a:solidFill>
+                <a:srgbClr val="1D1C1D"/>
+              </a:solidFill>
+              <a:effectLst/>
+              <a:latin typeface="Slack-Lato"/>
+            </a:endParaRPr>
+          </a:p>
+          <a:p>
+            <a:pPr algn="l"/>
+            <a:r>
+              <a:rPr lang="en-US" sz="5600" b="0" i="0" dirty="0">
+                <a:solidFill>
+                  <a:srgbClr val="1D1C1D"/>
+                </a:solidFill>
+                <a:effectLst/>
+                <a:latin typeface="Slack-Lato"/>
+              </a:rPr>
+              <a:t>Beaverton-Hillsboro, Washington – 5.36</a:t>
+            </a:r>
+            <a:br>
+              <a:rPr lang="en-US" sz="5600" b="0" i="0" dirty="0">
+                <a:solidFill>
+                  <a:srgbClr val="1D1C1D"/>
+                </a:solidFill>
+                <a:effectLst/>
+                <a:latin typeface="Slack-Lato"/>
+              </a:rPr>
+            </a:br>
+            <a:endParaRPr lang="en-US" sz="5600" b="0" i="0" dirty="0">
+              <a:solidFill>
+                <a:srgbClr val="1D1C1D"/>
+              </a:solidFill>
+              <a:effectLst/>
+              <a:latin typeface="Slack-Lato"/>
+            </a:endParaRPr>
+          </a:p>
+          <a:p>
+            <a:pPr algn="l"/>
+            <a:r>
+              <a:rPr lang="en-US" sz="5600" b="0" i="0" dirty="0">
+                <a:solidFill>
+                  <a:srgbClr val="1D1C1D"/>
+                </a:solidFill>
+                <a:effectLst/>
+                <a:latin typeface="Slack-Lato"/>
+              </a:rPr>
+              <a:t>Mount Hood, Clackamas – 5.30</a:t>
+            </a:r>
+            <a:br>
+              <a:rPr lang="en-US" b="0" i="0" dirty="0">
+                <a:solidFill>
+                  <a:srgbClr val="1D1C1D"/>
+                </a:solidFill>
+                <a:effectLst/>
+                <a:latin typeface="Slack-Lato"/>
+              </a:rPr>
+            </a:br>
+            <a:endParaRPr lang="en-US" b="0" i="0" dirty="0">
+              <a:solidFill>
+                <a:srgbClr val="1D1C1D"/>
+              </a:solidFill>
+              <a:effectLst/>
+              <a:latin typeface="Slack-Lato"/>
+            </a:endParaRPr>
+          </a:p>
+          <a:p>
+            <a:pPr marL="0" indent="0" algn="l">
+              <a:buNone/>
+            </a:pPr>
+            <a:endParaRPr lang="en-US" sz="6200" b="1" i="0" dirty="0">
+              <a:solidFill>
+                <a:srgbClr val="1D1C1D"/>
+              </a:solidFill>
+              <a:effectLst/>
+              <a:latin typeface="Slack-Lato"/>
+            </a:endParaRPr>
+          </a:p>
+          <a:p>
+            <a:pPr marL="0" indent="0" algn="l">
+              <a:buNone/>
+            </a:pPr>
+            <a:r>
+              <a:rPr lang="en-US" sz="6200" b="1" i="0" dirty="0">
+                <a:solidFill>
+                  <a:srgbClr val="1D1C1D"/>
+                </a:solidFill>
+                <a:effectLst/>
+                <a:latin typeface="Slack-Lato"/>
+              </a:rPr>
+              <a:t>Least Affordable Subdivisions (2023)</a:t>
+            </a:r>
+            <a:br>
+              <a:rPr lang="en-US" sz="5000" b="0" i="0" dirty="0">
+                <a:solidFill>
+                  <a:srgbClr val="1D1C1D"/>
+                </a:solidFill>
+                <a:effectLst/>
+                <a:latin typeface="Slack-Lato"/>
+              </a:rPr>
+            </a:br>
+            <a:r>
+              <a:rPr lang="en-US" sz="5000" b="0" i="0" dirty="0">
+                <a:solidFill>
+                  <a:srgbClr val="1D1C1D"/>
+                </a:solidFill>
+                <a:effectLst/>
+                <a:latin typeface="Slack-Lato"/>
+              </a:rPr>
+              <a:t>These areas have the highest home value-to-income ratios, indicating least affordability:</a:t>
+            </a:r>
+            <a:br>
+              <a:rPr lang="en-US" sz="5000" b="0" i="0" dirty="0">
+                <a:solidFill>
+                  <a:srgbClr val="1D1C1D"/>
+                </a:solidFill>
+                <a:effectLst/>
+                <a:latin typeface="Slack-Lato"/>
+              </a:rPr>
+            </a:br>
+            <a:r>
+              <a:rPr lang="en-US" sz="5000" b="0" i="0" dirty="0">
+                <a:solidFill>
+                  <a:srgbClr val="1D1C1D"/>
+                </a:solidFill>
+                <a:effectLst/>
+                <a:latin typeface="Slack-Lato"/>
+              </a:rPr>
+              <a:t>Estacada, Clackamas – 7.39</a:t>
+            </a:r>
+            <a:br>
+              <a:rPr lang="en-US" b="0" i="0" dirty="0">
+                <a:solidFill>
+                  <a:srgbClr val="1D1C1D"/>
+                </a:solidFill>
+                <a:effectLst/>
+                <a:latin typeface="Slack-Lato"/>
+              </a:rPr>
+            </a:br>
+            <a:endParaRPr lang="en-US" b="0" i="0" dirty="0">
+              <a:solidFill>
+                <a:srgbClr val="1D1C1D"/>
+              </a:solidFill>
+              <a:effectLst/>
+              <a:latin typeface="Slack-Lato"/>
+            </a:endParaRPr>
+          </a:p>
+          <a:p>
+            <a:pPr algn="l"/>
+            <a:r>
+              <a:rPr lang="en-US" sz="5600" b="0" i="0" dirty="0">
+                <a:solidFill>
+                  <a:srgbClr val="1D1C1D"/>
+                </a:solidFill>
+                <a:effectLst/>
+                <a:latin typeface="Slack-Lato"/>
+              </a:rPr>
+              <a:t>Skyline, Multnomah – 7.66</a:t>
+            </a:r>
+            <a:br>
+              <a:rPr lang="en-US" sz="5600" b="0" i="0" dirty="0">
+                <a:solidFill>
+                  <a:srgbClr val="1D1C1D"/>
+                </a:solidFill>
+                <a:effectLst/>
+                <a:latin typeface="Slack-Lato"/>
+              </a:rPr>
+            </a:br>
+            <a:endParaRPr lang="en-US" sz="5600" b="0" i="0" dirty="0">
+              <a:solidFill>
+                <a:srgbClr val="1D1C1D"/>
+              </a:solidFill>
+              <a:effectLst/>
+              <a:latin typeface="Slack-Lato"/>
+            </a:endParaRPr>
+          </a:p>
+          <a:p>
+            <a:pPr algn="l"/>
+            <a:r>
+              <a:rPr lang="en-US" sz="5600" b="0" i="0" dirty="0">
+                <a:solidFill>
+                  <a:srgbClr val="1D1C1D"/>
+                </a:solidFill>
+                <a:effectLst/>
+                <a:latin typeface="Slack-Lato"/>
+              </a:rPr>
+              <a:t>Portland West, Multnomah – 6.96</a:t>
+            </a:r>
+            <a:br>
+              <a:rPr lang="en-US" sz="5600" b="0" i="0" dirty="0">
+                <a:solidFill>
+                  <a:srgbClr val="1D1C1D"/>
+                </a:solidFill>
+                <a:effectLst/>
+                <a:latin typeface="Slack-Lato"/>
+              </a:rPr>
+            </a:br>
+            <a:endParaRPr lang="en-US" sz="5600" b="0" i="0" dirty="0">
+              <a:solidFill>
+                <a:srgbClr val="1D1C1D"/>
+              </a:solidFill>
+              <a:effectLst/>
+              <a:latin typeface="Slack-Lato"/>
+            </a:endParaRPr>
+          </a:p>
+          <a:p>
+            <a:pPr algn="l"/>
+            <a:r>
+              <a:rPr lang="en-US" sz="5600" b="0" i="0" dirty="0">
+                <a:solidFill>
+                  <a:srgbClr val="1D1C1D"/>
+                </a:solidFill>
+                <a:effectLst/>
+                <a:latin typeface="Slack-Lato"/>
+              </a:rPr>
+              <a:t>Wilsonville, Clackamas – 7.05</a:t>
+            </a:r>
+            <a:br>
+              <a:rPr lang="en-US" sz="5600" b="0" i="0" dirty="0">
+                <a:solidFill>
+                  <a:srgbClr val="1D1C1D"/>
+                </a:solidFill>
+                <a:effectLst/>
+                <a:latin typeface="Slack-Lato"/>
+              </a:rPr>
+            </a:br>
+            <a:endParaRPr lang="en-US" sz="5600" b="0" i="0" dirty="0">
+              <a:solidFill>
+                <a:srgbClr val="1D1C1D"/>
+              </a:solidFill>
+              <a:effectLst/>
+              <a:latin typeface="Slack-Lato"/>
+            </a:endParaRPr>
+          </a:p>
+          <a:p>
+            <a:pPr algn="l"/>
+            <a:r>
+              <a:rPr lang="en-US" sz="5600" b="0" i="0" dirty="0">
+                <a:solidFill>
+                  <a:srgbClr val="1D1C1D"/>
+                </a:solidFill>
+                <a:effectLst/>
+                <a:latin typeface="Slack-Lato"/>
+              </a:rPr>
+              <a:t>Yoder, Clackamas – 6.55</a:t>
+            </a:r>
+            <a:br>
+              <a:rPr lang="en-US" b="0" i="0" dirty="0">
+                <a:solidFill>
+                  <a:srgbClr val="1D1C1D"/>
+                </a:solidFill>
+                <a:effectLst/>
+                <a:latin typeface="Slack-Lato"/>
+              </a:rPr>
+            </a:br>
+            <a:br>
+              <a:rPr lang="en-US" b="0" i="0" dirty="0">
+                <a:solidFill>
+                  <a:srgbClr val="1D1C1D"/>
+                </a:solidFill>
+                <a:effectLst/>
+                <a:latin typeface="Slack-Lato"/>
+              </a:rPr>
+            </a:br>
+            <a:endParaRPr lang="en-US" dirty="0"/>
+          </a:p>
+        </p:txBody>
+      </p:sp>
+    </p:spTree>
+    <p:extLst>
+      <p:ext uri="{BB962C8B-B14F-4D97-AF65-F5344CB8AC3E}">
+        <p14:creationId xmlns:p14="http://schemas.microsoft.com/office/powerpoint/2010/main" val="3053260396"/>
+      </p:ext>
+    </p:extLst>
+  </p:cSld>
+  <p:clrMapOvr>
+    <a:masterClrMapping/>
+  </p:clrMapOvr>
+</p:sld>
+</file>
+
+<file path=ppt/slides/slide13.xml><?xml version="1.0" encoding="utf-8"?>
+<p:sld xmlns:a="http://schemas.openxmlformats.org/drawingml/2006/main" xmlns:r="http://schemas.openxmlformats.org/officeDocument/2006/relationships" xmlns:p="http://schemas.openxmlformats.org/presentationml/2006/main">
+  <p:cSld>
+    <p:spTree>
+      <p:nvGrpSpPr>
+        <p:cNvPr id="1" name=""/>
+        <p:cNvGrpSpPr/>
+        <p:nvPr/>
+      </p:nvGrpSpPr>
+      <p:grpSpPr>
+        <a:xfrm>
+          <a:off x="0" y="0"/>
+          <a:ext cx="0" cy="0"/>
+          <a:chOff x="0" y="0"/>
+          <a:chExt cx="0" cy="0"/>
+        </a:xfrm>
+      </p:grpSpPr>
       <p:pic>
         <p:nvPicPr>
           <p:cNvPr id="7" name="Picture 6" descr="A map with different colored circles&#10;&#10;Description automatically generated">
@@ -4217,6 +5596,86 @@
     <p:extLst>
       <p:ext uri="{BB962C8B-B14F-4D97-AF65-F5344CB8AC3E}">
         <p14:creationId xmlns:p14="http://schemas.microsoft.com/office/powerpoint/2010/main" val="4002816429"/>
+      </p:ext>
+    </p:extLst>
+  </p:cSld>
+  <p:clrMapOvr>
+    <a:masterClrMapping/>
+  </p:clrMapOvr>
+</p:sld>
+</file>
+
+<file path=ppt/slides/slide14.xml><?xml version="1.0" encoding="utf-8"?>
+<p:sld xmlns:a="http://schemas.openxmlformats.org/drawingml/2006/main" xmlns:r="http://schemas.openxmlformats.org/officeDocument/2006/relationships" xmlns:p="http://schemas.openxmlformats.org/presentationml/2006/main">
+  <p:cSld>
+    <p:spTree>
+      <p:nvGrpSpPr>
+        <p:cNvPr id="1" name=""/>
+        <p:cNvGrpSpPr/>
+        <p:nvPr/>
+      </p:nvGrpSpPr>
+      <p:grpSpPr>
+        <a:xfrm>
+          <a:off x="0" y="0"/>
+          <a:ext cx="0" cy="0"/>
+          <a:chOff x="0" y="0"/>
+          <a:chExt cx="0" cy="0"/>
+        </a:xfrm>
+      </p:grpSpPr>
+      <p:sp>
+        <p:nvSpPr>
+          <p:cNvPr id="2" name="Title 1">
+            <a:extLst>
+              <a:ext uri="{FF2B5EF4-FFF2-40B4-BE49-F238E27FC236}">
+                <a16:creationId xmlns:a16="http://schemas.microsoft.com/office/drawing/2014/main" id="{C71916E1-F86A-8CA4-470B-550B94655BD0}"/>
+              </a:ext>
+            </a:extLst>
+          </p:cNvPr>
+          <p:cNvSpPr>
+            <a:spLocks noGrp="1"/>
+          </p:cNvSpPr>
+          <p:nvPr>
+            <p:ph type="title"/>
+          </p:nvPr>
+        </p:nvSpPr>
+        <p:spPr/>
+        <p:txBody>
+          <a:bodyPr/>
+          <a:lstStyle/>
+          <a:p>
+            <a:endParaRPr lang="en-US"/>
+          </a:p>
+        </p:txBody>
+      </p:sp>
+      <p:sp>
+        <p:nvSpPr>
+          <p:cNvPr id="3" name="Content Placeholder 2">
+            <a:extLst>
+              <a:ext uri="{FF2B5EF4-FFF2-40B4-BE49-F238E27FC236}">
+                <a16:creationId xmlns:a16="http://schemas.microsoft.com/office/drawing/2014/main" id="{30489E4F-F7B7-47FB-A3FC-1B4BA5252C4A}"/>
+              </a:ext>
+            </a:extLst>
+          </p:cNvPr>
+          <p:cNvSpPr>
+            <a:spLocks noGrp="1"/>
+          </p:cNvSpPr>
+          <p:nvPr>
+            <p:ph idx="1"/>
+          </p:nvPr>
+        </p:nvSpPr>
+        <p:spPr/>
+        <p:txBody>
+          <a:bodyPr/>
+          <a:lstStyle/>
+          <a:p>
+            <a:endParaRPr lang="en-US" dirty="0"/>
+          </a:p>
+        </p:txBody>
+      </p:sp>
+    </p:spTree>
+    <p:extLst>
+      <p:ext uri="{BB962C8B-B14F-4D97-AF65-F5344CB8AC3E}">
+        <p14:creationId xmlns:p14="http://schemas.microsoft.com/office/powerpoint/2010/main" val="2545084118"/>
       </p:ext>
     </p:extLst>
   </p:cSld>
@@ -4693,7 +6152,7 @@
             </a:pPr>
             <a:r>
               <a:rPr lang="en-US" sz="1600" u="sng" dirty="0"/>
-              <a:t>Total Increase are as follows:</a:t>
+              <a:t>Total Increases are as follows:</a:t>
             </a:r>
           </a:p>
           <a:p>
@@ -4730,6 +6189,1457 @@
 </file>
 
 <file path=ppt/slides/slide3.xml><?xml version="1.0" encoding="utf-8"?>
+<p:sld xmlns:a="http://schemas.openxmlformats.org/drawingml/2006/main" xmlns:r="http://schemas.openxmlformats.org/officeDocument/2006/relationships" xmlns:p="http://schemas.openxmlformats.org/presentationml/2006/main">
+  <p:cSld>
+    <p:spTree>
+      <p:nvGrpSpPr>
+        <p:cNvPr id="1" name=""/>
+        <p:cNvGrpSpPr/>
+        <p:nvPr/>
+      </p:nvGrpSpPr>
+      <p:grpSpPr>
+        <a:xfrm>
+          <a:off x="0" y="0"/>
+          <a:ext cx="0" cy="0"/>
+          <a:chOff x="0" y="0"/>
+          <a:chExt cx="0" cy="0"/>
+        </a:xfrm>
+      </p:grpSpPr>
+      <p:pic>
+        <p:nvPicPr>
+          <p:cNvPr id="5" name="Content Placeholder 4" descr="A screenshot of a map&#10;&#10;Description automatically generated">
+            <a:extLst>
+              <a:ext uri="{FF2B5EF4-FFF2-40B4-BE49-F238E27FC236}">
+                <a16:creationId xmlns:a16="http://schemas.microsoft.com/office/drawing/2014/main" id="{A6172785-CFD4-8967-EAAD-649AC6E17754}"/>
+              </a:ext>
+            </a:extLst>
+          </p:cNvPr>
+          <p:cNvPicPr>
+            <a:picLocks noGrp="1" noChangeAspect="1"/>
+          </p:cNvPicPr>
+          <p:nvPr>
+            <p:ph idx="1"/>
+          </p:nvPr>
+        </p:nvPicPr>
+        <p:blipFill>
+          <a:blip r:embed="rId3">
+            <a:extLst>
+              <a:ext uri="{28A0092B-C50C-407E-A947-70E740481C1C}">
+                <a14:useLocalDpi xmlns:a14="http://schemas.microsoft.com/office/drawing/2010/main" val="0"/>
+              </a:ext>
+            </a:extLst>
+          </a:blip>
+          <a:stretch>
+            <a:fillRect/>
+          </a:stretch>
+        </p:blipFill>
+        <p:spPr>
+          <a:xfrm>
+            <a:off x="-9832" y="-1"/>
+            <a:ext cx="8504903" cy="6858001"/>
+          </a:xfrm>
+        </p:spPr>
+      </p:pic>
+      <p:sp>
+        <p:nvSpPr>
+          <p:cNvPr id="3" name="TextBox 2">
+            <a:extLst>
+              <a:ext uri="{FF2B5EF4-FFF2-40B4-BE49-F238E27FC236}">
+                <a16:creationId xmlns:a16="http://schemas.microsoft.com/office/drawing/2014/main" id="{F04BB51C-C235-7BD5-7638-5AD75E9598B2}"/>
+              </a:ext>
+            </a:extLst>
+          </p:cNvPr>
+          <p:cNvSpPr txBox="1"/>
+          <p:nvPr/>
+        </p:nvSpPr>
+        <p:spPr>
+          <a:xfrm>
+            <a:off x="619433" y="442452"/>
+            <a:ext cx="7983794" cy="369332"/>
+          </a:xfrm>
+          <a:prstGeom prst="rect">
+            <a:avLst/>
+          </a:prstGeom>
+          <a:noFill/>
+        </p:spPr>
+        <p:txBody>
+          <a:bodyPr wrap="square" rtlCol="0">
+            <a:spAutoFit/>
+          </a:bodyPr>
+          <a:lstStyle/>
+          <a:p>
+            <a:r>
+              <a:rPr lang="en-US" dirty="0"/>
+              <a:t>Interactive map showing median home values across all 23 county subdivisions</a:t>
+            </a:r>
+          </a:p>
+        </p:txBody>
+      </p:sp>
+      <p:sp>
+        <p:nvSpPr>
+          <p:cNvPr id="4" name="TextBox 3">
+            <a:extLst>
+              <a:ext uri="{FF2B5EF4-FFF2-40B4-BE49-F238E27FC236}">
+                <a16:creationId xmlns:a16="http://schemas.microsoft.com/office/drawing/2014/main" id="{2206C14A-2054-D4B9-E52E-B3CFAFE461F2}"/>
+              </a:ext>
+            </a:extLst>
+          </p:cNvPr>
+          <p:cNvSpPr txBox="1"/>
+          <p:nvPr/>
+        </p:nvSpPr>
+        <p:spPr>
+          <a:xfrm>
+            <a:off x="7796980" y="1116584"/>
+            <a:ext cx="4395019" cy="3416320"/>
+          </a:xfrm>
+          <a:prstGeom prst="rect">
+            <a:avLst/>
+          </a:prstGeom>
+          <a:noFill/>
+        </p:spPr>
+        <p:txBody>
+          <a:bodyPr wrap="square" rtlCol="0">
+            <a:spAutoFit/>
+          </a:bodyPr>
+          <a:lstStyle/>
+          <a:p>
+            <a:r>
+              <a:rPr lang="en-US" b="1" i="0" dirty="0">
+                <a:solidFill>
+                  <a:srgbClr val="1D1C1D"/>
+                </a:solidFill>
+                <a:effectLst/>
+                <a:latin typeface="Slack-Lato"/>
+              </a:rPr>
+              <a:t>Highest Median Home Value (2023)</a:t>
+            </a:r>
+            <a:br>
+              <a:rPr lang="en-US" dirty="0"/>
+            </a:br>
+            <a:r>
+              <a:rPr lang="en-US" b="0" i="0" dirty="0">
+                <a:solidFill>
+                  <a:srgbClr val="1D1C1D"/>
+                </a:solidFill>
+                <a:effectLst/>
+                <a:latin typeface="Slack-Lato"/>
+              </a:rPr>
+              <a:t>Skyline, Multnomah, Oregon – $780,100</a:t>
+            </a:r>
+            <a:br>
+              <a:rPr lang="en-US" dirty="0"/>
+            </a:br>
+            <a:r>
+              <a:rPr lang="en-US" b="0" i="0" dirty="0">
+                <a:solidFill>
+                  <a:srgbClr val="1D1C1D"/>
+                </a:solidFill>
+                <a:effectLst/>
+                <a:latin typeface="Slack-Lato"/>
+              </a:rPr>
+              <a:t>Yoder, Clackamas, Oregon – $719,800</a:t>
+            </a:r>
+            <a:br>
+              <a:rPr lang="en-US" dirty="0"/>
+            </a:br>
+            <a:r>
+              <a:rPr lang="en-US" b="0" i="0" dirty="0">
+                <a:solidFill>
+                  <a:srgbClr val="1D1C1D"/>
+                </a:solidFill>
+                <a:effectLst/>
+                <a:latin typeface="Slack-Lato"/>
+              </a:rPr>
+              <a:t>Portland West, Multnomah, Oregon – $694,000</a:t>
+            </a:r>
+            <a:br>
+              <a:rPr lang="en-US" dirty="0"/>
+            </a:br>
+            <a:r>
+              <a:rPr lang="en-US" b="0" i="0" dirty="0">
+                <a:solidFill>
+                  <a:srgbClr val="1D1C1D"/>
+                </a:solidFill>
+                <a:effectLst/>
+                <a:latin typeface="Slack-Lato"/>
+              </a:rPr>
+              <a:t>Wilsonville, Clackamas, Oregon – $605,600</a:t>
+            </a:r>
+            <a:br>
+              <a:rPr lang="en-US" dirty="0"/>
+            </a:br>
+            <a:r>
+              <a:rPr lang="en-US" b="1" i="0" dirty="0">
+                <a:solidFill>
+                  <a:srgbClr val="1D1C1D"/>
+                </a:solidFill>
+                <a:effectLst/>
+                <a:latin typeface="Slack-Lato"/>
+              </a:rPr>
+              <a:t>Lowest Median Home Value (2023)</a:t>
+            </a:r>
+            <a:br>
+              <a:rPr lang="en-US" dirty="0"/>
+            </a:br>
+            <a:r>
+              <a:rPr lang="en-US" b="0" i="0" dirty="0">
+                <a:solidFill>
+                  <a:srgbClr val="1D1C1D"/>
+                </a:solidFill>
+                <a:effectLst/>
+                <a:latin typeface="Slack-Lato"/>
+              </a:rPr>
+              <a:t>Gresham, Multnomah, Oregon – $438,300</a:t>
+            </a:r>
+            <a:br>
+              <a:rPr lang="en-US" dirty="0"/>
+            </a:br>
+            <a:r>
+              <a:rPr lang="en-US" b="0" i="0" dirty="0">
+                <a:solidFill>
+                  <a:srgbClr val="1D1C1D"/>
+                </a:solidFill>
+                <a:effectLst/>
+                <a:latin typeface="Slack-Lato"/>
+              </a:rPr>
+              <a:t>Molalla, Clackamas, Oregon – $438,300</a:t>
+            </a:r>
+            <a:br>
+              <a:rPr lang="en-US" dirty="0"/>
+            </a:br>
+            <a:r>
+              <a:rPr lang="en-US" b="0" i="0" dirty="0">
+                <a:solidFill>
+                  <a:srgbClr val="1D1C1D"/>
+                </a:solidFill>
+                <a:effectLst/>
+                <a:latin typeface="Slack-Lato"/>
+              </a:rPr>
+              <a:t>Forest Grove-Cornelius, Washington, Oregon – $457,200</a:t>
+            </a:r>
+            <a:br>
+              <a:rPr lang="en-US" dirty="0"/>
+            </a:br>
+            <a:r>
+              <a:rPr lang="en-US" b="0" i="0" dirty="0">
+                <a:solidFill>
+                  <a:srgbClr val="1D1C1D"/>
+                </a:solidFill>
+                <a:effectLst/>
+                <a:latin typeface="Slack-Lato"/>
+              </a:rPr>
+              <a:t>Canby, Clackamas, Oregon – $484,700</a:t>
+            </a:r>
+            <a:endParaRPr lang="en-US" dirty="0"/>
+          </a:p>
+        </p:txBody>
+      </p:sp>
+    </p:spTree>
+    <p:extLst>
+      <p:ext uri="{BB962C8B-B14F-4D97-AF65-F5344CB8AC3E}">
+        <p14:creationId xmlns:p14="http://schemas.microsoft.com/office/powerpoint/2010/main" val="1289324827"/>
+      </p:ext>
+    </p:extLst>
+  </p:cSld>
+  <p:clrMapOvr>
+    <a:masterClrMapping/>
+  </p:clrMapOvr>
+</p:sld>
+</file>
+
+<file path=ppt/slides/slide4.xml><?xml version="1.0" encoding="utf-8"?>
+<p:sld xmlns:a="http://schemas.openxmlformats.org/drawingml/2006/main" xmlns:r="http://schemas.openxmlformats.org/officeDocument/2006/relationships" xmlns:p="http://schemas.openxmlformats.org/presentationml/2006/main">
+  <p:cSld>
+    <p:spTree>
+      <p:nvGrpSpPr>
+        <p:cNvPr id="1" name=""/>
+        <p:cNvGrpSpPr/>
+        <p:nvPr/>
+      </p:nvGrpSpPr>
+      <p:grpSpPr>
+        <a:xfrm>
+          <a:off x="0" y="0"/>
+          <a:ext cx="0" cy="0"/>
+          <a:chOff x="0" y="0"/>
+          <a:chExt cx="0" cy="0"/>
+        </a:xfrm>
+      </p:grpSpPr>
+      <p:sp>
+        <p:nvSpPr>
+          <p:cNvPr id="2" name="Title 1">
+            <a:extLst>
+              <a:ext uri="{FF2B5EF4-FFF2-40B4-BE49-F238E27FC236}">
+                <a16:creationId xmlns:a16="http://schemas.microsoft.com/office/drawing/2014/main" id="{E9C7A802-C906-2D69-681B-9A7082BCC553}"/>
+              </a:ext>
+            </a:extLst>
+          </p:cNvPr>
+          <p:cNvSpPr>
+            <a:spLocks noGrp="1"/>
+          </p:cNvSpPr>
+          <p:nvPr>
+            <p:ph type="title"/>
+          </p:nvPr>
+        </p:nvSpPr>
+        <p:spPr/>
+        <p:txBody>
+          <a:bodyPr>
+            <a:normAutofit fontScale="90000"/>
+          </a:bodyPr>
+          <a:lstStyle/>
+          <a:p>
+            <a:r>
+              <a:rPr lang="en-US" b="1" i="1" dirty="0">
+                <a:solidFill>
+                  <a:srgbClr val="1D1C1D"/>
+                </a:solidFill>
+                <a:effectLst/>
+                <a:latin typeface="Slack-Lato"/>
+              </a:rPr>
+              <a:t>Did changes in housing inventory influence home values from 2019 to 2023?</a:t>
+            </a:r>
+            <a:br>
+              <a:rPr lang="en-US" dirty="0"/>
+            </a:br>
+            <a:endParaRPr lang="en-US" dirty="0"/>
+          </a:p>
+        </p:txBody>
+      </p:sp>
+      <p:sp>
+        <p:nvSpPr>
+          <p:cNvPr id="3" name="Content Placeholder 2">
+            <a:extLst>
+              <a:ext uri="{FF2B5EF4-FFF2-40B4-BE49-F238E27FC236}">
+                <a16:creationId xmlns:a16="http://schemas.microsoft.com/office/drawing/2014/main" id="{A7FC7537-F700-4E2A-5361-7A17A3DC398C}"/>
+              </a:ext>
+            </a:extLst>
+          </p:cNvPr>
+          <p:cNvSpPr>
+            <a:spLocks noGrp="1"/>
+          </p:cNvSpPr>
+          <p:nvPr>
+            <p:ph idx="1"/>
+          </p:nvPr>
+        </p:nvSpPr>
+        <p:spPr/>
+        <p:txBody>
+          <a:bodyPr/>
+          <a:lstStyle/>
+          <a:p>
+            <a:r>
+              <a:rPr lang="en-US" b="1" i="0" dirty="0">
+                <a:solidFill>
+                  <a:srgbClr val="1D1C1D"/>
+                </a:solidFill>
+                <a:effectLst/>
+                <a:latin typeface="Slack-Lato"/>
+              </a:rPr>
+              <a:t>Null Hypothesis:</a:t>
+            </a:r>
+            <a:r>
+              <a:rPr lang="en-US" b="0" i="0" dirty="0">
+                <a:solidFill>
+                  <a:srgbClr val="1D1C1D"/>
+                </a:solidFill>
+                <a:effectLst/>
+                <a:latin typeface="Slack-Lato"/>
+              </a:rPr>
+              <a:t> Changes in housing inventory did not significantly influence median home values in Washington, Clackamas, and Multnomah Counties from 2019 to 2023.</a:t>
+            </a:r>
+          </a:p>
+          <a:p>
+            <a:r>
+              <a:rPr lang="en-US" b="1" i="0" dirty="0">
+                <a:solidFill>
+                  <a:srgbClr val="1D1C1D"/>
+                </a:solidFill>
+                <a:effectLst/>
+                <a:latin typeface="Slack-Lato"/>
+              </a:rPr>
+              <a:t>Alternative Hypothesis:</a:t>
+            </a:r>
+            <a:r>
+              <a:rPr lang="en-US" b="0" i="0" dirty="0">
+                <a:solidFill>
+                  <a:srgbClr val="1D1C1D"/>
+                </a:solidFill>
+                <a:effectLst/>
+                <a:latin typeface="Slack-Lato"/>
+              </a:rPr>
+              <a:t> Changes in housing inventory had a statistically significant influence on median home values in Washington, Clackamas, and Multnomah Counties from 2019 to 2023.</a:t>
+            </a:r>
+            <a:endParaRPr lang="en-US" dirty="0"/>
+          </a:p>
+        </p:txBody>
+      </p:sp>
+    </p:spTree>
+    <p:extLst>
+      <p:ext uri="{BB962C8B-B14F-4D97-AF65-F5344CB8AC3E}">
+        <p14:creationId xmlns:p14="http://schemas.microsoft.com/office/powerpoint/2010/main" val="1401788394"/>
+      </p:ext>
+    </p:extLst>
+  </p:cSld>
+  <p:clrMapOvr>
+    <a:masterClrMapping/>
+  </p:clrMapOvr>
+</p:sld>
+</file>
+
+<file path=ppt/slides/slide5.xml><?xml version="1.0" encoding="utf-8"?>
+<p:sld xmlns:a="http://schemas.openxmlformats.org/drawingml/2006/main" xmlns:r="http://schemas.openxmlformats.org/officeDocument/2006/relationships" xmlns:p="http://schemas.openxmlformats.org/presentationml/2006/main">
+  <p:cSld>
+    <p:bg>
+      <p:bgPr>
+        <a:solidFill>
+          <a:schemeClr val="bg1"/>
+        </a:solidFill>
+        <a:effectLst/>
+      </p:bgPr>
+    </p:bg>
+    <p:spTree>
+      <p:nvGrpSpPr>
+        <p:cNvPr id="1" name=""/>
+        <p:cNvGrpSpPr/>
+        <p:nvPr/>
+      </p:nvGrpSpPr>
+      <p:grpSpPr>
+        <a:xfrm>
+          <a:off x="0" y="0"/>
+          <a:ext cx="0" cy="0"/>
+          <a:chOff x="0" y="0"/>
+          <a:chExt cx="0" cy="0"/>
+        </a:xfrm>
+      </p:grpSpPr>
+      <p:sp useBgFill="1">
+        <p:nvSpPr>
+          <p:cNvPr id="40" name="Rectangle 39">
+            <a:extLst>
+              <a:ext uri="{FF2B5EF4-FFF2-40B4-BE49-F238E27FC236}">
+                <a16:creationId xmlns:a16="http://schemas.microsoft.com/office/drawing/2014/main" id="{3756B343-807D-456E-AA26-80E96B75D13B}"/>
+              </a:ext>
+              <a:ext uri="{C183D7F6-B498-43B3-948B-1728B52AA6E4}">
+                <adec:decorative xmlns:adec="http://schemas.microsoft.com/office/drawing/2017/decorative" val="1"/>
+              </a:ext>
+            </a:extLst>
+          </p:cNvPr>
+          <p:cNvSpPr>
+            <a:spLocks noGrp="1" noRot="1" noChangeAspect="1" noMove="1" noResize="1" noEditPoints="1" noAdjustHandles="1" noChangeArrowheads="1" noChangeShapeType="1" noTextEdit="1"/>
+          </p:cNvSpPr>
+          <p:nvPr>
+            <p:extLst>
+              <p:ext uri="{386F3935-93C4-4BCD-93E2-E3B085C9AB24}">
+                <p16:designElem xmlns:p16="http://schemas.microsoft.com/office/powerpoint/2015/main" val="1"/>
+              </p:ext>
+            </p:extLst>
+          </p:nvPr>
+        </p:nvSpPr>
+        <p:spPr>
+          <a:xfrm>
+            <a:off x="0" y="0"/>
+            <a:ext cx="12191999" cy="6857365"/>
+          </a:xfrm>
+          <a:prstGeom prst="rect">
+            <a:avLst/>
+          </a:prstGeom>
+          <a:ln>
+            <a:noFill/>
+          </a:ln>
+        </p:spPr>
+        <p:style>
+          <a:lnRef idx="2">
+            <a:schemeClr val="accent1">
+              <a:shade val="50000"/>
+            </a:schemeClr>
+          </a:lnRef>
+          <a:fillRef idx="1">
+            <a:schemeClr val="accent1"/>
+          </a:fillRef>
+          <a:effectRef idx="0">
+            <a:schemeClr val="accent1"/>
+          </a:effectRef>
+          <a:fontRef idx="minor">
+            <a:schemeClr val="lt1"/>
+          </a:fontRef>
+        </p:style>
+        <p:txBody>
+          <a:bodyPr rtlCol="0" anchor="ctr"/>
+          <a:lstStyle/>
+          <a:p>
+            <a:pPr algn="ctr"/>
+            <a:endParaRPr lang="en-US"/>
+          </a:p>
+        </p:txBody>
+      </p:sp>
+      <p:sp>
+        <p:nvSpPr>
+          <p:cNvPr id="42" name="Rectangle 41">
+            <a:extLst>
+              <a:ext uri="{FF2B5EF4-FFF2-40B4-BE49-F238E27FC236}">
+                <a16:creationId xmlns:a16="http://schemas.microsoft.com/office/drawing/2014/main" id="{08980754-6F4B-43C9-B9BE-127B6BED6586}"/>
+              </a:ext>
+              <a:ext uri="{C183D7F6-B498-43B3-948B-1728B52AA6E4}">
+                <adec:decorative xmlns:adec="http://schemas.microsoft.com/office/drawing/2017/decorative" val="1"/>
+              </a:ext>
+            </a:extLst>
+          </p:cNvPr>
+          <p:cNvSpPr>
+            <a:spLocks noGrp="1" noRot="1" noChangeAspect="1" noMove="1" noResize="1" noEditPoints="1" noAdjustHandles="1" noChangeArrowheads="1" noChangeShapeType="1" noTextEdit="1"/>
+          </p:cNvSpPr>
+          <p:nvPr>
+            <p:extLst>
+              <p:ext uri="{386F3935-93C4-4BCD-93E2-E3B085C9AB24}">
+                <p16:designElem xmlns:p16="http://schemas.microsoft.com/office/powerpoint/2015/main" val="1"/>
+              </p:ext>
+            </p:extLst>
+          </p:nvPr>
+        </p:nvSpPr>
+        <p:spPr>
+          <a:xfrm rot="5400000">
+            <a:off x="5546413" y="215201"/>
+            <a:ext cx="740664" cy="11833491"/>
+          </a:xfrm>
+          <a:prstGeom prst="rect">
+            <a:avLst/>
+          </a:prstGeom>
+          <a:solidFill>
+            <a:schemeClr val="accent4"/>
+          </a:solidFill>
+          <a:ln>
+            <a:noFill/>
+          </a:ln>
+        </p:spPr>
+        <p:style>
+          <a:lnRef idx="2">
+            <a:schemeClr val="accent1">
+              <a:shade val="50000"/>
+            </a:schemeClr>
+          </a:lnRef>
+          <a:fillRef idx="1">
+            <a:schemeClr val="accent1"/>
+          </a:fillRef>
+          <a:effectRef idx="0">
+            <a:schemeClr val="accent1"/>
+          </a:effectRef>
+          <a:fontRef idx="minor">
+            <a:schemeClr val="lt1"/>
+          </a:fontRef>
+        </p:style>
+        <p:txBody>
+          <a:bodyPr rtlCol="0" anchor="ctr"/>
+          <a:lstStyle/>
+          <a:p>
+            <a:pPr algn="ctr"/>
+            <a:endParaRPr lang="en-US"/>
+          </a:p>
+        </p:txBody>
+      </p:sp>
+      <p:sp>
+        <p:nvSpPr>
+          <p:cNvPr id="44" name="Rectangle 43">
+            <a:extLst>
+              <a:ext uri="{FF2B5EF4-FFF2-40B4-BE49-F238E27FC236}">
+                <a16:creationId xmlns:a16="http://schemas.microsoft.com/office/drawing/2014/main" id="{2C1BBA94-3F40-40AA-8BB9-E69E25E537C1}"/>
+              </a:ext>
+              <a:ext uri="{C183D7F6-B498-43B3-948B-1728B52AA6E4}">
+                <adec:decorative xmlns:adec="http://schemas.microsoft.com/office/drawing/2017/decorative" val="1"/>
+              </a:ext>
+            </a:extLst>
+          </p:cNvPr>
+          <p:cNvSpPr>
+            <a:spLocks noGrp="1" noRot="1" noChangeAspect="1" noMove="1" noResize="1" noEditPoints="1" noAdjustHandles="1" noChangeArrowheads="1" noChangeShapeType="1" noTextEdit="1"/>
+          </p:cNvSpPr>
+          <p:nvPr>
+            <p:extLst>
+              <p:ext uri="{386F3935-93C4-4BCD-93E2-E3B085C9AB24}">
+                <p16:designElem xmlns:p16="http://schemas.microsoft.com/office/powerpoint/2015/main" val="1"/>
+              </p:ext>
+            </p:extLst>
+          </p:nvPr>
+        </p:nvSpPr>
+        <p:spPr>
+          <a:xfrm>
+            <a:off x="310234" y="354959"/>
+            <a:ext cx="6184973" cy="5915212"/>
+          </a:xfrm>
+          <a:prstGeom prst="rect">
+            <a:avLst/>
+          </a:prstGeom>
+          <a:solidFill>
+            <a:schemeClr val="bg1"/>
+          </a:solidFill>
+          <a:ln>
+            <a:noFill/>
+          </a:ln>
+          <a:effectLst>
+            <a:outerShdw blurRad="139700" dist="127000" dir="5400000" algn="t" rotWithShape="0">
+              <a:prstClr val="black">
+                <a:alpha val="15000"/>
+              </a:prstClr>
+            </a:outerShdw>
+          </a:effectLst>
+        </p:spPr>
+        <p:style>
+          <a:lnRef idx="2">
+            <a:schemeClr val="accent1">
+              <a:shade val="50000"/>
+            </a:schemeClr>
+          </a:lnRef>
+          <a:fillRef idx="1">
+            <a:schemeClr val="accent1"/>
+          </a:fillRef>
+          <a:effectRef idx="0">
+            <a:schemeClr val="accent1"/>
+          </a:effectRef>
+          <a:fontRef idx="minor">
+            <a:schemeClr val="lt1"/>
+          </a:fontRef>
+        </p:style>
+        <p:txBody>
+          <a:bodyPr rtlCol="0" anchor="ctr"/>
+          <a:lstStyle/>
+          <a:p>
+            <a:pPr algn="ctr"/>
+            <a:endParaRPr lang="en-US"/>
+          </a:p>
+        </p:txBody>
+      </p:sp>
+      <p:pic>
+        <p:nvPicPr>
+          <p:cNvPr id="9" name="Content Placeholder 8" descr="A graph with red and green lines and numbers&#10;&#10;Description automatically generated">
+            <a:extLst>
+              <a:ext uri="{FF2B5EF4-FFF2-40B4-BE49-F238E27FC236}">
+                <a16:creationId xmlns:a16="http://schemas.microsoft.com/office/drawing/2014/main" id="{9CDF5D82-53A2-67CD-4392-999572E5A75E}"/>
+              </a:ext>
+            </a:extLst>
+          </p:cNvPr>
+          <p:cNvPicPr>
+            <a:picLocks noGrp="1" noChangeAspect="1"/>
+          </p:cNvPicPr>
+          <p:nvPr>
+            <p:ph idx="1"/>
+          </p:nvPr>
+        </p:nvPicPr>
+        <p:blipFill>
+          <a:blip r:embed="rId2">
+            <a:extLst>
+              <a:ext uri="{28A0092B-C50C-407E-A947-70E740481C1C}">
+                <a14:useLocalDpi xmlns:a14="http://schemas.microsoft.com/office/drawing/2010/main" val="0"/>
+              </a:ext>
+            </a:extLst>
+          </a:blip>
+          <a:srcRect l="8117" r="12601" b="-1"/>
+          <a:stretch/>
+        </p:blipFill>
+        <p:spPr>
+          <a:xfrm>
+            <a:off x="576244" y="650494"/>
+            <a:ext cx="5628018" cy="5324142"/>
+          </a:xfrm>
+          <a:prstGeom prst="rect">
+            <a:avLst/>
+          </a:prstGeom>
+        </p:spPr>
+      </p:pic>
+      <p:sp>
+        <p:nvSpPr>
+          <p:cNvPr id="46" name="Rectangle 45">
+            <a:extLst>
+              <a:ext uri="{FF2B5EF4-FFF2-40B4-BE49-F238E27FC236}">
+                <a16:creationId xmlns:a16="http://schemas.microsoft.com/office/drawing/2014/main" id="{169CC832-2974-4E8D-90ED-3E2941BA7336}"/>
+              </a:ext>
+              <a:ext uri="{C183D7F6-B498-43B3-948B-1728B52AA6E4}">
+                <adec:decorative xmlns:adec="http://schemas.microsoft.com/office/drawing/2017/decorative" val="1"/>
+              </a:ext>
+            </a:extLst>
+          </p:cNvPr>
+          <p:cNvSpPr>
+            <a:spLocks noGrp="1" noRot="1" noChangeAspect="1" noMove="1" noResize="1" noEditPoints="1" noAdjustHandles="1" noChangeArrowheads="1" noChangeShapeType="1" noTextEdit="1"/>
+          </p:cNvSpPr>
+          <p:nvPr>
+            <p:extLst>
+              <p:ext uri="{386F3935-93C4-4BCD-93E2-E3B085C9AB24}">
+                <p16:designElem xmlns:p16="http://schemas.microsoft.com/office/powerpoint/2015/main" val="1"/>
+              </p:ext>
+            </p:extLst>
+          </p:nvPr>
+        </p:nvSpPr>
+        <p:spPr>
+          <a:xfrm flipH="1">
+            <a:off x="7277786" y="1944913"/>
+            <a:ext cx="4023360" cy="27432"/>
+          </a:xfrm>
+          <a:prstGeom prst="rect">
+            <a:avLst/>
+          </a:prstGeom>
+          <a:solidFill>
+            <a:schemeClr val="accent4"/>
+          </a:solidFill>
+          <a:ln>
+            <a:noFill/>
+          </a:ln>
+        </p:spPr>
+        <p:style>
+          <a:lnRef idx="2">
+            <a:schemeClr val="accent1">
+              <a:shade val="50000"/>
+            </a:schemeClr>
+          </a:lnRef>
+          <a:fillRef idx="1">
+            <a:schemeClr val="accent1"/>
+          </a:fillRef>
+          <a:effectRef idx="0">
+            <a:schemeClr val="accent1"/>
+          </a:effectRef>
+          <a:fontRef idx="minor">
+            <a:schemeClr val="lt1"/>
+          </a:fontRef>
+        </p:style>
+        <p:txBody>
+          <a:bodyPr rtlCol="0" anchor="ctr"/>
+          <a:lstStyle/>
+          <a:p>
+            <a:pPr algn="ctr"/>
+            <a:endParaRPr lang="en-US"/>
+          </a:p>
+        </p:txBody>
+      </p:sp>
+      <p:sp>
+        <p:nvSpPr>
+          <p:cNvPr id="11" name="Text Placeholder 10">
+            <a:extLst>
+              <a:ext uri="{FF2B5EF4-FFF2-40B4-BE49-F238E27FC236}">
+                <a16:creationId xmlns:a16="http://schemas.microsoft.com/office/drawing/2014/main" id="{7D751BA9-8535-6D9F-1DED-47A6BB8E3499}"/>
+              </a:ext>
+            </a:extLst>
+          </p:cNvPr>
+          <p:cNvSpPr>
+            <a:spLocks noGrp="1"/>
+          </p:cNvSpPr>
+          <p:nvPr>
+            <p:ph type="body" sz="half" idx="2"/>
+          </p:nvPr>
+        </p:nvSpPr>
+        <p:spPr>
+          <a:xfrm>
+            <a:off x="7239012" y="2031101"/>
+            <a:ext cx="4282984" cy="3511943"/>
+          </a:xfrm>
+        </p:spPr>
+        <p:txBody>
+          <a:bodyPr vert="horz" lIns="91440" tIns="45720" rIns="91440" bIns="45720" rtlCol="0" anchor="ctr">
+            <a:normAutofit/>
+          </a:bodyPr>
+          <a:lstStyle/>
+          <a:p>
+            <a:pPr indent="-228600">
+              <a:buFont typeface="Arial" panose="020B0604020202020204" pitchFamily="34" charset="0"/>
+              <a:buChar char="•"/>
+            </a:pPr>
+            <a:r>
+              <a:rPr lang="en-US" sz="1800" b="1" dirty="0">
+                <a:effectLst/>
+              </a:rPr>
+              <a:t>Significant correlation in Clackamas and Multnomah</a:t>
+            </a:r>
+            <a:r>
+              <a:rPr lang="en-US" sz="1800" b="0" dirty="0">
+                <a:effectLst/>
+              </a:rPr>
+              <a:t> → As inventory decreased, home values rose.</a:t>
+            </a:r>
+          </a:p>
+          <a:p>
+            <a:pPr indent="-228600">
+              <a:buFont typeface="Arial" panose="020B0604020202020204" pitchFamily="34" charset="0"/>
+              <a:buChar char="•"/>
+            </a:pPr>
+            <a:endParaRPr lang="en-US" sz="1800" b="0" dirty="0">
+              <a:effectLst/>
+            </a:endParaRPr>
+          </a:p>
+          <a:p>
+            <a:pPr indent="-228600">
+              <a:buFont typeface="Arial" panose="020B0604020202020204" pitchFamily="34" charset="0"/>
+              <a:buChar char="•"/>
+            </a:pPr>
+            <a:r>
+              <a:rPr lang="en-US" sz="1800" b="1" dirty="0">
+                <a:effectLst/>
+              </a:rPr>
+              <a:t>Washington County had almost no relationship (R² = 0.0554)</a:t>
+            </a:r>
+            <a:r>
+              <a:rPr lang="en-US" sz="1800" b="0" dirty="0">
+                <a:effectLst/>
+              </a:rPr>
+              <a:t>, meaning inventory changes did not meaningfully impact home values there.</a:t>
+            </a:r>
+          </a:p>
+          <a:p>
+            <a:pPr indent="-228600">
+              <a:buFont typeface="Arial" panose="020B0604020202020204" pitchFamily="34" charset="0"/>
+              <a:buChar char="•"/>
+            </a:pPr>
+            <a:endParaRPr lang="en-US" sz="1800" dirty="0"/>
+          </a:p>
+        </p:txBody>
+      </p:sp>
+      <p:sp>
+        <p:nvSpPr>
+          <p:cNvPr id="48" name="Rectangle 47">
+            <a:extLst>
+              <a:ext uri="{FF2B5EF4-FFF2-40B4-BE49-F238E27FC236}">
+                <a16:creationId xmlns:a16="http://schemas.microsoft.com/office/drawing/2014/main" id="{55222F96-971A-4F90-B841-6BAB416C7AC1}"/>
+              </a:ext>
+              <a:ext uri="{C183D7F6-B498-43B3-948B-1728B52AA6E4}">
+                <adec:decorative xmlns:adec="http://schemas.microsoft.com/office/drawing/2017/decorative" val="1"/>
+              </a:ext>
+            </a:extLst>
+          </p:cNvPr>
+          <p:cNvSpPr>
+            <a:spLocks noGrp="1" noRot="1" noChangeAspect="1" noMove="1" noResize="1" noEditPoints="1" noAdjustHandles="1" noChangeArrowheads="1" noChangeShapeType="1" noTextEdit="1"/>
+          </p:cNvSpPr>
+          <p:nvPr>
+            <p:extLst>
+              <p:ext uri="{386F3935-93C4-4BCD-93E2-E3B085C9AB24}">
+                <p16:designElem xmlns:p16="http://schemas.microsoft.com/office/powerpoint/2015/main" val="1"/>
+              </p:ext>
+            </p:extLst>
+          </p:nvPr>
+        </p:nvSpPr>
+        <p:spPr>
+          <a:xfrm rot="5400000">
+            <a:off x="11677179" y="6053360"/>
+            <a:ext cx="740664" cy="154124"/>
+          </a:xfrm>
+          <a:prstGeom prst="rect">
+            <a:avLst/>
+          </a:prstGeom>
+          <a:solidFill>
+            <a:schemeClr val="accent4"/>
+          </a:solidFill>
+          <a:ln>
+            <a:noFill/>
+          </a:ln>
+        </p:spPr>
+        <p:style>
+          <a:lnRef idx="2">
+            <a:schemeClr val="accent1">
+              <a:shade val="50000"/>
+            </a:schemeClr>
+          </a:lnRef>
+          <a:fillRef idx="1">
+            <a:schemeClr val="accent1"/>
+          </a:fillRef>
+          <a:effectRef idx="0">
+            <a:schemeClr val="accent1"/>
+          </a:effectRef>
+          <a:fontRef idx="minor">
+            <a:schemeClr val="lt1"/>
+          </a:fontRef>
+        </p:style>
+        <p:txBody>
+          <a:bodyPr rtlCol="0" anchor="ctr"/>
+          <a:lstStyle/>
+          <a:p>
+            <a:pPr algn="ctr"/>
+            <a:endParaRPr lang="en-US"/>
+          </a:p>
+        </p:txBody>
+      </p:sp>
+    </p:spTree>
+    <p:extLst>
+      <p:ext uri="{BB962C8B-B14F-4D97-AF65-F5344CB8AC3E}">
+        <p14:creationId xmlns:p14="http://schemas.microsoft.com/office/powerpoint/2010/main" val="1343469666"/>
+      </p:ext>
+    </p:extLst>
+  </p:cSld>
+  <p:clrMapOvr>
+    <a:masterClrMapping/>
+  </p:clrMapOvr>
+</p:sld>
+</file>
+
+<file path=ppt/slides/slide6.xml><?xml version="1.0" encoding="utf-8"?>
+<p:sld xmlns:a="http://schemas.openxmlformats.org/drawingml/2006/main" xmlns:r="http://schemas.openxmlformats.org/officeDocument/2006/relationships" xmlns:p="http://schemas.openxmlformats.org/presentationml/2006/main">
+  <p:cSld>
+    <p:spTree>
+      <p:nvGrpSpPr>
+        <p:cNvPr id="1" name=""/>
+        <p:cNvGrpSpPr/>
+        <p:nvPr/>
+      </p:nvGrpSpPr>
+      <p:grpSpPr>
+        <a:xfrm>
+          <a:off x="0" y="0"/>
+          <a:ext cx="0" cy="0"/>
+          <a:chOff x="0" y="0"/>
+          <a:chExt cx="0" cy="0"/>
+        </a:xfrm>
+      </p:grpSpPr>
+      <p:sp>
+        <p:nvSpPr>
+          <p:cNvPr id="2" name="Title 1">
+            <a:extLst>
+              <a:ext uri="{FF2B5EF4-FFF2-40B4-BE49-F238E27FC236}">
+                <a16:creationId xmlns:a16="http://schemas.microsoft.com/office/drawing/2014/main" id="{D14C6216-C32C-72D2-4FFF-87B016EDB068}"/>
+              </a:ext>
+            </a:extLst>
+          </p:cNvPr>
+          <p:cNvSpPr>
+            <a:spLocks noGrp="1"/>
+          </p:cNvSpPr>
+          <p:nvPr>
+            <p:ph type="title"/>
+          </p:nvPr>
+        </p:nvSpPr>
+        <p:spPr/>
+        <p:txBody>
+          <a:bodyPr>
+            <a:normAutofit/>
+          </a:bodyPr>
+          <a:lstStyle/>
+          <a:p>
+            <a:r>
+              <a:rPr lang="en-US" b="1" i="1" dirty="0">
+                <a:solidFill>
+                  <a:srgbClr val="1D1C1D"/>
+                </a:solidFill>
+                <a:effectLst/>
+                <a:latin typeface="Slack-Lato"/>
+              </a:rPr>
+              <a:t>Did changes in mortgage rates influence median home values from 2019 to 2023?</a:t>
+            </a:r>
+            <a:endParaRPr lang="en-US" b="1" i="1" dirty="0"/>
+          </a:p>
+        </p:txBody>
+      </p:sp>
+      <p:sp>
+        <p:nvSpPr>
+          <p:cNvPr id="3" name="Content Placeholder 2">
+            <a:extLst>
+              <a:ext uri="{FF2B5EF4-FFF2-40B4-BE49-F238E27FC236}">
+                <a16:creationId xmlns:a16="http://schemas.microsoft.com/office/drawing/2014/main" id="{6A7F2CE1-136A-FE64-5399-AD97FA123AD7}"/>
+              </a:ext>
+            </a:extLst>
+          </p:cNvPr>
+          <p:cNvSpPr>
+            <a:spLocks noGrp="1"/>
+          </p:cNvSpPr>
+          <p:nvPr>
+            <p:ph idx="1"/>
+          </p:nvPr>
+        </p:nvSpPr>
+        <p:spPr/>
+        <p:txBody>
+          <a:bodyPr/>
+          <a:lstStyle/>
+          <a:p>
+            <a:pPr marL="0" indent="0">
+              <a:buNone/>
+            </a:pPr>
+            <a:endParaRPr lang="en-US" b="1" i="0" dirty="0">
+              <a:solidFill>
+                <a:srgbClr val="1D1C1D"/>
+              </a:solidFill>
+              <a:effectLst/>
+              <a:latin typeface="Slack-Lato"/>
+            </a:endParaRPr>
+          </a:p>
+          <a:p>
+            <a:pPr marL="0" indent="0">
+              <a:buNone/>
+            </a:pPr>
+            <a:r>
+              <a:rPr lang="en-US" b="1" i="0" dirty="0">
+                <a:solidFill>
+                  <a:srgbClr val="1D1C1D"/>
+                </a:solidFill>
+                <a:effectLst/>
+                <a:latin typeface="Slack-Lato"/>
+              </a:rPr>
+              <a:t>Null Hypothesis:</a:t>
+            </a:r>
+            <a:r>
+              <a:rPr lang="en-US" b="0" i="0" dirty="0">
+                <a:solidFill>
+                  <a:srgbClr val="1D1C1D"/>
+                </a:solidFill>
+                <a:effectLst/>
+                <a:latin typeface="Slack-Lato"/>
+              </a:rPr>
+              <a:t> Changes in mortgage rates did not significantly influence median home values in Washington, Clackamas, and Multnomah Counties from 2019 to 2023.</a:t>
+            </a:r>
+            <a:r>
+              <a:rPr lang="en-US" b="1" i="0" dirty="0">
+                <a:solidFill>
+                  <a:srgbClr val="1D1C1D"/>
+                </a:solidFill>
+                <a:effectLst/>
+                <a:latin typeface="Slack-Lato"/>
+              </a:rPr>
+              <a:t>Alternative </a:t>
+            </a:r>
+          </a:p>
+          <a:p>
+            <a:pPr marL="0" indent="0">
+              <a:buNone/>
+            </a:pPr>
+            <a:endParaRPr lang="en-US" b="1" dirty="0">
+              <a:solidFill>
+                <a:srgbClr val="1D1C1D"/>
+              </a:solidFill>
+              <a:latin typeface="Slack-Lato"/>
+            </a:endParaRPr>
+          </a:p>
+          <a:p>
+            <a:pPr marL="0" indent="0">
+              <a:buNone/>
+            </a:pPr>
+            <a:r>
+              <a:rPr lang="en-US" b="1" i="0" dirty="0">
+                <a:solidFill>
+                  <a:srgbClr val="1D1C1D"/>
+                </a:solidFill>
+                <a:effectLst/>
+                <a:latin typeface="Slack-Lato"/>
+              </a:rPr>
+              <a:t>Hypothesis: </a:t>
+            </a:r>
+            <a:r>
+              <a:rPr lang="en-US" b="0" i="0" dirty="0">
+                <a:solidFill>
+                  <a:srgbClr val="1D1C1D"/>
+                </a:solidFill>
+                <a:effectLst/>
+                <a:latin typeface="Slack-Lato"/>
+              </a:rPr>
+              <a:t>Changes in mortgage rates had a statistically significant influence on median home values in Washington, Clackamas, and Multnomah Counties from 2019 to 202</a:t>
+            </a:r>
+            <a:endParaRPr lang="en-US" dirty="0"/>
+          </a:p>
+        </p:txBody>
+      </p:sp>
+    </p:spTree>
+    <p:extLst>
+      <p:ext uri="{BB962C8B-B14F-4D97-AF65-F5344CB8AC3E}">
+        <p14:creationId xmlns:p14="http://schemas.microsoft.com/office/powerpoint/2010/main" val="367915691"/>
+      </p:ext>
+    </p:extLst>
+  </p:cSld>
+  <p:clrMapOvr>
+    <a:masterClrMapping/>
+  </p:clrMapOvr>
+</p:sld>
+</file>
+
+<file path=ppt/slides/slide7.xml><?xml version="1.0" encoding="utf-8"?>
+<p:sld xmlns:a="http://schemas.openxmlformats.org/drawingml/2006/main" xmlns:r="http://schemas.openxmlformats.org/officeDocument/2006/relationships" xmlns:p="http://schemas.openxmlformats.org/presentationml/2006/main">
+  <p:cSld>
+    <p:bg>
+      <p:bgPr>
+        <a:solidFill>
+          <a:schemeClr val="bg1"/>
+        </a:solidFill>
+        <a:effectLst/>
+      </p:bgPr>
+    </p:bg>
+    <p:spTree>
+      <p:nvGrpSpPr>
+        <p:cNvPr id="1" name=""/>
+        <p:cNvGrpSpPr/>
+        <p:nvPr/>
+      </p:nvGrpSpPr>
+      <p:grpSpPr>
+        <a:xfrm>
+          <a:off x="0" y="0"/>
+          <a:ext cx="0" cy="0"/>
+          <a:chOff x="0" y="0"/>
+          <a:chExt cx="0" cy="0"/>
+        </a:xfrm>
+      </p:grpSpPr>
+      <p:sp useBgFill="1">
+        <p:nvSpPr>
+          <p:cNvPr id="42" name="Rectangle 41">
+            <a:extLst>
+              <a:ext uri="{FF2B5EF4-FFF2-40B4-BE49-F238E27FC236}">
+                <a16:creationId xmlns:a16="http://schemas.microsoft.com/office/drawing/2014/main" id="{BA79A7CF-01AF-4178-9369-94E0C90EB046}"/>
+              </a:ext>
+              <a:ext uri="{C183D7F6-B498-43B3-948B-1728B52AA6E4}">
+                <adec:decorative xmlns:adec="http://schemas.microsoft.com/office/drawing/2017/decorative" val="1"/>
+              </a:ext>
+            </a:extLst>
+          </p:cNvPr>
+          <p:cNvSpPr>
+            <a:spLocks noGrp="1" noRot="1" noChangeAspect="1" noMove="1" noResize="1" noEditPoints="1" noAdjustHandles="1" noChangeArrowheads="1" noChangeShapeType="1" noTextEdit="1"/>
+          </p:cNvSpPr>
+          <p:nvPr>
+            <p:extLst>
+              <p:ext uri="{386F3935-93C4-4BCD-93E2-E3B085C9AB24}">
+                <p16:designElem xmlns:p16="http://schemas.microsoft.com/office/powerpoint/2015/main" val="1"/>
+              </p:ext>
+            </p:extLst>
+          </p:nvPr>
+        </p:nvSpPr>
+        <p:spPr>
+          <a:xfrm>
+            <a:off x="0" y="0"/>
+            <a:ext cx="12191999" cy="6857365"/>
+          </a:xfrm>
+          <a:prstGeom prst="rect">
+            <a:avLst/>
+          </a:prstGeom>
+          <a:ln>
+            <a:noFill/>
+          </a:ln>
+        </p:spPr>
+        <p:style>
+          <a:lnRef idx="2">
+            <a:schemeClr val="accent1">
+              <a:shade val="50000"/>
+            </a:schemeClr>
+          </a:lnRef>
+          <a:fillRef idx="1">
+            <a:schemeClr val="accent1"/>
+          </a:fillRef>
+          <a:effectRef idx="0">
+            <a:schemeClr val="accent1"/>
+          </a:effectRef>
+          <a:fontRef idx="minor">
+            <a:schemeClr val="lt1"/>
+          </a:fontRef>
+        </p:style>
+        <p:txBody>
+          <a:bodyPr rtlCol="0" anchor="ctr"/>
+          <a:lstStyle/>
+          <a:p>
+            <a:pPr algn="ctr"/>
+            <a:endParaRPr lang="en-US"/>
+          </a:p>
+        </p:txBody>
+      </p:sp>
+      <p:sp>
+        <p:nvSpPr>
+          <p:cNvPr id="44" name="Rectangle 43">
+            <a:extLst>
+              <a:ext uri="{FF2B5EF4-FFF2-40B4-BE49-F238E27FC236}">
+                <a16:creationId xmlns:a16="http://schemas.microsoft.com/office/drawing/2014/main" id="{99413ED5-9ED4-4772-BCE4-2BCAE6B12E35}"/>
+              </a:ext>
+              <a:ext uri="{C183D7F6-B498-43B3-948B-1728B52AA6E4}">
+                <adec:decorative xmlns:adec="http://schemas.microsoft.com/office/drawing/2017/decorative" val="1"/>
+              </a:ext>
+            </a:extLst>
+          </p:cNvPr>
+          <p:cNvSpPr>
+            <a:spLocks noGrp="1" noRot="1" noChangeAspect="1" noMove="1" noResize="1" noEditPoints="1" noAdjustHandles="1" noChangeArrowheads="1" noChangeShapeType="1" noTextEdit="1"/>
+          </p:cNvSpPr>
+          <p:nvPr>
+            <p:extLst>
+              <p:ext uri="{386F3935-93C4-4BCD-93E2-E3B085C9AB24}">
+                <p16:designElem xmlns:p16="http://schemas.microsoft.com/office/powerpoint/2015/main" val="1"/>
+              </p:ext>
+            </p:extLst>
+          </p:nvPr>
+        </p:nvSpPr>
+        <p:spPr>
+          <a:xfrm rot="16200000">
+            <a:off x="3433973" y="-827233"/>
+            <a:ext cx="1715478" cy="8583421"/>
+          </a:xfrm>
+          <a:prstGeom prst="rect">
+            <a:avLst/>
+          </a:prstGeom>
+          <a:solidFill>
+            <a:schemeClr val="accent4"/>
+          </a:solidFill>
+          <a:ln>
+            <a:noFill/>
+          </a:ln>
+        </p:spPr>
+        <p:style>
+          <a:lnRef idx="2">
+            <a:schemeClr val="accent1">
+              <a:shade val="50000"/>
+            </a:schemeClr>
+          </a:lnRef>
+          <a:fillRef idx="1">
+            <a:schemeClr val="accent1"/>
+          </a:fillRef>
+          <a:effectRef idx="0">
+            <a:schemeClr val="accent1"/>
+          </a:effectRef>
+          <a:fontRef idx="minor">
+            <a:schemeClr val="lt1"/>
+          </a:fontRef>
+        </p:style>
+        <p:txBody>
+          <a:bodyPr rtlCol="0" anchor="ctr"/>
+          <a:lstStyle/>
+          <a:p>
+            <a:pPr algn="ctr"/>
+            <a:endParaRPr lang="en-US" dirty="0"/>
+          </a:p>
+        </p:txBody>
+      </p:sp>
+      <p:sp>
+        <p:nvSpPr>
+          <p:cNvPr id="46" name="Rectangle 45">
+            <a:extLst>
+              <a:ext uri="{FF2B5EF4-FFF2-40B4-BE49-F238E27FC236}">
+                <a16:creationId xmlns:a16="http://schemas.microsoft.com/office/drawing/2014/main" id="{04357C93-F0CB-4A1C-8F77-4E9063789819}"/>
+              </a:ext>
+              <a:ext uri="{C183D7F6-B498-43B3-948B-1728B52AA6E4}">
+                <adec:decorative xmlns:adec="http://schemas.microsoft.com/office/drawing/2017/decorative" val="1"/>
+              </a:ext>
+            </a:extLst>
+          </p:cNvPr>
+          <p:cNvSpPr>
+            <a:spLocks noGrp="1" noRot="1" noChangeAspect="1" noMove="1" noResize="1" noEditPoints="1" noAdjustHandles="1" noChangeArrowheads="1" noChangeShapeType="1" noTextEdit="1"/>
+          </p:cNvSpPr>
+          <p:nvPr>
+            <p:extLst>
+              <p:ext uri="{386F3935-93C4-4BCD-93E2-E3B085C9AB24}">
+                <p16:designElem xmlns:p16="http://schemas.microsoft.com/office/powerpoint/2015/main" val="1"/>
+              </p:ext>
+            </p:extLst>
+          </p:nvPr>
+        </p:nvSpPr>
+        <p:spPr>
+          <a:xfrm>
+            <a:off x="302085" y="664308"/>
+            <a:ext cx="8082632" cy="5600340"/>
+          </a:xfrm>
+          <a:prstGeom prst="rect">
+            <a:avLst/>
+          </a:prstGeom>
+          <a:solidFill>
+            <a:schemeClr val="bg1"/>
+          </a:solidFill>
+          <a:ln>
+            <a:noFill/>
+          </a:ln>
+          <a:effectLst>
+            <a:outerShdw blurRad="139700" dist="127000" dir="5400000" algn="t" rotWithShape="0">
+              <a:prstClr val="black">
+                <a:alpha val="15000"/>
+              </a:prstClr>
+            </a:outerShdw>
+          </a:effectLst>
+        </p:spPr>
+        <p:style>
+          <a:lnRef idx="2">
+            <a:schemeClr val="accent1">
+              <a:shade val="50000"/>
+            </a:schemeClr>
+          </a:lnRef>
+          <a:fillRef idx="1">
+            <a:schemeClr val="accent1"/>
+          </a:fillRef>
+          <a:effectRef idx="0">
+            <a:schemeClr val="accent1"/>
+          </a:effectRef>
+          <a:fontRef idx="minor">
+            <a:schemeClr val="lt1"/>
+          </a:fontRef>
+        </p:style>
+        <p:txBody>
+          <a:bodyPr rtlCol="0" anchor="ctr"/>
+          <a:lstStyle/>
+          <a:p>
+            <a:pPr algn="ctr"/>
+            <a:endParaRPr lang="en-US"/>
+          </a:p>
+        </p:txBody>
+      </p:sp>
+      <p:pic>
+        <p:nvPicPr>
+          <p:cNvPr id="28" name="Content Placeholder 27" descr="A graph with a line and a chart with numbers and a graph&#10;&#10;Description automatically generated with medium confidence">
+            <a:extLst>
+              <a:ext uri="{FF2B5EF4-FFF2-40B4-BE49-F238E27FC236}">
+                <a16:creationId xmlns:a16="http://schemas.microsoft.com/office/drawing/2014/main" id="{4F2BA404-A1EF-295B-BC29-6D24FAA48E2A}"/>
+              </a:ext>
+            </a:extLst>
+          </p:cNvPr>
+          <p:cNvPicPr>
+            <a:picLocks noGrp="1" noChangeAspect="1"/>
+          </p:cNvPicPr>
+          <p:nvPr>
+            <p:ph idx="1"/>
+          </p:nvPr>
+        </p:nvPicPr>
+        <p:blipFill>
+          <a:blip r:embed="rId2">
+            <a:extLst>
+              <a:ext uri="{28A0092B-C50C-407E-A947-70E740481C1C}">
+                <a14:useLocalDpi xmlns:a14="http://schemas.microsoft.com/office/drawing/2010/main" val="0"/>
+              </a:ext>
+            </a:extLst>
+          </a:blip>
+          <a:stretch>
+            <a:fillRect/>
+          </a:stretch>
+        </p:blipFill>
+        <p:spPr>
+          <a:xfrm>
+            <a:off x="874788" y="858525"/>
+            <a:ext cx="6949204" cy="5211906"/>
+          </a:xfrm>
+          <a:prstGeom prst="rect">
+            <a:avLst/>
+          </a:prstGeom>
+        </p:spPr>
+      </p:pic>
+      <p:sp>
+        <p:nvSpPr>
+          <p:cNvPr id="48" name="Rectangle 47">
+            <a:extLst>
+              <a:ext uri="{FF2B5EF4-FFF2-40B4-BE49-F238E27FC236}">
+                <a16:creationId xmlns:a16="http://schemas.microsoft.com/office/drawing/2014/main" id="{90F533E9-6690-41A8-A372-4C6C622D028D}"/>
+              </a:ext>
+              <a:ext uri="{C183D7F6-B498-43B3-948B-1728B52AA6E4}">
+                <adec:decorative xmlns:adec="http://schemas.microsoft.com/office/drawing/2017/decorative" val="1"/>
+              </a:ext>
+            </a:extLst>
+          </p:cNvPr>
+          <p:cNvSpPr>
+            <a:spLocks noGrp="1" noRot="1" noChangeAspect="1" noMove="1" noResize="1" noEditPoints="1" noAdjustHandles="1" noChangeArrowheads="1" noChangeShapeType="1" noTextEdit="1"/>
+          </p:cNvSpPr>
+          <p:nvPr>
+            <p:extLst>
+              <p:ext uri="{386F3935-93C4-4BCD-93E2-E3B085C9AB24}">
+                <p16:designElem xmlns:p16="http://schemas.microsoft.com/office/powerpoint/2015/main" val="1"/>
+              </p:ext>
+            </p:extLst>
+          </p:nvPr>
+        </p:nvSpPr>
+        <p:spPr>
+          <a:xfrm rot="5400000">
+            <a:off x="7950447" y="3392097"/>
+            <a:ext cx="1719072" cy="152382"/>
+          </a:xfrm>
+          <a:prstGeom prst="rect">
+            <a:avLst/>
+          </a:prstGeom>
+          <a:solidFill>
+            <a:schemeClr val="accent4"/>
+          </a:solidFill>
+          <a:ln>
+            <a:noFill/>
+          </a:ln>
+        </p:spPr>
+        <p:style>
+          <a:lnRef idx="2">
+            <a:schemeClr val="accent1">
+              <a:shade val="50000"/>
+            </a:schemeClr>
+          </a:lnRef>
+          <a:fillRef idx="1">
+            <a:schemeClr val="accent1"/>
+          </a:fillRef>
+          <a:effectRef idx="0">
+            <a:schemeClr val="accent1"/>
+          </a:effectRef>
+          <a:fontRef idx="minor">
+            <a:schemeClr val="lt1"/>
+          </a:fontRef>
+        </p:style>
+        <p:txBody>
+          <a:bodyPr rtlCol="0" anchor="ctr"/>
+          <a:lstStyle/>
+          <a:p>
+            <a:pPr algn="ctr"/>
+            <a:endParaRPr lang="en-US"/>
+          </a:p>
+        </p:txBody>
+      </p:sp>
+      <p:sp>
+        <p:nvSpPr>
+          <p:cNvPr id="4" name="TextBox 3">
+            <a:extLst>
+              <a:ext uri="{FF2B5EF4-FFF2-40B4-BE49-F238E27FC236}">
+                <a16:creationId xmlns:a16="http://schemas.microsoft.com/office/drawing/2014/main" id="{F8D63D7D-4DE1-BE6D-F655-CEEBE6F59983}"/>
+              </a:ext>
+            </a:extLst>
+          </p:cNvPr>
+          <p:cNvSpPr txBox="1"/>
+          <p:nvPr/>
+        </p:nvSpPr>
+        <p:spPr>
+          <a:xfrm>
+            <a:off x="8912872" y="1238865"/>
+            <a:ext cx="2949678" cy="2862322"/>
+          </a:xfrm>
+          <a:prstGeom prst="rect">
+            <a:avLst/>
+          </a:prstGeom>
+          <a:noFill/>
+        </p:spPr>
+        <p:txBody>
+          <a:bodyPr wrap="square" rtlCol="0">
+            <a:spAutoFit/>
+          </a:bodyPr>
+          <a:lstStyle/>
+          <a:p>
+            <a:pPr marL="285750" indent="-285750">
+              <a:buFontTx/>
+              <a:buChar char="-"/>
+            </a:pPr>
+            <a:r>
+              <a:rPr lang="en-US" b="0" i="0" dirty="0">
+                <a:solidFill>
+                  <a:srgbClr val="1D1C1D"/>
+                </a:solidFill>
+                <a:effectLst/>
+                <a:latin typeface="Slack-Lato"/>
+              </a:rPr>
+              <a:t>There is a strong positive correlation (r &gt; 0.83) between mortgage rates and home values.</a:t>
+            </a:r>
+          </a:p>
+          <a:p>
+            <a:pPr marL="285750" indent="-285750">
+              <a:buFontTx/>
+              <a:buChar char="-"/>
+            </a:pPr>
+            <a:endParaRPr lang="en-US" b="0" i="0" dirty="0">
+              <a:solidFill>
+                <a:srgbClr val="1D1C1D"/>
+              </a:solidFill>
+              <a:effectLst/>
+              <a:latin typeface="Slack-Lato"/>
+            </a:endParaRPr>
+          </a:p>
+          <a:p>
+            <a:pPr marL="285750" indent="-285750">
+              <a:buFontTx/>
+              <a:buChar char="-"/>
+            </a:pPr>
+            <a:r>
+              <a:rPr lang="en-US" b="0" i="0" dirty="0">
+                <a:solidFill>
+                  <a:srgbClr val="1D1C1D"/>
+                </a:solidFill>
+                <a:effectLst/>
+                <a:latin typeface="Slack-Lato"/>
+              </a:rPr>
+              <a:t>High R² values (~70-75%) indicate that mortgage rates explain a significant portion of home price variation.</a:t>
+            </a:r>
+            <a:endParaRPr lang="en-US" dirty="0"/>
+          </a:p>
+        </p:txBody>
+      </p:sp>
+    </p:spTree>
+    <p:extLst>
+      <p:ext uri="{BB962C8B-B14F-4D97-AF65-F5344CB8AC3E}">
+        <p14:creationId xmlns:p14="http://schemas.microsoft.com/office/powerpoint/2010/main" val="235427710"/>
+      </p:ext>
+    </p:extLst>
+  </p:cSld>
+  <p:clrMapOvr>
+    <a:masterClrMapping/>
+  </p:clrMapOvr>
+</p:sld>
+</file>
+
+<file path=ppt/slides/slide8.xml><?xml version="1.0" encoding="utf-8"?>
 <p:sld xmlns:a="http://schemas.openxmlformats.org/drawingml/2006/main" xmlns:r="http://schemas.openxmlformats.org/officeDocument/2006/relationships" xmlns:p="http://schemas.openxmlformats.org/presentationml/2006/main">
   <p:cSld>
     <p:bg>
@@ -5159,1264 +8069,66 @@
           </a:p>
         </p:txBody>
       </p:sp>
-      <p:pic>
-        <p:nvPicPr>
-          <p:cNvPr id="5" name="Content Placeholder 4" descr="A graph of a number of people&#10;&#10;Description automatically generated">
-            <a:extLst>
-              <a:ext uri="{FF2B5EF4-FFF2-40B4-BE49-F238E27FC236}">
-                <a16:creationId xmlns:a16="http://schemas.microsoft.com/office/drawing/2014/main" id="{617C7B46-B1B8-A4CB-99EA-0FF60A6E5535}"/>
-              </a:ext>
-            </a:extLst>
-          </p:cNvPr>
-          <p:cNvPicPr>
-            <a:picLocks noGrp="1" noChangeAspect="1"/>
-          </p:cNvPicPr>
-          <p:nvPr>
-            <p:ph idx="1"/>
-          </p:nvPr>
-        </p:nvPicPr>
-        <p:blipFill>
-          <a:blip r:embed="rId2">
-            <a:extLst>
-              <a:ext uri="{28A0092B-C50C-407E-A947-70E740481C1C}">
-                <a14:useLocalDpi xmlns:a14="http://schemas.microsoft.com/office/drawing/2010/main" val="0"/>
-              </a:ext>
-            </a:extLst>
-          </a:blip>
-          <a:srcRect r="3063" b="-1"/>
-          <a:stretch/>
-        </p:blipFill>
+      <p:sp>
+        <p:nvSpPr>
+          <p:cNvPr id="3" name="TextBox 2">
+            <a:extLst>
+              <a:ext uri="{FF2B5EF4-FFF2-40B4-BE49-F238E27FC236}">
+                <a16:creationId xmlns:a16="http://schemas.microsoft.com/office/drawing/2014/main" id="{DF42CABA-238A-7DD6-06E6-929C3E195D18}"/>
+              </a:ext>
+            </a:extLst>
+          </p:cNvPr>
+          <p:cNvSpPr txBox="1"/>
+          <p:nvPr/>
+        </p:nvSpPr>
         <p:spPr>
           <a:xfrm>
-            <a:off x="-1" y="588354"/>
-            <a:ext cx="7707972" cy="5466735"/>
-          </a:xfrm>
-          <a:prstGeom prst="rect">
-            <a:avLst/>
-          </a:prstGeom>
-        </p:spPr>
-      </p:pic>
-    </p:spTree>
-    <p:extLst>
-      <p:ext uri="{BB962C8B-B14F-4D97-AF65-F5344CB8AC3E}">
-        <p14:creationId xmlns:p14="http://schemas.microsoft.com/office/powerpoint/2010/main" val="1863822752"/>
-      </p:ext>
-    </p:extLst>
-  </p:cSld>
-  <p:clrMapOvr>
-    <a:masterClrMapping/>
-  </p:clrMapOvr>
-</p:sld>
-</file>
-
-<file path=ppt/slides/slide4.xml><?xml version="1.0" encoding="utf-8"?>
-<p:sld xmlns:a="http://schemas.openxmlformats.org/drawingml/2006/main" xmlns:r="http://schemas.openxmlformats.org/officeDocument/2006/relationships" xmlns:p="http://schemas.openxmlformats.org/presentationml/2006/main">
-  <p:cSld>
-    <p:bg>
-      <p:bgPr>
-        <a:solidFill>
-          <a:schemeClr val="bg1"/>
-        </a:solidFill>
-        <a:effectLst/>
-      </p:bgPr>
-    </p:bg>
-    <p:spTree>
-      <p:nvGrpSpPr>
-        <p:cNvPr id="1" name=""/>
-        <p:cNvGrpSpPr/>
-        <p:nvPr/>
-      </p:nvGrpSpPr>
-      <p:grpSpPr>
-        <a:xfrm>
-          <a:off x="0" y="0"/>
-          <a:ext cx="0" cy="0"/>
-          <a:chOff x="0" y="0"/>
-          <a:chExt cx="0" cy="0"/>
-        </a:xfrm>
-      </p:grpSpPr>
-      <p:sp useBgFill="1">
-        <p:nvSpPr>
-          <p:cNvPr id="42" name="Rectangle 41">
-            <a:extLst>
-              <a:ext uri="{FF2B5EF4-FFF2-40B4-BE49-F238E27FC236}">
-                <a16:creationId xmlns:a16="http://schemas.microsoft.com/office/drawing/2014/main" id="{BA79A7CF-01AF-4178-9369-94E0C90EB046}"/>
-              </a:ext>
-              <a:ext uri="{C183D7F6-B498-43B3-948B-1728B52AA6E4}">
-                <adec:decorative xmlns:adec="http://schemas.microsoft.com/office/drawing/2017/decorative" val="1"/>
-              </a:ext>
-            </a:extLst>
-          </p:cNvPr>
-          <p:cNvSpPr>
-            <a:spLocks noGrp="1" noRot="1" noChangeAspect="1" noMove="1" noResize="1" noEditPoints="1" noAdjustHandles="1" noChangeArrowheads="1" noChangeShapeType="1" noTextEdit="1"/>
-          </p:cNvSpPr>
-          <p:nvPr>
-            <p:extLst>
-              <p:ext uri="{386F3935-93C4-4BCD-93E2-E3B085C9AB24}">
-                <p16:designElem xmlns:p16="http://schemas.microsoft.com/office/powerpoint/2015/main" val="1"/>
-              </p:ext>
-            </p:extLst>
-          </p:nvPr>
-        </p:nvSpPr>
-        <p:spPr>
-          <a:xfrm>
-            <a:off x="0" y="0"/>
-            <a:ext cx="12191999" cy="6857365"/>
-          </a:xfrm>
-          <a:prstGeom prst="rect">
-            <a:avLst/>
-          </a:prstGeom>
-          <a:ln>
-            <a:noFill/>
-          </a:ln>
-        </p:spPr>
-        <p:style>
-          <a:lnRef idx="2">
-            <a:schemeClr val="accent1">
-              <a:shade val="50000"/>
-            </a:schemeClr>
-          </a:lnRef>
-          <a:fillRef idx="1">
-            <a:schemeClr val="accent1"/>
-          </a:fillRef>
-          <a:effectRef idx="0">
-            <a:schemeClr val="accent1"/>
-          </a:effectRef>
-          <a:fontRef idx="minor">
-            <a:schemeClr val="lt1"/>
-          </a:fontRef>
-        </p:style>
-        <p:txBody>
-          <a:bodyPr rtlCol="0" anchor="ctr"/>
-          <a:lstStyle/>
-          <a:p>
-            <a:pPr algn="ctr"/>
-            <a:endParaRPr lang="en-US"/>
-          </a:p>
-        </p:txBody>
-      </p:sp>
-      <p:sp>
-        <p:nvSpPr>
-          <p:cNvPr id="2" name="Title 1">
-            <a:extLst>
-              <a:ext uri="{FF2B5EF4-FFF2-40B4-BE49-F238E27FC236}">
-                <a16:creationId xmlns:a16="http://schemas.microsoft.com/office/drawing/2014/main" id="{843E137E-4A23-0D22-6AA9-E5183F9582DA}"/>
-              </a:ext>
-            </a:extLst>
-          </p:cNvPr>
-          <p:cNvSpPr>
-            <a:spLocks noGrp="1"/>
-          </p:cNvSpPr>
-          <p:nvPr>
-            <p:ph type="title"/>
-          </p:nvPr>
-        </p:nvSpPr>
-        <p:spPr>
-          <a:xfrm>
-            <a:off x="8885507" y="593983"/>
-            <a:ext cx="3306492" cy="5600340"/>
-          </a:xfrm>
-        </p:spPr>
-        <p:txBody>
-          <a:bodyPr vert="horz" lIns="91440" tIns="45720" rIns="91440" bIns="45720" rtlCol="0" anchor="ctr">
-            <a:normAutofit/>
-          </a:bodyPr>
-          <a:lstStyle/>
-          <a:p>
-            <a:pPr>
-              <a:lnSpc>
-                <a:spcPts val="1425"/>
-              </a:lnSpc>
-            </a:pPr>
-            <a:endParaRPr lang="en-US" sz="3700" kern="1200" dirty="0">
-              <a:solidFill>
-                <a:schemeClr val="tx1"/>
-              </a:solidFill>
-              <a:latin typeface="+mj-lt"/>
-              <a:ea typeface="+mj-ea"/>
-              <a:cs typeface="+mj-cs"/>
-            </a:endParaRPr>
-          </a:p>
-        </p:txBody>
-      </p:sp>
-      <p:sp>
-        <p:nvSpPr>
-          <p:cNvPr id="44" name="Rectangle 43">
-            <a:extLst>
-              <a:ext uri="{FF2B5EF4-FFF2-40B4-BE49-F238E27FC236}">
-                <a16:creationId xmlns:a16="http://schemas.microsoft.com/office/drawing/2014/main" id="{99413ED5-9ED4-4772-BCE4-2BCAE6B12E35}"/>
-              </a:ext>
-              <a:ext uri="{C183D7F6-B498-43B3-948B-1728B52AA6E4}">
-                <adec:decorative xmlns:adec="http://schemas.microsoft.com/office/drawing/2017/decorative" val="1"/>
-              </a:ext>
-            </a:extLst>
-          </p:cNvPr>
-          <p:cNvSpPr>
-            <a:spLocks noGrp="1" noRot="1" noChangeAspect="1" noMove="1" noResize="1" noEditPoints="1" noAdjustHandles="1" noChangeArrowheads="1" noChangeShapeType="1" noTextEdit="1"/>
-          </p:cNvSpPr>
-          <p:nvPr>
-            <p:extLst>
-              <p:ext uri="{386F3935-93C4-4BCD-93E2-E3B085C9AB24}">
-                <p16:designElem xmlns:p16="http://schemas.microsoft.com/office/powerpoint/2015/main" val="1"/>
-              </p:ext>
-            </p:extLst>
-          </p:nvPr>
-        </p:nvSpPr>
-        <p:spPr>
-          <a:xfrm rot="16200000">
-            <a:off x="3433973" y="-827233"/>
-            <a:ext cx="1715478" cy="8583421"/>
-          </a:xfrm>
-          <a:prstGeom prst="rect">
-            <a:avLst/>
-          </a:prstGeom>
-          <a:solidFill>
-            <a:schemeClr val="accent4"/>
-          </a:solidFill>
-          <a:ln>
-            <a:noFill/>
-          </a:ln>
-        </p:spPr>
-        <p:style>
-          <a:lnRef idx="2">
-            <a:schemeClr val="accent1">
-              <a:shade val="50000"/>
-            </a:schemeClr>
-          </a:lnRef>
-          <a:fillRef idx="1">
-            <a:schemeClr val="accent1"/>
-          </a:fillRef>
-          <a:effectRef idx="0">
-            <a:schemeClr val="accent1"/>
-          </a:effectRef>
-          <a:fontRef idx="minor">
-            <a:schemeClr val="lt1"/>
-          </a:fontRef>
-        </p:style>
-        <p:txBody>
-          <a:bodyPr rtlCol="0" anchor="ctr"/>
-          <a:lstStyle/>
-          <a:p>
-            <a:pPr algn="ctr"/>
-            <a:endParaRPr lang="en-US" dirty="0"/>
-          </a:p>
-        </p:txBody>
-      </p:sp>
-      <p:sp>
-        <p:nvSpPr>
-          <p:cNvPr id="46" name="Rectangle 45">
-            <a:extLst>
-              <a:ext uri="{FF2B5EF4-FFF2-40B4-BE49-F238E27FC236}">
-                <a16:creationId xmlns:a16="http://schemas.microsoft.com/office/drawing/2014/main" id="{04357C93-F0CB-4A1C-8F77-4E9063789819}"/>
-              </a:ext>
-              <a:ext uri="{C183D7F6-B498-43B3-948B-1728B52AA6E4}">
-                <adec:decorative xmlns:adec="http://schemas.microsoft.com/office/drawing/2017/decorative" val="1"/>
-              </a:ext>
-            </a:extLst>
-          </p:cNvPr>
-          <p:cNvSpPr>
-            <a:spLocks noGrp="1" noRot="1" noChangeAspect="1" noMove="1" noResize="1" noEditPoints="1" noAdjustHandles="1" noChangeArrowheads="1" noChangeShapeType="1" noTextEdit="1"/>
-          </p:cNvSpPr>
-          <p:nvPr>
-            <p:extLst>
-              <p:ext uri="{386F3935-93C4-4BCD-93E2-E3B085C9AB24}">
-                <p16:designElem xmlns:p16="http://schemas.microsoft.com/office/powerpoint/2015/main" val="1"/>
-              </p:ext>
-            </p:extLst>
-          </p:nvPr>
-        </p:nvSpPr>
-        <p:spPr>
-          <a:xfrm>
-            <a:off x="302085" y="664308"/>
-            <a:ext cx="8082632" cy="5600340"/>
-          </a:xfrm>
-          <a:prstGeom prst="rect">
-            <a:avLst/>
-          </a:prstGeom>
-          <a:solidFill>
-            <a:schemeClr val="bg1"/>
-          </a:solidFill>
-          <a:ln>
-            <a:noFill/>
-          </a:ln>
-          <a:effectLst>
-            <a:outerShdw blurRad="139700" dist="127000" dir="5400000" algn="t" rotWithShape="0">
-              <a:prstClr val="black">
-                <a:alpha val="15000"/>
-              </a:prstClr>
-            </a:outerShdw>
-          </a:effectLst>
-        </p:spPr>
-        <p:style>
-          <a:lnRef idx="2">
-            <a:schemeClr val="accent1">
-              <a:shade val="50000"/>
-            </a:schemeClr>
-          </a:lnRef>
-          <a:fillRef idx="1">
-            <a:schemeClr val="accent1"/>
-          </a:fillRef>
-          <a:effectRef idx="0">
-            <a:schemeClr val="accent1"/>
-          </a:effectRef>
-          <a:fontRef idx="minor">
-            <a:schemeClr val="lt1"/>
-          </a:fontRef>
-        </p:style>
-        <p:txBody>
-          <a:bodyPr rtlCol="0" anchor="ctr"/>
-          <a:lstStyle/>
-          <a:p>
-            <a:pPr algn="ctr"/>
-            <a:endParaRPr lang="en-US"/>
-          </a:p>
-        </p:txBody>
-      </p:sp>
-      <p:pic>
-        <p:nvPicPr>
-          <p:cNvPr id="28" name="Content Placeholder 27" descr="A graph with a line and a chart with numbers and a graph&#10;&#10;Description automatically generated with medium confidence">
-            <a:extLst>
-              <a:ext uri="{FF2B5EF4-FFF2-40B4-BE49-F238E27FC236}">
-                <a16:creationId xmlns:a16="http://schemas.microsoft.com/office/drawing/2014/main" id="{4F2BA404-A1EF-295B-BC29-6D24FAA48E2A}"/>
-              </a:ext>
-            </a:extLst>
-          </p:cNvPr>
-          <p:cNvPicPr>
-            <a:picLocks noGrp="1" noChangeAspect="1"/>
-          </p:cNvPicPr>
-          <p:nvPr>
-            <p:ph idx="1"/>
-          </p:nvPr>
-        </p:nvPicPr>
-        <p:blipFill>
-          <a:blip r:embed="rId2">
-            <a:extLst>
-              <a:ext uri="{28A0092B-C50C-407E-A947-70E740481C1C}">
-                <a14:useLocalDpi xmlns:a14="http://schemas.microsoft.com/office/drawing/2010/main" val="0"/>
-              </a:ext>
-            </a:extLst>
-          </a:blip>
-          <a:stretch>
-            <a:fillRect/>
-          </a:stretch>
-        </p:blipFill>
-        <p:spPr>
-          <a:xfrm>
-            <a:off x="874788" y="858525"/>
-            <a:ext cx="6949204" cy="5211906"/>
-          </a:xfrm>
-          <a:prstGeom prst="rect">
-            <a:avLst/>
-          </a:prstGeom>
-        </p:spPr>
-      </p:pic>
-      <p:sp>
-        <p:nvSpPr>
-          <p:cNvPr id="48" name="Rectangle 47">
-            <a:extLst>
-              <a:ext uri="{FF2B5EF4-FFF2-40B4-BE49-F238E27FC236}">
-                <a16:creationId xmlns:a16="http://schemas.microsoft.com/office/drawing/2014/main" id="{90F533E9-6690-41A8-A372-4C6C622D028D}"/>
-              </a:ext>
-              <a:ext uri="{C183D7F6-B498-43B3-948B-1728B52AA6E4}">
-                <adec:decorative xmlns:adec="http://schemas.microsoft.com/office/drawing/2017/decorative" val="1"/>
-              </a:ext>
-            </a:extLst>
-          </p:cNvPr>
-          <p:cNvSpPr>
-            <a:spLocks noGrp="1" noRot="1" noChangeAspect="1" noMove="1" noResize="1" noEditPoints="1" noAdjustHandles="1" noChangeArrowheads="1" noChangeShapeType="1" noTextEdit="1"/>
-          </p:cNvSpPr>
-          <p:nvPr>
-            <p:extLst>
-              <p:ext uri="{386F3935-93C4-4BCD-93E2-E3B085C9AB24}">
-                <p16:designElem xmlns:p16="http://schemas.microsoft.com/office/powerpoint/2015/main" val="1"/>
-              </p:ext>
-            </p:extLst>
-          </p:nvPr>
-        </p:nvSpPr>
-        <p:spPr>
-          <a:xfrm rot="5400000">
-            <a:off x="7950447" y="3392097"/>
-            <a:ext cx="1719072" cy="152382"/>
-          </a:xfrm>
-          <a:prstGeom prst="rect">
-            <a:avLst/>
-          </a:prstGeom>
-          <a:solidFill>
-            <a:schemeClr val="accent4"/>
-          </a:solidFill>
-          <a:ln>
-            <a:noFill/>
-          </a:ln>
-        </p:spPr>
-        <p:style>
-          <a:lnRef idx="2">
-            <a:schemeClr val="accent1">
-              <a:shade val="50000"/>
-            </a:schemeClr>
-          </a:lnRef>
-          <a:fillRef idx="1">
-            <a:schemeClr val="accent1"/>
-          </a:fillRef>
-          <a:effectRef idx="0">
-            <a:schemeClr val="accent1"/>
-          </a:effectRef>
-          <a:fontRef idx="minor">
-            <a:schemeClr val="lt1"/>
-          </a:fontRef>
-        </p:style>
-        <p:txBody>
-          <a:bodyPr rtlCol="0" anchor="ctr"/>
-          <a:lstStyle/>
-          <a:p>
-            <a:pPr algn="ctr"/>
-            <a:endParaRPr lang="en-US"/>
-          </a:p>
-        </p:txBody>
-      </p:sp>
-    </p:spTree>
-    <p:extLst>
-      <p:ext uri="{BB962C8B-B14F-4D97-AF65-F5344CB8AC3E}">
-        <p14:creationId xmlns:p14="http://schemas.microsoft.com/office/powerpoint/2010/main" val="235427710"/>
-      </p:ext>
-    </p:extLst>
-  </p:cSld>
-  <p:clrMapOvr>
-    <a:masterClrMapping/>
-  </p:clrMapOvr>
-</p:sld>
-</file>
-
-<file path=ppt/slides/slide5.xml><?xml version="1.0" encoding="utf-8"?>
-<p:sld xmlns:a="http://schemas.openxmlformats.org/drawingml/2006/main" xmlns:r="http://schemas.openxmlformats.org/officeDocument/2006/relationships" xmlns:p="http://schemas.openxmlformats.org/presentationml/2006/main">
-  <p:cSld>
-    <p:spTree>
-      <p:nvGrpSpPr>
-        <p:cNvPr id="1" name=""/>
-        <p:cNvGrpSpPr/>
-        <p:nvPr/>
-      </p:nvGrpSpPr>
-      <p:grpSpPr>
-        <a:xfrm>
-          <a:off x="0" y="0"/>
-          <a:ext cx="0" cy="0"/>
-          <a:chOff x="0" y="0"/>
-          <a:chExt cx="0" cy="0"/>
-        </a:xfrm>
-      </p:grpSpPr>
-      <p:sp>
-        <p:nvSpPr>
-          <p:cNvPr id="2" name="Title 1">
-            <a:extLst>
-              <a:ext uri="{FF2B5EF4-FFF2-40B4-BE49-F238E27FC236}">
-                <a16:creationId xmlns:a16="http://schemas.microsoft.com/office/drawing/2014/main" id="{6824F61B-4350-6BB5-56BA-8F60A44D0C10}"/>
-              </a:ext>
-            </a:extLst>
-          </p:cNvPr>
-          <p:cNvSpPr>
-            <a:spLocks noGrp="1"/>
-          </p:cNvSpPr>
-          <p:nvPr>
-            <p:ph type="title"/>
-          </p:nvPr>
-        </p:nvSpPr>
-        <p:spPr/>
-        <p:txBody>
-          <a:bodyPr/>
-          <a:lstStyle/>
-          <a:p>
-            <a:endParaRPr lang="en-US"/>
-          </a:p>
-        </p:txBody>
-      </p:sp>
-      <p:sp>
-        <p:nvSpPr>
-          <p:cNvPr id="3" name="Content Placeholder 2">
-            <a:extLst>
-              <a:ext uri="{FF2B5EF4-FFF2-40B4-BE49-F238E27FC236}">
-                <a16:creationId xmlns:a16="http://schemas.microsoft.com/office/drawing/2014/main" id="{FF5A875E-7F16-35E5-CD7F-A7A8C014ADA7}"/>
-              </a:ext>
-            </a:extLst>
-          </p:cNvPr>
-          <p:cNvSpPr>
-            <a:spLocks noGrp="1"/>
-          </p:cNvSpPr>
-          <p:nvPr>
-            <p:ph idx="1"/>
-          </p:nvPr>
-        </p:nvSpPr>
-        <p:spPr/>
-        <p:txBody>
-          <a:bodyPr>
-            <a:normAutofit/>
-          </a:bodyPr>
-          <a:lstStyle/>
-          <a:p>
-            <a:endParaRPr lang="en-US" dirty="0"/>
-          </a:p>
-        </p:txBody>
-      </p:sp>
-    </p:spTree>
-    <p:extLst>
-      <p:ext uri="{BB962C8B-B14F-4D97-AF65-F5344CB8AC3E}">
-        <p14:creationId xmlns:p14="http://schemas.microsoft.com/office/powerpoint/2010/main" val="3673177090"/>
-      </p:ext>
-    </p:extLst>
-  </p:cSld>
-  <p:clrMapOvr>
-    <a:masterClrMapping/>
-  </p:clrMapOvr>
-</p:sld>
-</file>
-
-<file path=ppt/slides/slide6.xml><?xml version="1.0" encoding="utf-8"?>
-<p:sld xmlns:a="http://schemas.openxmlformats.org/drawingml/2006/main" xmlns:r="http://schemas.openxmlformats.org/officeDocument/2006/relationships" xmlns:p="http://schemas.openxmlformats.org/presentationml/2006/main">
-  <p:cSld>
-    <p:bg>
-      <p:bgPr>
-        <a:solidFill>
-          <a:schemeClr val="bg1"/>
-        </a:solidFill>
-        <a:effectLst/>
-      </p:bgPr>
-    </p:bg>
-    <p:spTree>
-      <p:nvGrpSpPr>
-        <p:cNvPr id="1" name=""/>
-        <p:cNvGrpSpPr/>
-        <p:nvPr/>
-      </p:nvGrpSpPr>
-      <p:grpSpPr>
-        <a:xfrm>
-          <a:off x="0" y="0"/>
-          <a:ext cx="0" cy="0"/>
-          <a:chOff x="0" y="0"/>
-          <a:chExt cx="0" cy="0"/>
-        </a:xfrm>
-      </p:grpSpPr>
-      <p:sp useBgFill="1">
-        <p:nvSpPr>
-          <p:cNvPr id="29" name="Rectangle 28">
-            <a:extLst>
-              <a:ext uri="{FF2B5EF4-FFF2-40B4-BE49-F238E27FC236}">
-                <a16:creationId xmlns:a16="http://schemas.microsoft.com/office/drawing/2014/main" id="{FFB60E8C-7224-44A4-87A0-46A1711DD2ED}"/>
-              </a:ext>
-              <a:ext uri="{C183D7F6-B498-43B3-948B-1728B52AA6E4}">
-                <adec:decorative xmlns:adec="http://schemas.microsoft.com/office/drawing/2017/decorative" val="1"/>
-              </a:ext>
-            </a:extLst>
-          </p:cNvPr>
-          <p:cNvSpPr>
-            <a:spLocks noGrp="1" noRot="1" noChangeAspect="1" noMove="1" noResize="1" noEditPoints="1" noAdjustHandles="1" noChangeArrowheads="1" noChangeShapeType="1" noTextEdit="1"/>
-          </p:cNvSpPr>
-          <p:nvPr>
-            <p:extLst>
-              <p:ext uri="{386F3935-93C4-4BCD-93E2-E3B085C9AB24}">
-                <p16:designElem xmlns:p16="http://schemas.microsoft.com/office/powerpoint/2015/main" val="1"/>
-              </p:ext>
-            </p:extLst>
-          </p:nvPr>
-        </p:nvSpPr>
-        <p:spPr>
-          <a:xfrm>
-            <a:off x="0" y="0"/>
-            <a:ext cx="12191999" cy="6857365"/>
-          </a:xfrm>
-          <a:prstGeom prst="rect">
-            <a:avLst/>
-          </a:prstGeom>
-          <a:ln>
-            <a:noFill/>
-          </a:ln>
-        </p:spPr>
-        <p:style>
-          <a:lnRef idx="2">
-            <a:schemeClr val="accent1">
-              <a:shade val="50000"/>
-            </a:schemeClr>
-          </a:lnRef>
-          <a:fillRef idx="1">
-            <a:schemeClr val="accent1"/>
-          </a:fillRef>
-          <a:effectRef idx="0">
-            <a:schemeClr val="accent1"/>
-          </a:effectRef>
-          <a:fontRef idx="minor">
-            <a:schemeClr val="lt1"/>
-          </a:fontRef>
-        </p:style>
-        <p:txBody>
-          <a:bodyPr rtlCol="0" anchor="ctr"/>
-          <a:lstStyle/>
-          <a:p>
-            <a:pPr algn="ctr"/>
-            <a:endParaRPr lang="en-US"/>
-          </a:p>
-        </p:txBody>
-      </p:sp>
-      <p:sp>
-        <p:nvSpPr>
-          <p:cNvPr id="10" name="Title 9">
-            <a:extLst>
-              <a:ext uri="{FF2B5EF4-FFF2-40B4-BE49-F238E27FC236}">
-                <a16:creationId xmlns:a16="http://schemas.microsoft.com/office/drawing/2014/main" id="{8A4003E8-2697-1BA5-0063-30BBFCD098AB}"/>
-              </a:ext>
-            </a:extLst>
-          </p:cNvPr>
-          <p:cNvSpPr>
-            <a:spLocks noGrp="1"/>
-          </p:cNvSpPr>
-          <p:nvPr>
-            <p:ph type="title"/>
-          </p:nvPr>
-        </p:nvSpPr>
-        <p:spPr>
-          <a:xfrm>
-            <a:off x="795528" y="386930"/>
-            <a:ext cx="10141799" cy="1300554"/>
-          </a:xfrm>
-        </p:spPr>
-        <p:txBody>
-          <a:bodyPr vert="horz" lIns="91440" tIns="45720" rIns="91440" bIns="45720" rtlCol="0" anchor="b">
-            <a:normAutofit/>
-          </a:bodyPr>
-          <a:lstStyle/>
-          <a:p>
-            <a:endParaRPr lang="en-US" sz="4800" kern="1200">
-              <a:solidFill>
-                <a:schemeClr val="tx1"/>
-              </a:solidFill>
-              <a:latin typeface="+mj-lt"/>
-              <a:ea typeface="+mj-ea"/>
-              <a:cs typeface="+mj-cs"/>
-            </a:endParaRPr>
-          </a:p>
-        </p:txBody>
-      </p:sp>
-      <p:sp>
-        <p:nvSpPr>
-          <p:cNvPr id="31" name="Rectangle 30">
-            <a:extLst>
-              <a:ext uri="{FF2B5EF4-FFF2-40B4-BE49-F238E27FC236}">
-                <a16:creationId xmlns:a16="http://schemas.microsoft.com/office/drawing/2014/main" id="{5DA32751-37A2-45C0-BE94-63D375E27003}"/>
-              </a:ext>
-              <a:ext uri="{C183D7F6-B498-43B3-948B-1728B52AA6E4}">
-                <adec:decorative xmlns:adec="http://schemas.microsoft.com/office/drawing/2017/decorative" val="1"/>
-              </a:ext>
-            </a:extLst>
-          </p:cNvPr>
-          <p:cNvSpPr>
-            <a:spLocks noGrp="1" noRot="1" noChangeAspect="1" noMove="1" noResize="1" noEditPoints="1" noAdjustHandles="1" noChangeArrowheads="1" noChangeShapeType="1" noTextEdit="1"/>
-          </p:cNvSpPr>
-          <p:nvPr>
-            <p:extLst>
-              <p:ext uri="{386F3935-93C4-4BCD-93E2-E3B085C9AB24}">
-                <p16:designElem xmlns:p16="http://schemas.microsoft.com/office/powerpoint/2015/main" val="1"/>
-              </p:ext>
-            </p:extLst>
-          </p:nvPr>
-        </p:nvSpPr>
-        <p:spPr>
-          <a:xfrm flipH="1" flipV="1">
-            <a:off x="-2" y="1998845"/>
-            <a:ext cx="11454595" cy="781699"/>
-          </a:xfrm>
-          <a:prstGeom prst="rect">
-            <a:avLst/>
-          </a:prstGeom>
-          <a:solidFill>
-            <a:schemeClr val="accent4"/>
-          </a:solidFill>
-          <a:ln>
-            <a:noFill/>
-          </a:ln>
-        </p:spPr>
-        <p:style>
-          <a:lnRef idx="2">
-            <a:schemeClr val="accent1">
-              <a:shade val="50000"/>
-            </a:schemeClr>
-          </a:lnRef>
-          <a:fillRef idx="1">
-            <a:schemeClr val="accent1"/>
-          </a:fillRef>
-          <a:effectRef idx="0">
-            <a:schemeClr val="accent1"/>
-          </a:effectRef>
-          <a:fontRef idx="minor">
-            <a:schemeClr val="lt1"/>
-          </a:fontRef>
-        </p:style>
-        <p:txBody>
-          <a:bodyPr rtlCol="0" anchor="ctr"/>
-          <a:lstStyle/>
-          <a:p>
-            <a:pPr algn="ctr"/>
-            <a:endParaRPr lang="en-US"/>
-          </a:p>
-        </p:txBody>
-      </p:sp>
-      <p:sp>
-        <p:nvSpPr>
-          <p:cNvPr id="33" name="Rectangle 32">
-            <a:extLst>
-              <a:ext uri="{FF2B5EF4-FFF2-40B4-BE49-F238E27FC236}">
-                <a16:creationId xmlns:a16="http://schemas.microsoft.com/office/drawing/2014/main" id="{E659831F-0D9A-4C63-9EBB-8435B85A440F}"/>
-              </a:ext>
-              <a:ext uri="{C183D7F6-B498-43B3-948B-1728B52AA6E4}">
-                <adec:decorative xmlns:adec="http://schemas.microsoft.com/office/drawing/2017/decorative" val="1"/>
-              </a:ext>
-            </a:extLst>
-          </p:cNvPr>
-          <p:cNvSpPr>
-            <a:spLocks noGrp="1" noRot="1" noChangeAspect="1" noMove="1" noResize="1" noEditPoints="1" noAdjustHandles="1" noChangeArrowheads="1" noChangeShapeType="1" noTextEdit="1"/>
-          </p:cNvSpPr>
-          <p:nvPr>
-            <p:extLst>
-              <p:ext uri="{386F3935-93C4-4BCD-93E2-E3B085C9AB24}">
-                <p16:designElem xmlns:p16="http://schemas.microsoft.com/office/powerpoint/2015/main" val="1"/>
-              </p:ext>
-            </p:extLst>
-          </p:nvPr>
-        </p:nvSpPr>
-        <p:spPr>
-          <a:xfrm>
-            <a:off x="0" y="2203079"/>
-            <a:ext cx="11383362" cy="4267991"/>
-          </a:xfrm>
-          <a:prstGeom prst="rect">
-            <a:avLst/>
-          </a:prstGeom>
-          <a:solidFill>
-            <a:schemeClr val="bg1"/>
-          </a:solidFill>
-          <a:ln>
-            <a:noFill/>
-          </a:ln>
-          <a:effectLst>
-            <a:outerShdw blurRad="139700" dist="127000" dir="5400000" algn="t" rotWithShape="0">
-              <a:prstClr val="black">
-                <a:alpha val="15000"/>
-              </a:prstClr>
-            </a:outerShdw>
-          </a:effectLst>
-        </p:spPr>
-        <p:style>
-          <a:lnRef idx="2">
-            <a:schemeClr val="accent1">
-              <a:shade val="50000"/>
-            </a:schemeClr>
-          </a:lnRef>
-          <a:fillRef idx="1">
-            <a:schemeClr val="accent1"/>
-          </a:fillRef>
-          <a:effectRef idx="0">
-            <a:schemeClr val="accent1"/>
-          </a:effectRef>
-          <a:fontRef idx="minor">
-            <a:schemeClr val="lt1"/>
-          </a:fontRef>
-        </p:style>
-        <p:txBody>
-          <a:bodyPr rtlCol="0" anchor="ctr"/>
-          <a:lstStyle/>
-          <a:p>
-            <a:pPr algn="ctr"/>
-            <a:endParaRPr lang="en-US"/>
-          </a:p>
-        </p:txBody>
-      </p:sp>
-      <p:pic>
-        <p:nvPicPr>
-          <p:cNvPr id="9" name="Content Placeholder 8" descr="A graph with red and green lines and numbers&#10;&#10;Description automatically generated">
-            <a:extLst>
-              <a:ext uri="{FF2B5EF4-FFF2-40B4-BE49-F238E27FC236}">
-                <a16:creationId xmlns:a16="http://schemas.microsoft.com/office/drawing/2014/main" id="{9CDF5D82-53A2-67CD-4392-999572E5A75E}"/>
-              </a:ext>
-            </a:extLst>
-          </p:cNvPr>
-          <p:cNvPicPr>
-            <a:picLocks noGrp="1" noChangeAspect="1"/>
-          </p:cNvPicPr>
-          <p:nvPr>
-            <p:ph idx="1"/>
-          </p:nvPr>
-        </p:nvPicPr>
-        <p:blipFill>
-          <a:blip r:embed="rId2">
-            <a:extLst>
-              <a:ext uri="{28A0092B-C50C-407E-A947-70E740481C1C}">
-                <a14:useLocalDpi xmlns:a14="http://schemas.microsoft.com/office/drawing/2010/main" val="0"/>
-              </a:ext>
-            </a:extLst>
-          </a:blip>
-          <a:stretch>
-            <a:fillRect/>
-          </a:stretch>
-        </p:blipFill>
-        <p:spPr>
-          <a:xfrm>
-            <a:off x="734271" y="2524715"/>
-            <a:ext cx="4952325" cy="3714244"/>
-          </a:xfrm>
-          <a:prstGeom prst="rect">
-            <a:avLst/>
-          </a:prstGeom>
-        </p:spPr>
-      </p:pic>
-      <p:sp>
-        <p:nvSpPr>
-          <p:cNvPr id="11" name="Text Placeholder 10">
-            <a:extLst>
-              <a:ext uri="{FF2B5EF4-FFF2-40B4-BE49-F238E27FC236}">
-                <a16:creationId xmlns:a16="http://schemas.microsoft.com/office/drawing/2014/main" id="{7D751BA9-8535-6D9F-1DED-47A6BB8E3499}"/>
-              </a:ext>
-            </a:extLst>
-          </p:cNvPr>
-          <p:cNvSpPr>
-            <a:spLocks noGrp="1"/>
-          </p:cNvSpPr>
-          <p:nvPr>
-            <p:ph type="body" sz="half" idx="2"/>
-          </p:nvPr>
-        </p:nvSpPr>
-        <p:spPr>
-          <a:xfrm>
-            <a:off x="6406429" y="2599509"/>
-            <a:ext cx="4530898" cy="3639450"/>
-          </a:xfrm>
-        </p:spPr>
-        <p:txBody>
-          <a:bodyPr vert="horz" lIns="91440" tIns="45720" rIns="91440" bIns="45720" rtlCol="0" anchor="ctr">
-            <a:normAutofit/>
-          </a:bodyPr>
-          <a:lstStyle/>
-          <a:p>
-            <a:pPr>
-              <a:lnSpc>
-                <a:spcPct val="100000"/>
-              </a:lnSpc>
-            </a:pPr>
-            <a:r>
-              <a:rPr lang="en-US" sz="2400" b="1" dirty="0">
-                <a:solidFill>
-                  <a:schemeClr val="tx1">
-                    <a:lumMod val="85000"/>
-                    <a:lumOff val="15000"/>
-                  </a:schemeClr>
-                </a:solidFill>
-                <a:effectLst/>
-                <a:latin typeface="Arial Narrow" panose="020B0606020202030204" pitchFamily="34" charset="0"/>
-              </a:rPr>
-              <a:t>Significant correlation in Clackamas and Multnomah</a:t>
-            </a:r>
-            <a:r>
-              <a:rPr lang="en-US" sz="2400" b="0" dirty="0">
-                <a:solidFill>
-                  <a:schemeClr val="tx1">
-                    <a:lumMod val="85000"/>
-                    <a:lumOff val="15000"/>
-                  </a:schemeClr>
-                </a:solidFill>
-                <a:effectLst/>
-                <a:latin typeface="Arial Narrow" panose="020B0606020202030204" pitchFamily="34" charset="0"/>
-              </a:rPr>
-              <a:t> → As inventory decreased, home values rose.</a:t>
-            </a:r>
-          </a:p>
-          <a:p>
-            <a:pPr>
-              <a:lnSpc>
-                <a:spcPct val="100000"/>
-              </a:lnSpc>
-            </a:pPr>
-            <a:br>
-              <a:rPr lang="en-US" sz="2400" b="0" dirty="0">
-                <a:solidFill>
-                  <a:schemeClr val="tx1">
-                    <a:lumMod val="85000"/>
-                    <a:lumOff val="15000"/>
-                  </a:schemeClr>
-                </a:solidFill>
-                <a:effectLst/>
-                <a:latin typeface="Arial Narrow" panose="020B0606020202030204" pitchFamily="34" charset="0"/>
-              </a:rPr>
-            </a:br>
-            <a:r>
-              <a:rPr lang="en-US" sz="2400" b="1" dirty="0">
-                <a:solidFill>
-                  <a:schemeClr val="tx1">
-                    <a:lumMod val="85000"/>
-                    <a:lumOff val="15000"/>
-                  </a:schemeClr>
-                </a:solidFill>
-                <a:effectLst/>
-                <a:latin typeface="Arial Narrow" panose="020B0606020202030204" pitchFamily="34" charset="0"/>
-              </a:rPr>
-              <a:t>Washington County had almost no relationship (R² = 0.0554)</a:t>
-            </a:r>
-            <a:r>
-              <a:rPr lang="en-US" sz="2400" b="0" dirty="0">
-                <a:solidFill>
-                  <a:schemeClr val="tx1">
-                    <a:lumMod val="85000"/>
-                    <a:lumOff val="15000"/>
-                  </a:schemeClr>
-                </a:solidFill>
-                <a:effectLst/>
-                <a:latin typeface="Arial Narrow" panose="020B0606020202030204" pitchFamily="34" charset="0"/>
-              </a:rPr>
-              <a:t>, meaning inventory changes did not meaningfully impact home values there.</a:t>
-            </a:r>
-          </a:p>
-          <a:p>
-            <a:pPr>
-              <a:lnSpc>
-                <a:spcPts val="1425"/>
-              </a:lnSpc>
-            </a:pPr>
-            <a:endParaRPr lang="en-US" sz="2000" dirty="0"/>
-          </a:p>
-        </p:txBody>
-      </p:sp>
-      <p:sp>
-        <p:nvSpPr>
-          <p:cNvPr id="35" name="Rectangle 34">
-            <a:extLst>
-              <a:ext uri="{FF2B5EF4-FFF2-40B4-BE49-F238E27FC236}">
-                <a16:creationId xmlns:a16="http://schemas.microsoft.com/office/drawing/2014/main" id="{5A55FBCD-CD42-40F5-8A1B-3203F9CAEEAA}"/>
-              </a:ext>
-              <a:ext uri="{C183D7F6-B498-43B3-948B-1728B52AA6E4}">
-                <adec:decorative xmlns:adec="http://schemas.microsoft.com/office/drawing/2017/decorative" val="1"/>
-              </a:ext>
-            </a:extLst>
-          </p:cNvPr>
-          <p:cNvSpPr>
-            <a:spLocks noGrp="1" noRot="1" noChangeAspect="1" noMove="1" noResize="1" noEditPoints="1" noAdjustHandles="1" noChangeArrowheads="1" noChangeShapeType="1" noTextEdit="1"/>
-          </p:cNvSpPr>
-          <p:nvPr>
-            <p:extLst>
-              <p:ext uri="{386F3935-93C4-4BCD-93E2-E3B085C9AB24}">
-                <p16:designElem xmlns:p16="http://schemas.microsoft.com/office/powerpoint/2015/main" val="1"/>
-              </p:ext>
-            </p:extLst>
-          </p:nvPr>
-        </p:nvSpPr>
-        <p:spPr>
-          <a:xfrm rot="5400000">
-            <a:off x="11228040" y="2313027"/>
-            <a:ext cx="781700" cy="152382"/>
-          </a:xfrm>
-          <a:prstGeom prst="rect">
-            <a:avLst/>
-          </a:prstGeom>
-          <a:solidFill>
-            <a:schemeClr val="accent4"/>
-          </a:solidFill>
-          <a:ln>
-            <a:noFill/>
-          </a:ln>
-        </p:spPr>
-        <p:style>
-          <a:lnRef idx="2">
-            <a:schemeClr val="accent1">
-              <a:shade val="50000"/>
-            </a:schemeClr>
-          </a:lnRef>
-          <a:fillRef idx="1">
-            <a:schemeClr val="accent1"/>
-          </a:fillRef>
-          <a:effectRef idx="0">
-            <a:schemeClr val="accent1"/>
-          </a:effectRef>
-          <a:fontRef idx="minor">
-            <a:schemeClr val="lt1"/>
-          </a:fontRef>
-        </p:style>
-        <p:txBody>
-          <a:bodyPr rtlCol="0" anchor="ctr"/>
-          <a:lstStyle/>
-          <a:p>
-            <a:pPr algn="ctr"/>
-            <a:endParaRPr lang="en-US"/>
-          </a:p>
-        </p:txBody>
-      </p:sp>
-    </p:spTree>
-    <p:extLst>
-      <p:ext uri="{BB962C8B-B14F-4D97-AF65-F5344CB8AC3E}">
-        <p14:creationId xmlns:p14="http://schemas.microsoft.com/office/powerpoint/2010/main" val="1343469666"/>
-      </p:ext>
-    </p:extLst>
-  </p:cSld>
-  <p:clrMapOvr>
-    <a:masterClrMapping/>
-  </p:clrMapOvr>
-</p:sld>
-</file>
-
-<file path=ppt/slides/slide7.xml><?xml version="1.0" encoding="utf-8"?>
-<p:sld xmlns:a="http://schemas.openxmlformats.org/drawingml/2006/main" xmlns:r="http://schemas.openxmlformats.org/officeDocument/2006/relationships" xmlns:p="http://schemas.openxmlformats.org/presentationml/2006/main">
-  <p:cSld>
-    <p:bg>
-      <p:bgPr>
-        <a:solidFill>
-          <a:schemeClr val="bg1"/>
-        </a:solidFill>
-        <a:effectLst/>
-      </p:bgPr>
-    </p:bg>
-    <p:spTree>
-      <p:nvGrpSpPr>
-        <p:cNvPr id="1" name=""/>
-        <p:cNvGrpSpPr/>
-        <p:nvPr/>
-      </p:nvGrpSpPr>
-      <p:grpSpPr>
-        <a:xfrm>
-          <a:off x="0" y="0"/>
-          <a:ext cx="0" cy="0"/>
-          <a:chOff x="0" y="0"/>
-          <a:chExt cx="0" cy="0"/>
-        </a:xfrm>
-      </p:grpSpPr>
-      <p:sp>
-        <p:nvSpPr>
-          <p:cNvPr id="10" name="Rectangle 9">
-            <a:extLst>
-              <a:ext uri="{FF2B5EF4-FFF2-40B4-BE49-F238E27FC236}">
-                <a16:creationId xmlns:a16="http://schemas.microsoft.com/office/drawing/2014/main" id="{42A4FC2C-047E-45A5-965D-8E1E3BF09BC6}"/>
-              </a:ext>
-              <a:ext uri="{C183D7F6-B498-43B3-948B-1728B52AA6E4}">
-                <adec:decorative xmlns:adec="http://schemas.microsoft.com/office/drawing/2017/decorative" val="1"/>
-              </a:ext>
-            </a:extLst>
-          </p:cNvPr>
-          <p:cNvSpPr>
-            <a:spLocks noGrp="1" noRot="1" noChangeAspect="1" noMove="1" noResize="1" noEditPoints="1" noAdjustHandles="1" noChangeArrowheads="1" noChangeShapeType="1" noTextEdit="1"/>
-          </p:cNvSpPr>
-          <p:nvPr>
-            <p:extLst>
-              <p:ext uri="{386F3935-93C4-4BCD-93E2-E3B085C9AB24}">
-                <p16:designElem xmlns:p16="http://schemas.microsoft.com/office/powerpoint/2015/main" val="1"/>
-              </p:ext>
-            </p:extLst>
-          </p:nvPr>
-        </p:nvSpPr>
-        <p:spPr bwMode="white">
-          <a:xfrm>
-            <a:off x="1524" y="0"/>
-            <a:ext cx="12188952" cy="6858000"/>
+            <a:off x="9271819" y="1769806"/>
+            <a:ext cx="3168592" cy="923330"/>
           </a:xfrm>
           <a:prstGeom prst="rect">
             <a:avLst/>
           </a:prstGeom>
           <a:noFill/>
-          <a:ln>
-            <a:noFill/>
-          </a:ln>
         </p:spPr>
-        <p:style>
-          <a:lnRef idx="2">
-            <a:schemeClr val="accent1">
-              <a:shade val="50000"/>
-            </a:schemeClr>
-          </a:lnRef>
-          <a:fillRef idx="1">
-            <a:schemeClr val="accent1"/>
-          </a:fillRef>
-          <a:effectRef idx="0">
-            <a:schemeClr val="accent1"/>
-          </a:effectRef>
-          <a:fontRef idx="minor">
-            <a:schemeClr val="lt1"/>
-          </a:fontRef>
-        </p:style>
-        <p:txBody>
-          <a:bodyPr rtlCol="0" anchor="ctr"/>
-          <a:lstStyle>
-            <a:defPPr>
-              <a:defRPr lang="en-US"/>
-            </a:defPPr>
-            <a:lvl1pPr marL="0" algn="l" defTabSz="914400" rtl="0" eaLnBrk="1" latinLnBrk="0" hangingPunct="1">
-              <a:defRPr sz="1800" kern="1200">
+        <p:txBody>
+          <a:bodyPr wrap="square" rtlCol="0">
+            <a:spAutoFit/>
+          </a:bodyPr>
+          <a:lstStyle/>
+          <a:p>
+            <a:r>
+              <a:rPr lang="en-US" b="0" i="0" dirty="0">
                 <a:solidFill>
-                  <a:schemeClr val="lt1"/>
+                  <a:srgbClr val="1D1C1D"/>
                 </a:solidFill>
-                <a:latin typeface="+mn-lt"/>
-                <a:ea typeface="+mn-ea"/>
-                <a:cs typeface="+mn-cs"/>
-              </a:defRPr>
-            </a:lvl1pPr>
-            <a:lvl2pPr marL="457200" algn="l" defTabSz="914400" rtl="0" eaLnBrk="1" latinLnBrk="0" hangingPunct="1">
-              <a:defRPr sz="1800" kern="1200">
-                <a:solidFill>
-                  <a:schemeClr val="lt1"/>
-                </a:solidFill>
-                <a:latin typeface="+mn-lt"/>
-                <a:ea typeface="+mn-ea"/>
-                <a:cs typeface="+mn-cs"/>
-              </a:defRPr>
-            </a:lvl2pPr>
-            <a:lvl3pPr marL="914400" algn="l" defTabSz="914400" rtl="0" eaLnBrk="1" latinLnBrk="0" hangingPunct="1">
-              <a:defRPr sz="1800" kern="1200">
-                <a:solidFill>
-                  <a:schemeClr val="lt1"/>
-                </a:solidFill>
-                <a:latin typeface="+mn-lt"/>
-                <a:ea typeface="+mn-ea"/>
-                <a:cs typeface="+mn-cs"/>
-              </a:defRPr>
-            </a:lvl3pPr>
-            <a:lvl4pPr marL="1371600" algn="l" defTabSz="914400" rtl="0" eaLnBrk="1" latinLnBrk="0" hangingPunct="1">
-              <a:defRPr sz="1800" kern="1200">
-                <a:solidFill>
-                  <a:schemeClr val="lt1"/>
-                </a:solidFill>
-                <a:latin typeface="+mn-lt"/>
-                <a:ea typeface="+mn-ea"/>
-                <a:cs typeface="+mn-cs"/>
-              </a:defRPr>
-            </a:lvl4pPr>
-            <a:lvl5pPr marL="1828800" algn="l" defTabSz="914400" rtl="0" eaLnBrk="1" latinLnBrk="0" hangingPunct="1">
-              <a:defRPr sz="1800" kern="1200">
-                <a:solidFill>
-                  <a:schemeClr val="lt1"/>
-                </a:solidFill>
-                <a:latin typeface="+mn-lt"/>
-                <a:ea typeface="+mn-ea"/>
-                <a:cs typeface="+mn-cs"/>
-              </a:defRPr>
-            </a:lvl5pPr>
-            <a:lvl6pPr marL="2286000" algn="l" defTabSz="914400" rtl="0" eaLnBrk="1" latinLnBrk="0" hangingPunct="1">
-              <a:defRPr sz="1800" kern="1200">
-                <a:solidFill>
-                  <a:schemeClr val="lt1"/>
-                </a:solidFill>
-                <a:latin typeface="+mn-lt"/>
-                <a:ea typeface="+mn-ea"/>
-                <a:cs typeface="+mn-cs"/>
-              </a:defRPr>
-            </a:lvl6pPr>
-            <a:lvl7pPr marL="2743200" algn="l" defTabSz="914400" rtl="0" eaLnBrk="1" latinLnBrk="0" hangingPunct="1">
-              <a:defRPr sz="1800" kern="1200">
-                <a:solidFill>
-                  <a:schemeClr val="lt1"/>
-                </a:solidFill>
-                <a:latin typeface="+mn-lt"/>
-                <a:ea typeface="+mn-ea"/>
-                <a:cs typeface="+mn-cs"/>
-              </a:defRPr>
-            </a:lvl7pPr>
-            <a:lvl8pPr marL="3200400" algn="l" defTabSz="914400" rtl="0" eaLnBrk="1" latinLnBrk="0" hangingPunct="1">
-              <a:defRPr sz="1800" kern="1200">
-                <a:solidFill>
-                  <a:schemeClr val="lt1"/>
-                </a:solidFill>
-                <a:latin typeface="+mn-lt"/>
-                <a:ea typeface="+mn-ea"/>
-                <a:cs typeface="+mn-cs"/>
-              </a:defRPr>
-            </a:lvl8pPr>
-            <a:lvl9pPr marL="3657600" algn="l" defTabSz="914400" rtl="0" eaLnBrk="1" latinLnBrk="0" hangingPunct="1">
-              <a:defRPr sz="1800" kern="1200">
-                <a:solidFill>
-                  <a:schemeClr val="lt1"/>
-                </a:solidFill>
-                <a:latin typeface="+mn-lt"/>
-                <a:ea typeface="+mn-ea"/>
-                <a:cs typeface="+mn-cs"/>
-              </a:defRPr>
-            </a:lvl9pPr>
-          </a:lstStyle>
-          <a:p>
-            <a:pPr algn="ctr"/>
-            <a:endParaRPr lang="en-US"/>
+                <a:effectLst/>
+                <a:latin typeface="Slack-Lato"/>
+              </a:rPr>
+              <a:t> Year over year percent increases based off previous year's rent.</a:t>
+            </a:r>
+            <a:endParaRPr lang="en-US" dirty="0"/>
           </a:p>
         </p:txBody>
       </p:sp>
       <p:pic>
         <p:nvPicPr>
-          <p:cNvPr id="13" name="Picture 12" descr="A chart of different colors&#10;&#10;Description automatically generated with medium confidence">
-            <a:extLst>
-              <a:ext uri="{FF2B5EF4-FFF2-40B4-BE49-F238E27FC236}">
-                <a16:creationId xmlns:a16="http://schemas.microsoft.com/office/drawing/2014/main" id="{EDC7ED41-BAF5-5551-0AB0-215256181AD3}"/>
+          <p:cNvPr id="8" name="Content Placeholder 7" descr="A graph of a number of people&#10;&#10;Description automatically generated with medium confidence">
+            <a:extLst>
+              <a:ext uri="{FF2B5EF4-FFF2-40B4-BE49-F238E27FC236}">
+                <a16:creationId xmlns:a16="http://schemas.microsoft.com/office/drawing/2014/main" id="{6E7615B2-4699-60F9-F26B-5DB17B495F4B}"/>
               </a:ext>
             </a:extLst>
           </p:cNvPr>
           <p:cNvPicPr>
-            <a:picLocks noChangeAspect="1"/>
+            <a:picLocks noGrp="1" noChangeAspect="1"/>
           </p:cNvPicPr>
-          <p:nvPr/>
+          <p:nvPr>
+            <p:ph idx="1"/>
+          </p:nvPr>
         </p:nvPicPr>
         <p:blipFill>
           <a:blip r:embed="rId2">
-            <a:extLst>
-              <a:ext uri="{28A0092B-C50C-407E-A947-70E740481C1C}">
-                <a14:useLocalDpi xmlns:a14="http://schemas.microsoft.com/office/drawing/2010/main" val="0"/>
-              </a:ext>
-            </a:extLst>
-          </a:blip>
-          <a:stretch>
-            <a:fillRect/>
-          </a:stretch>
-        </p:blipFill>
-        <p:spPr>
-          <a:xfrm>
-            <a:off x="120752" y="0"/>
-            <a:ext cx="12069724" cy="6858000"/>
-          </a:xfrm>
-          <a:prstGeom prst="rect">
-            <a:avLst/>
-          </a:prstGeom>
-        </p:spPr>
-      </p:pic>
-    </p:spTree>
-    <p:extLst>
-      <p:ext uri="{BB962C8B-B14F-4D97-AF65-F5344CB8AC3E}">
-        <p14:creationId xmlns:p14="http://schemas.microsoft.com/office/powerpoint/2010/main" val="2065721054"/>
-      </p:ext>
-    </p:extLst>
-  </p:cSld>
-  <p:clrMapOvr>
-    <a:masterClrMapping/>
-  </p:clrMapOvr>
-</p:sld>
-</file>
-
-<file path=ppt/slides/slide8.xml><?xml version="1.0" encoding="utf-8"?>
-<p:sld xmlns:a="http://schemas.openxmlformats.org/drawingml/2006/main" xmlns:r="http://schemas.openxmlformats.org/officeDocument/2006/relationships" xmlns:p="http://schemas.openxmlformats.org/presentationml/2006/main">
-  <p:cSld>
-    <p:spTree>
-      <p:nvGrpSpPr>
-        <p:cNvPr id="1" name=""/>
-        <p:cNvGrpSpPr/>
-        <p:nvPr/>
-      </p:nvGrpSpPr>
-      <p:grpSpPr>
-        <a:xfrm>
-          <a:off x="0" y="0"/>
-          <a:ext cx="0" cy="0"/>
-          <a:chOff x="0" y="0"/>
-          <a:chExt cx="0" cy="0"/>
-        </a:xfrm>
-      </p:grpSpPr>
-      <p:pic>
-        <p:nvPicPr>
-          <p:cNvPr id="5" name="Content Placeholder 4" descr="A screenshot of a graph&#10;&#10;Description automatically generated">
-            <a:extLst>
-              <a:ext uri="{FF2B5EF4-FFF2-40B4-BE49-F238E27FC236}">
-                <a16:creationId xmlns:a16="http://schemas.microsoft.com/office/drawing/2014/main" id="{42903D7E-87BA-1629-0C98-8B1505DD2511}"/>
-              </a:ext>
-            </a:extLst>
-          </p:cNvPr>
-          <p:cNvPicPr>
-            <a:picLocks noGrp="1" noChangeAspect="1"/>
-          </p:cNvPicPr>
-          <p:nvPr>
-            <p:ph idx="1"/>
-          </p:nvPr>
-        </p:nvPicPr>
-        <p:blipFill>
-          <a:blip r:embed="rId3">
             <a:extLst>
               <a:ext uri="{28A0092B-C50C-407E-A947-70E740481C1C}">
                 <a14:useLocalDpi xmlns:a14="http://schemas.microsoft.com/office/drawing/2010/main" val="0"/>
@@ -6430,14 +8142,14 @@
         <p:spPr>
           <a:xfrm>
             <a:off x="0" y="0"/>
-            <a:ext cx="12001498" cy="6858000"/>
+            <a:ext cx="9271819" cy="6857365"/>
           </a:xfrm>
         </p:spPr>
       </p:pic>
     </p:spTree>
     <p:extLst>
       <p:ext uri="{BB962C8B-B14F-4D97-AF65-F5344CB8AC3E}">
-        <p14:creationId xmlns:p14="http://schemas.microsoft.com/office/powerpoint/2010/main" val="419163453"/>
+        <p14:creationId xmlns:p14="http://schemas.microsoft.com/office/powerpoint/2010/main" val="1863822752"/>
       </p:ext>
     </p:extLst>
   </p:cSld>
@@ -6466,22 +8178,20 @@
       </p:grpSpPr>
       <p:pic>
         <p:nvPicPr>
-          <p:cNvPr id="5" name="Content Placeholder 4" descr="A screenshot of a map&#10;&#10;Description automatically generated">
-            <a:extLst>
-              <a:ext uri="{FF2B5EF4-FFF2-40B4-BE49-F238E27FC236}">
-                <a16:creationId xmlns:a16="http://schemas.microsoft.com/office/drawing/2014/main" id="{A6172785-CFD4-8967-EAAD-649AC6E17754}"/>
+          <p:cNvPr id="5" name="Picture 4" descr="A graph of different colored bars&#10;&#10;Description automatically generated">
+            <a:extLst>
+              <a:ext uri="{FF2B5EF4-FFF2-40B4-BE49-F238E27FC236}">
+                <a16:creationId xmlns:a16="http://schemas.microsoft.com/office/drawing/2014/main" id="{E0509358-5B43-2852-0EA8-472480413938}"/>
               </a:ext>
             </a:extLst>
           </p:cNvPr>
           <p:cNvPicPr>
-            <a:picLocks noGrp="1" noChangeAspect="1"/>
+            <a:picLocks noChangeAspect="1"/>
           </p:cNvPicPr>
-          <p:nvPr>
-            <p:ph idx="1"/>
-          </p:nvPr>
+          <p:nvPr/>
         </p:nvPicPr>
         <p:blipFill>
-          <a:blip r:embed="rId3">
+          <a:blip r:embed="rId2">
             <a:extLst>
               <a:ext uri="{28A0092B-C50C-407E-A947-70E740481C1C}">
                 <a14:useLocalDpi xmlns:a14="http://schemas.microsoft.com/office/drawing/2010/main" val="0"/>
@@ -6494,15 +8204,67 @@
         </p:blipFill>
         <p:spPr>
           <a:xfrm>
-            <a:off x="952499" y="0"/>
-            <a:ext cx="10287002" cy="6858001"/>
+            <a:off x="0" y="819927"/>
+            <a:ext cx="12192000" cy="5945732"/>
           </a:xfrm>
+          <a:prstGeom prst="rect">
+            <a:avLst/>
+          </a:prstGeom>
         </p:spPr>
       </p:pic>
+      <p:sp>
+        <p:nvSpPr>
+          <p:cNvPr id="6" name="TextBox 5">
+            <a:extLst>
+              <a:ext uri="{FF2B5EF4-FFF2-40B4-BE49-F238E27FC236}">
+                <a16:creationId xmlns:a16="http://schemas.microsoft.com/office/drawing/2014/main" id="{4654BB0E-8D52-640B-14DD-43C06CBA4E72}"/>
+              </a:ext>
+            </a:extLst>
+          </p:cNvPr>
+          <p:cNvSpPr txBox="1"/>
+          <p:nvPr/>
+        </p:nvSpPr>
+        <p:spPr>
+          <a:xfrm>
+            <a:off x="2154247" y="0"/>
+            <a:ext cx="7883505" cy="369332"/>
+          </a:xfrm>
+          <a:prstGeom prst="rect">
+            <a:avLst/>
+          </a:prstGeom>
+          <a:noFill/>
+        </p:spPr>
+        <p:txBody>
+          <a:bodyPr wrap="none" rtlCol="0">
+            <a:spAutoFit/>
+          </a:bodyPr>
+          <a:lstStyle/>
+          <a:p>
+            <a:r>
+              <a:rPr lang="en-US" b="0" i="0" dirty="0">
+                <a:solidFill>
+                  <a:srgbClr val="1D1C1D"/>
+                </a:solidFill>
+                <a:effectLst/>
+                <a:latin typeface="Slack-Lato"/>
+              </a:rPr>
+              <a:t> Year over year percent increases in relation to Annual Median Household Income</a:t>
+            </a:r>
+            <a:r>
+              <a:rPr lang="en-US" b="0" i="0" dirty="0">
+                <a:effectLst/>
+                <a:latin typeface="Slack-Lato"/>
+              </a:rPr>
+              <a:t> </a:t>
+            </a:r>
+            <a:endParaRPr lang="en-US" dirty="0"/>
+          </a:p>
+        </p:txBody>
+      </p:sp>
     </p:spTree>
     <p:extLst>
       <p:ext uri="{BB962C8B-B14F-4D97-AF65-F5344CB8AC3E}">
-        <p14:creationId xmlns:p14="http://schemas.microsoft.com/office/powerpoint/2010/main" val="1289324827"/>
+        <p14:creationId xmlns:p14="http://schemas.microsoft.com/office/powerpoint/2010/main" val="356397702"/>
       </p:ext>
     </p:extLst>
   </p:cSld>

</xml_diff>

<commit_message>
Final touches to power point
</commit_message>
<xml_diff>
--- a/Portland , Or Housing & Affordability.pptx
+++ b/Portland , Or Housing & Affordability.pptx
@@ -5,7 +5,7 @@
     <p:sldMasterId id="2147483648" r:id="rId1"/>
   </p:sldMasterIdLst>
   <p:notesMasterIdLst>
-    <p:notesMasterId r:id="rId16"/>
+    <p:notesMasterId r:id="rId17"/>
   </p:notesMasterIdLst>
   <p:sldIdLst>
     <p:sldId id="256" r:id="rId2"/>
@@ -22,6 +22,7 @@
     <p:sldId id="268" r:id="rId13"/>
     <p:sldId id="264" r:id="rId14"/>
     <p:sldId id="270" r:id="rId15"/>
+    <p:sldId id="271" r:id="rId16"/>
   </p:sldIdLst>
   <p:sldSz cx="12192000" cy="6858000"/>
   <p:notesSz cx="6858000" cy="9144000"/>
@@ -139,6 +140,225 @@
 
 <file path=ppt/changesInfos/changesInfo1.xml><?xml version="1.0" encoding="utf-8"?>
 <pc:chgInfo xmlns:a="http://schemas.openxmlformats.org/drawingml/2006/main" xmlns:r="http://schemas.openxmlformats.org/officeDocument/2006/relationships" xmlns:ac="http://schemas.microsoft.com/office/drawing/2013/main/command" xmlns:pc="http://schemas.microsoft.com/office/powerpoint/2013/main/command">
+  <pc:docChgLst>
+    <pc:chgData name="Tiki tiki" userId="9b95eec42b947e32" providerId="LiveId" clId="{6C13EF49-7177-4324-9067-B7991CF0F0BE}"/>
+    <pc:docChg chg="custSel modSld">
+      <pc:chgData name="Tiki tiki" userId="9b95eec42b947e32" providerId="LiveId" clId="{6C13EF49-7177-4324-9067-B7991CF0F0BE}" dt="2025-02-04T02:08:32.687" v="63" actId="14100"/>
+      <pc:docMkLst>
+        <pc:docMk/>
+      </pc:docMkLst>
+      <pc:sldChg chg="modSp mod">
+        <pc:chgData name="Tiki tiki" userId="9b95eec42b947e32" providerId="LiveId" clId="{6C13EF49-7177-4324-9067-B7991CF0F0BE}" dt="2025-02-04T02:03:42.831" v="30" actId="14100"/>
+        <pc:sldMkLst>
+          <pc:docMk/>
+          <pc:sldMk cId="2844210991" sldId="257"/>
+        </pc:sldMkLst>
+        <pc:picChg chg="mod">
+          <ac:chgData name="Tiki tiki" userId="9b95eec42b947e32" providerId="LiveId" clId="{6C13EF49-7177-4324-9067-B7991CF0F0BE}" dt="2025-02-04T02:03:42.831" v="30" actId="14100"/>
+          <ac:picMkLst>
+            <pc:docMk/>
+            <pc:sldMk cId="2844210991" sldId="257"/>
+            <ac:picMk id="5" creationId="{5D0C5E56-DBD4-F671-9EF6-103691833ECF}"/>
+          </ac:picMkLst>
+        </pc:picChg>
+      </pc:sldChg>
+      <pc:sldChg chg="addSp delSp modSp mod">
+        <pc:chgData name="Tiki tiki" userId="9b95eec42b947e32" providerId="LiveId" clId="{6C13EF49-7177-4324-9067-B7991CF0F0BE}" dt="2025-02-04T02:03:36.129" v="28" actId="1076"/>
+        <pc:sldMkLst>
+          <pc:docMk/>
+          <pc:sldMk cId="1863822752" sldId="258"/>
+        </pc:sldMkLst>
+        <pc:spChg chg="del mod">
+          <ac:chgData name="Tiki tiki" userId="9b95eec42b947e32" providerId="LiveId" clId="{6C13EF49-7177-4324-9067-B7991CF0F0BE}" dt="2025-02-04T02:03:07.503" v="20" actId="478"/>
+          <ac:spMkLst>
+            <pc:docMk/>
+            <pc:sldMk cId="1863822752" sldId="258"/>
+            <ac:spMk id="2" creationId="{F4EE4F59-C3FC-A5E3-50C2-E11F0DF6E1CF}"/>
+          </ac:spMkLst>
+        </pc:spChg>
+        <pc:spChg chg="add del mod">
+          <ac:chgData name="Tiki tiki" userId="9b95eec42b947e32" providerId="LiveId" clId="{6C13EF49-7177-4324-9067-B7991CF0F0BE}" dt="2025-02-04T02:03:09.017" v="21" actId="478"/>
+          <ac:spMkLst>
+            <pc:docMk/>
+            <pc:sldMk cId="1863822752" sldId="258"/>
+            <ac:spMk id="4" creationId="{783E2B71-0A76-8D53-0F65-29466A0853C2}"/>
+          </ac:spMkLst>
+        </pc:spChg>
+        <pc:spChg chg="del">
+          <ac:chgData name="Tiki tiki" userId="9b95eec42b947e32" providerId="LiveId" clId="{6C13EF49-7177-4324-9067-B7991CF0F0BE}" dt="2025-02-04T02:03:20.021" v="23" actId="478"/>
+          <ac:spMkLst>
+            <pc:docMk/>
+            <pc:sldMk cId="1863822752" sldId="258"/>
+            <ac:spMk id="6" creationId="{A2F2C132-52FF-B292-8E14-25EEF7A7B3A0}"/>
+          </ac:spMkLst>
+        </pc:spChg>
+        <pc:picChg chg="mod">
+          <ac:chgData name="Tiki tiki" userId="9b95eec42b947e32" providerId="LiveId" clId="{6C13EF49-7177-4324-9067-B7991CF0F0BE}" dt="2025-02-04T02:03:36.129" v="28" actId="1076"/>
+          <ac:picMkLst>
+            <pc:docMk/>
+            <pc:sldMk cId="1863822752" sldId="258"/>
+            <ac:picMk id="5" creationId="{617C7B46-B1B8-A4CB-99EA-0FF60A6E5535}"/>
+          </ac:picMkLst>
+        </pc:picChg>
+      </pc:sldChg>
+      <pc:sldChg chg="addSp delSp modSp mod">
+        <pc:chgData name="Tiki tiki" userId="9b95eec42b947e32" providerId="LiveId" clId="{6C13EF49-7177-4324-9067-B7991CF0F0BE}" dt="2025-02-04T02:08:08.437" v="55" actId="14100"/>
+        <pc:sldMkLst>
+          <pc:docMk/>
+          <pc:sldMk cId="2065721054" sldId="261"/>
+        </pc:sldMkLst>
+        <pc:spChg chg="add del mod">
+          <ac:chgData name="Tiki tiki" userId="9b95eec42b947e32" providerId="LiveId" clId="{6C13EF49-7177-4324-9067-B7991CF0F0BE}" dt="2025-02-04T02:05:48.548" v="32" actId="478"/>
+          <ac:spMkLst>
+            <pc:docMk/>
+            <pc:sldMk cId="2065721054" sldId="261"/>
+            <ac:spMk id="3" creationId="{DBE50487-DC94-2505-8CF4-15EE38A5BD6A}"/>
+          </ac:spMkLst>
+        </pc:spChg>
+        <pc:picChg chg="del">
+          <ac:chgData name="Tiki tiki" userId="9b95eec42b947e32" providerId="LiveId" clId="{6C13EF49-7177-4324-9067-B7991CF0F0BE}" dt="2025-02-04T02:05:28.383" v="31" actId="478"/>
+          <ac:picMkLst>
+            <pc:docMk/>
+            <pc:sldMk cId="2065721054" sldId="261"/>
+            <ac:picMk id="5" creationId="{6B719281-3ABB-0BAB-B4C1-FBA180DBA318}"/>
+          </ac:picMkLst>
+        </pc:picChg>
+        <pc:picChg chg="add del mod">
+          <ac:chgData name="Tiki tiki" userId="9b95eec42b947e32" providerId="LiveId" clId="{6C13EF49-7177-4324-9067-B7991CF0F0BE}" dt="2025-02-04T02:06:05.369" v="38" actId="478"/>
+          <ac:picMkLst>
+            <pc:docMk/>
+            <pc:sldMk cId="2065721054" sldId="261"/>
+            <ac:picMk id="6" creationId="{E7B46DC8-4FA8-2B49-457C-7D1AF9FC5615}"/>
+          </ac:picMkLst>
+        </pc:picChg>
+        <pc:picChg chg="add del mod">
+          <ac:chgData name="Tiki tiki" userId="9b95eec42b947e32" providerId="LiveId" clId="{6C13EF49-7177-4324-9067-B7991CF0F0BE}" dt="2025-02-04T02:06:33.859" v="45" actId="478"/>
+          <ac:picMkLst>
+            <pc:docMk/>
+            <pc:sldMk cId="2065721054" sldId="261"/>
+            <ac:picMk id="8" creationId="{7AC142C3-6755-31BA-31D5-CC16DF127F77}"/>
+          </ac:picMkLst>
+        </pc:picChg>
+        <pc:picChg chg="add del mod">
+          <ac:chgData name="Tiki tiki" userId="9b95eec42b947e32" providerId="LiveId" clId="{6C13EF49-7177-4324-9067-B7991CF0F0BE}" dt="2025-02-04T02:06:41.861" v="50" actId="478"/>
+          <ac:picMkLst>
+            <pc:docMk/>
+            <pc:sldMk cId="2065721054" sldId="261"/>
+            <ac:picMk id="11" creationId="{46ED6242-4754-6AA8-6227-8CE91571469D}"/>
+          </ac:picMkLst>
+        </pc:picChg>
+        <pc:picChg chg="add mod">
+          <ac:chgData name="Tiki tiki" userId="9b95eec42b947e32" providerId="LiveId" clId="{6C13EF49-7177-4324-9067-B7991CF0F0BE}" dt="2025-02-04T02:08:08.437" v="55" actId="14100"/>
+          <ac:picMkLst>
+            <pc:docMk/>
+            <pc:sldMk cId="2065721054" sldId="261"/>
+            <ac:picMk id="13" creationId="{EDC7ED41-BAF5-5551-0AB0-215256181AD3}"/>
+          </ac:picMkLst>
+        </pc:picChg>
+      </pc:sldChg>
+      <pc:sldChg chg="addSp delSp modSp mod">
+        <pc:chgData name="Tiki tiki" userId="9b95eec42b947e32" providerId="LiveId" clId="{6C13EF49-7177-4324-9067-B7991CF0F0BE}" dt="2025-02-04T02:08:32.687" v="63" actId="14100"/>
+        <pc:sldMkLst>
+          <pc:docMk/>
+          <pc:sldMk cId="419163453" sldId="262"/>
+        </pc:sldMkLst>
+        <pc:spChg chg="add del mod">
+          <ac:chgData name="Tiki tiki" userId="9b95eec42b947e32" providerId="LiveId" clId="{6C13EF49-7177-4324-9067-B7991CF0F0BE}" dt="2025-02-04T02:08:26.941" v="59"/>
+          <ac:spMkLst>
+            <pc:docMk/>
+            <pc:sldMk cId="419163453" sldId="262"/>
+            <ac:spMk id="3" creationId="{48E6E0D0-2EE6-2804-F016-364C83491B9B}"/>
+          </ac:spMkLst>
+        </pc:spChg>
+        <pc:picChg chg="add mod">
+          <ac:chgData name="Tiki tiki" userId="9b95eec42b947e32" providerId="LiveId" clId="{6C13EF49-7177-4324-9067-B7991CF0F0BE}" dt="2025-02-04T02:08:32.687" v="63" actId="14100"/>
+          <ac:picMkLst>
+            <pc:docMk/>
+            <pc:sldMk cId="419163453" sldId="262"/>
+            <ac:picMk id="5" creationId="{42903D7E-87BA-1629-0C98-8B1505DD2511}"/>
+          </ac:picMkLst>
+        </pc:picChg>
+        <pc:picChg chg="del mod">
+          <ac:chgData name="Tiki tiki" userId="9b95eec42b947e32" providerId="LiveId" clId="{6C13EF49-7177-4324-9067-B7991CF0F0BE}" dt="2025-02-04T02:08:25.545" v="58" actId="478"/>
+          <ac:picMkLst>
+            <pc:docMk/>
+            <pc:sldMk cId="419163453" sldId="262"/>
+            <ac:picMk id="17" creationId="{8DBD0990-2C30-6CC6-D737-7E2EE39EA0AE}"/>
+          </ac:picMkLst>
+        </pc:picChg>
+      </pc:sldChg>
+      <pc:sldChg chg="addSp delSp modSp mod">
+        <pc:chgData name="Tiki tiki" userId="9b95eec42b947e32" providerId="LiveId" clId="{6C13EF49-7177-4324-9067-B7991CF0F0BE}" dt="2025-02-04T02:02:58.830" v="18" actId="1076"/>
+        <pc:sldMkLst>
+          <pc:docMk/>
+          <pc:sldMk cId="1289324827" sldId="263"/>
+        </pc:sldMkLst>
+        <pc:spChg chg="del mod">
+          <ac:chgData name="Tiki tiki" userId="9b95eec42b947e32" providerId="LiveId" clId="{6C13EF49-7177-4324-9067-B7991CF0F0BE}" dt="2025-02-04T02:02:27.174" v="5" actId="478"/>
+          <ac:spMkLst>
+            <pc:docMk/>
+            <pc:sldMk cId="1289324827" sldId="263"/>
+            <ac:spMk id="2" creationId="{9E9C00BC-763A-18BF-566E-9B915680FBF9}"/>
+          </ac:spMkLst>
+        </pc:spChg>
+        <pc:spChg chg="del">
+          <ac:chgData name="Tiki tiki" userId="9b95eec42b947e32" providerId="LiveId" clId="{6C13EF49-7177-4324-9067-B7991CF0F0BE}" dt="2025-02-04T02:02:17.022" v="0"/>
+          <ac:spMkLst>
+            <pc:docMk/>
+            <pc:sldMk cId="1289324827" sldId="263"/>
+            <ac:spMk id="3" creationId="{84A8DC68-2C6C-0AFB-2665-CB6D91BC966C}"/>
+          </ac:spMkLst>
+        </pc:spChg>
+        <pc:picChg chg="add mod">
+          <ac:chgData name="Tiki tiki" userId="9b95eec42b947e32" providerId="LiveId" clId="{6C13EF49-7177-4324-9067-B7991CF0F0BE}" dt="2025-02-04T02:02:58.830" v="18" actId="1076"/>
+          <ac:picMkLst>
+            <pc:docMk/>
+            <pc:sldMk cId="1289324827" sldId="263"/>
+            <ac:picMk id="5" creationId="{A6172785-CFD4-8967-EAAD-649AC6E17754}"/>
+          </ac:picMkLst>
+        </pc:picChg>
+      </pc:sldChg>
+      <pc:sldChg chg="addSp delSp modSp mod">
+        <pc:chgData name="Tiki tiki" userId="9b95eec42b947e32" providerId="LiveId" clId="{6C13EF49-7177-4324-9067-B7991CF0F0BE}" dt="2025-02-04T02:02:50.775" v="16" actId="962"/>
+        <pc:sldMkLst>
+          <pc:docMk/>
+          <pc:sldMk cId="4002816429" sldId="264"/>
+        </pc:sldMkLst>
+        <pc:spChg chg="del">
+          <ac:chgData name="Tiki tiki" userId="9b95eec42b947e32" providerId="LiveId" clId="{6C13EF49-7177-4324-9067-B7991CF0F0BE}" dt="2025-02-04T02:02:45.542" v="11" actId="478"/>
+          <ac:spMkLst>
+            <pc:docMk/>
+            <pc:sldMk cId="4002816429" sldId="264"/>
+            <ac:spMk id="2" creationId="{BE2887C2-B45A-05D4-31C7-0F383FF5250D}"/>
+          </ac:spMkLst>
+        </pc:spChg>
+        <pc:spChg chg="del">
+          <ac:chgData name="Tiki tiki" userId="9b95eec42b947e32" providerId="LiveId" clId="{6C13EF49-7177-4324-9067-B7991CF0F0BE}" dt="2025-02-04T02:02:47.036" v="12" actId="478"/>
+          <ac:spMkLst>
+            <pc:docMk/>
+            <pc:sldMk cId="4002816429" sldId="264"/>
+            <ac:spMk id="3" creationId="{97D72804-DA73-D81D-E737-547194F32705}"/>
+          </ac:spMkLst>
+        </pc:spChg>
+        <pc:spChg chg="add del mod">
+          <ac:chgData name="Tiki tiki" userId="9b95eec42b947e32" providerId="LiveId" clId="{6C13EF49-7177-4324-9067-B7991CF0F0BE}" dt="2025-02-04T02:02:47.680" v="13" actId="478"/>
+          <ac:spMkLst>
+            <pc:docMk/>
+            <pc:sldMk cId="4002816429" sldId="264"/>
+            <ac:spMk id="5" creationId="{CFCE4307-F701-3296-5B96-5C201CCC024F}"/>
+          </ac:spMkLst>
+        </pc:spChg>
+        <pc:picChg chg="add mod">
+          <ac:chgData name="Tiki tiki" userId="9b95eec42b947e32" providerId="LiveId" clId="{6C13EF49-7177-4324-9067-B7991CF0F0BE}" dt="2025-02-04T02:02:50.775" v="16" actId="962"/>
+          <ac:picMkLst>
+            <pc:docMk/>
+            <pc:sldMk cId="4002816429" sldId="264"/>
+            <ac:picMk id="7" creationId="{D08E6C92-CF2B-09D1-2AE0-E24D4D596846}"/>
+          </ac:picMkLst>
+        </pc:picChg>
+      </pc:sldChg>
+    </pc:docChg>
+  </pc:docChgLst>
   <pc:docChgLst>
     <pc:chgData name="Tiki tiki" userId="9b95eec42b947e32" providerId="LiveId" clId="{D8EC7A79-B977-4C69-BE6D-C41EAF22F477}"/>
     <pc:docChg chg="undo custSel addSld delSld modSld sldOrd">
@@ -669,225 +889,6 @@
       </pc:sldChg>
     </pc:docChg>
   </pc:docChgLst>
-  <pc:docChgLst>
-    <pc:chgData name="Tiki tiki" userId="9b95eec42b947e32" providerId="LiveId" clId="{6C13EF49-7177-4324-9067-B7991CF0F0BE}"/>
-    <pc:docChg chg="custSel modSld">
-      <pc:chgData name="Tiki tiki" userId="9b95eec42b947e32" providerId="LiveId" clId="{6C13EF49-7177-4324-9067-B7991CF0F0BE}" dt="2025-02-04T02:08:32.687" v="63" actId="14100"/>
-      <pc:docMkLst>
-        <pc:docMk/>
-      </pc:docMkLst>
-      <pc:sldChg chg="modSp mod">
-        <pc:chgData name="Tiki tiki" userId="9b95eec42b947e32" providerId="LiveId" clId="{6C13EF49-7177-4324-9067-B7991CF0F0BE}" dt="2025-02-04T02:03:42.831" v="30" actId="14100"/>
-        <pc:sldMkLst>
-          <pc:docMk/>
-          <pc:sldMk cId="2844210991" sldId="257"/>
-        </pc:sldMkLst>
-        <pc:picChg chg="mod">
-          <ac:chgData name="Tiki tiki" userId="9b95eec42b947e32" providerId="LiveId" clId="{6C13EF49-7177-4324-9067-B7991CF0F0BE}" dt="2025-02-04T02:03:42.831" v="30" actId="14100"/>
-          <ac:picMkLst>
-            <pc:docMk/>
-            <pc:sldMk cId="2844210991" sldId="257"/>
-            <ac:picMk id="5" creationId="{5D0C5E56-DBD4-F671-9EF6-103691833ECF}"/>
-          </ac:picMkLst>
-        </pc:picChg>
-      </pc:sldChg>
-      <pc:sldChg chg="addSp delSp modSp mod">
-        <pc:chgData name="Tiki tiki" userId="9b95eec42b947e32" providerId="LiveId" clId="{6C13EF49-7177-4324-9067-B7991CF0F0BE}" dt="2025-02-04T02:03:36.129" v="28" actId="1076"/>
-        <pc:sldMkLst>
-          <pc:docMk/>
-          <pc:sldMk cId="1863822752" sldId="258"/>
-        </pc:sldMkLst>
-        <pc:spChg chg="del mod">
-          <ac:chgData name="Tiki tiki" userId="9b95eec42b947e32" providerId="LiveId" clId="{6C13EF49-7177-4324-9067-B7991CF0F0BE}" dt="2025-02-04T02:03:07.503" v="20" actId="478"/>
-          <ac:spMkLst>
-            <pc:docMk/>
-            <pc:sldMk cId="1863822752" sldId="258"/>
-            <ac:spMk id="2" creationId="{F4EE4F59-C3FC-A5E3-50C2-E11F0DF6E1CF}"/>
-          </ac:spMkLst>
-        </pc:spChg>
-        <pc:spChg chg="add del mod">
-          <ac:chgData name="Tiki tiki" userId="9b95eec42b947e32" providerId="LiveId" clId="{6C13EF49-7177-4324-9067-B7991CF0F0BE}" dt="2025-02-04T02:03:09.017" v="21" actId="478"/>
-          <ac:spMkLst>
-            <pc:docMk/>
-            <pc:sldMk cId="1863822752" sldId="258"/>
-            <ac:spMk id="4" creationId="{783E2B71-0A76-8D53-0F65-29466A0853C2}"/>
-          </ac:spMkLst>
-        </pc:spChg>
-        <pc:spChg chg="del">
-          <ac:chgData name="Tiki tiki" userId="9b95eec42b947e32" providerId="LiveId" clId="{6C13EF49-7177-4324-9067-B7991CF0F0BE}" dt="2025-02-04T02:03:20.021" v="23" actId="478"/>
-          <ac:spMkLst>
-            <pc:docMk/>
-            <pc:sldMk cId="1863822752" sldId="258"/>
-            <ac:spMk id="6" creationId="{A2F2C132-52FF-B292-8E14-25EEF7A7B3A0}"/>
-          </ac:spMkLst>
-        </pc:spChg>
-        <pc:picChg chg="mod">
-          <ac:chgData name="Tiki tiki" userId="9b95eec42b947e32" providerId="LiveId" clId="{6C13EF49-7177-4324-9067-B7991CF0F0BE}" dt="2025-02-04T02:03:36.129" v="28" actId="1076"/>
-          <ac:picMkLst>
-            <pc:docMk/>
-            <pc:sldMk cId="1863822752" sldId="258"/>
-            <ac:picMk id="5" creationId="{617C7B46-B1B8-A4CB-99EA-0FF60A6E5535}"/>
-          </ac:picMkLst>
-        </pc:picChg>
-      </pc:sldChg>
-      <pc:sldChg chg="addSp delSp modSp mod">
-        <pc:chgData name="Tiki tiki" userId="9b95eec42b947e32" providerId="LiveId" clId="{6C13EF49-7177-4324-9067-B7991CF0F0BE}" dt="2025-02-04T02:08:08.437" v="55" actId="14100"/>
-        <pc:sldMkLst>
-          <pc:docMk/>
-          <pc:sldMk cId="2065721054" sldId="261"/>
-        </pc:sldMkLst>
-        <pc:spChg chg="add del mod">
-          <ac:chgData name="Tiki tiki" userId="9b95eec42b947e32" providerId="LiveId" clId="{6C13EF49-7177-4324-9067-B7991CF0F0BE}" dt="2025-02-04T02:05:48.548" v="32" actId="478"/>
-          <ac:spMkLst>
-            <pc:docMk/>
-            <pc:sldMk cId="2065721054" sldId="261"/>
-            <ac:spMk id="3" creationId="{DBE50487-DC94-2505-8CF4-15EE38A5BD6A}"/>
-          </ac:spMkLst>
-        </pc:spChg>
-        <pc:picChg chg="del">
-          <ac:chgData name="Tiki tiki" userId="9b95eec42b947e32" providerId="LiveId" clId="{6C13EF49-7177-4324-9067-B7991CF0F0BE}" dt="2025-02-04T02:05:28.383" v="31" actId="478"/>
-          <ac:picMkLst>
-            <pc:docMk/>
-            <pc:sldMk cId="2065721054" sldId="261"/>
-            <ac:picMk id="5" creationId="{6B719281-3ABB-0BAB-B4C1-FBA180DBA318}"/>
-          </ac:picMkLst>
-        </pc:picChg>
-        <pc:picChg chg="add del mod">
-          <ac:chgData name="Tiki tiki" userId="9b95eec42b947e32" providerId="LiveId" clId="{6C13EF49-7177-4324-9067-B7991CF0F0BE}" dt="2025-02-04T02:06:05.369" v="38" actId="478"/>
-          <ac:picMkLst>
-            <pc:docMk/>
-            <pc:sldMk cId="2065721054" sldId="261"/>
-            <ac:picMk id="6" creationId="{E7B46DC8-4FA8-2B49-457C-7D1AF9FC5615}"/>
-          </ac:picMkLst>
-        </pc:picChg>
-        <pc:picChg chg="add del mod">
-          <ac:chgData name="Tiki tiki" userId="9b95eec42b947e32" providerId="LiveId" clId="{6C13EF49-7177-4324-9067-B7991CF0F0BE}" dt="2025-02-04T02:06:33.859" v="45" actId="478"/>
-          <ac:picMkLst>
-            <pc:docMk/>
-            <pc:sldMk cId="2065721054" sldId="261"/>
-            <ac:picMk id="8" creationId="{7AC142C3-6755-31BA-31D5-CC16DF127F77}"/>
-          </ac:picMkLst>
-        </pc:picChg>
-        <pc:picChg chg="add del mod">
-          <ac:chgData name="Tiki tiki" userId="9b95eec42b947e32" providerId="LiveId" clId="{6C13EF49-7177-4324-9067-B7991CF0F0BE}" dt="2025-02-04T02:06:41.861" v="50" actId="478"/>
-          <ac:picMkLst>
-            <pc:docMk/>
-            <pc:sldMk cId="2065721054" sldId="261"/>
-            <ac:picMk id="11" creationId="{46ED6242-4754-6AA8-6227-8CE91571469D}"/>
-          </ac:picMkLst>
-        </pc:picChg>
-        <pc:picChg chg="add mod">
-          <ac:chgData name="Tiki tiki" userId="9b95eec42b947e32" providerId="LiveId" clId="{6C13EF49-7177-4324-9067-B7991CF0F0BE}" dt="2025-02-04T02:08:08.437" v="55" actId="14100"/>
-          <ac:picMkLst>
-            <pc:docMk/>
-            <pc:sldMk cId="2065721054" sldId="261"/>
-            <ac:picMk id="13" creationId="{EDC7ED41-BAF5-5551-0AB0-215256181AD3}"/>
-          </ac:picMkLst>
-        </pc:picChg>
-      </pc:sldChg>
-      <pc:sldChg chg="addSp delSp modSp mod">
-        <pc:chgData name="Tiki tiki" userId="9b95eec42b947e32" providerId="LiveId" clId="{6C13EF49-7177-4324-9067-B7991CF0F0BE}" dt="2025-02-04T02:08:32.687" v="63" actId="14100"/>
-        <pc:sldMkLst>
-          <pc:docMk/>
-          <pc:sldMk cId="419163453" sldId="262"/>
-        </pc:sldMkLst>
-        <pc:spChg chg="add del mod">
-          <ac:chgData name="Tiki tiki" userId="9b95eec42b947e32" providerId="LiveId" clId="{6C13EF49-7177-4324-9067-B7991CF0F0BE}" dt="2025-02-04T02:08:26.941" v="59"/>
-          <ac:spMkLst>
-            <pc:docMk/>
-            <pc:sldMk cId="419163453" sldId="262"/>
-            <ac:spMk id="3" creationId="{48E6E0D0-2EE6-2804-F016-364C83491B9B}"/>
-          </ac:spMkLst>
-        </pc:spChg>
-        <pc:picChg chg="add mod">
-          <ac:chgData name="Tiki tiki" userId="9b95eec42b947e32" providerId="LiveId" clId="{6C13EF49-7177-4324-9067-B7991CF0F0BE}" dt="2025-02-04T02:08:32.687" v="63" actId="14100"/>
-          <ac:picMkLst>
-            <pc:docMk/>
-            <pc:sldMk cId="419163453" sldId="262"/>
-            <ac:picMk id="5" creationId="{42903D7E-87BA-1629-0C98-8B1505DD2511}"/>
-          </ac:picMkLst>
-        </pc:picChg>
-        <pc:picChg chg="del mod">
-          <ac:chgData name="Tiki tiki" userId="9b95eec42b947e32" providerId="LiveId" clId="{6C13EF49-7177-4324-9067-B7991CF0F0BE}" dt="2025-02-04T02:08:25.545" v="58" actId="478"/>
-          <ac:picMkLst>
-            <pc:docMk/>
-            <pc:sldMk cId="419163453" sldId="262"/>
-            <ac:picMk id="17" creationId="{8DBD0990-2C30-6CC6-D737-7E2EE39EA0AE}"/>
-          </ac:picMkLst>
-        </pc:picChg>
-      </pc:sldChg>
-      <pc:sldChg chg="addSp delSp modSp mod">
-        <pc:chgData name="Tiki tiki" userId="9b95eec42b947e32" providerId="LiveId" clId="{6C13EF49-7177-4324-9067-B7991CF0F0BE}" dt="2025-02-04T02:02:58.830" v="18" actId="1076"/>
-        <pc:sldMkLst>
-          <pc:docMk/>
-          <pc:sldMk cId="1289324827" sldId="263"/>
-        </pc:sldMkLst>
-        <pc:spChg chg="del mod">
-          <ac:chgData name="Tiki tiki" userId="9b95eec42b947e32" providerId="LiveId" clId="{6C13EF49-7177-4324-9067-B7991CF0F0BE}" dt="2025-02-04T02:02:27.174" v="5" actId="478"/>
-          <ac:spMkLst>
-            <pc:docMk/>
-            <pc:sldMk cId="1289324827" sldId="263"/>
-            <ac:spMk id="2" creationId="{9E9C00BC-763A-18BF-566E-9B915680FBF9}"/>
-          </ac:spMkLst>
-        </pc:spChg>
-        <pc:spChg chg="del">
-          <ac:chgData name="Tiki tiki" userId="9b95eec42b947e32" providerId="LiveId" clId="{6C13EF49-7177-4324-9067-B7991CF0F0BE}" dt="2025-02-04T02:02:17.022" v="0"/>
-          <ac:spMkLst>
-            <pc:docMk/>
-            <pc:sldMk cId="1289324827" sldId="263"/>
-            <ac:spMk id="3" creationId="{84A8DC68-2C6C-0AFB-2665-CB6D91BC966C}"/>
-          </ac:spMkLst>
-        </pc:spChg>
-        <pc:picChg chg="add mod">
-          <ac:chgData name="Tiki tiki" userId="9b95eec42b947e32" providerId="LiveId" clId="{6C13EF49-7177-4324-9067-B7991CF0F0BE}" dt="2025-02-04T02:02:58.830" v="18" actId="1076"/>
-          <ac:picMkLst>
-            <pc:docMk/>
-            <pc:sldMk cId="1289324827" sldId="263"/>
-            <ac:picMk id="5" creationId="{A6172785-CFD4-8967-EAAD-649AC6E17754}"/>
-          </ac:picMkLst>
-        </pc:picChg>
-      </pc:sldChg>
-      <pc:sldChg chg="addSp delSp modSp mod">
-        <pc:chgData name="Tiki tiki" userId="9b95eec42b947e32" providerId="LiveId" clId="{6C13EF49-7177-4324-9067-B7991CF0F0BE}" dt="2025-02-04T02:02:50.775" v="16" actId="962"/>
-        <pc:sldMkLst>
-          <pc:docMk/>
-          <pc:sldMk cId="4002816429" sldId="264"/>
-        </pc:sldMkLst>
-        <pc:spChg chg="del">
-          <ac:chgData name="Tiki tiki" userId="9b95eec42b947e32" providerId="LiveId" clId="{6C13EF49-7177-4324-9067-B7991CF0F0BE}" dt="2025-02-04T02:02:45.542" v="11" actId="478"/>
-          <ac:spMkLst>
-            <pc:docMk/>
-            <pc:sldMk cId="4002816429" sldId="264"/>
-            <ac:spMk id="2" creationId="{BE2887C2-B45A-05D4-31C7-0F383FF5250D}"/>
-          </ac:spMkLst>
-        </pc:spChg>
-        <pc:spChg chg="del">
-          <ac:chgData name="Tiki tiki" userId="9b95eec42b947e32" providerId="LiveId" clId="{6C13EF49-7177-4324-9067-B7991CF0F0BE}" dt="2025-02-04T02:02:47.036" v="12" actId="478"/>
-          <ac:spMkLst>
-            <pc:docMk/>
-            <pc:sldMk cId="4002816429" sldId="264"/>
-            <ac:spMk id="3" creationId="{97D72804-DA73-D81D-E737-547194F32705}"/>
-          </ac:spMkLst>
-        </pc:spChg>
-        <pc:spChg chg="add del mod">
-          <ac:chgData name="Tiki tiki" userId="9b95eec42b947e32" providerId="LiveId" clId="{6C13EF49-7177-4324-9067-B7991CF0F0BE}" dt="2025-02-04T02:02:47.680" v="13" actId="478"/>
-          <ac:spMkLst>
-            <pc:docMk/>
-            <pc:sldMk cId="4002816429" sldId="264"/>
-            <ac:spMk id="5" creationId="{CFCE4307-F701-3296-5B96-5C201CCC024F}"/>
-          </ac:spMkLst>
-        </pc:spChg>
-        <pc:picChg chg="add mod">
-          <ac:chgData name="Tiki tiki" userId="9b95eec42b947e32" providerId="LiveId" clId="{6C13EF49-7177-4324-9067-B7991CF0F0BE}" dt="2025-02-04T02:02:50.775" v="16" actId="962"/>
-          <ac:picMkLst>
-            <pc:docMk/>
-            <pc:sldMk cId="4002816429" sldId="264"/>
-            <ac:picMk id="7" creationId="{D08E6C92-CF2B-09D1-2AE0-E24D4D596846}"/>
-          </ac:picMkLst>
-        </pc:picChg>
-      </pc:sldChg>
-    </pc:docChg>
-  </pc:docChgLst>
 </pc:chgInfo>
 </file>
 
@@ -973,7 +974,7 @@
           <a:p>
             <a:fld id="{3B9ED087-320F-4C2A-A59E-822B1F4F7463}" type="datetimeFigureOut">
               <a:rPr lang="en-US" smtClean="0"/>
-              <a:t>2/3/2025</a:t>
+              <a:t>2/4/2025</a:t>
             </a:fld>
             <a:endParaRPr lang="en-US"/>
           </a:p>
@@ -1389,6 +1390,174 @@
           <a:p>
             <a:fld id="{E66EED18-0FEB-4E26-8FB1-B4D6647DA350}" type="slidenum">
               <a:rPr lang="en-US" smtClean="0"/>
+              <a:t>7</a:t>
+            </a:fld>
+            <a:endParaRPr lang="en-US"/>
+          </a:p>
+        </p:txBody>
+      </p:sp>
+    </p:spTree>
+    <p:extLst>
+      <p:ext uri="{BB962C8B-B14F-4D97-AF65-F5344CB8AC3E}">
+        <p14:creationId xmlns:p14="http://schemas.microsoft.com/office/powerpoint/2010/main" val="4047676603"/>
+      </p:ext>
+    </p:extLst>
+  </p:cSld>
+  <p:clrMapOvr>
+    <a:masterClrMapping/>
+  </p:clrMapOvr>
+</p:notes>
+</file>
+
+<file path=ppt/notesSlides/notesSlide3.xml><?xml version="1.0" encoding="utf-8"?>
+<p:notes xmlns:a="http://schemas.openxmlformats.org/drawingml/2006/main" xmlns:r="http://schemas.openxmlformats.org/officeDocument/2006/relationships" xmlns:p="http://schemas.openxmlformats.org/presentationml/2006/main">
+  <p:cSld>
+    <p:spTree>
+      <p:nvGrpSpPr>
+        <p:cNvPr id="1" name=""/>
+        <p:cNvGrpSpPr/>
+        <p:nvPr/>
+      </p:nvGrpSpPr>
+      <p:grpSpPr>
+        <a:xfrm>
+          <a:off x="0" y="0"/>
+          <a:ext cx="0" cy="0"/>
+          <a:chOff x="0" y="0"/>
+          <a:chExt cx="0" cy="0"/>
+        </a:xfrm>
+      </p:grpSpPr>
+      <p:sp>
+        <p:nvSpPr>
+          <p:cNvPr id="2" name="Slide Image Placeholder 1"/>
+          <p:cNvSpPr>
+            <a:spLocks noGrp="1" noRot="1" noChangeAspect="1"/>
+          </p:cNvSpPr>
+          <p:nvPr>
+            <p:ph type="sldImg"/>
+          </p:nvPr>
+        </p:nvSpPr>
+        <p:spPr/>
+      </p:sp>
+      <p:sp>
+        <p:nvSpPr>
+          <p:cNvPr id="3" name="Notes Placeholder 2"/>
+          <p:cNvSpPr>
+            <a:spLocks noGrp="1"/>
+          </p:cNvSpPr>
+          <p:nvPr>
+            <p:ph type="body" idx="1"/>
+          </p:nvPr>
+        </p:nvSpPr>
+        <p:spPr/>
+        <p:txBody>
+          <a:bodyPr/>
+          <a:lstStyle/>
+          <a:p>
+            <a:endParaRPr lang="en-US" dirty="0"/>
+          </a:p>
+        </p:txBody>
+      </p:sp>
+      <p:sp>
+        <p:nvSpPr>
+          <p:cNvPr id="4" name="Slide Number Placeholder 3"/>
+          <p:cNvSpPr>
+            <a:spLocks noGrp="1"/>
+          </p:cNvSpPr>
+          <p:nvPr>
+            <p:ph type="sldNum" sz="quarter" idx="5"/>
+          </p:nvPr>
+        </p:nvSpPr>
+        <p:spPr/>
+        <p:txBody>
+          <a:bodyPr/>
+          <a:lstStyle/>
+          <a:p>
+            <a:fld id="{E66EED18-0FEB-4E26-8FB1-B4D6647DA350}" type="slidenum">
+              <a:rPr lang="en-US" smtClean="0"/>
+              <a:t>9</a:t>
+            </a:fld>
+            <a:endParaRPr lang="en-US"/>
+          </a:p>
+        </p:txBody>
+      </p:sp>
+    </p:spTree>
+    <p:extLst>
+      <p:ext uri="{BB962C8B-B14F-4D97-AF65-F5344CB8AC3E}">
+        <p14:creationId xmlns:p14="http://schemas.microsoft.com/office/powerpoint/2010/main" val="3348245164"/>
+      </p:ext>
+    </p:extLst>
+  </p:cSld>
+  <p:clrMapOvr>
+    <a:masterClrMapping/>
+  </p:clrMapOvr>
+</p:notes>
+</file>
+
+<file path=ppt/notesSlides/notesSlide4.xml><?xml version="1.0" encoding="utf-8"?>
+<p:notes xmlns:a="http://schemas.openxmlformats.org/drawingml/2006/main" xmlns:r="http://schemas.openxmlformats.org/officeDocument/2006/relationships" xmlns:p="http://schemas.openxmlformats.org/presentationml/2006/main">
+  <p:cSld>
+    <p:spTree>
+      <p:nvGrpSpPr>
+        <p:cNvPr id="1" name=""/>
+        <p:cNvGrpSpPr/>
+        <p:nvPr/>
+      </p:nvGrpSpPr>
+      <p:grpSpPr>
+        <a:xfrm>
+          <a:off x="0" y="0"/>
+          <a:ext cx="0" cy="0"/>
+          <a:chOff x="0" y="0"/>
+          <a:chExt cx="0" cy="0"/>
+        </a:xfrm>
+      </p:grpSpPr>
+      <p:sp>
+        <p:nvSpPr>
+          <p:cNvPr id="2" name="Slide Image Placeholder 1"/>
+          <p:cNvSpPr>
+            <a:spLocks noGrp="1" noRot="1" noChangeAspect="1"/>
+          </p:cNvSpPr>
+          <p:nvPr>
+            <p:ph type="sldImg"/>
+          </p:nvPr>
+        </p:nvSpPr>
+        <p:spPr/>
+      </p:sp>
+      <p:sp>
+        <p:nvSpPr>
+          <p:cNvPr id="3" name="Notes Placeholder 2"/>
+          <p:cNvSpPr>
+            <a:spLocks noGrp="1"/>
+          </p:cNvSpPr>
+          <p:nvPr>
+            <p:ph type="body" idx="1"/>
+          </p:nvPr>
+        </p:nvSpPr>
+        <p:spPr/>
+        <p:txBody>
+          <a:bodyPr/>
+          <a:lstStyle/>
+          <a:p>
+            <a:endParaRPr lang="en-US" dirty="0"/>
+          </a:p>
+        </p:txBody>
+      </p:sp>
+      <p:sp>
+        <p:nvSpPr>
+          <p:cNvPr id="4" name="Slide Number Placeholder 3"/>
+          <p:cNvSpPr>
+            <a:spLocks noGrp="1"/>
+          </p:cNvSpPr>
+          <p:nvPr>
+            <p:ph type="sldNum" sz="quarter" idx="5"/>
+          </p:nvPr>
+        </p:nvSpPr>
+        <p:spPr/>
+        <p:txBody>
+          <a:bodyPr/>
+          <a:lstStyle/>
+          <a:p>
+            <a:fld id="{E66EED18-0FEB-4E26-8FB1-B4D6647DA350}" type="slidenum">
+              <a:rPr lang="en-US" smtClean="0"/>
               <a:t>11</a:t>
             </a:fld>
             <a:endParaRPr lang="en-US"/>
@@ -1555,7 +1724,7 @@
           <a:p>
             <a:fld id="{084165EF-9FD6-4261-A9B2-8530B474D6B8}" type="datetimeFigureOut">
               <a:rPr lang="en-US" smtClean="0"/>
-              <a:t>2/3/2025</a:t>
+              <a:t>2/4/2025</a:t>
             </a:fld>
             <a:endParaRPr lang="en-US"/>
           </a:p>
@@ -1753,7 +1922,7 @@
           <a:p>
             <a:fld id="{084165EF-9FD6-4261-A9B2-8530B474D6B8}" type="datetimeFigureOut">
               <a:rPr lang="en-US" smtClean="0"/>
-              <a:t>2/3/2025</a:t>
+              <a:t>2/4/2025</a:t>
             </a:fld>
             <a:endParaRPr lang="en-US"/>
           </a:p>
@@ -1961,7 +2130,7 @@
           <a:p>
             <a:fld id="{084165EF-9FD6-4261-A9B2-8530B474D6B8}" type="datetimeFigureOut">
               <a:rPr lang="en-US" smtClean="0"/>
-              <a:t>2/3/2025</a:t>
+              <a:t>2/4/2025</a:t>
             </a:fld>
             <a:endParaRPr lang="en-US"/>
           </a:p>
@@ -2159,7 +2328,7 @@
           <a:p>
             <a:fld id="{084165EF-9FD6-4261-A9B2-8530B474D6B8}" type="datetimeFigureOut">
               <a:rPr lang="en-US" smtClean="0"/>
-              <a:t>2/3/2025</a:t>
+              <a:t>2/4/2025</a:t>
             </a:fld>
             <a:endParaRPr lang="en-US"/>
           </a:p>
@@ -2434,7 +2603,7 @@
           <a:p>
             <a:fld id="{084165EF-9FD6-4261-A9B2-8530B474D6B8}" type="datetimeFigureOut">
               <a:rPr lang="en-US" smtClean="0"/>
-              <a:t>2/3/2025</a:t>
+              <a:t>2/4/2025</a:t>
             </a:fld>
             <a:endParaRPr lang="en-US"/>
           </a:p>
@@ -2699,7 +2868,7 @@
           <a:p>
             <a:fld id="{084165EF-9FD6-4261-A9B2-8530B474D6B8}" type="datetimeFigureOut">
               <a:rPr lang="en-US" smtClean="0"/>
-              <a:t>2/3/2025</a:t>
+              <a:t>2/4/2025</a:t>
             </a:fld>
             <a:endParaRPr lang="en-US"/>
           </a:p>
@@ -3111,7 +3280,7 @@
           <a:p>
             <a:fld id="{084165EF-9FD6-4261-A9B2-8530B474D6B8}" type="datetimeFigureOut">
               <a:rPr lang="en-US" smtClean="0"/>
-              <a:t>2/3/2025</a:t>
+              <a:t>2/4/2025</a:t>
             </a:fld>
             <a:endParaRPr lang="en-US"/>
           </a:p>
@@ -3252,7 +3421,7 @@
           <a:p>
             <a:fld id="{084165EF-9FD6-4261-A9B2-8530B474D6B8}" type="datetimeFigureOut">
               <a:rPr lang="en-US" smtClean="0"/>
-              <a:t>2/3/2025</a:t>
+              <a:t>2/4/2025</a:t>
             </a:fld>
             <a:endParaRPr lang="en-US"/>
           </a:p>
@@ -3365,7 +3534,7 @@
           <a:p>
             <a:fld id="{084165EF-9FD6-4261-A9B2-8530B474D6B8}" type="datetimeFigureOut">
               <a:rPr lang="en-US" smtClean="0"/>
-              <a:t>2/3/2025</a:t>
+              <a:t>2/4/2025</a:t>
             </a:fld>
             <a:endParaRPr lang="en-US"/>
           </a:p>
@@ -3676,7 +3845,7 @@
           <a:p>
             <a:fld id="{084165EF-9FD6-4261-A9B2-8530B474D6B8}" type="datetimeFigureOut">
               <a:rPr lang="en-US" smtClean="0"/>
-              <a:t>2/3/2025</a:t>
+              <a:t>2/4/2025</a:t>
             </a:fld>
             <a:endParaRPr lang="en-US"/>
           </a:p>
@@ -3964,7 +4133,7 @@
           <a:p>
             <a:fld id="{084165EF-9FD6-4261-A9B2-8530B474D6B8}" type="datetimeFigureOut">
               <a:rPr lang="en-US" smtClean="0"/>
-              <a:t>2/3/2025</a:t>
+              <a:t>2/4/2025</a:t>
             </a:fld>
             <a:endParaRPr lang="en-US"/>
           </a:p>
@@ -4205,7 +4374,7 @@
           <a:p>
             <a:fld id="{084165EF-9FD6-4261-A9B2-8530B474D6B8}" type="datetimeFigureOut">
               <a:rPr lang="en-US" smtClean="0"/>
-              <a:t>2/3/2025</a:t>
+              <a:t>2/4/2025</a:t>
             </a:fld>
             <a:endParaRPr lang="en-US"/>
           </a:p>
@@ -4757,9 +4926,83 @@
                 <a:solidFill>
                   <a:srgbClr val="FFFFFF"/>
                 </a:solidFill>
+                <a:latin typeface="Times New Roman" panose="02020603050405020304" pitchFamily="18" charset="0"/>
+                <a:cs typeface="Times New Roman" panose="02020603050405020304" pitchFamily="18" charset="0"/>
               </a:rPr>
               <a:t>Portland , OR Housing &amp; Affordability 2019-2023</a:t>
             </a:r>
+          </a:p>
+        </p:txBody>
+      </p:sp>
+      <p:sp>
+        <p:nvSpPr>
+          <p:cNvPr id="3" name="TextBox 2">
+            <a:extLst>
+              <a:ext uri="{FF2B5EF4-FFF2-40B4-BE49-F238E27FC236}">
+                <a16:creationId xmlns:a16="http://schemas.microsoft.com/office/drawing/2014/main" id="{DD729AF8-F31C-44A1-8EB1-6ADC978A14B1}"/>
+              </a:ext>
+            </a:extLst>
+          </p:cNvPr>
+          <p:cNvSpPr txBox="1"/>
+          <p:nvPr/>
+        </p:nvSpPr>
+        <p:spPr>
+          <a:xfrm>
+            <a:off x="2679031" y="4119613"/>
+            <a:ext cx="6833937" cy="369332"/>
+          </a:xfrm>
+          <a:prstGeom prst="rect">
+            <a:avLst/>
+          </a:prstGeom>
+          <a:noFill/>
+        </p:spPr>
+        <p:txBody>
+          <a:bodyPr wrap="square" rtlCol="0">
+            <a:spAutoFit/>
+          </a:bodyPr>
+          <a:lstStyle/>
+          <a:p>
+            <a:r>
+              <a:rPr lang="en-US" sz="1800" dirty="0">
+                <a:effectLst/>
+                <a:latin typeface="Times New Roman" panose="02020603050405020304" pitchFamily="18" charset="0"/>
+                <a:ea typeface="Aptos" panose="020B0004020202020204" pitchFamily="34" charset="0"/>
+              </a:rPr>
+              <a:t>Group 2: Devin Brindle, </a:t>
+            </a:r>
+            <a:r>
+              <a:rPr lang="en-US" sz="1800" dirty="0" err="1">
+                <a:effectLst/>
+                <a:latin typeface="Times New Roman" panose="02020603050405020304" pitchFamily="18" charset="0"/>
+                <a:ea typeface="Aptos" panose="020B0004020202020204" pitchFamily="34" charset="0"/>
+              </a:rPr>
+              <a:t>Asres</a:t>
+            </a:r>
+            <a:r>
+              <a:rPr lang="en-US" sz="1800" dirty="0">
+                <a:effectLst/>
+                <a:latin typeface="Times New Roman" panose="02020603050405020304" pitchFamily="18" charset="0"/>
+                <a:ea typeface="Aptos" panose="020B0004020202020204" pitchFamily="34" charset="0"/>
+              </a:rPr>
+              <a:t> </a:t>
+            </a:r>
+            <a:r>
+              <a:rPr lang="en-US" sz="1800" dirty="0" err="1">
+                <a:effectLst/>
+                <a:latin typeface="Times New Roman" panose="02020603050405020304" pitchFamily="18" charset="0"/>
+                <a:ea typeface="Aptos" panose="020B0004020202020204" pitchFamily="34" charset="0"/>
+              </a:rPr>
+              <a:t>Dagnew</a:t>
+            </a:r>
+            <a:r>
+              <a:rPr lang="en-US" sz="1800" dirty="0">
+                <a:effectLst/>
+                <a:latin typeface="Times New Roman" panose="02020603050405020304" pitchFamily="18" charset="0"/>
+                <a:ea typeface="Aptos" panose="020B0004020202020204" pitchFamily="34" charset="0"/>
+              </a:rPr>
+              <a:t>, Iyer Megan, Forrest Margulies</a:t>
+            </a:r>
+            <a:endParaRPr lang="en-US" dirty="0"/>
           </a:p>
         </p:txBody>
       </p:sp>
@@ -4887,10 +5130,10 @@
       </p:grpSpPr>
       <p:sp>
         <p:nvSpPr>
-          <p:cNvPr id="2" name="Title 1">
-            <a:extLst>
-              <a:ext uri="{FF2B5EF4-FFF2-40B4-BE49-F238E27FC236}">
-                <a16:creationId xmlns:a16="http://schemas.microsoft.com/office/drawing/2014/main" id="{8EBF4C62-6231-A0B0-F047-43FA632EB307}"/>
+          <p:cNvPr id="3" name="Content Placeholder 2">
+            <a:extLst>
+              <a:ext uri="{FF2B5EF4-FFF2-40B4-BE49-F238E27FC236}">
+                <a16:creationId xmlns:a16="http://schemas.microsoft.com/office/drawing/2014/main" id="{7BA83987-2445-A9B9-9804-EAF6E6BC1099}"/>
               </a:ext>
             </a:extLst>
           </p:cNvPr>
@@ -4898,51 +5141,42 @@
             <a:spLocks noGrp="1"/>
           </p:cNvSpPr>
           <p:nvPr>
-            <p:ph type="title"/>
-          </p:nvPr>
-        </p:nvSpPr>
-        <p:spPr/>
-        <p:txBody>
-          <a:bodyPr/>
-          <a:lstStyle/>
-          <a:p>
-            <a:endParaRPr lang="en-US"/>
-          </a:p>
-        </p:txBody>
-      </p:sp>
-      <p:sp>
-        <p:nvSpPr>
-          <p:cNvPr id="3" name="Content Placeholder 2">
-            <a:extLst>
-              <a:ext uri="{FF2B5EF4-FFF2-40B4-BE49-F238E27FC236}">
-                <a16:creationId xmlns:a16="http://schemas.microsoft.com/office/drawing/2014/main" id="{7BA83987-2445-A9B9-9804-EAF6E6BC1099}"/>
-              </a:ext>
-            </a:extLst>
-          </p:cNvPr>
-          <p:cNvSpPr>
-            <a:spLocks noGrp="1"/>
-          </p:cNvSpPr>
-          <p:nvPr>
             <p:ph idx="1"/>
           </p:nvPr>
         </p:nvSpPr>
-        <p:spPr/>
-        <p:txBody>
-          <a:bodyPr/>
-          <a:lstStyle/>
-          <a:p>
+        <p:spPr>
+          <a:xfrm>
+            <a:off x="838200" y="556591"/>
+            <a:ext cx="10515600" cy="5620372"/>
+          </a:xfrm>
+        </p:spPr>
+        <p:txBody>
+          <a:bodyPr>
+            <a:normAutofit fontScale="85000" lnSpcReduction="20000"/>
+          </a:bodyPr>
+          <a:lstStyle/>
+          <a:p>
+            <a:pPr>
+              <a:lnSpc>
+                <a:spcPct val="150000"/>
+              </a:lnSpc>
+            </a:pPr>
             <a:r>
               <a:rPr lang="en-US" b="0" i="0" dirty="0">
                 <a:solidFill>
                   <a:srgbClr val="1D1C1D"/>
                 </a:solidFill>
                 <a:effectLst/>
-                <a:latin typeface="Slack-Lato"/>
+                <a:latin typeface="Times New Roman" panose="02020603050405020304" pitchFamily="18" charset="0"/>
+                <a:cs typeface="Times New Roman" panose="02020603050405020304" pitchFamily="18" charset="0"/>
               </a:rPr>
               <a:t>According to U.S. Department of Housing and Urban Development, the general rule of thumb for housing affordability based on the home value-to-income ratio is:</a:t>
             </a:r>
             <a:br>
-              <a:rPr lang="en-US" dirty="0"/>
+              <a:rPr lang="en-US" dirty="0">
+                <a:latin typeface="Times New Roman" panose="02020603050405020304" pitchFamily="18" charset="0"/>
+                <a:cs typeface="Times New Roman" panose="02020603050405020304" pitchFamily="18" charset="0"/>
+              </a:rPr>
             </a:br>
             <a:r>
               <a:rPr lang="en-US" b="1" i="0" dirty="0">
@@ -4950,7 +5184,8 @@
                   <a:srgbClr val="1D1C1D"/>
                 </a:solidFill>
                 <a:effectLst/>
-                <a:latin typeface="Slack-Lato"/>
+                <a:latin typeface="Times New Roman" panose="02020603050405020304" pitchFamily="18" charset="0"/>
+                <a:cs typeface="Times New Roman" panose="02020603050405020304" pitchFamily="18" charset="0"/>
               </a:rPr>
               <a:t>Affordable: ≤ 3.0</a:t>
             </a:r>
@@ -4960,12 +5195,16 @@
                   <a:srgbClr val="1D1C1D"/>
                 </a:solidFill>
                 <a:effectLst/>
-                <a:latin typeface="Slack-Lato"/>
+                <a:latin typeface="Times New Roman" panose="02020603050405020304" pitchFamily="18" charset="0"/>
+                <a:cs typeface="Times New Roman" panose="02020603050405020304" pitchFamily="18" charset="0"/>
               </a:rPr>
               <a:t> → The home price is three times or less than the household's annual income.</a:t>
             </a:r>
             <a:br>
-              <a:rPr lang="en-US" dirty="0"/>
+              <a:rPr lang="en-US" dirty="0">
+                <a:latin typeface="Times New Roman" panose="02020603050405020304" pitchFamily="18" charset="0"/>
+                <a:cs typeface="Times New Roman" panose="02020603050405020304" pitchFamily="18" charset="0"/>
+              </a:rPr>
             </a:br>
             <a:r>
               <a:rPr lang="en-US" b="1" i="0" dirty="0">
@@ -4973,7 +5212,8 @@
                   <a:srgbClr val="1D1C1D"/>
                 </a:solidFill>
                 <a:effectLst/>
-                <a:latin typeface="Slack-Lato"/>
+                <a:latin typeface="Times New Roman" panose="02020603050405020304" pitchFamily="18" charset="0"/>
+                <a:cs typeface="Times New Roman" panose="02020603050405020304" pitchFamily="18" charset="0"/>
               </a:rPr>
               <a:t>Moderately Affordable: 3.1 </a:t>
             </a:r>
@@ -4983,12 +5223,37 @@
                   <a:srgbClr val="1D1C1D"/>
                 </a:solidFill>
                 <a:effectLst/>
-                <a:latin typeface="Slack-Lato"/>
-              </a:rPr>
-              <a:t>- 5 → Still manageable, but may require some financial adjustments.</a:t>
+                <a:latin typeface="Times New Roman" panose="02020603050405020304" pitchFamily="18" charset="0"/>
+                <a:cs typeface="Times New Roman" panose="02020603050405020304" pitchFamily="18" charset="0"/>
+              </a:rPr>
+              <a:t>- 5 → Still manageable</a:t>
+            </a:r>
+            <a:r>
+              <a:rPr lang="en-US" dirty="0">
+                <a:solidFill>
+                  <a:srgbClr val="1D1C1D"/>
+                </a:solidFill>
+                <a:latin typeface="Times New Roman" panose="02020603050405020304" pitchFamily="18" charset="0"/>
+                <a:cs typeface="Times New Roman" panose="02020603050405020304" pitchFamily="18" charset="0"/>
+              </a:rPr>
+              <a:t> </a:t>
+            </a:r>
+            <a:r>
+              <a:rPr lang="en-US" b="0" i="0" dirty="0">
+                <a:solidFill>
+                  <a:srgbClr val="1D1C1D"/>
+                </a:solidFill>
+                <a:effectLst/>
+                <a:latin typeface="Times New Roman" panose="02020603050405020304" pitchFamily="18" charset="0"/>
+                <a:cs typeface="Times New Roman" panose="02020603050405020304" pitchFamily="18" charset="0"/>
+              </a:rPr>
+              <a:t>but may require some financial adjustments.</a:t>
             </a:r>
             <a:br>
-              <a:rPr lang="en-US" dirty="0"/>
+              <a:rPr lang="en-US" dirty="0">
+                <a:latin typeface="Times New Roman" panose="02020603050405020304" pitchFamily="18" charset="0"/>
+                <a:cs typeface="Times New Roman" panose="02020603050405020304" pitchFamily="18" charset="0"/>
+              </a:rPr>
             </a:br>
             <a:r>
               <a:rPr lang="en-US" b="1" i="0" dirty="0">
@@ -4996,7 +5261,8 @@
                   <a:srgbClr val="1D1C1D"/>
                 </a:solidFill>
                 <a:effectLst/>
-                <a:latin typeface="Slack-Lato"/>
+                <a:latin typeface="Times New Roman" panose="02020603050405020304" pitchFamily="18" charset="0"/>
+                <a:cs typeface="Times New Roman" panose="02020603050405020304" pitchFamily="18" charset="0"/>
               </a:rPr>
               <a:t>Severely Unaffordable: &gt; 5.0</a:t>
             </a:r>
@@ -5006,11 +5272,15 @@
                   <a:srgbClr val="1D1C1D"/>
                 </a:solidFill>
                 <a:effectLst/>
-                <a:latin typeface="Slack-Lato"/>
+                <a:latin typeface="Times New Roman" panose="02020603050405020304" pitchFamily="18" charset="0"/>
+                <a:cs typeface="Times New Roman" panose="02020603050405020304" pitchFamily="18" charset="0"/>
               </a:rPr>
               <a:t> → Indicates significant housing affordability issues, where home prices are five times or more than annual income. Homeownership may require excessive debt, high mortgage payments, or compromises in other financial areas.</a:t>
             </a:r>
-            <a:endParaRPr lang="en-US" dirty="0"/>
+            <a:endParaRPr lang="en-US" dirty="0">
+              <a:latin typeface="Times New Roman" panose="02020603050405020304" pitchFamily="18" charset="0"/>
+              <a:cs typeface="Times New Roman" panose="02020603050405020304" pitchFamily="18" charset="0"/>
+            </a:endParaRPr>
           </a:p>
         </p:txBody>
       </p:sp>
@@ -5079,6 +5349,44 @@
           </a:xfrm>
         </p:spPr>
       </p:pic>
+      <p:sp>
+        <p:nvSpPr>
+          <p:cNvPr id="3" name="TextBox 2">
+            <a:extLst>
+              <a:ext uri="{FF2B5EF4-FFF2-40B4-BE49-F238E27FC236}">
+                <a16:creationId xmlns:a16="http://schemas.microsoft.com/office/drawing/2014/main" id="{EBBFBD85-1F50-48CD-9391-38B5781A6449}"/>
+              </a:ext>
+            </a:extLst>
+          </p:cNvPr>
+          <p:cNvSpPr txBox="1"/>
+          <p:nvPr/>
+        </p:nvSpPr>
+        <p:spPr>
+          <a:xfrm>
+            <a:off x="0" y="6562852"/>
+            <a:ext cx="6129130" cy="246221"/>
+          </a:xfrm>
+          <a:prstGeom prst="rect">
+            <a:avLst/>
+          </a:prstGeom>
+          <a:noFill/>
+        </p:spPr>
+        <p:txBody>
+          <a:bodyPr wrap="square">
+            <a:spAutoFit/>
+          </a:bodyPr>
+          <a:lstStyle/>
+          <a:p>
+            <a:r>
+              <a:rPr lang="en-US" sz="1000" dirty="0">
+                <a:latin typeface="Times New Roman" panose="02020603050405020304" pitchFamily="18" charset="0"/>
+                <a:cs typeface="Times New Roman" panose="02020603050405020304" pitchFamily="18" charset="0"/>
+              </a:rPr>
+              <a:t>Source: U.S. Department of Housing and Urban Development. (n.d.)</a:t>
+            </a:r>
+          </a:p>
+        </p:txBody>
+      </p:sp>
     </p:spTree>
     <p:extLst>
       <p:ext uri="{BB962C8B-B14F-4D97-AF65-F5344CB8AC3E}">
@@ -5127,401 +5435,431 @@
         </p:nvSpPr>
         <p:spPr>
           <a:xfrm>
-            <a:off x="700548" y="911225"/>
-            <a:ext cx="10515600" cy="4667250"/>
+            <a:off x="766809" y="231912"/>
+            <a:ext cx="4593695" cy="6453809"/>
           </a:xfrm>
         </p:spPr>
         <p:txBody>
           <a:bodyPr>
-            <a:normAutofit fontScale="25000" lnSpcReduction="20000"/>
+            <a:noAutofit/>
           </a:bodyPr>
           <a:lstStyle/>
           <a:p>
             <a:pPr marL="0" indent="0" algn="l">
+              <a:lnSpc>
+                <a:spcPct val="150000"/>
+              </a:lnSpc>
               <a:buNone/>
             </a:pPr>
             <a:r>
-              <a:rPr lang="en-US" sz="6200" b="1" i="0" dirty="0">
+              <a:rPr lang="en-US" sz="1800" b="1" i="0" dirty="0">
                 <a:solidFill>
                   <a:srgbClr val="1D1C1D"/>
                 </a:solidFill>
                 <a:effectLst/>
-                <a:latin typeface="Slack-Lato"/>
+                <a:latin typeface="Times New Roman" panose="02020603050405020304" pitchFamily="18" charset="0"/>
+                <a:cs typeface="Times New Roman" panose="02020603050405020304" pitchFamily="18" charset="0"/>
               </a:rPr>
               <a:t>Affordable Subdivisions (2023)</a:t>
             </a:r>
-            <a:endParaRPr lang="en-US" sz="6200" b="0" i="0" dirty="0">
+            <a:endParaRPr lang="en-US" sz="1800" b="0" i="0" dirty="0">
               <a:solidFill>
                 <a:srgbClr val="1D1C1D"/>
               </a:solidFill>
               <a:effectLst/>
-              <a:latin typeface="Slack-Lato"/>
+              <a:latin typeface="Times New Roman" panose="02020603050405020304" pitchFamily="18" charset="0"/>
+              <a:cs typeface="Times New Roman" panose="02020603050405020304" pitchFamily="18" charset="0"/>
             </a:endParaRPr>
           </a:p>
           <a:p>
             <a:pPr marL="0" indent="0" algn="l">
+              <a:lnSpc>
+                <a:spcPct val="150000"/>
+              </a:lnSpc>
               <a:buNone/>
             </a:pPr>
             <a:r>
-              <a:rPr lang="en-US" sz="5000" b="0" i="0" dirty="0">
+              <a:rPr lang="en-US" sz="1800" b="0" i="0" dirty="0">
                 <a:solidFill>
                   <a:srgbClr val="1D1C1D"/>
                 </a:solidFill>
                 <a:effectLst/>
-                <a:latin typeface="Slack-Lato"/>
+                <a:latin typeface="Times New Roman" panose="02020603050405020304" pitchFamily="18" charset="0"/>
+                <a:cs typeface="Times New Roman" panose="02020603050405020304" pitchFamily="18" charset="0"/>
               </a:rPr>
               <a:t>These areas have the lowest home value-to-income ratios, making them moderately affordable:</a:t>
             </a:r>
             <a:br>
-              <a:rPr lang="en-US" sz="5000" b="0" i="0" dirty="0">
+              <a:rPr lang="en-US" sz="1800" b="0" i="0" dirty="0">
                 <a:solidFill>
                   <a:srgbClr val="1D1C1D"/>
                 </a:solidFill>
                 <a:effectLst/>
-                <a:latin typeface="Slack-Lato"/>
+                <a:latin typeface="Times New Roman" panose="02020603050405020304" pitchFamily="18" charset="0"/>
+                <a:cs typeface="Times New Roman" panose="02020603050405020304" pitchFamily="18" charset="0"/>
               </a:rPr>
             </a:br>
-            <a:r>
-              <a:rPr lang="en-US" sz="5000" b="0" i="0" dirty="0">
+            <a:endParaRPr lang="en-US" sz="1800" b="0" i="0" dirty="0">
+              <a:solidFill>
+                <a:srgbClr val="1D1C1D"/>
+              </a:solidFill>
+              <a:effectLst/>
+              <a:latin typeface="Times New Roman" panose="02020603050405020304" pitchFamily="18" charset="0"/>
+              <a:cs typeface="Times New Roman" panose="02020603050405020304" pitchFamily="18" charset="0"/>
+            </a:endParaRPr>
+          </a:p>
+          <a:p>
+            <a:pPr>
+              <a:lnSpc>
+                <a:spcPct val="150000"/>
+              </a:lnSpc>
+            </a:pPr>
+            <a:r>
+              <a:rPr lang="en-US" sz="1800" b="0" i="0" dirty="0">
                 <a:solidFill>
                   <a:srgbClr val="1D1C1D"/>
                 </a:solidFill>
                 <a:effectLst/>
-                <a:latin typeface="Slack-Lato"/>
+                <a:latin typeface="Times New Roman" panose="02020603050405020304" pitchFamily="18" charset="0"/>
+                <a:cs typeface="Times New Roman" panose="02020603050405020304" pitchFamily="18" charset="0"/>
               </a:rPr>
               <a:t>Sandy, Clackamas – 4.38</a:t>
             </a:r>
-            <a:br>
-              <a:rPr lang="en-US" b="0" i="0" dirty="0">
+          </a:p>
+          <a:p>
+            <a:pPr>
+              <a:lnSpc>
+                <a:spcPct val="150000"/>
+              </a:lnSpc>
+            </a:pPr>
+            <a:r>
+              <a:rPr lang="en-US" sz="1800" b="0" i="0" dirty="0">
                 <a:solidFill>
                   <a:srgbClr val="1D1C1D"/>
                 </a:solidFill>
                 <a:effectLst/>
-                <a:latin typeface="Slack-Lato"/>
+                <a:latin typeface="Times New Roman" panose="02020603050405020304" pitchFamily="18" charset="0"/>
+                <a:cs typeface="Times New Roman" panose="02020603050405020304" pitchFamily="18" charset="0"/>
+              </a:rPr>
+              <a:t>Forest Grove-Cornelius, Washington – 5.20</a:t>
+            </a:r>
+          </a:p>
+          <a:p>
+            <a:pPr>
+              <a:lnSpc>
+                <a:spcPct val="150000"/>
+              </a:lnSpc>
+            </a:pPr>
+            <a:r>
+              <a:rPr lang="en-US" sz="1800" b="0" i="0" dirty="0">
+                <a:solidFill>
+                  <a:srgbClr val="1D1C1D"/>
+                </a:solidFill>
+                <a:effectLst/>
+                <a:latin typeface="Times New Roman" panose="02020603050405020304" pitchFamily="18" charset="0"/>
+                <a:cs typeface="Times New Roman" panose="02020603050405020304" pitchFamily="18" charset="0"/>
+              </a:rPr>
+              <a:t>Molalla, Clackamas – 5.02</a:t>
+            </a:r>
+          </a:p>
+          <a:p>
+            <a:pPr>
+              <a:lnSpc>
+                <a:spcPct val="150000"/>
+              </a:lnSpc>
+            </a:pPr>
+            <a:r>
+              <a:rPr lang="en-US" sz="1800" b="0" i="0" dirty="0">
+                <a:solidFill>
+                  <a:srgbClr val="1D1C1D"/>
+                </a:solidFill>
+                <a:effectLst/>
+                <a:latin typeface="Times New Roman" panose="02020603050405020304" pitchFamily="18" charset="0"/>
+                <a:cs typeface="Times New Roman" panose="02020603050405020304" pitchFamily="18" charset="0"/>
+              </a:rPr>
+              <a:t>Beaverton-Hillsboro, Washington – 5.36</a:t>
+            </a:r>
+          </a:p>
+          <a:p>
+            <a:pPr>
+              <a:lnSpc>
+                <a:spcPct val="150000"/>
+              </a:lnSpc>
+            </a:pPr>
+            <a:r>
+              <a:rPr lang="en-US" sz="1800" b="0" i="0" dirty="0">
+                <a:solidFill>
+                  <a:srgbClr val="1D1C1D"/>
+                </a:solidFill>
+                <a:effectLst/>
+                <a:latin typeface="Times New Roman" panose="02020603050405020304" pitchFamily="18" charset="0"/>
+                <a:cs typeface="Times New Roman" panose="02020603050405020304" pitchFamily="18" charset="0"/>
+              </a:rPr>
+              <a:t>Mount Hood, Clackamas – 5.30</a:t>
+            </a:r>
+            <a:br>
+              <a:rPr lang="en-US" sz="1800" b="0" i="0" dirty="0">
+                <a:solidFill>
+                  <a:srgbClr val="1D1C1D"/>
+                </a:solidFill>
+                <a:effectLst/>
+                <a:latin typeface="Times New Roman" panose="02020603050405020304" pitchFamily="18" charset="0"/>
+                <a:cs typeface="Times New Roman" panose="02020603050405020304" pitchFamily="18" charset="0"/>
               </a:rPr>
             </a:br>
-            <a:endParaRPr lang="en-US" b="0" i="0" dirty="0">
+            <a:endParaRPr lang="en-US" sz="1800" b="0" i="0" dirty="0">
               <a:solidFill>
                 <a:srgbClr val="1D1C1D"/>
               </a:solidFill>
               <a:effectLst/>
-              <a:latin typeface="Slack-Lato"/>
+              <a:latin typeface="Times New Roman" panose="02020603050405020304" pitchFamily="18" charset="0"/>
+              <a:cs typeface="Times New Roman" panose="02020603050405020304" pitchFamily="18" charset="0"/>
             </a:endParaRPr>
           </a:p>
           <a:p>
-            <a:pPr algn="l"/>
-            <a:r>
-              <a:rPr lang="en-US" sz="5600" b="0" i="0" dirty="0">
+            <a:pPr marL="0" indent="0" algn="l">
+              <a:lnSpc>
+                <a:spcPct val="150000"/>
+              </a:lnSpc>
+              <a:buNone/>
+            </a:pPr>
+            <a:endParaRPr lang="en-US" sz="1800" b="1" i="0" dirty="0">
+              <a:solidFill>
+                <a:srgbClr val="1D1C1D"/>
+              </a:solidFill>
+              <a:effectLst/>
+              <a:latin typeface="Times New Roman" panose="02020603050405020304" pitchFamily="18" charset="0"/>
+              <a:cs typeface="Times New Roman" panose="02020603050405020304" pitchFamily="18" charset="0"/>
+            </a:endParaRPr>
+          </a:p>
+        </p:txBody>
+      </p:sp>
+      <p:sp>
+        <p:nvSpPr>
+          <p:cNvPr id="2" name="TextBox 1">
+            <a:extLst>
+              <a:ext uri="{FF2B5EF4-FFF2-40B4-BE49-F238E27FC236}">
+                <a16:creationId xmlns:a16="http://schemas.microsoft.com/office/drawing/2014/main" id="{308D5FC9-8ACB-3CE2-CEC9-D7B39A133BDF}"/>
+              </a:ext>
+            </a:extLst>
+          </p:cNvPr>
+          <p:cNvSpPr txBox="1"/>
+          <p:nvPr/>
+        </p:nvSpPr>
+        <p:spPr>
+          <a:xfrm>
+            <a:off x="5970104" y="231912"/>
+            <a:ext cx="6109252" cy="6324808"/>
+          </a:xfrm>
+          <a:prstGeom prst="rect">
+            <a:avLst/>
+          </a:prstGeom>
+          <a:noFill/>
+        </p:spPr>
+        <p:txBody>
+          <a:bodyPr wrap="square" rtlCol="0">
+            <a:spAutoFit/>
+          </a:bodyPr>
+          <a:lstStyle/>
+          <a:p>
+            <a:pPr marL="0" indent="0" algn="l">
+              <a:lnSpc>
+                <a:spcPct val="150000"/>
+              </a:lnSpc>
+              <a:buNone/>
+            </a:pPr>
+            <a:r>
+              <a:rPr lang="en-US" sz="1800" b="1" i="0" dirty="0">
                 <a:solidFill>
                   <a:srgbClr val="1D1C1D"/>
                 </a:solidFill>
                 <a:effectLst/>
-                <a:latin typeface="Slack-Lato"/>
-              </a:rPr>
-              <a:t>Forest Grove-Cornelius, Washington – 5.20</a:t>
+                <a:latin typeface="Times New Roman" panose="02020603050405020304" pitchFamily="18" charset="0"/>
+                <a:cs typeface="Times New Roman" panose="02020603050405020304" pitchFamily="18" charset="0"/>
+              </a:rPr>
+              <a:t>Least Affordable Subdivisions (2023)</a:t>
             </a:r>
             <a:br>
-              <a:rPr lang="en-US" sz="5600" b="0" i="0" dirty="0">
+              <a:rPr lang="en-US" sz="1800" b="0" i="0" dirty="0">
                 <a:solidFill>
                   <a:srgbClr val="1D1C1D"/>
                 </a:solidFill>
                 <a:effectLst/>
-                <a:latin typeface="Slack-Lato"/>
+                <a:latin typeface="Times New Roman" panose="02020603050405020304" pitchFamily="18" charset="0"/>
+                <a:cs typeface="Times New Roman" panose="02020603050405020304" pitchFamily="18" charset="0"/>
               </a:rPr>
             </a:br>
-            <a:endParaRPr lang="en-US" sz="5600" b="0" i="0" dirty="0">
+            <a:r>
+              <a:rPr lang="en-US" sz="1800" b="0" i="0" dirty="0">
+                <a:solidFill>
+                  <a:srgbClr val="1D1C1D"/>
+                </a:solidFill>
+                <a:effectLst/>
+                <a:latin typeface="Times New Roman" panose="02020603050405020304" pitchFamily="18" charset="0"/>
+                <a:cs typeface="Times New Roman" panose="02020603050405020304" pitchFamily="18" charset="0"/>
+              </a:rPr>
+              <a:t>These areas have the highest home value-to-income ratios, indicating least affordability:</a:t>
+            </a:r>
+            <a:br>
+              <a:rPr lang="en-US" sz="1800" b="0" i="0" dirty="0">
+                <a:solidFill>
+                  <a:srgbClr val="1D1C1D"/>
+                </a:solidFill>
+                <a:effectLst/>
+                <a:latin typeface="Times New Roman" panose="02020603050405020304" pitchFamily="18" charset="0"/>
+                <a:cs typeface="Times New Roman" panose="02020603050405020304" pitchFamily="18" charset="0"/>
+              </a:rPr>
+            </a:br>
+            <a:endParaRPr lang="en-US" sz="1800" b="0" i="0" dirty="0">
               <a:solidFill>
                 <a:srgbClr val="1D1C1D"/>
               </a:solidFill>
               <a:effectLst/>
-              <a:latin typeface="Slack-Lato"/>
+              <a:latin typeface="Times New Roman" panose="02020603050405020304" pitchFamily="18" charset="0"/>
+              <a:cs typeface="Times New Roman" panose="02020603050405020304" pitchFamily="18" charset="0"/>
             </a:endParaRPr>
           </a:p>
           <a:p>
-            <a:pPr algn="l"/>
-            <a:r>
-              <a:rPr lang="en-US" sz="5600" b="0" i="0" dirty="0">
+            <a:pPr marL="0" indent="0" algn="l">
+              <a:lnSpc>
+                <a:spcPct val="150000"/>
+              </a:lnSpc>
+              <a:buNone/>
+            </a:pPr>
+            <a:endParaRPr lang="en-US" sz="1800" b="0" i="0" dirty="0">
+              <a:solidFill>
+                <a:srgbClr val="1D1C1D"/>
+              </a:solidFill>
+              <a:effectLst/>
+              <a:latin typeface="Times New Roman" panose="02020603050405020304" pitchFamily="18" charset="0"/>
+              <a:cs typeface="Times New Roman" panose="02020603050405020304" pitchFamily="18" charset="0"/>
+            </a:endParaRPr>
+          </a:p>
+          <a:p>
+            <a:pPr marL="285750" indent="-285750" algn="l">
+              <a:lnSpc>
+                <a:spcPct val="200000"/>
+              </a:lnSpc>
+              <a:buFont typeface="Arial" panose="020B0604020202020204" pitchFamily="34" charset="0"/>
+              <a:buChar char="•"/>
+            </a:pPr>
+            <a:r>
+              <a:rPr lang="en-US" sz="1800" b="0" i="0" dirty="0">
                 <a:solidFill>
                   <a:srgbClr val="1D1C1D"/>
                 </a:solidFill>
                 <a:effectLst/>
-                <a:latin typeface="Slack-Lato"/>
-              </a:rPr>
-              <a:t>Molalla, Clackamas – 5.02</a:t>
-            </a:r>
-            <a:br>
-              <a:rPr lang="en-US" sz="5600" b="0" i="0" dirty="0">
+                <a:latin typeface="Times New Roman" panose="02020603050405020304" pitchFamily="18" charset="0"/>
+                <a:cs typeface="Times New Roman" panose="02020603050405020304" pitchFamily="18" charset="0"/>
+              </a:rPr>
+              <a:t>Estacada, Clackamas – 7.39</a:t>
+            </a:r>
+          </a:p>
+          <a:p>
+            <a:pPr marL="285750" indent="-285750" algn="l">
+              <a:lnSpc>
+                <a:spcPct val="200000"/>
+              </a:lnSpc>
+              <a:buFont typeface="Arial" panose="020B0604020202020204" pitchFamily="34" charset="0"/>
+              <a:buChar char="•"/>
+            </a:pPr>
+            <a:r>
+              <a:rPr lang="en-US" sz="1800" b="0" i="0" dirty="0">
                 <a:solidFill>
                   <a:srgbClr val="1D1C1D"/>
                 </a:solidFill>
                 <a:effectLst/>
-                <a:latin typeface="Slack-Lato"/>
-              </a:rPr>
-            </a:br>
-            <a:endParaRPr lang="en-US" sz="5600" b="0" i="0" dirty="0">
-              <a:solidFill>
-                <a:srgbClr val="1D1C1D"/>
-              </a:solidFill>
-              <a:effectLst/>
-              <a:latin typeface="Slack-Lato"/>
-            </a:endParaRPr>
-          </a:p>
-          <a:p>
-            <a:pPr algn="l"/>
-            <a:r>
-              <a:rPr lang="en-US" sz="5600" b="0" i="0" dirty="0">
+                <a:latin typeface="Times New Roman" panose="02020603050405020304" pitchFamily="18" charset="0"/>
+                <a:cs typeface="Times New Roman" panose="02020603050405020304" pitchFamily="18" charset="0"/>
+              </a:rPr>
+              <a:t>Skyline, Multnomah – 7.66</a:t>
+            </a:r>
+          </a:p>
+          <a:p>
+            <a:pPr marL="285750" indent="-285750" algn="l">
+              <a:lnSpc>
+                <a:spcPct val="200000"/>
+              </a:lnSpc>
+              <a:buFont typeface="Arial" panose="020B0604020202020204" pitchFamily="34" charset="0"/>
+              <a:buChar char="•"/>
+            </a:pPr>
+            <a:r>
+              <a:rPr lang="en-US" sz="1800" b="0" i="0" dirty="0">
                 <a:solidFill>
                   <a:srgbClr val="1D1C1D"/>
                 </a:solidFill>
                 <a:effectLst/>
-                <a:latin typeface="Slack-Lato"/>
-              </a:rPr>
-              <a:t>Beaverton-Hillsboro, Washington – 5.36</a:t>
-            </a:r>
-            <a:br>
-              <a:rPr lang="en-US" sz="5600" b="0" i="0" dirty="0">
+                <a:latin typeface="Times New Roman" panose="02020603050405020304" pitchFamily="18" charset="0"/>
+                <a:cs typeface="Times New Roman" panose="02020603050405020304" pitchFamily="18" charset="0"/>
+              </a:rPr>
+              <a:t>Portland West, Multnomah – 6.96</a:t>
+            </a:r>
+          </a:p>
+          <a:p>
+            <a:pPr marL="285750" indent="-285750" algn="l">
+              <a:lnSpc>
+                <a:spcPct val="200000"/>
+              </a:lnSpc>
+              <a:buFont typeface="Arial" panose="020B0604020202020204" pitchFamily="34" charset="0"/>
+              <a:buChar char="•"/>
+            </a:pPr>
+            <a:r>
+              <a:rPr lang="en-US" sz="1800" b="0" i="0" dirty="0">
                 <a:solidFill>
                   <a:srgbClr val="1D1C1D"/>
                 </a:solidFill>
                 <a:effectLst/>
-                <a:latin typeface="Slack-Lato"/>
-              </a:rPr>
-            </a:br>
-            <a:endParaRPr lang="en-US" sz="5600" b="0" i="0" dirty="0">
-              <a:solidFill>
-                <a:srgbClr val="1D1C1D"/>
-              </a:solidFill>
-              <a:effectLst/>
-              <a:latin typeface="Slack-Lato"/>
-            </a:endParaRPr>
-          </a:p>
-          <a:p>
-            <a:pPr algn="l"/>
-            <a:r>
-              <a:rPr lang="en-US" sz="5600" b="0" i="0" dirty="0">
+                <a:latin typeface="Times New Roman" panose="02020603050405020304" pitchFamily="18" charset="0"/>
+                <a:cs typeface="Times New Roman" panose="02020603050405020304" pitchFamily="18" charset="0"/>
+              </a:rPr>
+              <a:t>Wilsonville, Clackamas – 7.05</a:t>
+            </a:r>
+          </a:p>
+          <a:p>
+            <a:pPr marL="285750" indent="-285750" algn="l">
+              <a:lnSpc>
+                <a:spcPct val="200000"/>
+              </a:lnSpc>
+              <a:buFont typeface="Arial" panose="020B0604020202020204" pitchFamily="34" charset="0"/>
+              <a:buChar char="•"/>
+            </a:pPr>
+            <a:r>
+              <a:rPr lang="en-US" sz="1800" b="0" i="0" dirty="0">
                 <a:solidFill>
                   <a:srgbClr val="1D1C1D"/>
                 </a:solidFill>
                 <a:effectLst/>
-                <a:latin typeface="Slack-Lato"/>
-              </a:rPr>
-              <a:t>Mount Hood, Clackamas – 5.30</a:t>
+                <a:latin typeface="Times New Roman" panose="02020603050405020304" pitchFamily="18" charset="0"/>
+                <a:cs typeface="Times New Roman" panose="02020603050405020304" pitchFamily="18" charset="0"/>
+              </a:rPr>
+              <a:t>Yoder, Clackamas – 6.55</a:t>
             </a:r>
             <a:br>
-              <a:rPr lang="en-US" b="0" i="0" dirty="0">
+              <a:rPr lang="en-US" sz="1800" b="0" i="0" dirty="0">
                 <a:solidFill>
                   <a:srgbClr val="1D1C1D"/>
                 </a:solidFill>
                 <a:effectLst/>
-                <a:latin typeface="Slack-Lato"/>
+                <a:latin typeface="Times New Roman" panose="02020603050405020304" pitchFamily="18" charset="0"/>
+                <a:cs typeface="Times New Roman" panose="02020603050405020304" pitchFamily="18" charset="0"/>
               </a:rPr>
             </a:br>
-            <a:endParaRPr lang="en-US" b="0" i="0" dirty="0">
-              <a:solidFill>
-                <a:srgbClr val="1D1C1D"/>
-              </a:solidFill>
-              <a:effectLst/>
-              <a:latin typeface="Slack-Lato"/>
-            </a:endParaRPr>
-          </a:p>
-          <a:p>
-            <a:pPr marL="0" indent="0" algn="l">
-              <a:buNone/>
-            </a:pPr>
-            <a:endParaRPr lang="en-US" sz="6200" b="1" i="0" dirty="0">
-              <a:solidFill>
-                <a:srgbClr val="1D1C1D"/>
-              </a:solidFill>
-              <a:effectLst/>
-              <a:latin typeface="Slack-Lato"/>
-            </a:endParaRPr>
-          </a:p>
-          <a:p>
-            <a:pPr marL="0" indent="0" algn="l">
-              <a:buNone/>
-            </a:pPr>
-            <a:r>
-              <a:rPr lang="en-US" sz="6200" b="1" i="0" dirty="0">
+            <a:br>
+              <a:rPr lang="en-US" sz="1800" b="0" i="0" dirty="0">
                 <a:solidFill>
                   <a:srgbClr val="1D1C1D"/>
                 </a:solidFill>
                 <a:effectLst/>
-                <a:latin typeface="Slack-Lato"/>
-              </a:rPr>
-              <a:t>Least Affordable Subdivisions (2023)</a:t>
-            </a:r>
-            <a:br>
-              <a:rPr lang="en-US" sz="5000" b="0" i="0" dirty="0">
-                <a:solidFill>
-                  <a:srgbClr val="1D1C1D"/>
-                </a:solidFill>
-                <a:effectLst/>
-                <a:latin typeface="Slack-Lato"/>
+                <a:latin typeface="Times New Roman" panose="02020603050405020304" pitchFamily="18" charset="0"/>
+                <a:cs typeface="Times New Roman" panose="02020603050405020304" pitchFamily="18" charset="0"/>
               </a:rPr>
             </a:br>
-            <a:r>
-              <a:rPr lang="en-US" sz="5000" b="0" i="0" dirty="0">
-                <a:solidFill>
-                  <a:srgbClr val="1D1C1D"/>
-                </a:solidFill>
-                <a:effectLst/>
-                <a:latin typeface="Slack-Lato"/>
-              </a:rPr>
-              <a:t>These areas have the highest home value-to-income ratios, indicating least affordability:</a:t>
-            </a:r>
-            <a:br>
-              <a:rPr lang="en-US" sz="5000" b="0" i="0" dirty="0">
-                <a:solidFill>
-                  <a:srgbClr val="1D1C1D"/>
-                </a:solidFill>
-                <a:effectLst/>
-                <a:latin typeface="Slack-Lato"/>
-              </a:rPr>
-            </a:br>
-            <a:r>
-              <a:rPr lang="en-US" sz="5000" b="0" i="0" dirty="0">
-                <a:solidFill>
-                  <a:srgbClr val="1D1C1D"/>
-                </a:solidFill>
-                <a:effectLst/>
-                <a:latin typeface="Slack-Lato"/>
-              </a:rPr>
-              <a:t>Estacada, Clackamas – 7.39</a:t>
-            </a:r>
-            <a:br>
-              <a:rPr lang="en-US" b="0" i="0" dirty="0">
-                <a:solidFill>
-                  <a:srgbClr val="1D1C1D"/>
-                </a:solidFill>
-                <a:effectLst/>
-                <a:latin typeface="Slack-Lato"/>
-              </a:rPr>
-            </a:br>
-            <a:endParaRPr lang="en-US" b="0" i="0" dirty="0">
-              <a:solidFill>
-                <a:srgbClr val="1D1C1D"/>
-              </a:solidFill>
-              <a:effectLst/>
-              <a:latin typeface="Slack-Lato"/>
+            <a:endParaRPr lang="en-US" sz="1800" dirty="0">
+              <a:latin typeface="Times New Roman" panose="02020603050405020304" pitchFamily="18" charset="0"/>
+              <a:cs typeface="Times New Roman" panose="02020603050405020304" pitchFamily="18" charset="0"/>
             </a:endParaRPr>
           </a:p>
           <a:p>
-            <a:pPr algn="l"/>
-            <a:r>
-              <a:rPr lang="en-US" sz="5600" b="0" i="0" dirty="0">
-                <a:solidFill>
-                  <a:srgbClr val="1D1C1D"/>
-                </a:solidFill>
-                <a:effectLst/>
-                <a:latin typeface="Slack-Lato"/>
-              </a:rPr>
-              <a:t>Skyline, Multnomah – 7.66</a:t>
-            </a:r>
-            <a:br>
-              <a:rPr lang="en-US" sz="5600" b="0" i="0" dirty="0">
-                <a:solidFill>
-                  <a:srgbClr val="1D1C1D"/>
-                </a:solidFill>
-                <a:effectLst/>
-                <a:latin typeface="Slack-Lato"/>
-              </a:rPr>
-            </a:br>
-            <a:endParaRPr lang="en-US" sz="5600" b="0" i="0" dirty="0">
-              <a:solidFill>
-                <a:srgbClr val="1D1C1D"/>
-              </a:solidFill>
-              <a:effectLst/>
-              <a:latin typeface="Slack-Lato"/>
-            </a:endParaRPr>
-          </a:p>
-          <a:p>
-            <a:pPr algn="l"/>
-            <a:r>
-              <a:rPr lang="en-US" sz="5600" b="0" i="0" dirty="0">
-                <a:solidFill>
-                  <a:srgbClr val="1D1C1D"/>
-                </a:solidFill>
-                <a:effectLst/>
-                <a:latin typeface="Slack-Lato"/>
-              </a:rPr>
-              <a:t>Portland West, Multnomah – 6.96</a:t>
-            </a:r>
-            <a:br>
-              <a:rPr lang="en-US" sz="5600" b="0" i="0" dirty="0">
-                <a:solidFill>
-                  <a:srgbClr val="1D1C1D"/>
-                </a:solidFill>
-                <a:effectLst/>
-                <a:latin typeface="Slack-Lato"/>
-              </a:rPr>
-            </a:br>
-            <a:endParaRPr lang="en-US" sz="5600" b="0" i="0" dirty="0">
-              <a:solidFill>
-                <a:srgbClr val="1D1C1D"/>
-              </a:solidFill>
-              <a:effectLst/>
-              <a:latin typeface="Slack-Lato"/>
-            </a:endParaRPr>
-          </a:p>
-          <a:p>
-            <a:pPr algn="l"/>
-            <a:r>
-              <a:rPr lang="en-US" sz="5600" b="0" i="0" dirty="0">
-                <a:solidFill>
-                  <a:srgbClr val="1D1C1D"/>
-                </a:solidFill>
-                <a:effectLst/>
-                <a:latin typeface="Slack-Lato"/>
-              </a:rPr>
-              <a:t>Wilsonville, Clackamas – 7.05</a:t>
-            </a:r>
-            <a:br>
-              <a:rPr lang="en-US" sz="5600" b="0" i="0" dirty="0">
-                <a:solidFill>
-                  <a:srgbClr val="1D1C1D"/>
-                </a:solidFill>
-                <a:effectLst/>
-                <a:latin typeface="Slack-Lato"/>
-              </a:rPr>
-            </a:br>
-            <a:endParaRPr lang="en-US" sz="5600" b="0" i="0" dirty="0">
-              <a:solidFill>
-                <a:srgbClr val="1D1C1D"/>
-              </a:solidFill>
-              <a:effectLst/>
-              <a:latin typeface="Slack-Lato"/>
-            </a:endParaRPr>
-          </a:p>
-          <a:p>
-            <a:pPr algn="l"/>
-            <a:r>
-              <a:rPr lang="en-US" sz="5600" b="0" i="0" dirty="0">
-                <a:solidFill>
-                  <a:srgbClr val="1D1C1D"/>
-                </a:solidFill>
-                <a:effectLst/>
-                <a:latin typeface="Slack-Lato"/>
-              </a:rPr>
-              <a:t>Yoder, Clackamas – 6.55</a:t>
-            </a:r>
-            <a:br>
-              <a:rPr lang="en-US" b="0" i="0" dirty="0">
-                <a:solidFill>
-                  <a:srgbClr val="1D1C1D"/>
-                </a:solidFill>
-                <a:effectLst/>
-                <a:latin typeface="Slack-Lato"/>
-              </a:rPr>
-            </a:br>
-            <a:br>
-              <a:rPr lang="en-US" b="0" i="0" dirty="0">
-                <a:solidFill>
-                  <a:srgbClr val="1D1C1D"/>
-                </a:solidFill>
-                <a:effectLst/>
-                <a:latin typeface="Slack-Lato"/>
-              </a:rPr>
-            </a:br>
             <a:endParaRPr lang="en-US" dirty="0"/>
           </a:p>
         </p:txBody>
@@ -5584,14 +5922,52 @@
         </p:blipFill>
         <p:spPr>
           <a:xfrm>
-            <a:off x="952500" y="0"/>
-            <a:ext cx="10287000" cy="6858000"/>
+            <a:off x="1152111" y="0"/>
+            <a:ext cx="9887778" cy="6591852"/>
           </a:xfrm>
           <a:prstGeom prst="rect">
             <a:avLst/>
           </a:prstGeom>
         </p:spPr>
       </p:pic>
+      <p:sp>
+        <p:nvSpPr>
+          <p:cNvPr id="3" name="TextBox 2">
+            <a:extLst>
+              <a:ext uri="{FF2B5EF4-FFF2-40B4-BE49-F238E27FC236}">
+                <a16:creationId xmlns:a16="http://schemas.microsoft.com/office/drawing/2014/main" id="{747B9F2A-4158-0769-3816-0C35DE63A524}"/>
+              </a:ext>
+            </a:extLst>
+          </p:cNvPr>
+          <p:cNvSpPr txBox="1"/>
+          <p:nvPr/>
+        </p:nvSpPr>
+        <p:spPr>
+          <a:xfrm>
+            <a:off x="1729408" y="6468741"/>
+            <a:ext cx="6096000" cy="246221"/>
+          </a:xfrm>
+          <a:prstGeom prst="rect">
+            <a:avLst/>
+          </a:prstGeom>
+          <a:noFill/>
+        </p:spPr>
+        <p:txBody>
+          <a:bodyPr wrap="square">
+            <a:spAutoFit/>
+          </a:bodyPr>
+          <a:lstStyle/>
+          <a:p>
+            <a:r>
+              <a:rPr lang="en-US" sz="1000" dirty="0">
+                <a:latin typeface="Times New Roman" panose="02020603050405020304" pitchFamily="18" charset="0"/>
+                <a:cs typeface="Times New Roman" panose="02020603050405020304" pitchFamily="18" charset="0"/>
+              </a:rPr>
+              <a:t>Source: U.S. Department of Housing and Urban Development. (n.d.)</a:t>
+            </a:r>
+          </a:p>
+        </p:txBody>
+      </p:sp>
     </p:spTree>
     <p:extLst>
       <p:ext uri="{BB962C8B-B14F-4D97-AF65-F5344CB8AC3E}">
@@ -5643,7 +6019,13 @@
           <a:bodyPr/>
           <a:lstStyle/>
           <a:p>
-            <a:endParaRPr lang="en-US"/>
+            <a:r>
+              <a:rPr lang="en-US" dirty="0">
+                <a:latin typeface="Times New Roman" panose="02020603050405020304" pitchFamily="18" charset="0"/>
+                <a:cs typeface="Times New Roman" panose="02020603050405020304" pitchFamily="18" charset="0"/>
+              </a:rPr>
+              <a:t>Summary</a:t>
+            </a:r>
           </a:p>
         </p:txBody>
       </p:sp>
@@ -5663,12 +6045,31 @@
             <p:ph idx="1"/>
           </p:nvPr>
         </p:nvSpPr>
-        <p:spPr/>
-        <p:txBody>
-          <a:bodyPr/>
-          <a:lstStyle/>
-          <a:p>
-            <a:endParaRPr lang="en-US" dirty="0"/>
+        <p:spPr>
+          <a:xfrm>
+            <a:off x="838200" y="1487694"/>
+            <a:ext cx="10515600" cy="4946236"/>
+          </a:xfrm>
+        </p:spPr>
+        <p:txBody>
+          <a:bodyPr>
+            <a:noAutofit/>
+          </a:bodyPr>
+          <a:lstStyle/>
+          <a:p>
+            <a:pPr marL="0" indent="0">
+              <a:lnSpc>
+                <a:spcPct val="150000"/>
+              </a:lnSpc>
+              <a:buNone/>
+            </a:pPr>
+            <a:r>
+              <a:rPr lang="en-US" sz="2000" dirty="0">
+                <a:latin typeface="Times New Roman" panose="02020603050405020304" pitchFamily="18" charset="0"/>
+                <a:cs typeface="Times New Roman" panose="02020603050405020304" pitchFamily="18" charset="0"/>
+              </a:rPr>
+              <a:t>	Overall housing affordability in the Portland Metro Area has declined from 2019 to 2023. The data indicates that surging home values, higher mortgage rates relative, and escalating rents relative to incomes have worsened the issue.  The affordability crisis is further exacerbated by  limited housing supply, with strong demand has increasing market pressures.  Despite rents remaining an affordable alternative to home-ownership, . Income growth is being outpaced by increasing rental costs. The data shows a persistent downward trend in overall affordability, and without targeted interventions to address supply, income disparities, and market pressures, the affordability crisis impacting the Portland Metro area can be expected to continue.</a:t>
+            </a:r>
           </a:p>
         </p:txBody>
       </p:sp>
@@ -5676,6 +6077,313 @@
     <p:extLst>
       <p:ext uri="{BB962C8B-B14F-4D97-AF65-F5344CB8AC3E}">
         <p14:creationId xmlns:p14="http://schemas.microsoft.com/office/powerpoint/2010/main" val="2545084118"/>
+      </p:ext>
+    </p:extLst>
+  </p:cSld>
+  <p:clrMapOvr>
+    <a:masterClrMapping/>
+  </p:clrMapOvr>
+</p:sld>
+</file>
+
+<file path=ppt/slides/slide15.xml><?xml version="1.0" encoding="utf-8"?>
+<p:sld xmlns:a="http://schemas.openxmlformats.org/drawingml/2006/main" xmlns:r="http://schemas.openxmlformats.org/officeDocument/2006/relationships" xmlns:p="http://schemas.openxmlformats.org/presentationml/2006/main">
+  <p:cSld>
+    <p:spTree>
+      <p:nvGrpSpPr>
+        <p:cNvPr id="1" name=""/>
+        <p:cNvGrpSpPr/>
+        <p:nvPr/>
+      </p:nvGrpSpPr>
+      <p:grpSpPr>
+        <a:xfrm>
+          <a:off x="0" y="0"/>
+          <a:ext cx="0" cy="0"/>
+          <a:chOff x="0" y="0"/>
+          <a:chExt cx="0" cy="0"/>
+        </a:xfrm>
+      </p:grpSpPr>
+      <p:sp>
+        <p:nvSpPr>
+          <p:cNvPr id="2" name="Title 1">
+            <a:extLst>
+              <a:ext uri="{FF2B5EF4-FFF2-40B4-BE49-F238E27FC236}">
+                <a16:creationId xmlns:a16="http://schemas.microsoft.com/office/drawing/2014/main" id="{2FD25289-BFD9-A41D-AF34-750D9551A678}"/>
+              </a:ext>
+            </a:extLst>
+          </p:cNvPr>
+          <p:cNvSpPr>
+            <a:spLocks noGrp="1"/>
+          </p:cNvSpPr>
+          <p:nvPr>
+            <p:ph type="title"/>
+          </p:nvPr>
+        </p:nvSpPr>
+        <p:spPr/>
+        <p:txBody>
+          <a:bodyPr/>
+          <a:lstStyle/>
+          <a:p>
+            <a:r>
+              <a:rPr lang="en-US" dirty="0">
+                <a:latin typeface="Times New Roman" panose="02020603050405020304" pitchFamily="18" charset="0"/>
+                <a:cs typeface="Times New Roman" panose="02020603050405020304" pitchFamily="18" charset="0"/>
+              </a:rPr>
+              <a:t>Citations</a:t>
+            </a:r>
+          </a:p>
+        </p:txBody>
+      </p:sp>
+      <p:sp>
+        <p:nvSpPr>
+          <p:cNvPr id="3" name="Content Placeholder 2">
+            <a:extLst>
+              <a:ext uri="{FF2B5EF4-FFF2-40B4-BE49-F238E27FC236}">
+                <a16:creationId xmlns:a16="http://schemas.microsoft.com/office/drawing/2014/main" id="{7E29495C-D509-6942-1885-D7E60451AF44}"/>
+              </a:ext>
+            </a:extLst>
+          </p:cNvPr>
+          <p:cNvSpPr>
+            <a:spLocks noGrp="1"/>
+          </p:cNvSpPr>
+          <p:nvPr>
+            <p:ph idx="1"/>
+          </p:nvPr>
+        </p:nvSpPr>
+        <p:spPr>
+          <a:xfrm>
+            <a:off x="838200" y="1384852"/>
+            <a:ext cx="10515600" cy="4792111"/>
+          </a:xfrm>
+        </p:spPr>
+        <p:txBody>
+          <a:bodyPr>
+            <a:normAutofit/>
+          </a:bodyPr>
+          <a:lstStyle/>
+          <a:p>
+            <a:pPr marL="0" indent="0">
+              <a:lnSpc>
+                <a:spcPct val="150000"/>
+              </a:lnSpc>
+              <a:buNone/>
+            </a:pPr>
+            <a:r>
+              <a:rPr lang="en-US" sz="1800" b="0" i="0" dirty="0">
+                <a:solidFill>
+                  <a:srgbClr val="1D1C1D"/>
+                </a:solidFill>
+                <a:effectLst/>
+                <a:latin typeface="Times New Roman" panose="02020603050405020304" pitchFamily="18" charset="0"/>
+                <a:cs typeface="Times New Roman" panose="02020603050405020304" pitchFamily="18" charset="0"/>
+              </a:rPr>
+              <a:t>	Federal Reserve Bank of St. Louis. (n.d.). </a:t>
+            </a:r>
+            <a:r>
+              <a:rPr lang="en-US" sz="1800" b="0" i="1" dirty="0">
+                <a:solidFill>
+                  <a:srgbClr val="1D1C1D"/>
+                </a:solidFill>
+                <a:effectLst/>
+                <a:latin typeface="Times New Roman" panose="02020603050405020304" pitchFamily="18" charset="0"/>
+                <a:cs typeface="Times New Roman" panose="02020603050405020304" pitchFamily="18" charset="0"/>
+              </a:rPr>
+              <a:t>ALFRED: Archival Federal Reserve Economic Data</a:t>
+            </a:r>
+            <a:r>
+              <a:rPr lang="en-US" sz="1800" b="0" i="0" dirty="0">
+                <a:solidFill>
+                  <a:srgbClr val="1D1C1D"/>
+                </a:solidFill>
+                <a:effectLst/>
+                <a:latin typeface="Times New Roman" panose="02020603050405020304" pitchFamily="18" charset="0"/>
+                <a:cs typeface="Times New Roman" panose="02020603050405020304" pitchFamily="18" charset="0"/>
+              </a:rPr>
+              <a:t>. Retrieved February 4, 2025, from </a:t>
+            </a:r>
+            <a:r>
+              <a:rPr lang="en-US" sz="1800" b="0" i="0" u="none" strike="noStrike" dirty="0">
+                <a:effectLst/>
+                <a:latin typeface="Times New Roman" panose="02020603050405020304" pitchFamily="18" charset="0"/>
+                <a:cs typeface="Times New Roman" panose="02020603050405020304" pitchFamily="18" charset="0"/>
+                <a:hlinkClick r:id="rId2"/>
+              </a:rPr>
+              <a:t>https://alfred.stlouisfed.org/</a:t>
+            </a:r>
+            <a:endParaRPr lang="en-US" sz="1800" b="0" i="0" u="none" strike="noStrike" dirty="0">
+              <a:effectLst/>
+              <a:latin typeface="Times New Roman" panose="02020603050405020304" pitchFamily="18" charset="0"/>
+              <a:cs typeface="Times New Roman" panose="02020603050405020304" pitchFamily="18" charset="0"/>
+            </a:endParaRPr>
+          </a:p>
+          <a:p>
+            <a:pPr marL="0" indent="0">
+              <a:lnSpc>
+                <a:spcPct val="150000"/>
+              </a:lnSpc>
+              <a:buNone/>
+            </a:pPr>
+            <a:r>
+              <a:rPr lang="en-US" sz="1800" b="0" i="0" dirty="0">
+                <a:solidFill>
+                  <a:srgbClr val="1D1C1D"/>
+                </a:solidFill>
+                <a:effectLst/>
+                <a:latin typeface="Times New Roman" panose="02020603050405020304" pitchFamily="18" charset="0"/>
+                <a:cs typeface="Times New Roman" panose="02020603050405020304" pitchFamily="18" charset="0"/>
+              </a:rPr>
+              <a:t>	U.S. Census Bureau. (n.d.). </a:t>
+            </a:r>
+            <a:r>
+              <a:rPr lang="en-US" sz="1800" b="0" i="1" dirty="0">
+                <a:solidFill>
+                  <a:srgbClr val="1D1C1D"/>
+                </a:solidFill>
+                <a:effectLst/>
+                <a:latin typeface="Times New Roman" panose="02020603050405020304" pitchFamily="18" charset="0"/>
+                <a:cs typeface="Times New Roman" panose="02020603050405020304" pitchFamily="18" charset="0"/>
+              </a:rPr>
+              <a:t>United States Census Bureau</a:t>
+            </a:r>
+            <a:r>
+              <a:rPr lang="en-US" sz="1800" b="0" i="0" dirty="0">
+                <a:solidFill>
+                  <a:srgbClr val="1D1C1D"/>
+                </a:solidFill>
+                <a:effectLst/>
+                <a:latin typeface="Times New Roman" panose="02020603050405020304" pitchFamily="18" charset="0"/>
+                <a:cs typeface="Times New Roman" panose="02020603050405020304" pitchFamily="18" charset="0"/>
+              </a:rPr>
+              <a:t>. Retrieved February 4, 2025, from </a:t>
+            </a:r>
+            <a:r>
+              <a:rPr lang="en-US" sz="1800" b="0" i="0" u="none" strike="noStrike" dirty="0">
+                <a:effectLst/>
+                <a:latin typeface="Times New Roman" panose="02020603050405020304" pitchFamily="18" charset="0"/>
+                <a:cs typeface="Times New Roman" panose="02020603050405020304" pitchFamily="18" charset="0"/>
+                <a:hlinkClick r:id="rId3"/>
+              </a:rPr>
+              <a:t>https://www.census.gov/</a:t>
+            </a:r>
+            <a:endParaRPr lang="en-US" sz="1800" b="0" i="0" u="none" strike="noStrike" dirty="0">
+              <a:effectLst/>
+              <a:latin typeface="Times New Roman" panose="02020603050405020304" pitchFamily="18" charset="0"/>
+              <a:cs typeface="Times New Roman" panose="02020603050405020304" pitchFamily="18" charset="0"/>
+            </a:endParaRPr>
+          </a:p>
+          <a:p>
+            <a:pPr marL="0" indent="0">
+              <a:lnSpc>
+                <a:spcPct val="150000"/>
+              </a:lnSpc>
+              <a:buNone/>
+            </a:pPr>
+            <a:r>
+              <a:rPr lang="en-US" sz="1800" dirty="0">
+                <a:latin typeface="Times New Roman" panose="02020603050405020304" pitchFamily="18" charset="0"/>
+                <a:cs typeface="Times New Roman" panose="02020603050405020304" pitchFamily="18" charset="0"/>
+              </a:rPr>
+              <a:t>	U.S. Department of Housing and Urban Development. (n.d.). </a:t>
+            </a:r>
+            <a:r>
+              <a:rPr lang="en-US" sz="1800" i="1" dirty="0">
+                <a:latin typeface="Times New Roman" panose="02020603050405020304" pitchFamily="18" charset="0"/>
+                <a:cs typeface="Times New Roman" panose="02020603050405020304" pitchFamily="18" charset="0"/>
+              </a:rPr>
+              <a:t>U.S. Department of Housing and Urban Development (HUD)</a:t>
+            </a:r>
+            <a:r>
+              <a:rPr lang="en-US" sz="1800" dirty="0">
+                <a:latin typeface="Times New Roman" panose="02020603050405020304" pitchFamily="18" charset="0"/>
+                <a:cs typeface="Times New Roman" panose="02020603050405020304" pitchFamily="18" charset="0"/>
+              </a:rPr>
+              <a:t>. Retrieved February 4, 2025, from </a:t>
+            </a:r>
+            <a:r>
+              <a:rPr lang="en-US" sz="1800" dirty="0">
+                <a:latin typeface="Times New Roman" panose="02020603050405020304" pitchFamily="18" charset="0"/>
+                <a:cs typeface="Times New Roman" panose="02020603050405020304" pitchFamily="18" charset="0"/>
+                <a:hlinkClick r:id="rId4"/>
+              </a:rPr>
+              <a:t>https://www.hud.gov/</a:t>
+            </a:r>
+            <a:endParaRPr lang="en-US" sz="1800" dirty="0">
+              <a:latin typeface="Times New Roman" panose="02020603050405020304" pitchFamily="18" charset="0"/>
+              <a:cs typeface="Times New Roman" panose="02020603050405020304" pitchFamily="18" charset="0"/>
+            </a:endParaRPr>
+          </a:p>
+          <a:p>
+            <a:pPr marL="0" indent="0">
+              <a:lnSpc>
+                <a:spcPct val="150000"/>
+              </a:lnSpc>
+              <a:buNone/>
+            </a:pPr>
+            <a:r>
+              <a:rPr lang="en-US" sz="1800" b="0" i="0" dirty="0">
+                <a:solidFill>
+                  <a:srgbClr val="1D1C1D"/>
+                </a:solidFill>
+                <a:effectLst/>
+                <a:latin typeface="Times New Roman" panose="02020603050405020304" pitchFamily="18" charset="0"/>
+                <a:cs typeface="Times New Roman" panose="02020603050405020304" pitchFamily="18" charset="0"/>
+              </a:rPr>
+              <a:t>	Herbert, C. E., Hermann, A., &amp; McCue, D. (2018). </a:t>
+            </a:r>
+            <a:r>
+              <a:rPr lang="en-US" sz="1800" b="0" i="1" dirty="0">
+                <a:solidFill>
+                  <a:srgbClr val="1D1C1D"/>
+                </a:solidFill>
+                <a:effectLst/>
+                <a:latin typeface="Times New Roman" panose="02020603050405020304" pitchFamily="18" charset="0"/>
+                <a:cs typeface="Times New Roman" panose="02020603050405020304" pitchFamily="18" charset="0"/>
+              </a:rPr>
+              <a:t>Measuring housing affordability: Assessing the 30 percent of income standard</a:t>
+            </a:r>
+            <a:r>
+              <a:rPr lang="en-US" sz="1800" b="0" i="0" dirty="0">
+                <a:solidFill>
+                  <a:srgbClr val="1D1C1D"/>
+                </a:solidFill>
+                <a:effectLst/>
+                <a:latin typeface="Times New Roman" panose="02020603050405020304" pitchFamily="18" charset="0"/>
+                <a:cs typeface="Times New Roman" panose="02020603050405020304" pitchFamily="18" charset="0"/>
+              </a:rPr>
+              <a:t> (Working Paper). Joint Center for Housing Studies of Harvard University. </a:t>
+            </a:r>
+            <a:r>
+              <a:rPr lang="en-US" sz="1800" b="0" i="0" u="none" strike="noStrike" dirty="0">
+                <a:effectLst/>
+                <a:latin typeface="Times New Roman" panose="02020603050405020304" pitchFamily="18" charset="0"/>
+                <a:cs typeface="Times New Roman" panose="02020603050405020304" pitchFamily="18" charset="0"/>
+                <a:hlinkClick r:id="rId5"/>
+              </a:rPr>
+              <a:t>https://www.jchs.harvard.edu/sites/default/files/Harvard_JCHS_Herbert_Hermann_McCue_measuring_housing_affordability.pdf</a:t>
+            </a:r>
+            <a:endParaRPr lang="en-US" sz="1800" dirty="0">
+              <a:latin typeface="Times New Roman" panose="02020603050405020304" pitchFamily="18" charset="0"/>
+              <a:cs typeface="Times New Roman" panose="02020603050405020304" pitchFamily="18" charset="0"/>
+            </a:endParaRPr>
+          </a:p>
+          <a:p>
+            <a:pPr marL="0" indent="0">
+              <a:lnSpc>
+                <a:spcPct val="150000"/>
+              </a:lnSpc>
+              <a:buNone/>
+            </a:pPr>
+            <a:endParaRPr lang="en-US" sz="1800" dirty="0">
+              <a:latin typeface="Times New Roman" panose="02020603050405020304" pitchFamily="18" charset="0"/>
+              <a:cs typeface="Times New Roman" panose="02020603050405020304" pitchFamily="18" charset="0"/>
+            </a:endParaRPr>
+          </a:p>
+        </p:txBody>
+      </p:sp>
+    </p:spTree>
+    <p:extLst>
+      <p:ext uri="{BB962C8B-B14F-4D97-AF65-F5344CB8AC3E}">
+        <p14:creationId xmlns:p14="http://schemas.microsoft.com/office/powerpoint/2010/main" val="545706224"/>
       </p:ext>
     </p:extLst>
   </p:cSld>
@@ -5976,8 +6684,8 @@
         </p:blipFill>
         <p:spPr>
           <a:xfrm>
-            <a:off x="288726" y="354959"/>
-            <a:ext cx="6252823" cy="5915212"/>
+            <a:off x="-2" y="-1"/>
+            <a:ext cx="6919280" cy="6290867"/>
           </a:xfrm>
           <a:prstGeom prst="rect">
             <a:avLst/>
@@ -6134,43 +6842,117 @@
         </p:spPr>
         <p:txBody>
           <a:bodyPr>
-            <a:normAutofit/>
+            <a:noAutofit/>
           </a:bodyPr>
           <a:lstStyle/>
           <a:p>
             <a:pPr marL="0" indent="0">
+              <a:lnSpc>
+                <a:spcPct val="170000"/>
+              </a:lnSpc>
               <a:buNone/>
             </a:pPr>
             <a:r>
-              <a:rPr lang="en-US" sz="1600" dirty="0"/>
-              <a:t>This data shows that over the five year span from 2019-2023 the median home value in Clackamas, Washington, and Multnomah counties saw a significant increase.</a:t>
+              <a:rPr lang="en-US" sz="1400" dirty="0">
+                <a:latin typeface="Times New Roman" panose="02020603050405020304" pitchFamily="18" charset="0"/>
+                <a:cs typeface="Times New Roman" panose="02020603050405020304" pitchFamily="18" charset="0"/>
+              </a:rPr>
+              <a:t>This data shows that over the five-year span from 2019-2023 the median home value in Clackamas, Washington, and Multnomah counties saw a significant increase.</a:t>
             </a:r>
           </a:p>
           <a:p>
             <a:pPr marL="0" indent="0">
+              <a:lnSpc>
+                <a:spcPct val="170000"/>
+              </a:lnSpc>
               <a:buNone/>
             </a:pPr>
             <a:r>
-              <a:rPr lang="en-US" sz="1600" u="sng" dirty="0"/>
+              <a:rPr lang="en-US" sz="1400" u="sng" dirty="0">
+                <a:latin typeface="Times New Roman" panose="02020603050405020304" pitchFamily="18" charset="0"/>
+                <a:cs typeface="Times New Roman" panose="02020603050405020304" pitchFamily="18" charset="0"/>
+              </a:rPr>
               <a:t>Total Increases are as follows:</a:t>
             </a:r>
           </a:p>
           <a:p>
-            <a:r>
-              <a:rPr lang="en-US" sz="1600" dirty="0"/>
+            <a:pPr>
+              <a:lnSpc>
+                <a:spcPct val="170000"/>
+              </a:lnSpc>
+            </a:pPr>
+            <a:r>
+              <a:rPr lang="en-US" sz="1400" dirty="0">
+                <a:latin typeface="Times New Roman" panose="02020603050405020304" pitchFamily="18" charset="0"/>
+                <a:cs typeface="Times New Roman" panose="02020603050405020304" pitchFamily="18" charset="0"/>
+              </a:rPr>
               <a:t>Clackamas – 40.3%</a:t>
             </a:r>
           </a:p>
           <a:p>
-            <a:r>
-              <a:rPr lang="en-US" sz="1600" dirty="0"/>
+            <a:pPr>
+              <a:lnSpc>
+                <a:spcPct val="170000"/>
+              </a:lnSpc>
+            </a:pPr>
+            <a:r>
+              <a:rPr lang="en-US" sz="1400" dirty="0">
+                <a:latin typeface="Times New Roman" panose="02020603050405020304" pitchFamily="18" charset="0"/>
+                <a:cs typeface="Times New Roman" panose="02020603050405020304" pitchFamily="18" charset="0"/>
+              </a:rPr>
               <a:t>Washington – 38.7%</a:t>
             </a:r>
           </a:p>
           <a:p>
-            <a:r>
-              <a:rPr lang="en-US" sz="1600" dirty="0"/>
+            <a:pPr>
+              <a:lnSpc>
+                <a:spcPct val="170000"/>
+              </a:lnSpc>
+            </a:pPr>
+            <a:r>
+              <a:rPr lang="en-US" sz="1400" dirty="0">
+                <a:latin typeface="Times New Roman" panose="02020603050405020304" pitchFamily="18" charset="0"/>
+                <a:cs typeface="Times New Roman" panose="02020603050405020304" pitchFamily="18" charset="0"/>
+              </a:rPr>
               <a:t>Multnomah -  32.7%</a:t>
+            </a:r>
+          </a:p>
+        </p:txBody>
+      </p:sp>
+      <p:sp>
+        <p:nvSpPr>
+          <p:cNvPr id="2" name="TextBox 1">
+            <a:extLst>
+              <a:ext uri="{FF2B5EF4-FFF2-40B4-BE49-F238E27FC236}">
+                <a16:creationId xmlns:a16="http://schemas.microsoft.com/office/drawing/2014/main" id="{A856C457-C199-A123-2497-D34D9A8B3CFB}"/>
+              </a:ext>
+            </a:extLst>
+          </p:cNvPr>
+          <p:cNvSpPr txBox="1"/>
+          <p:nvPr/>
+        </p:nvSpPr>
+        <p:spPr>
+          <a:xfrm>
+            <a:off x="310233" y="5960379"/>
+            <a:ext cx="5466522" cy="246221"/>
+          </a:xfrm>
+          <a:prstGeom prst="rect">
+            <a:avLst/>
+          </a:prstGeom>
+          <a:noFill/>
+        </p:spPr>
+        <p:txBody>
+          <a:bodyPr wrap="square" rtlCol="0">
+            <a:spAutoFit/>
+          </a:bodyPr>
+          <a:lstStyle/>
+          <a:p>
+            <a:r>
+              <a:rPr lang="en-US" sz="1000" dirty="0">
+                <a:latin typeface="Times New Roman" panose="02020603050405020304" pitchFamily="18" charset="0"/>
+                <a:cs typeface="Times New Roman" panose="02020603050405020304" pitchFamily="18" charset="0"/>
+              </a:rPr>
+              <a:t>Source: USCensus.gov (n.d.)</a:t>
             </a:r>
           </a:p>
         </p:txBody>
@@ -6235,8 +7017,8 @@
         </p:blipFill>
         <p:spPr>
           <a:xfrm>
-            <a:off x="-9832" y="-1"/>
-            <a:ext cx="8504903" cy="6858001"/>
+            <a:off x="-9831" y="-1"/>
+            <a:ext cx="8246058" cy="6649279"/>
           </a:xfrm>
         </p:spPr>
       </p:pic>
@@ -6290,7 +7072,7 @@
         <p:spPr>
           <a:xfrm>
             <a:off x="7796980" y="1116584"/>
-            <a:ext cx="4395019" cy="3416320"/>
+            <a:ext cx="4395019" cy="4480073"/>
           </a:xfrm>
           <a:prstGeom prst="rect">
             <a:avLst/>
@@ -6303,134 +7085,224 @@
           </a:bodyPr>
           <a:lstStyle/>
           <a:p>
-            <a:r>
-              <a:rPr lang="en-US" b="1" i="0" dirty="0">
+            <a:pPr>
+              <a:lnSpc>
+                <a:spcPct val="150000"/>
+              </a:lnSpc>
+            </a:pPr>
+            <a:r>
+              <a:rPr lang="en-US" sz="1600" b="1" i="0" dirty="0">
                 <a:solidFill>
                   <a:srgbClr val="1D1C1D"/>
                 </a:solidFill>
                 <a:effectLst/>
-                <a:latin typeface="Slack-Lato"/>
+                <a:latin typeface="Times New Roman" panose="02020603050405020304" pitchFamily="18" charset="0"/>
+                <a:cs typeface="Times New Roman" panose="02020603050405020304" pitchFamily="18" charset="0"/>
               </a:rPr>
               <a:t>Highest Median Home Value (2023)</a:t>
             </a:r>
             <a:br>
-              <a:rPr lang="en-US" dirty="0"/>
+              <a:rPr lang="en-US" sz="1600" dirty="0">
+                <a:latin typeface="Times New Roman" panose="02020603050405020304" pitchFamily="18" charset="0"/>
+                <a:cs typeface="Times New Roman" panose="02020603050405020304" pitchFamily="18" charset="0"/>
+              </a:rPr>
             </a:br>
             <a:r>
-              <a:rPr lang="en-US" b="0" i="0" dirty="0">
+              <a:rPr lang="en-US" sz="1600" b="0" i="0" dirty="0">
                 <a:solidFill>
                   <a:srgbClr val="1D1C1D"/>
                 </a:solidFill>
                 <a:effectLst/>
-                <a:latin typeface="Slack-Lato"/>
+                <a:latin typeface="Times New Roman" panose="02020603050405020304" pitchFamily="18" charset="0"/>
+                <a:cs typeface="Times New Roman" panose="02020603050405020304" pitchFamily="18" charset="0"/>
               </a:rPr>
               <a:t>Skyline, Multnomah, Oregon – $780,100</a:t>
             </a:r>
             <a:br>
-              <a:rPr lang="en-US" dirty="0"/>
+              <a:rPr lang="en-US" sz="1600" dirty="0">
+                <a:latin typeface="Times New Roman" panose="02020603050405020304" pitchFamily="18" charset="0"/>
+                <a:cs typeface="Times New Roman" panose="02020603050405020304" pitchFamily="18" charset="0"/>
+              </a:rPr>
             </a:br>
             <a:r>
-              <a:rPr lang="en-US" b="0" i="0" dirty="0">
+              <a:rPr lang="en-US" sz="1600" b="0" i="0" dirty="0">
                 <a:solidFill>
                   <a:srgbClr val="1D1C1D"/>
                 </a:solidFill>
                 <a:effectLst/>
-                <a:latin typeface="Slack-Lato"/>
+                <a:latin typeface="Times New Roman" panose="02020603050405020304" pitchFamily="18" charset="0"/>
+                <a:cs typeface="Times New Roman" panose="02020603050405020304" pitchFamily="18" charset="0"/>
               </a:rPr>
               <a:t>Yoder, Clackamas, Oregon – $719,800</a:t>
             </a:r>
             <a:br>
-              <a:rPr lang="en-US" dirty="0"/>
+              <a:rPr lang="en-US" sz="1600" dirty="0">
+                <a:latin typeface="Times New Roman" panose="02020603050405020304" pitchFamily="18" charset="0"/>
+                <a:cs typeface="Times New Roman" panose="02020603050405020304" pitchFamily="18" charset="0"/>
+              </a:rPr>
             </a:br>
             <a:r>
-              <a:rPr lang="en-US" b="0" i="0" dirty="0">
+              <a:rPr lang="en-US" sz="1600" b="0" i="0" dirty="0">
                 <a:solidFill>
                   <a:srgbClr val="1D1C1D"/>
                 </a:solidFill>
                 <a:effectLst/>
-                <a:latin typeface="Slack-Lato"/>
+                <a:latin typeface="Times New Roman" panose="02020603050405020304" pitchFamily="18" charset="0"/>
+                <a:cs typeface="Times New Roman" panose="02020603050405020304" pitchFamily="18" charset="0"/>
               </a:rPr>
               <a:t>Portland West, Multnomah, Oregon – $694,000</a:t>
             </a:r>
             <a:br>
-              <a:rPr lang="en-US" dirty="0"/>
+              <a:rPr lang="en-US" sz="1600" dirty="0">
+                <a:latin typeface="Times New Roman" panose="02020603050405020304" pitchFamily="18" charset="0"/>
+                <a:cs typeface="Times New Roman" panose="02020603050405020304" pitchFamily="18" charset="0"/>
+              </a:rPr>
             </a:br>
             <a:r>
-              <a:rPr lang="en-US" b="0" i="0" dirty="0">
+              <a:rPr lang="en-US" sz="1600" b="0" i="0" dirty="0">
                 <a:solidFill>
                   <a:srgbClr val="1D1C1D"/>
                 </a:solidFill>
                 <a:effectLst/>
-                <a:latin typeface="Slack-Lato"/>
+                <a:latin typeface="Times New Roman" panose="02020603050405020304" pitchFamily="18" charset="0"/>
+                <a:cs typeface="Times New Roman" panose="02020603050405020304" pitchFamily="18" charset="0"/>
               </a:rPr>
               <a:t>Wilsonville, Clackamas, Oregon – $605,600</a:t>
             </a:r>
+          </a:p>
+          <a:p>
+            <a:pPr>
+              <a:lnSpc>
+                <a:spcPct val="150000"/>
+              </a:lnSpc>
+            </a:pPr>
             <a:br>
-              <a:rPr lang="en-US" dirty="0"/>
+              <a:rPr lang="en-US" sz="1600" dirty="0">
+                <a:latin typeface="Times New Roman" panose="02020603050405020304" pitchFamily="18" charset="0"/>
+                <a:cs typeface="Times New Roman" panose="02020603050405020304" pitchFamily="18" charset="0"/>
+              </a:rPr>
             </a:br>
             <a:r>
-              <a:rPr lang="en-US" b="1" i="0" dirty="0">
+              <a:rPr lang="en-US" sz="1600" b="1" i="0" dirty="0">
                 <a:solidFill>
                   <a:srgbClr val="1D1C1D"/>
                 </a:solidFill>
                 <a:effectLst/>
-                <a:latin typeface="Slack-Lato"/>
+                <a:latin typeface="Times New Roman" panose="02020603050405020304" pitchFamily="18" charset="0"/>
+                <a:cs typeface="Times New Roman" panose="02020603050405020304" pitchFamily="18" charset="0"/>
               </a:rPr>
               <a:t>Lowest Median Home Value (2023)</a:t>
             </a:r>
             <a:br>
-              <a:rPr lang="en-US" dirty="0"/>
+              <a:rPr lang="en-US" sz="1600" dirty="0">
+                <a:latin typeface="Times New Roman" panose="02020603050405020304" pitchFamily="18" charset="0"/>
+                <a:cs typeface="Times New Roman" panose="02020603050405020304" pitchFamily="18" charset="0"/>
+              </a:rPr>
             </a:br>
             <a:r>
-              <a:rPr lang="en-US" b="0" i="0" dirty="0">
+              <a:rPr lang="en-US" sz="1600" b="0" i="0" dirty="0">
                 <a:solidFill>
                   <a:srgbClr val="1D1C1D"/>
                 </a:solidFill>
                 <a:effectLst/>
-                <a:latin typeface="Slack-Lato"/>
+                <a:latin typeface="Times New Roman" panose="02020603050405020304" pitchFamily="18" charset="0"/>
+                <a:cs typeface="Times New Roman" panose="02020603050405020304" pitchFamily="18" charset="0"/>
               </a:rPr>
               <a:t>Gresham, Multnomah, Oregon – $438,300</a:t>
             </a:r>
             <a:br>
-              <a:rPr lang="en-US" dirty="0"/>
+              <a:rPr lang="en-US" sz="1600" dirty="0">
+                <a:latin typeface="Times New Roman" panose="02020603050405020304" pitchFamily="18" charset="0"/>
+                <a:cs typeface="Times New Roman" panose="02020603050405020304" pitchFamily="18" charset="0"/>
+              </a:rPr>
             </a:br>
             <a:r>
-              <a:rPr lang="en-US" b="0" i="0" dirty="0">
+              <a:rPr lang="en-US" sz="1600" b="0" i="0" dirty="0">
                 <a:solidFill>
                   <a:srgbClr val="1D1C1D"/>
                 </a:solidFill>
                 <a:effectLst/>
-                <a:latin typeface="Slack-Lato"/>
+                <a:latin typeface="Times New Roman" panose="02020603050405020304" pitchFamily="18" charset="0"/>
+                <a:cs typeface="Times New Roman" panose="02020603050405020304" pitchFamily="18" charset="0"/>
               </a:rPr>
               <a:t>Molalla, Clackamas, Oregon – $438,300</a:t>
             </a:r>
             <a:br>
-              <a:rPr lang="en-US" dirty="0"/>
+              <a:rPr lang="en-US" sz="1600" dirty="0">
+                <a:latin typeface="Times New Roman" panose="02020603050405020304" pitchFamily="18" charset="0"/>
+                <a:cs typeface="Times New Roman" panose="02020603050405020304" pitchFamily="18" charset="0"/>
+              </a:rPr>
             </a:br>
             <a:r>
-              <a:rPr lang="en-US" b="0" i="0" dirty="0">
+              <a:rPr lang="en-US" sz="1600" b="0" i="0" dirty="0">
                 <a:solidFill>
                   <a:srgbClr val="1D1C1D"/>
                 </a:solidFill>
                 <a:effectLst/>
-                <a:latin typeface="Slack-Lato"/>
+                <a:latin typeface="Times New Roman" panose="02020603050405020304" pitchFamily="18" charset="0"/>
+                <a:cs typeface="Times New Roman" panose="02020603050405020304" pitchFamily="18" charset="0"/>
               </a:rPr>
               <a:t>Forest Grove-Cornelius, Washington, Oregon – $457,200</a:t>
             </a:r>
             <a:br>
-              <a:rPr lang="en-US" dirty="0"/>
+              <a:rPr lang="en-US" sz="1600" dirty="0">
+                <a:latin typeface="Times New Roman" panose="02020603050405020304" pitchFamily="18" charset="0"/>
+                <a:cs typeface="Times New Roman" panose="02020603050405020304" pitchFamily="18" charset="0"/>
+              </a:rPr>
             </a:br>
             <a:r>
-              <a:rPr lang="en-US" b="0" i="0" dirty="0">
+              <a:rPr lang="en-US" sz="1600" b="0" i="0" dirty="0">
                 <a:solidFill>
                   <a:srgbClr val="1D1C1D"/>
                 </a:solidFill>
                 <a:effectLst/>
-                <a:latin typeface="Slack-Lato"/>
+                <a:latin typeface="Times New Roman" panose="02020603050405020304" pitchFamily="18" charset="0"/>
+                <a:cs typeface="Times New Roman" panose="02020603050405020304" pitchFamily="18" charset="0"/>
               </a:rPr>
               <a:t>Canby, Clackamas, Oregon – $484,700</a:t>
             </a:r>
-            <a:endParaRPr lang="en-US" dirty="0"/>
+            <a:endParaRPr lang="en-US" sz="1600" dirty="0">
+              <a:latin typeface="Times New Roman" panose="02020603050405020304" pitchFamily="18" charset="0"/>
+              <a:cs typeface="Times New Roman" panose="02020603050405020304" pitchFamily="18" charset="0"/>
+            </a:endParaRPr>
+          </a:p>
+        </p:txBody>
+      </p:sp>
+      <p:sp>
+        <p:nvSpPr>
+          <p:cNvPr id="6" name="TextBox 5">
+            <a:extLst>
+              <a:ext uri="{FF2B5EF4-FFF2-40B4-BE49-F238E27FC236}">
+                <a16:creationId xmlns:a16="http://schemas.microsoft.com/office/drawing/2014/main" id="{87C2F147-45C6-691F-9FEC-99FCBF16D52D}"/>
+              </a:ext>
+            </a:extLst>
+          </p:cNvPr>
+          <p:cNvSpPr txBox="1"/>
+          <p:nvPr/>
+        </p:nvSpPr>
+        <p:spPr>
+          <a:xfrm>
+            <a:off x="241960" y="6526167"/>
+            <a:ext cx="6099312" cy="246221"/>
+          </a:xfrm>
+          <a:prstGeom prst="rect">
+            <a:avLst/>
+          </a:prstGeom>
+          <a:noFill/>
+        </p:spPr>
+        <p:txBody>
+          <a:bodyPr wrap="square">
+            <a:spAutoFit/>
+          </a:bodyPr>
+          <a:lstStyle/>
+          <a:p>
+            <a:r>
+              <a:rPr lang="en-US" sz="1000" dirty="0">
+                <a:latin typeface="Times New Roman" panose="02020603050405020304" pitchFamily="18" charset="0"/>
+                <a:cs typeface="Times New Roman" panose="02020603050405020304" pitchFamily="18" charset="0"/>
+              </a:rPr>
+              <a:t>Source: U.S. Department of Housing and Urban Development. (n.d.)</a:t>
+            </a:r>
           </a:p>
         </p:txBody>
       </p:sp>
@@ -6493,14 +7365,21 @@
                   <a:srgbClr val="1D1C1D"/>
                 </a:solidFill>
                 <a:effectLst/>
-                <a:latin typeface="Slack-Lato"/>
+                <a:latin typeface="Times New Roman" panose="02020603050405020304" pitchFamily="18" charset="0"/>
+                <a:cs typeface="Times New Roman" panose="02020603050405020304" pitchFamily="18" charset="0"/>
               </a:rPr>
               <a:t>Did changes in housing inventory influence home values from 2019 to 2023?</a:t>
             </a:r>
             <a:br>
-              <a:rPr lang="en-US" dirty="0"/>
+              <a:rPr lang="en-US" dirty="0">
+                <a:latin typeface="Times New Roman" panose="02020603050405020304" pitchFamily="18" charset="0"/>
+                <a:cs typeface="Times New Roman" panose="02020603050405020304" pitchFamily="18" charset="0"/>
+              </a:rPr>
             </a:br>
-            <a:endParaRPr lang="en-US" dirty="0"/>
+            <a:endParaRPr lang="en-US" dirty="0">
+              <a:latin typeface="Times New Roman" panose="02020603050405020304" pitchFamily="18" charset="0"/>
+              <a:cs typeface="Times New Roman" panose="02020603050405020304" pitchFamily="18" charset="0"/>
+            </a:endParaRPr>
           </a:p>
         </p:txBody>
       </p:sp>
@@ -6525,13 +7404,19 @@
           <a:bodyPr/>
           <a:lstStyle/>
           <a:p>
+            <a:pPr>
+              <a:lnSpc>
+                <a:spcPct val="150000"/>
+              </a:lnSpc>
+            </a:pPr>
             <a:r>
               <a:rPr lang="en-US" b="1" i="0" dirty="0">
                 <a:solidFill>
                   <a:srgbClr val="1D1C1D"/>
                 </a:solidFill>
                 <a:effectLst/>
-                <a:latin typeface="Slack-Lato"/>
+                <a:latin typeface="Times New Roman" panose="02020603050405020304" pitchFamily="18" charset="0"/>
+                <a:cs typeface="Times New Roman" panose="02020603050405020304" pitchFamily="18" charset="0"/>
               </a:rPr>
               <a:t>Null Hypothesis:</a:t>
             </a:r>
@@ -6541,19 +7426,26 @@
                   <a:srgbClr val="1D1C1D"/>
                 </a:solidFill>
                 <a:effectLst/>
-                <a:latin typeface="Slack-Lato"/>
+                <a:latin typeface="Times New Roman" panose="02020603050405020304" pitchFamily="18" charset="0"/>
+                <a:cs typeface="Times New Roman" panose="02020603050405020304" pitchFamily="18" charset="0"/>
               </a:rPr>
               <a:t> Changes in housing inventory did not significantly influence median home values in Washington, Clackamas, and Multnomah Counties from 2019 to 2023.</a:t>
             </a:r>
           </a:p>
           <a:p>
+            <a:pPr>
+              <a:lnSpc>
+                <a:spcPct val="150000"/>
+              </a:lnSpc>
+            </a:pPr>
             <a:r>
               <a:rPr lang="en-US" b="1" i="0" dirty="0">
                 <a:solidFill>
                   <a:srgbClr val="1D1C1D"/>
                 </a:solidFill>
                 <a:effectLst/>
-                <a:latin typeface="Slack-Lato"/>
+                <a:latin typeface="Times New Roman" panose="02020603050405020304" pitchFamily="18" charset="0"/>
+                <a:cs typeface="Times New Roman" panose="02020603050405020304" pitchFamily="18" charset="0"/>
               </a:rPr>
               <a:t>Alternative Hypothesis:</a:t>
             </a:r>
@@ -6563,11 +7455,15 @@
                   <a:srgbClr val="1D1C1D"/>
                 </a:solidFill>
                 <a:effectLst/>
-                <a:latin typeface="Slack-Lato"/>
+                <a:latin typeface="Times New Roman" panose="02020603050405020304" pitchFamily="18" charset="0"/>
+                <a:cs typeface="Times New Roman" panose="02020603050405020304" pitchFamily="18" charset="0"/>
               </a:rPr>
               <a:t> Changes in housing inventory had a statistically significant influence on median home values in Washington, Clackamas, and Multnomah Counties from 2019 to 2023.</a:t>
             </a:r>
-            <a:endParaRPr lang="en-US" dirty="0"/>
+            <a:endParaRPr lang="en-US" dirty="0">
+              <a:latin typeface="Times New Roman" panose="02020603050405020304" pitchFamily="18" charset="0"/>
+              <a:cs typeface="Times New Roman" panose="02020603050405020304" pitchFamily="18" charset="0"/>
+            </a:endParaRPr>
           </a:p>
         </p:txBody>
       </p:sp>
@@ -6831,7 +7727,7 @@
         </p:blipFill>
         <p:spPr>
           <a:xfrm>
-            <a:off x="576244" y="650494"/>
+            <a:off x="457200" y="435948"/>
             <a:ext cx="5628018" cy="5324142"/>
           </a:xfrm>
           <a:prstGeom prst="rect">
@@ -6920,8 +7816,8 @@
         </p:nvSpPr>
         <p:spPr>
           <a:xfrm>
-            <a:off x="7239012" y="2031101"/>
-            <a:ext cx="4282984" cy="3511943"/>
+            <a:off x="7277786" y="1996599"/>
+            <a:ext cx="4457014" cy="3511943"/>
           </a:xfrm>
         </p:spPr>
         <p:txBody>
@@ -6931,55 +7827,80 @@
           <a:lstStyle/>
           <a:p>
             <a:pPr indent="-228600">
+              <a:lnSpc>
+                <a:spcPct val="160000"/>
+              </a:lnSpc>
               <a:buFont typeface="Arial" panose="020B0604020202020204" pitchFamily="34" charset="0"/>
               <a:buChar char="•"/>
             </a:pPr>
             <a:r>
-              <a:rPr lang="en-US" sz="1800" b="1" dirty="0">
+              <a:rPr lang="en-US" b="1" dirty="0">
                 <a:effectLst/>
+                <a:latin typeface="Times New Roman" panose="02020603050405020304" pitchFamily="18" charset="0"/>
+                <a:cs typeface="Times New Roman" panose="02020603050405020304" pitchFamily="18" charset="0"/>
               </a:rPr>
               <a:t>Significant correlation in Clackamas and Multnomah</a:t>
             </a:r>
             <a:r>
-              <a:rPr lang="en-US" sz="1800" b="0" dirty="0">
+              <a:rPr lang="en-US" b="0" dirty="0">
                 <a:effectLst/>
+                <a:latin typeface="Times New Roman" panose="02020603050405020304" pitchFamily="18" charset="0"/>
+                <a:cs typeface="Times New Roman" panose="02020603050405020304" pitchFamily="18" charset="0"/>
               </a:rPr>
               <a:t> → As inventory decreased, home values rose.</a:t>
             </a:r>
           </a:p>
           <a:p>
             <a:pPr indent="-228600">
+              <a:lnSpc>
+                <a:spcPct val="160000"/>
+              </a:lnSpc>
               <a:buFont typeface="Arial" panose="020B0604020202020204" pitchFamily="34" charset="0"/>
               <a:buChar char="•"/>
             </a:pPr>
-            <a:endParaRPr lang="en-US" sz="1800" b="0" dirty="0">
+            <a:endParaRPr lang="en-US" b="0" dirty="0">
               <a:effectLst/>
+              <a:latin typeface="Times New Roman" panose="02020603050405020304" pitchFamily="18" charset="0"/>
+              <a:cs typeface="Times New Roman" panose="02020603050405020304" pitchFamily="18" charset="0"/>
             </a:endParaRPr>
           </a:p>
           <a:p>
             <a:pPr indent="-228600">
+              <a:lnSpc>
+                <a:spcPct val="160000"/>
+              </a:lnSpc>
               <a:buFont typeface="Arial" panose="020B0604020202020204" pitchFamily="34" charset="0"/>
               <a:buChar char="•"/>
             </a:pPr>
             <a:r>
-              <a:rPr lang="en-US" sz="1800" b="1" dirty="0">
+              <a:rPr lang="en-US" b="1" dirty="0">
                 <a:effectLst/>
+                <a:latin typeface="Times New Roman" panose="02020603050405020304" pitchFamily="18" charset="0"/>
+                <a:cs typeface="Times New Roman" panose="02020603050405020304" pitchFamily="18" charset="0"/>
               </a:rPr>
               <a:t>Washington County had almost no relationship (R² = 0.0554)</a:t>
             </a:r>
             <a:r>
-              <a:rPr lang="en-US" sz="1800" b="0" dirty="0">
+              <a:rPr lang="en-US" b="0" dirty="0">
                 <a:effectLst/>
-              </a:rPr>
-              <a:t>, meaning inventory changes did not meaningfully impact home values there.</a:t>
+                <a:latin typeface="Times New Roman" panose="02020603050405020304" pitchFamily="18" charset="0"/>
+                <a:cs typeface="Times New Roman" panose="02020603050405020304" pitchFamily="18" charset="0"/>
+              </a:rPr>
+              <a:t>, meaning inventory changes did not meaningfully impact home values.</a:t>
             </a:r>
           </a:p>
           <a:p>
             <a:pPr indent="-228600">
+              <a:lnSpc>
+                <a:spcPct val="160000"/>
+              </a:lnSpc>
               <a:buFont typeface="Arial" panose="020B0604020202020204" pitchFamily="34" charset="0"/>
               <a:buChar char="•"/>
             </a:pPr>
-            <a:endParaRPr lang="en-US" sz="1800" dirty="0"/>
+            <a:endParaRPr lang="en-US" dirty="0">
+              <a:latin typeface="Times New Roman" panose="02020603050405020304" pitchFamily="18" charset="0"/>
+              <a:cs typeface="Times New Roman" panose="02020603050405020304" pitchFamily="18" charset="0"/>
+            </a:endParaRPr>
           </a:p>
         </p:txBody>
       </p:sp>
@@ -7046,6 +7967,45 @@
           </a:p>
         </p:txBody>
       </p:sp>
+      <p:sp>
+        <p:nvSpPr>
+          <p:cNvPr id="2" name="TextBox 1">
+            <a:extLst>
+              <a:ext uri="{FF2B5EF4-FFF2-40B4-BE49-F238E27FC236}">
+                <a16:creationId xmlns:a16="http://schemas.microsoft.com/office/drawing/2014/main" id="{26DE53E3-E51C-F995-3A85-4D0B10CD31CC}"/>
+              </a:ext>
+            </a:extLst>
+          </p:cNvPr>
+          <p:cNvSpPr txBox="1"/>
+          <p:nvPr/>
+        </p:nvSpPr>
+        <p:spPr>
+          <a:xfrm>
+            <a:off x="320059" y="5901933"/>
+            <a:ext cx="3239990" cy="246221"/>
+          </a:xfrm>
+          <a:prstGeom prst="rect">
+            <a:avLst/>
+          </a:prstGeom>
+          <a:noFill/>
+        </p:spPr>
+        <p:txBody>
+          <a:bodyPr wrap="none" rtlCol="0">
+            <a:spAutoFit/>
+          </a:bodyPr>
+          <a:lstStyle/>
+          <a:p>
+            <a:r>
+              <a:rPr lang="en-US" sz="1000" dirty="0">
+                <a:latin typeface="Times New Roman" panose="02020603050405020304" pitchFamily="18" charset="0"/>
+                <a:cs typeface="Times New Roman" panose="02020603050405020304" pitchFamily="18" charset="0"/>
+              </a:rPr>
+              <a:t>Sources: USCensus.gov (n.d.), Federal Reserve Bank (n.d.)</a:t>
+            </a:r>
+            <a:endParaRPr lang="en-US" sz="1000" dirty="0"/>
+          </a:p>
+        </p:txBody>
+      </p:sp>
     </p:spTree>
     <p:extLst>
       <p:ext uri="{BB962C8B-B14F-4D97-AF65-F5344CB8AC3E}">
@@ -7105,11 +8065,15 @@
                   <a:srgbClr val="1D1C1D"/>
                 </a:solidFill>
                 <a:effectLst/>
-                <a:latin typeface="Slack-Lato"/>
+                <a:latin typeface="Times New Roman" panose="02020603050405020304" pitchFamily="18" charset="0"/>
+                <a:cs typeface="Times New Roman" panose="02020603050405020304" pitchFamily="18" charset="0"/>
               </a:rPr>
               <a:t>Did changes in mortgage rates influence median home values from 2019 to 2023?</a:t>
             </a:r>
-            <a:endParaRPr lang="en-US" b="1" i="1" dirty="0"/>
+            <a:endParaRPr lang="en-US" b="1" i="1" dirty="0">
+              <a:latin typeface="Times New Roman" panose="02020603050405020304" pitchFamily="18" charset="0"/>
+              <a:cs typeface="Times New Roman" panose="02020603050405020304" pitchFamily="18" charset="0"/>
+            </a:endParaRPr>
           </a:p>
         </p:txBody>
       </p:sp>
@@ -7131,22 +8095,15 @@
         </p:nvSpPr>
         <p:spPr/>
         <p:txBody>
-          <a:bodyPr/>
+          <a:bodyPr>
+            <a:normAutofit/>
+          </a:bodyPr>
           <a:lstStyle/>
           <a:p>
             <a:pPr marL="0" indent="0">
-              <a:buNone/>
-            </a:pPr>
-            <a:endParaRPr lang="en-US" b="1" i="0" dirty="0">
-              <a:solidFill>
-                <a:srgbClr val="1D1C1D"/>
-              </a:solidFill>
-              <a:effectLst/>
-              <a:latin typeface="Slack-Lato"/>
-            </a:endParaRPr>
-          </a:p>
-          <a:p>
-            <a:pPr marL="0" indent="0">
+              <a:lnSpc>
+                <a:spcPct val="150000"/>
+              </a:lnSpc>
               <a:buNone/>
             </a:pPr>
             <a:r>
@@ -7155,7 +8112,8 @@
                   <a:srgbClr val="1D1C1D"/>
                 </a:solidFill>
                 <a:effectLst/>
-                <a:latin typeface="Slack-Lato"/>
+                <a:latin typeface="Times New Roman" panose="02020603050405020304" pitchFamily="18" charset="0"/>
+                <a:cs typeface="Times New Roman" panose="02020603050405020304" pitchFamily="18" charset="0"/>
               </a:rPr>
               <a:t>Null Hypothesis:</a:t>
             </a:r>
@@ -7165,45 +8123,29 @@
                   <a:srgbClr val="1D1C1D"/>
                 </a:solidFill>
                 <a:effectLst/>
-                <a:latin typeface="Slack-Lato"/>
+                <a:latin typeface="Times New Roman" panose="02020603050405020304" pitchFamily="18" charset="0"/>
+                <a:cs typeface="Times New Roman" panose="02020603050405020304" pitchFamily="18" charset="0"/>
               </a:rPr>
               <a:t> Changes in mortgage rates did not significantly influence median home values in Washington, Clackamas, and Multnomah Counties from 2019 to 2023.</a:t>
             </a:r>
+          </a:p>
+          <a:p>
+            <a:pPr marL="0" indent="0">
+              <a:lnSpc>
+                <a:spcPct val="150000"/>
+              </a:lnSpc>
+              <a:buNone/>
+            </a:pPr>
             <a:r>
               <a:rPr lang="en-US" b="1" i="0" dirty="0">
                 <a:solidFill>
                   <a:srgbClr val="1D1C1D"/>
                 </a:solidFill>
                 <a:effectLst/>
-                <a:latin typeface="Slack-Lato"/>
-              </a:rPr>
-              <a:t>Alternative </a:t>
-            </a:r>
-          </a:p>
-          <a:p>
-            <a:pPr marL="0" indent="0">
-              <a:buNone/>
-            </a:pPr>
-            <a:endParaRPr lang="en-US" b="1" dirty="0">
-              <a:solidFill>
-                <a:srgbClr val="1D1C1D"/>
-              </a:solidFill>
-              <a:latin typeface="Slack-Lato"/>
-            </a:endParaRPr>
-          </a:p>
-          <a:p>
-            <a:pPr marL="0" indent="0">
-              <a:buNone/>
-            </a:pPr>
-            <a:r>
-              <a:rPr lang="en-US" b="1" i="0" dirty="0">
-                <a:solidFill>
-                  <a:srgbClr val="1D1C1D"/>
-                </a:solidFill>
-                <a:effectLst/>
-                <a:latin typeface="Slack-Lato"/>
-              </a:rPr>
-              <a:t>Hypothesis: </a:t>
+                <a:latin typeface="Times New Roman" panose="02020603050405020304" pitchFamily="18" charset="0"/>
+                <a:cs typeface="Times New Roman" panose="02020603050405020304" pitchFamily="18" charset="0"/>
+              </a:rPr>
+              <a:t>Alternative Hypothesis: </a:t>
             </a:r>
             <a:r>
               <a:rPr lang="en-US" b="0" i="0" dirty="0">
@@ -7211,11 +8153,15 @@
                   <a:srgbClr val="1D1C1D"/>
                 </a:solidFill>
                 <a:effectLst/>
-                <a:latin typeface="Slack-Lato"/>
-              </a:rPr>
-              <a:t>Changes in mortgage rates had a statistically significant influence on median home values in Washington, Clackamas, and Multnomah Counties from 2019 to 202</a:t>
-            </a:r>
-            <a:endParaRPr lang="en-US" dirty="0"/>
+                <a:latin typeface="Times New Roman" panose="02020603050405020304" pitchFamily="18" charset="0"/>
+                <a:cs typeface="Times New Roman" panose="02020603050405020304" pitchFamily="18" charset="0"/>
+              </a:rPr>
+              <a:t>Changes in mortgage rates had a statistically significant influence on median home values in Washington, Clackamas, and Multnomah Counties from 2019 to 2023.</a:t>
+            </a:r>
+            <a:endParaRPr lang="en-US" dirty="0">
+              <a:latin typeface="Times New Roman" panose="02020603050405020304" pitchFamily="18" charset="0"/>
+              <a:cs typeface="Times New Roman" panose="02020603050405020304" pitchFamily="18" charset="0"/>
+            </a:endParaRPr>
           </a:p>
         </p:txBody>
       </p:sp>
@@ -7467,7 +8413,7 @@
           </p:nvPr>
         </p:nvPicPr>
         <p:blipFill>
-          <a:blip r:embed="rId2">
+          <a:blip r:embed="rId3">
             <a:extLst>
               <a:ext uri="{28A0092B-C50C-407E-A947-70E740481C1C}">
                 <a14:useLocalDpi xmlns:a14="http://schemas.microsoft.com/office/drawing/2010/main" val="0"/>
@@ -7480,7 +8426,7 @@
         </p:blipFill>
         <p:spPr>
           <a:xfrm>
-            <a:off x="874788" y="858525"/>
+            <a:off x="817110" y="731691"/>
             <a:ext cx="6949204" cy="5211906"/>
           </a:xfrm>
           <a:prstGeom prst="rect">
@@ -7566,7 +8512,7 @@
         <p:spPr>
           <a:xfrm>
             <a:off x="8912872" y="1238865"/>
-            <a:ext cx="2949678" cy="2862322"/>
+            <a:ext cx="2949678" cy="4197559"/>
           </a:xfrm>
           <a:prstGeom prst="rect">
             <a:avLst/>
@@ -7580,6 +8526,9 @@
           <a:lstStyle/>
           <a:p>
             <a:pPr marL="285750" indent="-285750">
+              <a:lnSpc>
+                <a:spcPct val="150000"/>
+              </a:lnSpc>
               <a:buFontTx/>
               <a:buChar char="-"/>
             </a:pPr>
@@ -7589,13 +8538,17 @@
                   <a:srgbClr val="1D1C1D"/>
                 </a:solidFill>
                 <a:effectLst/>
-                <a:latin typeface="Slack-Lato"/>
+                <a:latin typeface="Times New Roman" panose="02020603050405020304" pitchFamily="18" charset="0"/>
+                <a:cs typeface="Times New Roman" panose="02020603050405020304" pitchFamily="18" charset="0"/>
               </a:rPr>
               <a:t>There is a strong positive correlation (r &gt; 0.83) between mortgage rates and home values.</a:t>
             </a:r>
           </a:p>
           <a:p>
             <a:pPr marL="285750" indent="-285750">
+              <a:lnSpc>
+                <a:spcPct val="150000"/>
+              </a:lnSpc>
               <a:buFontTx/>
               <a:buChar char="-"/>
             </a:pPr>
@@ -7604,11 +8557,15 @@
                 <a:srgbClr val="1D1C1D"/>
               </a:solidFill>
               <a:effectLst/>
-              <a:latin typeface="Slack-Lato"/>
+              <a:latin typeface="Times New Roman" panose="02020603050405020304" pitchFamily="18" charset="0"/>
+              <a:cs typeface="Times New Roman" panose="02020603050405020304" pitchFamily="18" charset="0"/>
             </a:endParaRPr>
           </a:p>
           <a:p>
             <a:pPr marL="285750" indent="-285750">
+              <a:lnSpc>
+                <a:spcPct val="150000"/>
+              </a:lnSpc>
               <a:buFontTx/>
               <a:buChar char="-"/>
             </a:pPr>
@@ -7618,11 +8575,54 @@
                   <a:srgbClr val="1D1C1D"/>
                 </a:solidFill>
                 <a:effectLst/>
-                <a:latin typeface="Slack-Lato"/>
+                <a:latin typeface="Times New Roman" panose="02020603050405020304" pitchFamily="18" charset="0"/>
+                <a:cs typeface="Times New Roman" panose="02020603050405020304" pitchFamily="18" charset="0"/>
               </a:rPr>
               <a:t>High R² values (~70-75%) indicate that mortgage rates explain a significant portion of home price variation.</a:t>
             </a:r>
-            <a:endParaRPr lang="en-US" dirty="0"/>
+            <a:endParaRPr lang="en-US" dirty="0">
+              <a:latin typeface="Times New Roman" panose="02020603050405020304" pitchFamily="18" charset="0"/>
+              <a:cs typeface="Times New Roman" panose="02020603050405020304" pitchFamily="18" charset="0"/>
+            </a:endParaRPr>
+          </a:p>
+        </p:txBody>
+      </p:sp>
+      <p:sp>
+        <p:nvSpPr>
+          <p:cNvPr id="3" name="TextBox 2">
+            <a:extLst>
+              <a:ext uri="{FF2B5EF4-FFF2-40B4-BE49-F238E27FC236}">
+                <a16:creationId xmlns:a16="http://schemas.microsoft.com/office/drawing/2014/main" id="{99BC80E8-0E1E-3C6B-5307-3A3E959880EB}"/>
+              </a:ext>
+            </a:extLst>
+          </p:cNvPr>
+          <p:cNvSpPr txBox="1"/>
+          <p:nvPr/>
+        </p:nvSpPr>
+        <p:spPr>
+          <a:xfrm>
+            <a:off x="817110" y="6018426"/>
+            <a:ext cx="6096000" cy="246221"/>
+          </a:xfrm>
+          <a:prstGeom prst="rect">
+            <a:avLst/>
+          </a:prstGeom>
+          <a:noFill/>
+        </p:spPr>
+        <p:txBody>
+          <a:bodyPr wrap="square">
+            <a:spAutoFit/>
+          </a:bodyPr>
+          <a:lstStyle/>
+          <a:p>
+            <a:r>
+              <a:rPr lang="en-US" sz="1000" dirty="0">
+                <a:latin typeface="Times New Roman" panose="02020603050405020304" pitchFamily="18" charset="0"/>
+                <a:cs typeface="Times New Roman" panose="02020603050405020304" pitchFamily="18" charset="0"/>
+              </a:rPr>
+              <a:t>Sources: USCensus.gov (n.d.), Federal Reserve Bank (n.d.)</a:t>
+            </a:r>
+            <a:endParaRPr lang="en-US" sz="1000" dirty="0"/>
           </a:p>
         </p:txBody>
       </p:sp>
@@ -8083,8 +9083,8 @@
         </p:nvSpPr>
         <p:spPr>
           <a:xfrm>
-            <a:off x="9271819" y="1769806"/>
-            <a:ext cx="3168592" cy="923330"/>
+            <a:off x="8673213" y="687575"/>
+            <a:ext cx="3168592" cy="1289071"/>
           </a:xfrm>
           <a:prstGeom prst="rect">
             <a:avLst/>
@@ -8097,17 +9097,26 @@
           </a:bodyPr>
           <a:lstStyle/>
           <a:p>
+            <a:pPr>
+              <a:lnSpc>
+                <a:spcPct val="150000"/>
+              </a:lnSpc>
+            </a:pPr>
             <a:r>
               <a:rPr lang="en-US" b="0" i="0" dirty="0">
                 <a:solidFill>
                   <a:srgbClr val="1D1C1D"/>
                 </a:solidFill>
                 <a:effectLst/>
-                <a:latin typeface="Slack-Lato"/>
+                <a:latin typeface="Times New Roman" panose="02020603050405020304" pitchFamily="18" charset="0"/>
+                <a:cs typeface="Times New Roman" panose="02020603050405020304" pitchFamily="18" charset="0"/>
               </a:rPr>
               <a:t> Year over year percent increases based off previous year's rent.</a:t>
             </a:r>
-            <a:endParaRPr lang="en-US" dirty="0"/>
+            <a:endParaRPr lang="en-US" dirty="0">
+              <a:latin typeface="Times New Roman" panose="02020603050405020304" pitchFamily="18" charset="0"/>
+              <a:cs typeface="Times New Roman" panose="02020603050405020304" pitchFamily="18" charset="0"/>
+            </a:endParaRPr>
           </a:p>
         </p:txBody>
       </p:sp>
@@ -8141,11 +9150,50 @@
         </p:blipFill>
         <p:spPr>
           <a:xfrm>
-            <a:off x="0" y="0"/>
-            <a:ext cx="9271819" cy="6857365"/>
+            <a:off x="0" y="193104"/>
+            <a:ext cx="8673213" cy="6414641"/>
           </a:xfrm>
         </p:spPr>
       </p:pic>
+      <p:sp>
+        <p:nvSpPr>
+          <p:cNvPr id="4" name="TextBox 3">
+            <a:extLst>
+              <a:ext uri="{FF2B5EF4-FFF2-40B4-BE49-F238E27FC236}">
+                <a16:creationId xmlns:a16="http://schemas.microsoft.com/office/drawing/2014/main" id="{AA5124F4-3CFC-1077-2156-F46F337BD448}"/>
+              </a:ext>
+            </a:extLst>
+          </p:cNvPr>
+          <p:cNvSpPr txBox="1"/>
+          <p:nvPr/>
+        </p:nvSpPr>
+        <p:spPr>
+          <a:xfrm>
+            <a:off x="541442" y="6418675"/>
+            <a:ext cx="6096000" cy="246221"/>
+          </a:xfrm>
+          <a:prstGeom prst="rect">
+            <a:avLst/>
+          </a:prstGeom>
+          <a:noFill/>
+        </p:spPr>
+        <p:txBody>
+          <a:bodyPr wrap="square">
+            <a:spAutoFit/>
+          </a:bodyPr>
+          <a:lstStyle/>
+          <a:p>
+            <a:r>
+              <a:rPr lang="en-US" sz="1000" dirty="0">
+                <a:latin typeface="Times New Roman" panose="02020603050405020304" pitchFamily="18" charset="0"/>
+                <a:cs typeface="Times New Roman" panose="02020603050405020304" pitchFamily="18" charset="0"/>
+              </a:rPr>
+              <a:t>Sources: USCensus.gov (n.d.)</a:t>
+            </a:r>
+            <a:endParaRPr lang="en-US" sz="1000" dirty="0"/>
+          </a:p>
+        </p:txBody>
+      </p:sp>
     </p:spTree>
     <p:extLst>
       <p:ext uri="{BB962C8B-B14F-4D97-AF65-F5344CB8AC3E}">
@@ -8191,7 +9239,7 @@
           <p:nvPr/>
         </p:nvPicPr>
         <p:blipFill>
-          <a:blip r:embed="rId2">
+          <a:blip r:embed="rId3">
             <a:extLst>
               <a:ext uri="{28A0092B-C50C-407E-A947-70E740481C1C}">
                 <a14:useLocalDpi xmlns:a14="http://schemas.microsoft.com/office/drawing/2010/main" val="0"/>
@@ -8246,18 +9294,80 @@
                   <a:srgbClr val="1D1C1D"/>
                 </a:solidFill>
                 <a:effectLst/>
-                <a:latin typeface="Slack-Lato"/>
+                <a:latin typeface="Times New Roman" panose="02020603050405020304" pitchFamily="18" charset="0"/>
+                <a:cs typeface="Times New Roman" panose="02020603050405020304" pitchFamily="18" charset="0"/>
               </a:rPr>
               <a:t> Year over year percent increases in relation to Annual Median Household Income</a:t>
             </a:r>
             <a:r>
               <a:rPr lang="en-US" b="0" i="0" dirty="0">
                 <a:effectLst/>
-                <a:latin typeface="Slack-Lato"/>
+                <a:latin typeface="Times New Roman" panose="02020603050405020304" pitchFamily="18" charset="0"/>
+                <a:cs typeface="Times New Roman" panose="02020603050405020304" pitchFamily="18" charset="0"/>
               </a:rPr>
               <a:t> </a:t>
             </a:r>
-            <a:endParaRPr lang="en-US" dirty="0"/>
+            <a:endParaRPr lang="en-US" dirty="0">
+              <a:latin typeface="Times New Roman" panose="02020603050405020304" pitchFamily="18" charset="0"/>
+              <a:cs typeface="Times New Roman" panose="02020603050405020304" pitchFamily="18" charset="0"/>
+            </a:endParaRPr>
+          </a:p>
+        </p:txBody>
+      </p:sp>
+      <p:sp>
+        <p:nvSpPr>
+          <p:cNvPr id="2" name="TextBox 1">
+            <a:extLst>
+              <a:ext uri="{FF2B5EF4-FFF2-40B4-BE49-F238E27FC236}">
+                <a16:creationId xmlns:a16="http://schemas.microsoft.com/office/drawing/2014/main" id="{759DD15B-B3B9-86BF-055B-2011CF0A3E71}"/>
+              </a:ext>
+            </a:extLst>
+          </p:cNvPr>
+          <p:cNvSpPr txBox="1"/>
+          <p:nvPr/>
+        </p:nvSpPr>
+        <p:spPr>
+          <a:xfrm>
+            <a:off x="596348" y="6519438"/>
+            <a:ext cx="6964017" cy="246221"/>
+          </a:xfrm>
+          <a:prstGeom prst="rect">
+            <a:avLst/>
+          </a:prstGeom>
+          <a:noFill/>
+        </p:spPr>
+        <p:txBody>
+          <a:bodyPr wrap="square" rtlCol="0">
+            <a:spAutoFit/>
+          </a:bodyPr>
+          <a:lstStyle/>
+          <a:p>
+            <a:r>
+              <a:rPr lang="en-US" sz="1000" dirty="0">
+                <a:latin typeface="Times New Roman" panose="02020603050405020304" pitchFamily="18" charset="0"/>
+                <a:cs typeface="Times New Roman" panose="02020603050405020304" pitchFamily="18" charset="0"/>
+              </a:rPr>
+              <a:t>Sources: USCensus.gov (n.d.), </a:t>
+            </a:r>
+            <a:r>
+              <a:rPr lang="en-US" sz="1000" b="0" i="0" dirty="0">
+                <a:solidFill>
+                  <a:srgbClr val="1D1C1D"/>
+                </a:solidFill>
+                <a:effectLst/>
+                <a:latin typeface="Times New Roman" panose="02020603050405020304" pitchFamily="18" charset="0"/>
+                <a:cs typeface="Times New Roman" panose="02020603050405020304" pitchFamily="18" charset="0"/>
+              </a:rPr>
+              <a:t>Herbert, C. E., Hermann, A., &amp; McCue, D. (2018)</a:t>
+            </a:r>
+            <a:r>
+              <a:rPr lang="en-US" sz="1000" dirty="0">
+                <a:latin typeface="Times New Roman" panose="02020603050405020304" pitchFamily="18" charset="0"/>
+                <a:cs typeface="Times New Roman" panose="02020603050405020304" pitchFamily="18" charset="0"/>
+              </a:rPr>
+              <a:t> </a:t>
+            </a:r>
+            <a:endParaRPr lang="en-US" sz="1000" dirty="0"/>
           </a:p>
         </p:txBody>
       </p:sp>

</xml_diff>

<commit_message>
inserted my linegraph with correct colors
</commit_message>
<xml_diff>
--- a/Portland , Or Housing & Affordability.pptx
+++ b/Portland , Or Housing & Affordability.pptx
@@ -974,7 +974,7 @@
           <a:p>
             <a:fld id="{3B9ED087-320F-4C2A-A59E-822B1F4F7463}" type="datetimeFigureOut">
               <a:rPr lang="en-US" smtClean="0"/>
-              <a:t>2/4/2025</a:t>
+              <a:t>2/5/2025</a:t>
             </a:fld>
             <a:endParaRPr lang="en-US"/>
           </a:p>
@@ -1724,7 +1724,7 @@
           <a:p>
             <a:fld id="{084165EF-9FD6-4261-A9B2-8530B474D6B8}" type="datetimeFigureOut">
               <a:rPr lang="en-US" smtClean="0"/>
-              <a:t>2/4/2025</a:t>
+              <a:t>2/5/2025</a:t>
             </a:fld>
             <a:endParaRPr lang="en-US"/>
           </a:p>
@@ -1922,7 +1922,7 @@
           <a:p>
             <a:fld id="{084165EF-9FD6-4261-A9B2-8530B474D6B8}" type="datetimeFigureOut">
               <a:rPr lang="en-US" smtClean="0"/>
-              <a:t>2/4/2025</a:t>
+              <a:t>2/5/2025</a:t>
             </a:fld>
             <a:endParaRPr lang="en-US"/>
           </a:p>
@@ -2130,7 +2130,7 @@
           <a:p>
             <a:fld id="{084165EF-9FD6-4261-A9B2-8530B474D6B8}" type="datetimeFigureOut">
               <a:rPr lang="en-US" smtClean="0"/>
-              <a:t>2/4/2025</a:t>
+              <a:t>2/5/2025</a:t>
             </a:fld>
             <a:endParaRPr lang="en-US"/>
           </a:p>
@@ -2328,7 +2328,7 @@
           <a:p>
             <a:fld id="{084165EF-9FD6-4261-A9B2-8530B474D6B8}" type="datetimeFigureOut">
               <a:rPr lang="en-US" smtClean="0"/>
-              <a:t>2/4/2025</a:t>
+              <a:t>2/5/2025</a:t>
             </a:fld>
             <a:endParaRPr lang="en-US"/>
           </a:p>
@@ -2603,7 +2603,7 @@
           <a:p>
             <a:fld id="{084165EF-9FD6-4261-A9B2-8530B474D6B8}" type="datetimeFigureOut">
               <a:rPr lang="en-US" smtClean="0"/>
-              <a:t>2/4/2025</a:t>
+              <a:t>2/5/2025</a:t>
             </a:fld>
             <a:endParaRPr lang="en-US"/>
           </a:p>
@@ -2868,7 +2868,7 @@
           <a:p>
             <a:fld id="{084165EF-9FD6-4261-A9B2-8530B474D6B8}" type="datetimeFigureOut">
               <a:rPr lang="en-US" smtClean="0"/>
-              <a:t>2/4/2025</a:t>
+              <a:t>2/5/2025</a:t>
             </a:fld>
             <a:endParaRPr lang="en-US"/>
           </a:p>
@@ -3280,7 +3280,7 @@
           <a:p>
             <a:fld id="{084165EF-9FD6-4261-A9B2-8530B474D6B8}" type="datetimeFigureOut">
               <a:rPr lang="en-US" smtClean="0"/>
-              <a:t>2/4/2025</a:t>
+              <a:t>2/5/2025</a:t>
             </a:fld>
             <a:endParaRPr lang="en-US"/>
           </a:p>
@@ -3421,7 +3421,7 @@
           <a:p>
             <a:fld id="{084165EF-9FD6-4261-A9B2-8530B474D6B8}" type="datetimeFigureOut">
               <a:rPr lang="en-US" smtClean="0"/>
-              <a:t>2/4/2025</a:t>
+              <a:t>2/5/2025</a:t>
             </a:fld>
             <a:endParaRPr lang="en-US"/>
           </a:p>
@@ -3534,7 +3534,7 @@
           <a:p>
             <a:fld id="{084165EF-9FD6-4261-A9B2-8530B474D6B8}" type="datetimeFigureOut">
               <a:rPr lang="en-US" smtClean="0"/>
-              <a:t>2/4/2025</a:t>
+              <a:t>2/5/2025</a:t>
             </a:fld>
             <a:endParaRPr lang="en-US"/>
           </a:p>
@@ -3845,7 +3845,7 @@
           <a:p>
             <a:fld id="{084165EF-9FD6-4261-A9B2-8530B474D6B8}" type="datetimeFigureOut">
               <a:rPr lang="en-US" smtClean="0"/>
-              <a:t>2/4/2025</a:t>
+              <a:t>2/5/2025</a:t>
             </a:fld>
             <a:endParaRPr lang="en-US"/>
           </a:p>
@@ -4133,7 +4133,7 @@
           <a:p>
             <a:fld id="{084165EF-9FD6-4261-A9B2-8530B474D6B8}" type="datetimeFigureOut">
               <a:rPr lang="en-US" smtClean="0"/>
-              <a:t>2/4/2025</a:t>
+              <a:t>2/5/2025</a:t>
             </a:fld>
             <a:endParaRPr lang="en-US"/>
           </a:p>
@@ -4374,7 +4374,7 @@
           <a:p>
             <a:fld id="{084165EF-9FD6-4261-A9B2-8530B474D6B8}" type="datetimeFigureOut">
               <a:rPr lang="en-US" smtClean="0"/>
-              <a:t>2/4/2025</a:t>
+              <a:t>2/5/2025</a:t>
             </a:fld>
             <a:endParaRPr lang="en-US"/>
           </a:p>
@@ -9120,41 +9120,6 @@
           </a:p>
         </p:txBody>
       </p:sp>
-      <p:pic>
-        <p:nvPicPr>
-          <p:cNvPr id="8" name="Content Placeholder 7" descr="A graph of a number of people&#10;&#10;Description automatically generated with medium confidence">
-            <a:extLst>
-              <a:ext uri="{FF2B5EF4-FFF2-40B4-BE49-F238E27FC236}">
-                <a16:creationId xmlns:a16="http://schemas.microsoft.com/office/drawing/2014/main" id="{6E7615B2-4699-60F9-F26B-5DB17B495F4B}"/>
-              </a:ext>
-            </a:extLst>
-          </p:cNvPr>
-          <p:cNvPicPr>
-            <a:picLocks noGrp="1" noChangeAspect="1"/>
-          </p:cNvPicPr>
-          <p:nvPr>
-            <p:ph idx="1"/>
-          </p:nvPr>
-        </p:nvPicPr>
-        <p:blipFill>
-          <a:blip r:embed="rId2">
-            <a:extLst>
-              <a:ext uri="{28A0092B-C50C-407E-A947-70E740481C1C}">
-                <a14:useLocalDpi xmlns:a14="http://schemas.microsoft.com/office/drawing/2010/main" val="0"/>
-              </a:ext>
-            </a:extLst>
-          </a:blip>
-          <a:stretch>
-            <a:fillRect/>
-          </a:stretch>
-        </p:blipFill>
-        <p:spPr>
-          <a:xfrm>
-            <a:off x="0" y="193104"/>
-            <a:ext cx="8673213" cy="6414641"/>
-          </a:xfrm>
-        </p:spPr>
-      </p:pic>
       <p:sp>
         <p:nvSpPr>
           <p:cNvPr id="4" name="TextBox 3">
@@ -9194,6 +9159,41 @@
           </a:p>
         </p:txBody>
       </p:sp>
+      <p:pic>
+        <p:nvPicPr>
+          <p:cNvPr id="7" name="Content Placeholder 6" descr="A graph of a number of people&#10;&#10;Description automatically generated">
+            <a:extLst>
+              <a:ext uri="{FF2B5EF4-FFF2-40B4-BE49-F238E27FC236}">
+                <a16:creationId xmlns:a16="http://schemas.microsoft.com/office/drawing/2014/main" id="{1428325B-2199-DCDD-4F20-41780FFE0583}"/>
+              </a:ext>
+            </a:extLst>
+          </p:cNvPr>
+          <p:cNvPicPr>
+            <a:picLocks noGrp="1" noChangeAspect="1"/>
+          </p:cNvPicPr>
+          <p:nvPr>
+            <p:ph idx="1"/>
+          </p:nvPr>
+        </p:nvPicPr>
+        <p:blipFill>
+          <a:blip r:embed="rId2">
+            <a:extLst>
+              <a:ext uri="{28A0092B-C50C-407E-A947-70E740481C1C}">
+                <a14:useLocalDpi xmlns:a14="http://schemas.microsoft.com/office/drawing/2010/main" val="0"/>
+              </a:ext>
+            </a:extLst>
+          </a:blip>
+          <a:stretch>
+            <a:fillRect/>
+          </a:stretch>
+        </p:blipFill>
+        <p:spPr>
+          <a:xfrm>
+            <a:off x="0" y="313183"/>
+            <a:ext cx="8743082" cy="6017078"/>
+          </a:xfrm>
+        </p:spPr>
+      </p:pic>
     </p:spTree>
     <p:extLst>
       <p:ext uri="{BB962C8B-B14F-4D97-AF65-F5344CB8AC3E}">

</xml_diff>

<commit_message>
more final touches to ppt
</commit_message>
<xml_diff>
--- a/Portland , Or Housing & Affordability.pptx
+++ b/Portland , Or Housing & Affordability.pptx
@@ -4968,39 +4968,7 @@
                 <a:latin typeface="Times New Roman" panose="02020603050405020304" pitchFamily="18" charset="0"/>
                 <a:ea typeface="Aptos" panose="020B0004020202020204" pitchFamily="34" charset="0"/>
               </a:rPr>
-              <a:t>Group 2: Devin Brindle, </a:t>
-            </a:r>
-            <a:r>
-              <a:rPr lang="en-US" sz="1800" dirty="0" err="1">
-                <a:effectLst/>
-                <a:latin typeface="Times New Roman" panose="02020603050405020304" pitchFamily="18" charset="0"/>
-                <a:ea typeface="Aptos" panose="020B0004020202020204" pitchFamily="34" charset="0"/>
-              </a:rPr>
-              <a:t>Asres</a:t>
-            </a:r>
-            <a:r>
-              <a:rPr lang="en-US" sz="1800" dirty="0">
-                <a:effectLst/>
-                <a:latin typeface="Times New Roman" panose="02020603050405020304" pitchFamily="18" charset="0"/>
-                <a:ea typeface="Aptos" panose="020B0004020202020204" pitchFamily="34" charset="0"/>
-              </a:rPr>
-              <a:t> </a:t>
-            </a:r>
-            <a:r>
-              <a:rPr lang="en-US" sz="1800" dirty="0" err="1">
-                <a:effectLst/>
-                <a:latin typeface="Times New Roman" panose="02020603050405020304" pitchFamily="18" charset="0"/>
-                <a:ea typeface="Aptos" panose="020B0004020202020204" pitchFamily="34" charset="0"/>
-              </a:rPr>
-              <a:t>Dagnew</a:t>
-            </a:r>
-            <a:r>
-              <a:rPr lang="en-US" sz="1800" dirty="0">
-                <a:effectLst/>
-                <a:latin typeface="Times New Roman" panose="02020603050405020304" pitchFamily="18" charset="0"/>
-                <a:ea typeface="Aptos" panose="020B0004020202020204" pitchFamily="34" charset="0"/>
-              </a:rPr>
-              <a:t>, Iyer Megan, Forrest Margulies</a:t>
+              <a:t>Group 2: Devin Brindle, Asres Dagnew, Megan Iyer, Forrest Margulies</a:t>
             </a:r>
             <a:endParaRPr lang="en-US" dirty="0"/>
           </a:p>
@@ -5146,13 +5114,13 @@
         </p:nvSpPr>
         <p:spPr>
           <a:xfrm>
-            <a:off x="838200" y="556591"/>
-            <a:ext cx="10515600" cy="5620372"/>
+            <a:off x="838200" y="1327093"/>
+            <a:ext cx="10515600" cy="5222103"/>
           </a:xfrm>
         </p:spPr>
         <p:txBody>
           <a:bodyPr>
-            <a:normAutofit fontScale="85000" lnSpcReduction="20000"/>
+            <a:normAutofit/>
           </a:bodyPr>
           <a:lstStyle/>
           <a:p>
@@ -5162,7 +5130,7 @@
               </a:lnSpc>
             </a:pPr>
             <a:r>
-              <a:rPr lang="en-US" b="0" i="0" dirty="0">
+              <a:rPr lang="en-US" sz="2000" b="0" i="0" dirty="0">
                 <a:solidFill>
                   <a:srgbClr val="1D1C1D"/>
                 </a:solidFill>
@@ -5172,14 +5140,16 @@
               </a:rPr>
               <a:t>According to U.S. Department of Housing and Urban Development, the general rule of thumb for housing affordability based on the home value-to-income ratio is:</a:t>
             </a:r>
-            <a:br>
-              <a:rPr lang="en-US" dirty="0">
-                <a:latin typeface="Times New Roman" panose="02020603050405020304" pitchFamily="18" charset="0"/>
-                <a:cs typeface="Times New Roman" panose="02020603050405020304" pitchFamily="18" charset="0"/>
-              </a:rPr>
-            </a:br>
-            <a:r>
-              <a:rPr lang="en-US" b="1" i="0" dirty="0">
+          </a:p>
+          <a:p>
+            <a:pPr marL="0" indent="0">
+              <a:lnSpc>
+                <a:spcPct val="150000"/>
+              </a:lnSpc>
+              <a:buNone/>
+            </a:pPr>
+            <a:r>
+              <a:rPr lang="en-US" sz="3200" b="1" i="0" dirty="0">
                 <a:solidFill>
                   <a:srgbClr val="1D1C1D"/>
                 </a:solidFill>
@@ -5190,7 +5160,7 @@
               <a:t>Affordable: ≤ 3.0</a:t>
             </a:r>
             <a:r>
-              <a:rPr lang="en-US" b="0" i="0" dirty="0">
+              <a:rPr lang="en-US" sz="3200" b="0" i="0" dirty="0">
                 <a:solidFill>
                   <a:srgbClr val="1D1C1D"/>
                 </a:solidFill>
@@ -5198,16 +5168,24 @@
                 <a:latin typeface="Times New Roman" panose="02020603050405020304" pitchFamily="18" charset="0"/>
                 <a:cs typeface="Times New Roman" panose="02020603050405020304" pitchFamily="18" charset="0"/>
               </a:rPr>
-              <a:t> → The home price is three times or less than the household's annual income.</a:t>
-            </a:r>
+              <a:t> </a:t>
+            </a:r>
+          </a:p>
+          <a:p>
+            <a:pPr marL="0" indent="0">
+              <a:lnSpc>
+                <a:spcPct val="150000"/>
+              </a:lnSpc>
+              <a:buNone/>
+            </a:pPr>
             <a:br>
-              <a:rPr lang="en-US" dirty="0">
+              <a:rPr lang="en-US" sz="3200" dirty="0">
                 <a:latin typeface="Times New Roman" panose="02020603050405020304" pitchFamily="18" charset="0"/>
                 <a:cs typeface="Times New Roman" panose="02020603050405020304" pitchFamily="18" charset="0"/>
               </a:rPr>
             </a:br>
             <a:r>
-              <a:rPr lang="en-US" b="1" i="0" dirty="0">
+              <a:rPr lang="en-US" sz="3200" b="1" i="0" dirty="0">
                 <a:solidFill>
                   <a:srgbClr val="1D1C1D"/>
                 </a:solidFill>
@@ -5218,7 +5196,7 @@
               <a:t>Moderately Affordable: 3.1 </a:t>
             </a:r>
             <a:r>
-              <a:rPr lang="en-US" b="0" i="0" dirty="0">
+              <a:rPr lang="en-US" sz="3200" b="0" i="0" dirty="0">
                 <a:solidFill>
                   <a:srgbClr val="1D1C1D"/>
                 </a:solidFill>
@@ -5226,20 +5204,10 @@
                 <a:latin typeface="Times New Roman" panose="02020603050405020304" pitchFamily="18" charset="0"/>
                 <a:cs typeface="Times New Roman" panose="02020603050405020304" pitchFamily="18" charset="0"/>
               </a:rPr>
-              <a:t>- 5 → Still manageable</a:t>
-            </a:r>
-            <a:r>
-              <a:rPr lang="en-US" dirty="0">
-                <a:solidFill>
-                  <a:srgbClr val="1D1C1D"/>
-                </a:solidFill>
-                <a:latin typeface="Times New Roman" panose="02020603050405020304" pitchFamily="18" charset="0"/>
-                <a:cs typeface="Times New Roman" panose="02020603050405020304" pitchFamily="18" charset="0"/>
-              </a:rPr>
-              <a:t> </a:t>
-            </a:r>
-            <a:r>
-              <a:rPr lang="en-US" b="0" i="0" dirty="0">
+              <a:t>- </a:t>
+            </a:r>
+            <a:r>
+              <a:rPr lang="en-US" sz="3200" b="1" i="0" dirty="0">
                 <a:solidFill>
                   <a:srgbClr val="1D1C1D"/>
                 </a:solidFill>
@@ -5247,16 +5215,10 @@
                 <a:latin typeface="Times New Roman" panose="02020603050405020304" pitchFamily="18" charset="0"/>
                 <a:cs typeface="Times New Roman" panose="02020603050405020304" pitchFamily="18" charset="0"/>
               </a:rPr>
-              <a:t>but may require some financial adjustments.</a:t>
-            </a:r>
-            <a:br>
-              <a:rPr lang="en-US" dirty="0">
-                <a:latin typeface="Times New Roman" panose="02020603050405020304" pitchFamily="18" charset="0"/>
-                <a:cs typeface="Times New Roman" panose="02020603050405020304" pitchFamily="18" charset="0"/>
-              </a:rPr>
-            </a:br>
-            <a:r>
-              <a:rPr lang="en-US" b="1" i="0" dirty="0">
+              <a:t>5</a:t>
+            </a:r>
+            <a:r>
+              <a:rPr lang="en-US" sz="3200" b="0" i="0" dirty="0">
                 <a:solidFill>
                   <a:srgbClr val="1D1C1D"/>
                 </a:solidFill>
@@ -5264,10 +5226,24 @@
                 <a:latin typeface="Times New Roman" panose="02020603050405020304" pitchFamily="18" charset="0"/>
                 <a:cs typeface="Times New Roman" panose="02020603050405020304" pitchFamily="18" charset="0"/>
               </a:rPr>
-              <a:t>Severely Unaffordable: &gt; 5.0</a:t>
-            </a:r>
-            <a:r>
-              <a:rPr lang="en-US" b="0" i="0" dirty="0">
+              <a:t> </a:t>
+            </a:r>
+          </a:p>
+          <a:p>
+            <a:pPr marL="0" indent="0">
+              <a:lnSpc>
+                <a:spcPct val="150000"/>
+              </a:lnSpc>
+              <a:buNone/>
+            </a:pPr>
+            <a:br>
+              <a:rPr lang="en-US" sz="3200" dirty="0">
+                <a:latin typeface="Times New Roman" panose="02020603050405020304" pitchFamily="18" charset="0"/>
+                <a:cs typeface="Times New Roman" panose="02020603050405020304" pitchFamily="18" charset="0"/>
+              </a:rPr>
+            </a:br>
+            <a:r>
+              <a:rPr lang="en-US" sz="3200" b="1" i="0" dirty="0">
                 <a:solidFill>
                   <a:srgbClr val="1D1C1D"/>
                 </a:solidFill>
@@ -5275,12 +5251,61 @@
                 <a:latin typeface="Times New Roman" panose="02020603050405020304" pitchFamily="18" charset="0"/>
                 <a:cs typeface="Times New Roman" panose="02020603050405020304" pitchFamily="18" charset="0"/>
               </a:rPr>
-              <a:t> → Indicates significant housing affordability issues, where home prices are five times or more than annual income. Homeownership may require excessive debt, high mortgage payments, or compromises in other financial areas.</a:t>
-            </a:r>
-            <a:endParaRPr lang="en-US" dirty="0">
+              <a:t>Severely Unaffordable: &gt; 5.0</a:t>
+            </a:r>
+            <a:r>
+              <a:rPr lang="en-US" sz="3200" b="0" i="0" dirty="0">
+                <a:solidFill>
+                  <a:srgbClr val="1D1C1D"/>
+                </a:solidFill>
+                <a:effectLst/>
+                <a:latin typeface="Times New Roman" panose="02020603050405020304" pitchFamily="18" charset="0"/>
+                <a:cs typeface="Times New Roman" panose="02020603050405020304" pitchFamily="18" charset="0"/>
+              </a:rPr>
+              <a:t> </a:t>
+            </a:r>
+            <a:endParaRPr lang="en-US" sz="3200" dirty="0">
               <a:latin typeface="Times New Roman" panose="02020603050405020304" pitchFamily="18" charset="0"/>
               <a:cs typeface="Times New Roman" panose="02020603050405020304" pitchFamily="18" charset="0"/>
             </a:endParaRPr>
+          </a:p>
+        </p:txBody>
+      </p:sp>
+      <p:sp>
+        <p:nvSpPr>
+          <p:cNvPr id="2" name="TextBox 1">
+            <a:extLst>
+              <a:ext uri="{FF2B5EF4-FFF2-40B4-BE49-F238E27FC236}">
+                <a16:creationId xmlns:a16="http://schemas.microsoft.com/office/drawing/2014/main" id="{FDC0876C-EE6F-1755-7C4B-ABA3A413CA39}"/>
+              </a:ext>
+            </a:extLst>
+          </p:cNvPr>
+          <p:cNvSpPr txBox="1"/>
+          <p:nvPr/>
+        </p:nvSpPr>
+        <p:spPr>
+          <a:xfrm>
+            <a:off x="838200" y="219792"/>
+            <a:ext cx="8124404" cy="707886"/>
+          </a:xfrm>
+          <a:prstGeom prst="rect">
+            <a:avLst/>
+          </a:prstGeom>
+          <a:noFill/>
+        </p:spPr>
+        <p:txBody>
+          <a:bodyPr wrap="square" rtlCol="0">
+            <a:spAutoFit/>
+          </a:bodyPr>
+          <a:lstStyle/>
+          <a:p>
+            <a:r>
+              <a:rPr lang="en-US" sz="4000" b="1" dirty="0">
+                <a:latin typeface="Times New Roman" panose="02020603050405020304" pitchFamily="18" charset="0"/>
+                <a:cs typeface="Times New Roman" panose="02020603050405020304" pitchFamily="18" charset="0"/>
+              </a:rPr>
+              <a:t>Price to Income Ratio</a:t>
+            </a:r>
           </a:p>
         </p:txBody>
       </p:sp>
@@ -5435,7 +5460,7 @@
         </p:nvSpPr>
         <p:spPr>
           <a:xfrm>
-            <a:off x="766809" y="231912"/>
+            <a:off x="823959" y="231912"/>
             <a:ext cx="4593695" cy="6453809"/>
           </a:xfrm>
         </p:spPr>
@@ -6014,41 +6039,46 @@
             <p:ph type="title"/>
           </p:nvPr>
         </p:nvSpPr>
-        <p:spPr/>
-        <p:txBody>
-          <a:bodyPr/>
-          <a:lstStyle/>
-          <a:p>
-            <a:r>
-              <a:rPr lang="en-US" dirty="0">
-                <a:latin typeface="Times New Roman" panose="02020603050405020304" pitchFamily="18" charset="0"/>
-                <a:cs typeface="Times New Roman" panose="02020603050405020304" pitchFamily="18" charset="0"/>
-              </a:rPr>
-              <a:t>Summary</a:t>
-            </a:r>
-          </a:p>
-        </p:txBody>
-      </p:sp>
-      <p:sp>
-        <p:nvSpPr>
-          <p:cNvPr id="3" name="Content Placeholder 2">
-            <a:extLst>
-              <a:ext uri="{FF2B5EF4-FFF2-40B4-BE49-F238E27FC236}">
-                <a16:creationId xmlns:a16="http://schemas.microsoft.com/office/drawing/2014/main" id="{30489E4F-F7B7-47FB-A3FC-1B4BA5252C4A}"/>
-              </a:ext>
-            </a:extLst>
-          </p:cNvPr>
-          <p:cNvSpPr>
-            <a:spLocks noGrp="1"/>
-          </p:cNvSpPr>
-          <p:nvPr>
-            <p:ph idx="1"/>
-          </p:nvPr>
-        </p:nvSpPr>
         <p:spPr>
           <a:xfrm>
-            <a:off x="838200" y="1487694"/>
-            <a:ext cx="10515600" cy="4946236"/>
+            <a:off x="838200" y="0"/>
+            <a:ext cx="10515600" cy="1325563"/>
+          </a:xfrm>
+        </p:spPr>
+        <p:txBody>
+          <a:bodyPr/>
+          <a:lstStyle/>
+          <a:p>
+            <a:r>
+              <a:rPr lang="en-US" dirty="0">
+                <a:latin typeface="Times New Roman" panose="02020603050405020304" pitchFamily="18" charset="0"/>
+                <a:cs typeface="Times New Roman" panose="02020603050405020304" pitchFamily="18" charset="0"/>
+              </a:rPr>
+              <a:t>Summary</a:t>
+            </a:r>
+          </a:p>
+        </p:txBody>
+      </p:sp>
+      <p:sp>
+        <p:nvSpPr>
+          <p:cNvPr id="3" name="Content Placeholder 2">
+            <a:extLst>
+              <a:ext uri="{FF2B5EF4-FFF2-40B4-BE49-F238E27FC236}">
+                <a16:creationId xmlns:a16="http://schemas.microsoft.com/office/drawing/2014/main" id="{30489E4F-F7B7-47FB-A3FC-1B4BA5252C4A}"/>
+              </a:ext>
+            </a:extLst>
+          </p:cNvPr>
+          <p:cNvSpPr>
+            <a:spLocks noGrp="1"/>
+          </p:cNvSpPr>
+          <p:nvPr>
+            <p:ph idx="1"/>
+          </p:nvPr>
+        </p:nvSpPr>
+        <p:spPr>
+          <a:xfrm>
+            <a:off x="838200" y="1065124"/>
+            <a:ext cx="10515600" cy="5792876"/>
           </a:xfrm>
         </p:spPr>
         <p:txBody>
@@ -6056,6 +6086,76 @@
             <a:noAutofit/>
           </a:bodyPr>
           <a:lstStyle/>
+          <a:p>
+            <a:pPr>
+              <a:lnSpc>
+                <a:spcPct val="150000"/>
+              </a:lnSpc>
+            </a:pPr>
+            <a:r>
+              <a:rPr lang="en-US" sz="2400" dirty="0">
+                <a:latin typeface="Times New Roman" panose="02020603050405020304" pitchFamily="18" charset="0"/>
+                <a:cs typeface="Times New Roman" panose="02020603050405020304" pitchFamily="18" charset="0"/>
+              </a:rPr>
+              <a:t>Higher mortgage rates and low supply have led to increased home values.</a:t>
+            </a:r>
+          </a:p>
+          <a:p>
+            <a:pPr>
+              <a:lnSpc>
+                <a:spcPct val="150000"/>
+              </a:lnSpc>
+            </a:pPr>
+            <a:r>
+              <a:rPr lang="en-US" sz="2400" dirty="0">
+                <a:latin typeface="Times New Roman" panose="02020603050405020304" pitchFamily="18" charset="0"/>
+                <a:cs typeface="Times New Roman" panose="02020603050405020304" pitchFamily="18" charset="0"/>
+              </a:rPr>
+              <a:t>Despite rents remaining an affordable alternative to home-ownership.</a:t>
+            </a:r>
+          </a:p>
+          <a:p>
+            <a:pPr>
+              <a:lnSpc>
+                <a:spcPct val="150000"/>
+              </a:lnSpc>
+            </a:pPr>
+            <a:r>
+              <a:rPr lang="en-US" sz="2400" dirty="0">
+                <a:latin typeface="Times New Roman" panose="02020603050405020304" pitchFamily="18" charset="0"/>
+                <a:cs typeface="Times New Roman" panose="02020603050405020304" pitchFamily="18" charset="0"/>
+              </a:rPr>
+              <a:t>Trends indicate income growth is being outpaced by increasing rental costs.</a:t>
+            </a:r>
+          </a:p>
+          <a:p>
+            <a:pPr>
+              <a:lnSpc>
+                <a:spcPct val="150000"/>
+              </a:lnSpc>
+            </a:pPr>
+            <a:r>
+              <a:rPr lang="en-US" sz="2400" dirty="0">
+                <a:latin typeface="Times New Roman" panose="02020603050405020304" pitchFamily="18" charset="0"/>
+                <a:cs typeface="Times New Roman" panose="02020603050405020304" pitchFamily="18" charset="0"/>
+              </a:rPr>
+              <a:t>In 2023, Sandy, Clackamas is the most affordable neighborhood to purchase in.</a:t>
+            </a:r>
+          </a:p>
+          <a:p>
+            <a:pPr>
+              <a:lnSpc>
+                <a:spcPct val="150000"/>
+              </a:lnSpc>
+            </a:pPr>
+            <a:r>
+              <a:rPr lang="en-US" sz="2400" dirty="0">
+                <a:latin typeface="Times New Roman" panose="02020603050405020304" pitchFamily="18" charset="0"/>
+                <a:cs typeface="Times New Roman" panose="02020603050405020304" pitchFamily="18" charset="0"/>
+              </a:rPr>
+              <a:t>Overall housing affordability in the Portland Metro Area has declined from 2019 to 2023.</a:t>
+            </a:r>
+          </a:p>
           <a:p>
             <a:pPr marL="0" indent="0">
               <a:lnSpc>
@@ -6063,13 +6163,10 @@
               </a:lnSpc>
               <a:buNone/>
             </a:pPr>
-            <a:r>
-              <a:rPr lang="en-US" sz="2000" dirty="0">
-                <a:latin typeface="Times New Roman" panose="02020603050405020304" pitchFamily="18" charset="0"/>
-                <a:cs typeface="Times New Roman" panose="02020603050405020304" pitchFamily="18" charset="0"/>
-              </a:rPr>
-              <a:t>	Overall housing affordability in the Portland Metro Area has declined from 2019 to 2023. The data indicates that surging home values, higher mortgage rates relative, and escalating rents relative to incomes have worsened the issue.  The affordability crisis is further exacerbated by  limited housing supply, with strong demand has increasing market pressures.  Despite rents remaining an affordable alternative to home-ownership, . Income growth is being outpaced by increasing rental costs. The data shows a persistent downward trend in overall affordability, and without targeted interventions to address supply, income disparities, and market pressures, the affordability crisis impacting the Portland Metro area can be expected to continue.</a:t>
-            </a:r>
+            <a:endParaRPr lang="en-US" sz="2000" dirty="0">
+              <a:latin typeface="Times New Roman" panose="02020603050405020304" pitchFamily="18" charset="0"/>
+              <a:cs typeface="Times New Roman" panose="02020603050405020304" pitchFamily="18" charset="0"/>
+            </a:endParaRPr>
           </a:p>
         </p:txBody>
       </p:sp>
@@ -7352,7 +7449,12 @@
             <p:ph type="title"/>
           </p:nvPr>
         </p:nvSpPr>
-        <p:spPr/>
+        <p:spPr>
+          <a:xfrm>
+            <a:off x="838200" y="500062"/>
+            <a:ext cx="10515600" cy="1325563"/>
+          </a:xfrm>
+        </p:spPr>
         <p:txBody>
           <a:bodyPr>
             <a:normAutofit fontScale="90000"/>
@@ -7360,7 +7462,7 @@
           <a:lstStyle/>
           <a:p>
             <a:r>
-              <a:rPr lang="en-US" b="1" i="1" dirty="0">
+              <a:rPr lang="en-US" b="1" dirty="0">
                 <a:solidFill>
                   <a:srgbClr val="1D1C1D"/>
                 </a:solidFill>
@@ -7722,13 +7824,13 @@
               </a:ext>
             </a:extLst>
           </a:blip>
-          <a:srcRect l="8117" r="12601" b="-1"/>
+          <a:srcRect l="377" t="78" r="283" b="-1"/>
           <a:stretch/>
         </p:blipFill>
         <p:spPr>
           <a:xfrm>
-            <a:off x="457200" y="435948"/>
-            <a:ext cx="5628018" cy="5324142"/>
+            <a:off x="-1" y="329415"/>
+            <a:ext cx="7218094" cy="5310182"/>
           </a:xfrm>
           <a:prstGeom prst="rect">
             <a:avLst/>
@@ -8060,7 +8162,7 @@
           <a:lstStyle/>
           <a:p>
             <a:r>
-              <a:rPr lang="en-US" b="1" i="1" dirty="0">
+              <a:rPr lang="en-US" b="1" dirty="0">
                 <a:solidFill>
                   <a:srgbClr val="1D1C1D"/>
                 </a:solidFill>
@@ -8070,7 +8172,7 @@
               </a:rPr>
               <a:t>Did changes in mortgage rates influence median home values from 2019 to 2023?</a:t>
             </a:r>
-            <a:endParaRPr lang="en-US" b="1" i="1" dirty="0">
+            <a:endParaRPr lang="en-US" b="1" dirty="0">
               <a:latin typeface="Times New Roman" panose="02020603050405020304" pitchFamily="18" charset="0"/>
               <a:cs typeface="Times New Roman" panose="02020603050405020304" pitchFamily="18" charset="0"/>
             </a:endParaRPr>
@@ -8426,8 +8528,8 @@
         </p:blipFill>
         <p:spPr>
           <a:xfrm>
-            <a:off x="817110" y="731691"/>
-            <a:ext cx="6949204" cy="5211906"/>
+            <a:off x="817109" y="267888"/>
+            <a:ext cx="7567607" cy="5675709"/>
           </a:xfrm>
           <a:prstGeom prst="rect">
             <a:avLst/>
@@ -9071,10 +9173,10 @@
       </p:sp>
       <p:sp>
         <p:nvSpPr>
-          <p:cNvPr id="3" name="TextBox 2">
-            <a:extLst>
-              <a:ext uri="{FF2B5EF4-FFF2-40B4-BE49-F238E27FC236}">
-                <a16:creationId xmlns:a16="http://schemas.microsoft.com/office/drawing/2014/main" id="{DF42CABA-238A-7DD6-06E6-929C3E195D18}"/>
+          <p:cNvPr id="4" name="TextBox 3">
+            <a:extLst>
+              <a:ext uri="{FF2B5EF4-FFF2-40B4-BE49-F238E27FC236}">
+                <a16:creationId xmlns:a16="http://schemas.microsoft.com/office/drawing/2014/main" id="{AA5124F4-3CFC-1077-2156-F46F337BD448}"/>
               </a:ext>
             </a:extLst>
           </p:cNvPr>
@@ -9083,58 +9185,7 @@
         </p:nvSpPr>
         <p:spPr>
           <a:xfrm>
-            <a:off x="8673213" y="687575"/>
-            <a:ext cx="3168592" cy="1289071"/>
-          </a:xfrm>
-          <a:prstGeom prst="rect">
-            <a:avLst/>
-          </a:prstGeom>
-          <a:noFill/>
-        </p:spPr>
-        <p:txBody>
-          <a:bodyPr wrap="square" rtlCol="0">
-            <a:spAutoFit/>
-          </a:bodyPr>
-          <a:lstStyle/>
-          <a:p>
-            <a:pPr>
-              <a:lnSpc>
-                <a:spcPct val="150000"/>
-              </a:lnSpc>
-            </a:pPr>
-            <a:r>
-              <a:rPr lang="en-US" b="0" i="0" dirty="0">
-                <a:solidFill>
-                  <a:srgbClr val="1D1C1D"/>
-                </a:solidFill>
-                <a:effectLst/>
-                <a:latin typeface="Times New Roman" panose="02020603050405020304" pitchFamily="18" charset="0"/>
-                <a:cs typeface="Times New Roman" panose="02020603050405020304" pitchFamily="18" charset="0"/>
-              </a:rPr>
-              <a:t> Year over year percent increases based off previous year's rent.</a:t>
-            </a:r>
-            <a:endParaRPr lang="en-US" dirty="0">
-              <a:latin typeface="Times New Roman" panose="02020603050405020304" pitchFamily="18" charset="0"/>
-              <a:cs typeface="Times New Roman" panose="02020603050405020304" pitchFamily="18" charset="0"/>
-            </a:endParaRPr>
-          </a:p>
-        </p:txBody>
-      </p:sp>
-      <p:sp>
-        <p:nvSpPr>
-          <p:cNvPr id="4" name="TextBox 3">
-            <a:extLst>
-              <a:ext uri="{FF2B5EF4-FFF2-40B4-BE49-F238E27FC236}">
-                <a16:creationId xmlns:a16="http://schemas.microsoft.com/office/drawing/2014/main" id="{AA5124F4-3CFC-1077-2156-F46F337BD448}"/>
-              </a:ext>
-            </a:extLst>
-          </p:cNvPr>
-          <p:cNvSpPr txBox="1"/>
-          <p:nvPr/>
-        </p:nvSpPr>
-        <p:spPr>
-          <a:xfrm>
-            <a:off x="541442" y="6418675"/>
+            <a:off x="1371840" y="6386943"/>
             <a:ext cx="6096000" cy="246221"/>
           </a:xfrm>
           <a:prstGeom prst="rect">
@@ -9189,7 +9240,7 @@
         </p:blipFill>
         <p:spPr>
           <a:xfrm>
-            <a:off x="0" y="313183"/>
+            <a:off x="1371840" y="313183"/>
             <a:ext cx="8743082" cy="6017078"/>
           </a:xfrm>
         </p:spPr>

</xml_diff>